<commit_message>
added finding demand images
</commit_message>
<xml_diff>
--- a/Slides/graph-creator.pptx
+++ b/Slides/graph-creator.pptx
@@ -30,6 +30,9 @@
     <p:sldId id="277" r:id="rId24"/>
     <p:sldId id="278" r:id="rId25"/>
     <p:sldId id="280" r:id="rId26"/>
+    <p:sldId id="281" r:id="rId27"/>
+    <p:sldId id="282" r:id="rId28"/>
+    <p:sldId id="283" r:id="rId29"/>
   </p:sldIdLst>
   <p:sldSz cx="12192000" cy="6858000"/>
   <p:notesSz cx="6858000" cy="9144000"/>
@@ -283,7 +286,7 @@
           <a:p>
             <a:fld id="{7F9C3969-815D-4313-AD47-20854D5F097C}" type="datetimeFigureOut">
               <a:rPr lang="en-US" smtClean="0"/>
-              <a:t>9/29/2024</a:t>
+              <a:t>10/5/2024</a:t>
             </a:fld>
             <a:endParaRPr lang="en-US"/>
           </a:p>
@@ -481,7 +484,7 @@
           <a:p>
             <a:fld id="{7F9C3969-815D-4313-AD47-20854D5F097C}" type="datetimeFigureOut">
               <a:rPr lang="en-US" smtClean="0"/>
-              <a:t>9/29/2024</a:t>
+              <a:t>10/5/2024</a:t>
             </a:fld>
             <a:endParaRPr lang="en-US"/>
           </a:p>
@@ -689,7 +692,7 @@
           <a:p>
             <a:fld id="{7F9C3969-815D-4313-AD47-20854D5F097C}" type="datetimeFigureOut">
               <a:rPr lang="en-US" smtClean="0"/>
-              <a:t>9/29/2024</a:t>
+              <a:t>10/5/2024</a:t>
             </a:fld>
             <a:endParaRPr lang="en-US"/>
           </a:p>
@@ -887,7 +890,7 @@
           <a:p>
             <a:fld id="{7F9C3969-815D-4313-AD47-20854D5F097C}" type="datetimeFigureOut">
               <a:rPr lang="en-US" smtClean="0"/>
-              <a:t>9/29/2024</a:t>
+              <a:t>10/5/2024</a:t>
             </a:fld>
             <a:endParaRPr lang="en-US"/>
           </a:p>
@@ -1162,7 +1165,7 @@
           <a:p>
             <a:fld id="{7F9C3969-815D-4313-AD47-20854D5F097C}" type="datetimeFigureOut">
               <a:rPr lang="en-US" smtClean="0"/>
-              <a:t>9/29/2024</a:t>
+              <a:t>10/5/2024</a:t>
             </a:fld>
             <a:endParaRPr lang="en-US"/>
           </a:p>
@@ -1427,7 +1430,7 @@
           <a:p>
             <a:fld id="{7F9C3969-815D-4313-AD47-20854D5F097C}" type="datetimeFigureOut">
               <a:rPr lang="en-US" smtClean="0"/>
-              <a:t>9/29/2024</a:t>
+              <a:t>10/5/2024</a:t>
             </a:fld>
             <a:endParaRPr lang="en-US"/>
           </a:p>
@@ -1839,7 +1842,7 @@
           <a:p>
             <a:fld id="{7F9C3969-815D-4313-AD47-20854D5F097C}" type="datetimeFigureOut">
               <a:rPr lang="en-US" smtClean="0"/>
-              <a:t>9/29/2024</a:t>
+              <a:t>10/5/2024</a:t>
             </a:fld>
             <a:endParaRPr lang="en-US"/>
           </a:p>
@@ -1980,7 +1983,7 @@
           <a:p>
             <a:fld id="{7F9C3969-815D-4313-AD47-20854D5F097C}" type="datetimeFigureOut">
               <a:rPr lang="en-US" smtClean="0"/>
-              <a:t>9/29/2024</a:t>
+              <a:t>10/5/2024</a:t>
             </a:fld>
             <a:endParaRPr lang="en-US"/>
           </a:p>
@@ -2093,7 +2096,7 @@
           <a:p>
             <a:fld id="{7F9C3969-815D-4313-AD47-20854D5F097C}" type="datetimeFigureOut">
               <a:rPr lang="en-US" smtClean="0"/>
-              <a:t>9/29/2024</a:t>
+              <a:t>10/5/2024</a:t>
             </a:fld>
             <a:endParaRPr lang="en-US"/>
           </a:p>
@@ -2404,7 +2407,7 @@
           <a:p>
             <a:fld id="{7F9C3969-815D-4313-AD47-20854D5F097C}" type="datetimeFigureOut">
               <a:rPr lang="en-US" smtClean="0"/>
-              <a:t>9/29/2024</a:t>
+              <a:t>10/5/2024</a:t>
             </a:fld>
             <a:endParaRPr lang="en-US"/>
           </a:p>
@@ -2692,7 +2695,7 @@
           <a:p>
             <a:fld id="{7F9C3969-815D-4313-AD47-20854D5F097C}" type="datetimeFigureOut">
               <a:rPr lang="en-US" smtClean="0"/>
-              <a:t>9/29/2024</a:t>
+              <a:t>10/5/2024</a:t>
             </a:fld>
             <a:endParaRPr lang="en-US"/>
           </a:p>
@@ -2933,7 +2936,7 @@
           <a:p>
             <a:fld id="{7F9C3969-815D-4313-AD47-20854D5F097C}" type="datetimeFigureOut">
               <a:rPr lang="en-US" smtClean="0"/>
-              <a:t>9/29/2024</a:t>
+              <a:t>10/5/2024</a:t>
             </a:fld>
             <a:endParaRPr lang="en-US"/>
           </a:p>
@@ -12938,6 +12941,776 @@
     <p:extLst>
       <p:ext uri="{BB962C8B-B14F-4D97-AF65-F5344CB8AC3E}">
         <p14:creationId xmlns:p14="http://schemas.microsoft.com/office/powerpoint/2010/main" val="2014544107"/>
+      </p:ext>
+    </p:extLst>
+  </p:cSld>
+  <p:clrMapOvr>
+    <a:masterClrMapping/>
+  </p:clrMapOvr>
+</p:sld>
+</file>
+
+<file path=ppt/slides/slide26.xml><?xml version="1.0" encoding="utf-8"?>
+<p:sld xmlns:a="http://schemas.openxmlformats.org/drawingml/2006/main" xmlns:r="http://schemas.openxmlformats.org/officeDocument/2006/relationships" xmlns:p="http://schemas.openxmlformats.org/presentationml/2006/main">
+  <p:cSld>
+    <p:spTree>
+      <p:nvGrpSpPr>
+        <p:cNvPr id="1" name=""/>
+        <p:cNvGrpSpPr/>
+        <p:nvPr/>
+      </p:nvGrpSpPr>
+      <p:grpSpPr>
+        <a:xfrm>
+          <a:off x="0" y="0"/>
+          <a:ext cx="0" cy="0"/>
+          <a:chOff x="0" y="0"/>
+          <a:chExt cx="0" cy="0"/>
+        </a:xfrm>
+      </p:grpSpPr>
+      <p:graphicFrame>
+        <p:nvGraphicFramePr>
+          <p:cNvPr id="2" name="Table 1">
+            <a:extLst>
+              <a:ext uri="{FF2B5EF4-FFF2-40B4-BE49-F238E27FC236}">
+                <a16:creationId xmlns:a16="http://schemas.microsoft.com/office/drawing/2014/main" id="{9758CB20-1E15-1B0D-6687-8165C8E48B80}"/>
+              </a:ext>
+            </a:extLst>
+          </p:cNvPr>
+          <p:cNvGraphicFramePr>
+            <a:graphicFrameLocks noGrp="1"/>
+          </p:cNvGraphicFramePr>
+          <p:nvPr>
+            <p:extLst>
+              <p:ext uri="{D42A27DB-BD31-4B8C-83A1-F6EECF244321}">
+                <p14:modId xmlns:p14="http://schemas.microsoft.com/office/powerpoint/2010/main" val="1977055644"/>
+              </p:ext>
+            </p:extLst>
+          </p:nvPr>
+        </p:nvGraphicFramePr>
+        <p:xfrm>
+          <a:off x="1981200" y="942108"/>
+          <a:ext cx="8236527" cy="4966855"/>
+        </p:xfrm>
+        <a:graphic>
+          <a:graphicData uri="http://schemas.openxmlformats.org/drawingml/2006/table">
+            <a:tbl>
+              <a:tblPr firstRow="1" bandRow="1">
+                <a:tableStyleId>{85BE263C-DBD7-4A20-BB59-AAB30ACAA65A}</a:tableStyleId>
+              </a:tblPr>
+              <a:tblGrid>
+                <a:gridCol w="2745509">
+                  <a:extLst>
+                    <a:ext uri="{9D8B030D-6E8A-4147-A177-3AD203B41FA5}">
+                      <a16:colId xmlns:a16="http://schemas.microsoft.com/office/drawing/2014/main" val="3160644143"/>
+                    </a:ext>
+                  </a:extLst>
+                </a:gridCol>
+                <a:gridCol w="2745509">
+                  <a:extLst>
+                    <a:ext uri="{9D8B030D-6E8A-4147-A177-3AD203B41FA5}">
+                      <a16:colId xmlns:a16="http://schemas.microsoft.com/office/drawing/2014/main" val="3886888139"/>
+                    </a:ext>
+                  </a:extLst>
+                </a:gridCol>
+                <a:gridCol w="2745509">
+                  <a:extLst>
+                    <a:ext uri="{9D8B030D-6E8A-4147-A177-3AD203B41FA5}">
+                      <a16:colId xmlns:a16="http://schemas.microsoft.com/office/drawing/2014/main" val="2101699905"/>
+                    </a:ext>
+                  </a:extLst>
+                </a:gridCol>
+              </a:tblGrid>
+              <a:tr h="1594423">
+                <a:tc>
+                  <a:txBody>
+                    <a:bodyPr/>
+                    <a:lstStyle/>
+                    <a:p>
+                      <a:pPr algn="ctr"/>
+                      <a:r>
+                        <a:rPr lang="en-US" sz="3200" b="1" dirty="0"/>
+                        <a:t>Country</a:t>
+                      </a:r>
+                    </a:p>
+                  </a:txBody>
+                  <a:tcPr anchor="ctr"/>
+                </a:tc>
+                <a:tc>
+                  <a:txBody>
+                    <a:bodyPr/>
+                    <a:lstStyle/>
+                    <a:p>
+                      <a:pPr algn="ctr"/>
+                      <a:r>
+                        <a:rPr lang="en-US" sz="3200" dirty="0" err="1"/>
+                        <a:t>Slurm</a:t>
+                      </a:r>
+                      <a:endParaRPr lang="en-US" sz="3200" dirty="0"/>
+                    </a:p>
+                  </a:txBody>
+                  <a:tcPr anchor="ctr"/>
+                </a:tc>
+                <a:tc>
+                  <a:txBody>
+                    <a:bodyPr/>
+                    <a:lstStyle/>
+                    <a:p>
+                      <a:pPr algn="ctr"/>
+                      <a:r>
+                        <a:rPr lang="en-US" sz="3200" dirty="0" err="1"/>
+                        <a:t>Popplers</a:t>
+                      </a:r>
+                      <a:endParaRPr lang="en-US" sz="3200" dirty="0"/>
+                    </a:p>
+                  </a:txBody>
+                  <a:tcPr anchor="ctr"/>
+                </a:tc>
+                <a:extLst>
+                  <a:ext uri="{0D108BD9-81ED-4DB2-BD59-A6C34878D82A}">
+                    <a16:rowId xmlns:a16="http://schemas.microsoft.com/office/drawing/2014/main" val="1453696166"/>
+                  </a:ext>
+                </a:extLst>
+              </a:tr>
+              <a:tr h="1778009">
+                <a:tc>
+                  <a:txBody>
+                    <a:bodyPr/>
+                    <a:lstStyle/>
+                    <a:p>
+                      <a:pPr algn="ctr"/>
+                      <a:r>
+                        <a:rPr lang="en-US" sz="3200" b="1" dirty="0"/>
+                        <a:t>New </a:t>
+                      </a:r>
+                      <a:r>
+                        <a:rPr lang="en-US" sz="3200" b="1" dirty="0" err="1"/>
+                        <a:t>New</a:t>
+                      </a:r>
+                      <a:r>
+                        <a:rPr lang="en-US" sz="3200" b="1" dirty="0"/>
+                        <a:t> York</a:t>
+                      </a:r>
+                    </a:p>
+                  </a:txBody>
+                  <a:tcPr anchor="ctr"/>
+                </a:tc>
+                <a:tc>
+                  <a:txBody>
+                    <a:bodyPr/>
+                    <a:lstStyle/>
+                    <a:p>
+                      <a:pPr algn="ctr"/>
+                      <a:r>
+                        <a:rPr lang="en-US" sz="3200" b="1" dirty="0"/>
+                        <a:t>7</a:t>
+                      </a:r>
+                    </a:p>
+                  </a:txBody>
+                  <a:tcPr anchor="ctr"/>
+                </a:tc>
+                <a:tc>
+                  <a:txBody>
+                    <a:bodyPr/>
+                    <a:lstStyle/>
+                    <a:p>
+                      <a:pPr algn="ctr"/>
+                      <a:r>
+                        <a:rPr lang="en-US" sz="3200" b="1" dirty="0"/>
+                        <a:t>9</a:t>
+                      </a:r>
+                    </a:p>
+                  </a:txBody>
+                  <a:tcPr anchor="ctr"/>
+                </a:tc>
+                <a:extLst>
+                  <a:ext uri="{0D108BD9-81ED-4DB2-BD59-A6C34878D82A}">
+                    <a16:rowId xmlns:a16="http://schemas.microsoft.com/office/drawing/2014/main" val="345930810"/>
+                  </a:ext>
+                </a:extLst>
+              </a:tr>
+              <a:tr h="1594423">
+                <a:tc>
+                  <a:txBody>
+                    <a:bodyPr/>
+                    <a:lstStyle/>
+                    <a:p>
+                      <a:pPr algn="ctr"/>
+                      <a:r>
+                        <a:rPr lang="en-US" sz="3200" b="1" dirty="0"/>
+                        <a:t>Omicron Persei 8</a:t>
+                      </a:r>
+                    </a:p>
+                  </a:txBody>
+                  <a:tcPr anchor="ctr"/>
+                </a:tc>
+                <a:tc>
+                  <a:txBody>
+                    <a:bodyPr/>
+                    <a:lstStyle/>
+                    <a:p>
+                      <a:pPr algn="ctr"/>
+                      <a:r>
+                        <a:rPr lang="en-US" sz="3200" b="1" dirty="0"/>
+                        <a:t>14</a:t>
+                      </a:r>
+                    </a:p>
+                  </a:txBody>
+                  <a:tcPr anchor="ctr"/>
+                </a:tc>
+                <a:tc>
+                  <a:txBody>
+                    <a:bodyPr/>
+                    <a:lstStyle/>
+                    <a:p>
+                      <a:pPr algn="ctr"/>
+                      <a:r>
+                        <a:rPr lang="en-US" sz="3200" b="1" dirty="0"/>
+                        <a:t>28</a:t>
+                      </a:r>
+                    </a:p>
+                  </a:txBody>
+                  <a:tcPr anchor="ctr"/>
+                </a:tc>
+                <a:extLst>
+                  <a:ext uri="{0D108BD9-81ED-4DB2-BD59-A6C34878D82A}">
+                    <a16:rowId xmlns:a16="http://schemas.microsoft.com/office/drawing/2014/main" val="1095405567"/>
+                  </a:ext>
+                </a:extLst>
+              </a:tr>
+            </a:tbl>
+          </a:graphicData>
+        </a:graphic>
+      </p:graphicFrame>
+    </p:spTree>
+    <p:extLst>
+      <p:ext uri="{BB962C8B-B14F-4D97-AF65-F5344CB8AC3E}">
+        <p14:creationId xmlns:p14="http://schemas.microsoft.com/office/powerpoint/2010/main" val="553159068"/>
+      </p:ext>
+    </p:extLst>
+  </p:cSld>
+  <p:clrMapOvr>
+    <a:masterClrMapping/>
+  </p:clrMapOvr>
+</p:sld>
+</file>
+
+<file path=ppt/slides/slide27.xml><?xml version="1.0" encoding="utf-8"?>
+<p:sld xmlns:a="http://schemas.openxmlformats.org/drawingml/2006/main" xmlns:r="http://schemas.openxmlformats.org/officeDocument/2006/relationships" xmlns:p="http://schemas.openxmlformats.org/presentationml/2006/main">
+  <p:cSld>
+    <p:spTree>
+      <p:nvGrpSpPr>
+        <p:cNvPr id="1" name=""/>
+        <p:cNvGrpSpPr/>
+        <p:nvPr/>
+      </p:nvGrpSpPr>
+      <p:grpSpPr>
+        <a:xfrm>
+          <a:off x="0" y="0"/>
+          <a:ext cx="0" cy="0"/>
+          <a:chOff x="0" y="0"/>
+          <a:chExt cx="0" cy="0"/>
+        </a:xfrm>
+      </p:grpSpPr>
+      <p:graphicFrame>
+        <p:nvGraphicFramePr>
+          <p:cNvPr id="2" name="Table 1">
+            <a:extLst>
+              <a:ext uri="{FF2B5EF4-FFF2-40B4-BE49-F238E27FC236}">
+                <a16:creationId xmlns:a16="http://schemas.microsoft.com/office/drawing/2014/main" id="{703A4490-5877-1ED8-0997-E5A4D4C358E7}"/>
+              </a:ext>
+            </a:extLst>
+          </p:cNvPr>
+          <p:cNvGraphicFramePr>
+            <a:graphicFrameLocks noGrp="1"/>
+          </p:cNvGraphicFramePr>
+          <p:nvPr>
+            <p:extLst>
+              <p:ext uri="{D42A27DB-BD31-4B8C-83A1-F6EECF244321}">
+                <p14:modId xmlns:p14="http://schemas.microsoft.com/office/powerpoint/2010/main" val="703831512"/>
+              </p:ext>
+            </p:extLst>
+          </p:nvPr>
+        </p:nvGraphicFramePr>
+        <p:xfrm>
+          <a:off x="1981200" y="942108"/>
+          <a:ext cx="8236527" cy="3372432"/>
+        </p:xfrm>
+        <a:graphic>
+          <a:graphicData uri="http://schemas.openxmlformats.org/drawingml/2006/table">
+            <a:tbl>
+              <a:tblPr firstRow="1" bandRow="1">
+                <a:tableStyleId>{85BE263C-DBD7-4A20-BB59-AAB30ACAA65A}</a:tableStyleId>
+              </a:tblPr>
+              <a:tblGrid>
+                <a:gridCol w="2745509">
+                  <a:extLst>
+                    <a:ext uri="{9D8B030D-6E8A-4147-A177-3AD203B41FA5}">
+                      <a16:colId xmlns:a16="http://schemas.microsoft.com/office/drawing/2014/main" val="3160644143"/>
+                    </a:ext>
+                  </a:extLst>
+                </a:gridCol>
+                <a:gridCol w="2745509">
+                  <a:extLst>
+                    <a:ext uri="{9D8B030D-6E8A-4147-A177-3AD203B41FA5}">
+                      <a16:colId xmlns:a16="http://schemas.microsoft.com/office/drawing/2014/main" val="3886888139"/>
+                    </a:ext>
+                  </a:extLst>
+                </a:gridCol>
+                <a:gridCol w="2745509">
+                  <a:extLst>
+                    <a:ext uri="{9D8B030D-6E8A-4147-A177-3AD203B41FA5}">
+                      <a16:colId xmlns:a16="http://schemas.microsoft.com/office/drawing/2014/main" val="2101699905"/>
+                    </a:ext>
+                  </a:extLst>
+                </a:gridCol>
+              </a:tblGrid>
+              <a:tr h="1594423">
+                <a:tc>
+                  <a:txBody>
+                    <a:bodyPr/>
+                    <a:lstStyle/>
+                    <a:p>
+                      <a:pPr algn="ctr"/>
+                      <a:r>
+                        <a:rPr lang="en-US" sz="3200" b="1" dirty="0"/>
+                        <a:t>Country</a:t>
+                      </a:r>
+                    </a:p>
+                  </a:txBody>
+                  <a:tcPr anchor="ctr"/>
+                </a:tc>
+                <a:tc>
+                  <a:txBody>
+                    <a:bodyPr/>
+                    <a:lstStyle/>
+                    <a:p>
+                      <a:pPr algn="ctr"/>
+                      <a:r>
+                        <a:rPr lang="en-US" sz="3200" dirty="0" err="1"/>
+                        <a:t>Slurm</a:t>
+                      </a:r>
+                      <a:endParaRPr lang="en-US" sz="3200" dirty="0"/>
+                    </a:p>
+                  </a:txBody>
+                  <a:tcPr anchor="ctr"/>
+                </a:tc>
+                <a:tc>
+                  <a:txBody>
+                    <a:bodyPr/>
+                    <a:lstStyle/>
+                    <a:p>
+                      <a:pPr algn="ctr"/>
+                      <a:r>
+                        <a:rPr lang="en-US" sz="3200" dirty="0" err="1"/>
+                        <a:t>Popplers</a:t>
+                      </a:r>
+                      <a:endParaRPr lang="en-US" sz="3200" dirty="0"/>
+                    </a:p>
+                  </a:txBody>
+                  <a:tcPr anchor="ctr"/>
+                </a:tc>
+                <a:extLst>
+                  <a:ext uri="{0D108BD9-81ED-4DB2-BD59-A6C34878D82A}">
+                    <a16:rowId xmlns:a16="http://schemas.microsoft.com/office/drawing/2014/main" val="1453696166"/>
+                  </a:ext>
+                </a:extLst>
+              </a:tr>
+              <a:tr h="1778009">
+                <a:tc>
+                  <a:txBody>
+                    <a:bodyPr/>
+                    <a:lstStyle/>
+                    <a:p>
+                      <a:pPr algn="ctr"/>
+                      <a:r>
+                        <a:rPr lang="en-US" sz="3200" b="1" dirty="0"/>
+                        <a:t>New </a:t>
+                      </a:r>
+                      <a:r>
+                        <a:rPr lang="en-US" sz="3200" b="1" dirty="0" err="1"/>
+                        <a:t>New</a:t>
+                      </a:r>
+                      <a:r>
+                        <a:rPr lang="en-US" sz="3200" b="1" dirty="0"/>
+                        <a:t> York</a:t>
+                      </a:r>
+                    </a:p>
+                  </a:txBody>
+                  <a:tcPr anchor="ctr"/>
+                </a:tc>
+                <a:tc>
+                  <a:txBody>
+                    <a:bodyPr/>
+                    <a:lstStyle/>
+                    <a:p>
+                      <a:pPr algn="ctr"/>
+                      <a:r>
+                        <a:rPr lang="en-US" sz="3200" b="1" dirty="0"/>
+                        <a:t>7</a:t>
+                      </a:r>
+                    </a:p>
+                  </a:txBody>
+                  <a:tcPr anchor="ctr"/>
+                </a:tc>
+                <a:tc>
+                  <a:txBody>
+                    <a:bodyPr/>
+                    <a:lstStyle/>
+                    <a:p>
+                      <a:pPr algn="ctr"/>
+                      <a:r>
+                        <a:rPr lang="en-US" sz="3200" b="1" dirty="0"/>
+                        <a:t>9</a:t>
+                      </a:r>
+                    </a:p>
+                  </a:txBody>
+                  <a:tcPr anchor="ctr"/>
+                </a:tc>
+                <a:extLst>
+                  <a:ext uri="{0D108BD9-81ED-4DB2-BD59-A6C34878D82A}">
+                    <a16:rowId xmlns:a16="http://schemas.microsoft.com/office/drawing/2014/main" val="345930810"/>
+                  </a:ext>
+                </a:extLst>
+              </a:tr>
+            </a:tbl>
+          </a:graphicData>
+        </a:graphic>
+      </p:graphicFrame>
+    </p:spTree>
+    <p:extLst>
+      <p:ext uri="{BB962C8B-B14F-4D97-AF65-F5344CB8AC3E}">
+        <p14:creationId xmlns:p14="http://schemas.microsoft.com/office/powerpoint/2010/main" val="1687056118"/>
+      </p:ext>
+    </p:extLst>
+  </p:cSld>
+  <p:clrMapOvr>
+    <a:masterClrMapping/>
+  </p:clrMapOvr>
+</p:sld>
+</file>
+
+<file path=ppt/slides/slide28.xml><?xml version="1.0" encoding="utf-8"?>
+<p:sld xmlns:a="http://schemas.openxmlformats.org/drawingml/2006/main" xmlns:r="http://schemas.openxmlformats.org/officeDocument/2006/relationships" xmlns:p="http://schemas.openxmlformats.org/presentationml/2006/main">
+  <p:cSld>
+    <p:spTree>
+      <p:nvGrpSpPr>
+        <p:cNvPr id="1" name=""/>
+        <p:cNvGrpSpPr/>
+        <p:nvPr/>
+      </p:nvGrpSpPr>
+      <p:grpSpPr>
+        <a:xfrm>
+          <a:off x="0" y="0"/>
+          <a:ext cx="0" cy="0"/>
+          <a:chOff x="0" y="0"/>
+          <a:chExt cx="0" cy="0"/>
+        </a:xfrm>
+      </p:grpSpPr>
+      <p:cxnSp>
+        <p:nvCxnSpPr>
+          <p:cNvPr id="2" name="Straight Connector 1">
+            <a:extLst>
+              <a:ext uri="{FF2B5EF4-FFF2-40B4-BE49-F238E27FC236}">
+                <a16:creationId xmlns:a16="http://schemas.microsoft.com/office/drawing/2014/main" id="{DB14F386-3AEA-6065-D009-E63D99B28BE2}"/>
+              </a:ext>
+            </a:extLst>
+          </p:cNvPr>
+          <p:cNvCxnSpPr>
+            <a:cxnSpLocks/>
+            <a:stCxn id="8" idx="3"/>
+          </p:cNvCxnSpPr>
+          <p:nvPr/>
+        </p:nvCxnSpPr>
+        <p:spPr>
+          <a:xfrm>
+            <a:off x="2312666" y="1716284"/>
+            <a:ext cx="3665570" cy="4611569"/>
+          </a:xfrm>
+          <a:prstGeom prst="line">
+            <a:avLst/>
+          </a:prstGeom>
+          <a:ln w="57150">
+            <a:solidFill>
+              <a:srgbClr val="C00000"/>
+            </a:solidFill>
+          </a:ln>
+        </p:spPr>
+        <p:style>
+          <a:lnRef idx="2">
+            <a:schemeClr val="accent1"/>
+          </a:lnRef>
+          <a:fillRef idx="0">
+            <a:schemeClr val="accent1"/>
+          </a:fillRef>
+          <a:effectRef idx="1">
+            <a:schemeClr val="accent1"/>
+          </a:effectRef>
+          <a:fontRef idx="minor">
+            <a:schemeClr val="tx1"/>
+          </a:fontRef>
+        </p:style>
+      </p:cxnSp>
+      <p:grpSp>
+        <p:nvGrpSpPr>
+          <p:cNvPr id="3" name="Group 2">
+            <a:extLst>
+              <a:ext uri="{FF2B5EF4-FFF2-40B4-BE49-F238E27FC236}">
+                <a16:creationId xmlns:a16="http://schemas.microsoft.com/office/drawing/2014/main" id="{24D808AB-5B95-3341-528E-C4F44A2E7742}"/>
+              </a:ext>
+            </a:extLst>
+          </p:cNvPr>
+          <p:cNvGrpSpPr/>
+          <p:nvPr/>
+        </p:nvGrpSpPr>
+        <p:grpSpPr>
+          <a:xfrm>
+            <a:off x="2298071" y="509257"/>
+            <a:ext cx="6601485" cy="5839485"/>
+            <a:chOff x="1023042" y="115432"/>
+            <a:chExt cx="9942214" cy="6627136"/>
+          </a:xfrm>
+        </p:grpSpPr>
+        <p:cxnSp>
+          <p:nvCxnSpPr>
+            <p:cNvPr id="4" name="Straight Connector 3">
+              <a:extLst>
+                <a:ext uri="{FF2B5EF4-FFF2-40B4-BE49-F238E27FC236}">
+                  <a16:creationId xmlns:a16="http://schemas.microsoft.com/office/drawing/2014/main" id="{F998583A-A620-E38D-F045-93B3D29A1320}"/>
+                </a:ext>
+              </a:extLst>
+            </p:cNvPr>
+            <p:cNvCxnSpPr/>
+            <p:nvPr/>
+          </p:nvCxnSpPr>
+          <p:spPr>
+            <a:xfrm>
+              <a:off x="1032095" y="115432"/>
+              <a:ext cx="0" cy="6627136"/>
+            </a:xfrm>
+            <a:prstGeom prst="line">
+              <a:avLst/>
+            </a:prstGeom>
+            <a:ln w="57150"/>
+          </p:spPr>
+          <p:style>
+            <a:lnRef idx="3">
+              <a:schemeClr val="dk1"/>
+            </a:lnRef>
+            <a:fillRef idx="0">
+              <a:schemeClr val="dk1"/>
+            </a:fillRef>
+            <a:effectRef idx="2">
+              <a:schemeClr val="dk1"/>
+            </a:effectRef>
+            <a:fontRef idx="minor">
+              <a:schemeClr val="tx1"/>
+            </a:fontRef>
+          </p:style>
+        </p:cxnSp>
+        <p:cxnSp>
+          <p:nvCxnSpPr>
+            <p:cNvPr id="5" name="Straight Connector 4">
+              <a:extLst>
+                <a:ext uri="{FF2B5EF4-FFF2-40B4-BE49-F238E27FC236}">
+                  <a16:creationId xmlns:a16="http://schemas.microsoft.com/office/drawing/2014/main" id="{9A73249B-7638-6EA8-9F35-A9C491D662EA}"/>
+                </a:ext>
+              </a:extLst>
+            </p:cNvPr>
+            <p:cNvCxnSpPr>
+              <a:cxnSpLocks/>
+            </p:cNvCxnSpPr>
+            <p:nvPr/>
+          </p:nvCxnSpPr>
+          <p:spPr>
+            <a:xfrm flipH="1">
+              <a:off x="1023042" y="6732006"/>
+              <a:ext cx="9942214" cy="0"/>
+            </a:xfrm>
+            <a:prstGeom prst="line">
+              <a:avLst/>
+            </a:prstGeom>
+            <a:ln w="57150"/>
+          </p:spPr>
+          <p:style>
+            <a:lnRef idx="3">
+              <a:schemeClr val="dk1"/>
+            </a:lnRef>
+            <a:fillRef idx="0">
+              <a:schemeClr val="dk1"/>
+            </a:fillRef>
+            <a:effectRef idx="2">
+              <a:schemeClr val="dk1"/>
+            </a:effectRef>
+            <a:fontRef idx="minor">
+              <a:schemeClr val="tx1"/>
+            </a:fontRef>
+          </p:style>
+        </p:cxnSp>
+      </p:grpSp>
+      <p:sp>
+        <p:nvSpPr>
+          <p:cNvPr id="6" name="TextBox 5">
+            <a:extLst>
+              <a:ext uri="{FF2B5EF4-FFF2-40B4-BE49-F238E27FC236}">
+                <a16:creationId xmlns:a16="http://schemas.microsoft.com/office/drawing/2014/main" id="{2F79E9BE-4826-03AB-81A0-80B244D66BAD}"/>
+              </a:ext>
+            </a:extLst>
+          </p:cNvPr>
+          <p:cNvSpPr txBox="1"/>
+          <p:nvPr/>
+        </p:nvSpPr>
+        <p:spPr>
+          <a:xfrm>
+            <a:off x="546073" y="247647"/>
+            <a:ext cx="1755003" cy="523220"/>
+          </a:xfrm>
+          <a:prstGeom prst="rect">
+            <a:avLst/>
+          </a:prstGeom>
+          <a:noFill/>
+        </p:spPr>
+        <p:txBody>
+          <a:bodyPr wrap="square" rtlCol="0">
+            <a:spAutoFit/>
+          </a:bodyPr>
+          <a:lstStyle/>
+          <a:p>
+            <a:r>
+              <a:rPr lang="en-US" sz="2800" dirty="0" err="1">
+                <a:latin typeface="Aharoni" panose="02010803020104030203" pitchFamily="2" charset="-79"/>
+                <a:cs typeface="Aharoni" panose="02010803020104030203" pitchFamily="2" charset="-79"/>
+              </a:rPr>
+              <a:t>Popplers</a:t>
+            </a:r>
+            <a:endParaRPr lang="en-US" sz="2800" dirty="0">
+              <a:latin typeface="Aharoni" panose="02010803020104030203" pitchFamily="2" charset="-79"/>
+              <a:cs typeface="Aharoni" panose="02010803020104030203" pitchFamily="2" charset="-79"/>
+            </a:endParaRPr>
+          </a:p>
+        </p:txBody>
+      </p:sp>
+      <p:sp>
+        <p:nvSpPr>
+          <p:cNvPr id="7" name="TextBox 6">
+            <a:extLst>
+              <a:ext uri="{FF2B5EF4-FFF2-40B4-BE49-F238E27FC236}">
+                <a16:creationId xmlns:a16="http://schemas.microsoft.com/office/drawing/2014/main" id="{C3A4D1ED-B05D-3BE6-8139-18A4E9572920}"/>
+              </a:ext>
+            </a:extLst>
+          </p:cNvPr>
+          <p:cNvSpPr txBox="1"/>
+          <p:nvPr/>
+        </p:nvSpPr>
+        <p:spPr>
+          <a:xfrm>
+            <a:off x="8910113" y="6087132"/>
+            <a:ext cx="1403288" cy="523220"/>
+          </a:xfrm>
+          <a:prstGeom prst="rect">
+            <a:avLst/>
+          </a:prstGeom>
+          <a:noFill/>
+        </p:spPr>
+        <p:txBody>
+          <a:bodyPr wrap="square" rtlCol="0">
+            <a:spAutoFit/>
+          </a:bodyPr>
+          <a:lstStyle/>
+          <a:p>
+            <a:r>
+              <a:rPr lang="en-US" sz="2800" dirty="0" err="1">
+                <a:latin typeface="Aharoni" panose="02010803020104030203" pitchFamily="2" charset="-79"/>
+                <a:cs typeface="Aharoni" panose="02010803020104030203" pitchFamily="2" charset="-79"/>
+              </a:rPr>
+              <a:t>Slurm</a:t>
+            </a:r>
+            <a:endParaRPr lang="en-US" sz="2800" dirty="0">
+              <a:latin typeface="Aharoni" panose="02010803020104030203" pitchFamily="2" charset="-79"/>
+              <a:cs typeface="Aharoni" panose="02010803020104030203" pitchFamily="2" charset="-79"/>
+            </a:endParaRPr>
+          </a:p>
+        </p:txBody>
+      </p:sp>
+      <p:sp>
+        <p:nvSpPr>
+          <p:cNvPr id="8" name="TextBox 7">
+            <a:extLst>
+              <a:ext uri="{FF2B5EF4-FFF2-40B4-BE49-F238E27FC236}">
+                <a16:creationId xmlns:a16="http://schemas.microsoft.com/office/drawing/2014/main" id="{2366BAB6-F50D-FDFC-7F21-9C8249B19D74}"/>
+              </a:ext>
+            </a:extLst>
+          </p:cNvPr>
+          <p:cNvSpPr txBox="1"/>
+          <p:nvPr/>
+        </p:nvSpPr>
+        <p:spPr>
+          <a:xfrm>
+            <a:off x="1423574" y="1454674"/>
+            <a:ext cx="889092" cy="523220"/>
+          </a:xfrm>
+          <a:prstGeom prst="rect">
+            <a:avLst/>
+          </a:prstGeom>
+          <a:noFill/>
+        </p:spPr>
+        <p:txBody>
+          <a:bodyPr wrap="square" rtlCol="0">
+            <a:spAutoFit/>
+          </a:bodyPr>
+          <a:lstStyle/>
+          <a:p>
+            <a:r>
+              <a:rPr lang="en-US" sz="2800" dirty="0">
+                <a:latin typeface="Arial Rounded MT Bold" panose="020F0704030504030204" pitchFamily="34" charset="0"/>
+                <a:cs typeface="Aharoni" panose="02010803020104030203" pitchFamily="2" charset="-79"/>
+              </a:rPr>
+              <a:t>180</a:t>
+            </a:r>
+          </a:p>
+        </p:txBody>
+      </p:sp>
+      <p:sp>
+        <p:nvSpPr>
+          <p:cNvPr id="9" name="TextBox 8">
+            <a:extLst>
+              <a:ext uri="{FF2B5EF4-FFF2-40B4-BE49-F238E27FC236}">
+                <a16:creationId xmlns:a16="http://schemas.microsoft.com/office/drawing/2014/main" id="{C0550801-55C8-4E7F-4E52-68E0AA7A5F74}"/>
+              </a:ext>
+            </a:extLst>
+          </p:cNvPr>
+          <p:cNvSpPr txBox="1"/>
+          <p:nvPr/>
+        </p:nvSpPr>
+        <p:spPr>
+          <a:xfrm>
+            <a:off x="5598813" y="6327853"/>
+            <a:ext cx="1060582" cy="523220"/>
+          </a:xfrm>
+          <a:prstGeom prst="rect">
+            <a:avLst/>
+          </a:prstGeom>
+          <a:noFill/>
+        </p:spPr>
+        <p:txBody>
+          <a:bodyPr wrap="square" rtlCol="0">
+            <a:spAutoFit/>
+          </a:bodyPr>
+          <a:lstStyle/>
+          <a:p>
+            <a:r>
+              <a:rPr lang="en-US" sz="2800" dirty="0">
+                <a:latin typeface="Arial Rounded MT Bold" panose="020F0704030504030204" pitchFamily="34" charset="0"/>
+                <a:cs typeface="Aharoni" panose="02010803020104030203" pitchFamily="2" charset="-79"/>
+              </a:rPr>
+              <a:t>140</a:t>
+            </a:r>
+          </a:p>
+        </p:txBody>
+      </p:sp>
+    </p:spTree>
+    <p:extLst>
+      <p:ext uri="{BB962C8B-B14F-4D97-AF65-F5344CB8AC3E}">
+        <p14:creationId xmlns:p14="http://schemas.microsoft.com/office/powerpoint/2010/main" val="1528304403"/>
       </p:ext>
     </p:extLst>
   </p:cSld>

</xml_diff>

<commit_message>
added graphs/tables for extensions section
</commit_message>
<xml_diff>
--- a/Slides/graph-creator.pptx
+++ b/Slides/graph-creator.pptx
@@ -30,9 +30,12 @@
     <p:sldId id="277" r:id="rId24"/>
     <p:sldId id="278" r:id="rId25"/>
     <p:sldId id="280" r:id="rId26"/>
-    <p:sldId id="281" r:id="rId27"/>
+    <p:sldId id="284" r:id="rId27"/>
     <p:sldId id="282" r:id="rId28"/>
     <p:sldId id="283" r:id="rId29"/>
+    <p:sldId id="281" r:id="rId30"/>
+    <p:sldId id="285" r:id="rId31"/>
+    <p:sldId id="286" r:id="rId32"/>
   </p:sldIdLst>
   <p:sldSz cx="12192000" cy="6858000"/>
   <p:notesSz cx="6858000" cy="9144000"/>
@@ -286,7 +289,7 @@
           <a:p>
             <a:fld id="{7F9C3969-815D-4313-AD47-20854D5F097C}" type="datetimeFigureOut">
               <a:rPr lang="en-US" smtClean="0"/>
-              <a:t>10/5/2024</a:t>
+              <a:t>10/12/2024</a:t>
             </a:fld>
             <a:endParaRPr lang="en-US"/>
           </a:p>
@@ -484,7 +487,7 @@
           <a:p>
             <a:fld id="{7F9C3969-815D-4313-AD47-20854D5F097C}" type="datetimeFigureOut">
               <a:rPr lang="en-US" smtClean="0"/>
-              <a:t>10/5/2024</a:t>
+              <a:t>10/12/2024</a:t>
             </a:fld>
             <a:endParaRPr lang="en-US"/>
           </a:p>
@@ -692,7 +695,7 @@
           <a:p>
             <a:fld id="{7F9C3969-815D-4313-AD47-20854D5F097C}" type="datetimeFigureOut">
               <a:rPr lang="en-US" smtClean="0"/>
-              <a:t>10/5/2024</a:t>
+              <a:t>10/12/2024</a:t>
             </a:fld>
             <a:endParaRPr lang="en-US"/>
           </a:p>
@@ -890,7 +893,7 @@
           <a:p>
             <a:fld id="{7F9C3969-815D-4313-AD47-20854D5F097C}" type="datetimeFigureOut">
               <a:rPr lang="en-US" smtClean="0"/>
-              <a:t>10/5/2024</a:t>
+              <a:t>10/12/2024</a:t>
             </a:fld>
             <a:endParaRPr lang="en-US"/>
           </a:p>
@@ -1165,7 +1168,7 @@
           <a:p>
             <a:fld id="{7F9C3969-815D-4313-AD47-20854D5F097C}" type="datetimeFigureOut">
               <a:rPr lang="en-US" smtClean="0"/>
-              <a:t>10/5/2024</a:t>
+              <a:t>10/12/2024</a:t>
             </a:fld>
             <a:endParaRPr lang="en-US"/>
           </a:p>
@@ -1430,7 +1433,7 @@
           <a:p>
             <a:fld id="{7F9C3969-815D-4313-AD47-20854D5F097C}" type="datetimeFigureOut">
               <a:rPr lang="en-US" smtClean="0"/>
-              <a:t>10/5/2024</a:t>
+              <a:t>10/12/2024</a:t>
             </a:fld>
             <a:endParaRPr lang="en-US"/>
           </a:p>
@@ -1842,7 +1845,7 @@
           <a:p>
             <a:fld id="{7F9C3969-815D-4313-AD47-20854D5F097C}" type="datetimeFigureOut">
               <a:rPr lang="en-US" smtClean="0"/>
-              <a:t>10/5/2024</a:t>
+              <a:t>10/12/2024</a:t>
             </a:fld>
             <a:endParaRPr lang="en-US"/>
           </a:p>
@@ -1983,7 +1986,7 @@
           <a:p>
             <a:fld id="{7F9C3969-815D-4313-AD47-20854D5F097C}" type="datetimeFigureOut">
               <a:rPr lang="en-US" smtClean="0"/>
-              <a:t>10/5/2024</a:t>
+              <a:t>10/12/2024</a:t>
             </a:fld>
             <a:endParaRPr lang="en-US"/>
           </a:p>
@@ -2096,7 +2099,7 @@
           <a:p>
             <a:fld id="{7F9C3969-815D-4313-AD47-20854D5F097C}" type="datetimeFigureOut">
               <a:rPr lang="en-US" smtClean="0"/>
-              <a:t>10/5/2024</a:t>
+              <a:t>10/12/2024</a:t>
             </a:fld>
             <a:endParaRPr lang="en-US"/>
           </a:p>
@@ -2407,7 +2410,7 @@
           <a:p>
             <a:fld id="{7F9C3969-815D-4313-AD47-20854D5F097C}" type="datetimeFigureOut">
               <a:rPr lang="en-US" smtClean="0"/>
-              <a:t>10/5/2024</a:t>
+              <a:t>10/12/2024</a:t>
             </a:fld>
             <a:endParaRPr lang="en-US"/>
           </a:p>
@@ -2695,7 +2698,7 @@
           <a:p>
             <a:fld id="{7F9C3969-815D-4313-AD47-20854D5F097C}" type="datetimeFigureOut">
               <a:rPr lang="en-US" smtClean="0"/>
-              <a:t>10/5/2024</a:t>
+              <a:t>10/12/2024</a:t>
             </a:fld>
             <a:endParaRPr lang="en-US"/>
           </a:p>
@@ -2936,7 +2939,7 @@
           <a:p>
             <a:fld id="{7F9C3969-815D-4313-AD47-20854D5F097C}" type="datetimeFigureOut">
               <a:rPr lang="en-US" smtClean="0"/>
-              <a:t>10/5/2024</a:t>
+              <a:t>10/12/2024</a:t>
             </a:fld>
             <a:endParaRPr lang="en-US"/>
           </a:p>
@@ -12955,7 +12958,13 @@
   <p:cSld>
     <p:spTree>
       <p:nvGrpSpPr>
-        <p:cNvPr id="1" name=""/>
+        <p:cNvPr id="1" name="">
+          <a:extLst>
+            <a:ext uri="{FF2B5EF4-FFF2-40B4-BE49-F238E27FC236}">
+              <a16:creationId xmlns:a16="http://schemas.microsoft.com/office/drawing/2014/main" id="{A9002811-FEE6-5BF2-5B65-1B7CE78015D5}"/>
+            </a:ext>
+          </a:extLst>
+        </p:cNvPr>
         <p:cNvGrpSpPr/>
         <p:nvPr/>
       </p:nvGrpSpPr>
@@ -12972,20 +12981,14 @@
           <p:cNvPr id="2" name="Table 1">
             <a:extLst>
               <a:ext uri="{FF2B5EF4-FFF2-40B4-BE49-F238E27FC236}">
-                <a16:creationId xmlns:a16="http://schemas.microsoft.com/office/drawing/2014/main" id="{9758CB20-1E15-1B0D-6687-8165C8E48B80}"/>
+                <a16:creationId xmlns:a16="http://schemas.microsoft.com/office/drawing/2014/main" id="{6DA230B6-9444-CBB6-3805-93DDB67527C7}"/>
               </a:ext>
             </a:extLst>
           </p:cNvPr>
           <p:cNvGraphicFramePr>
             <a:graphicFrameLocks noGrp="1"/>
           </p:cNvGraphicFramePr>
-          <p:nvPr>
-            <p:extLst>
-              <p:ext uri="{D42A27DB-BD31-4B8C-83A1-F6EECF244321}">
-                <p14:modId xmlns:p14="http://schemas.microsoft.com/office/powerpoint/2010/main" val="1977055644"/>
-              </p:ext>
-            </p:extLst>
-          </p:nvPr>
+          <p:nvPr/>
         </p:nvGraphicFramePr>
         <p:xfrm>
           <a:off x="1981200" y="942108"/>
@@ -13184,7 +13187,7 @@
     </p:spTree>
     <p:extLst>
       <p:ext uri="{BB962C8B-B14F-4D97-AF65-F5344CB8AC3E}">
-        <p14:creationId xmlns:p14="http://schemas.microsoft.com/office/powerpoint/2010/main" val="553159068"/>
+        <p14:creationId xmlns:p14="http://schemas.microsoft.com/office/powerpoint/2010/main" val="3734529718"/>
       </p:ext>
     </p:extLst>
   </p:cSld>
@@ -13720,6 +13723,240 @@
 </p:sld>
 </file>
 
+<file path=ppt/slides/slide29.xml><?xml version="1.0" encoding="utf-8"?>
+<p:sld xmlns:a="http://schemas.openxmlformats.org/drawingml/2006/main" xmlns:r="http://schemas.openxmlformats.org/officeDocument/2006/relationships" xmlns:p="http://schemas.openxmlformats.org/presentationml/2006/main">
+  <p:cSld>
+    <p:spTree>
+      <p:nvGrpSpPr>
+        <p:cNvPr id="1" name=""/>
+        <p:cNvGrpSpPr/>
+        <p:nvPr/>
+      </p:nvGrpSpPr>
+      <p:grpSpPr>
+        <a:xfrm>
+          <a:off x="0" y="0"/>
+          <a:ext cx="0" cy="0"/>
+          <a:chOff x="0" y="0"/>
+          <a:chExt cx="0" cy="0"/>
+        </a:xfrm>
+      </p:grpSpPr>
+      <p:graphicFrame>
+        <p:nvGraphicFramePr>
+          <p:cNvPr id="2" name="Table 1">
+            <a:extLst>
+              <a:ext uri="{FF2B5EF4-FFF2-40B4-BE49-F238E27FC236}">
+                <a16:creationId xmlns:a16="http://schemas.microsoft.com/office/drawing/2014/main" id="{9758CB20-1E15-1B0D-6687-8165C8E48B80}"/>
+              </a:ext>
+            </a:extLst>
+          </p:cNvPr>
+          <p:cNvGraphicFramePr>
+            <a:graphicFrameLocks noGrp="1"/>
+          </p:cNvGraphicFramePr>
+          <p:nvPr>
+            <p:extLst>
+              <p:ext uri="{D42A27DB-BD31-4B8C-83A1-F6EECF244321}">
+                <p14:modId xmlns:p14="http://schemas.microsoft.com/office/powerpoint/2010/main" val="1313689223"/>
+              </p:ext>
+            </p:extLst>
+          </p:nvPr>
+        </p:nvGraphicFramePr>
+        <p:xfrm>
+          <a:off x="1981200" y="942108"/>
+          <a:ext cx="8236527" cy="4966855"/>
+        </p:xfrm>
+        <a:graphic>
+          <a:graphicData uri="http://schemas.openxmlformats.org/drawingml/2006/table">
+            <a:tbl>
+              <a:tblPr bandRow="1">
+                <a:tableStyleId>{BC89EF96-8CEA-46FF-86C4-4CE0E7609802}</a:tableStyleId>
+              </a:tblPr>
+              <a:tblGrid>
+                <a:gridCol w="2745509">
+                  <a:extLst>
+                    <a:ext uri="{9D8B030D-6E8A-4147-A177-3AD203B41FA5}">
+                      <a16:colId xmlns:a16="http://schemas.microsoft.com/office/drawing/2014/main" val="3160644143"/>
+                    </a:ext>
+                  </a:extLst>
+                </a:gridCol>
+                <a:gridCol w="2745509">
+                  <a:extLst>
+                    <a:ext uri="{9D8B030D-6E8A-4147-A177-3AD203B41FA5}">
+                      <a16:colId xmlns:a16="http://schemas.microsoft.com/office/drawing/2014/main" val="3886888139"/>
+                    </a:ext>
+                  </a:extLst>
+                </a:gridCol>
+                <a:gridCol w="2745509">
+                  <a:extLst>
+                    <a:ext uri="{9D8B030D-6E8A-4147-A177-3AD203B41FA5}">
+                      <a16:colId xmlns:a16="http://schemas.microsoft.com/office/drawing/2014/main" val="2101699905"/>
+                    </a:ext>
+                  </a:extLst>
+                </a:gridCol>
+              </a:tblGrid>
+              <a:tr h="1594423">
+                <a:tc>
+                  <a:txBody>
+                    <a:bodyPr/>
+                    <a:lstStyle/>
+                    <a:p>
+                      <a:pPr algn="ctr"/>
+                      <a:r>
+                        <a:rPr lang="en-US" sz="3200" b="1" dirty="0"/>
+                        <a:t>Factors</a:t>
+                      </a:r>
+                    </a:p>
+                  </a:txBody>
+                  <a:tcPr anchor="ctr"/>
+                </a:tc>
+                <a:tc>
+                  <a:txBody>
+                    <a:bodyPr/>
+                    <a:lstStyle/>
+                    <a:p>
+                      <a:pPr algn="ctr"/>
+                      <a:r>
+                        <a:rPr lang="en-US" sz="3200" b="1" dirty="0"/>
+                        <a:t>Cloth</a:t>
+                      </a:r>
+                    </a:p>
+                  </a:txBody>
+                  <a:tcPr anchor="ctr"/>
+                </a:tc>
+                <a:tc>
+                  <a:txBody>
+                    <a:bodyPr/>
+                    <a:lstStyle/>
+                    <a:p>
+                      <a:pPr algn="ctr"/>
+                      <a:r>
+                        <a:rPr lang="en-US" sz="3200" b="1" dirty="0"/>
+                        <a:t>Food</a:t>
+                      </a:r>
+                    </a:p>
+                  </a:txBody>
+                  <a:tcPr anchor="ctr"/>
+                </a:tc>
+                <a:extLst>
+                  <a:ext uri="{0D108BD9-81ED-4DB2-BD59-A6C34878D82A}">
+                    <a16:rowId xmlns:a16="http://schemas.microsoft.com/office/drawing/2014/main" val="1453696166"/>
+                  </a:ext>
+                </a:extLst>
+              </a:tr>
+              <a:tr h="1778009">
+                <a:tc>
+                  <a:txBody>
+                    <a:bodyPr/>
+                    <a:lstStyle/>
+                    <a:p>
+                      <a:pPr algn="ctr"/>
+                      <a:r>
+                        <a:rPr lang="en-US" sz="3200" b="1" dirty="0"/>
+                        <a:t>Specific</a:t>
+                      </a:r>
+                    </a:p>
+                  </a:txBody>
+                  <a:tcPr anchor="ctr"/>
+                </a:tc>
+                <a:tc>
+                  <a:txBody>
+                    <a:bodyPr/>
+                    <a:lstStyle/>
+                    <a:p>
+                      <a:pPr algn="ctr"/>
+                      <a:r>
+                        <a:rPr lang="en-US" sz="3200" b="1" dirty="0"/>
+                        <a:t>Capital</a:t>
+                      </a:r>
+                    </a:p>
+                  </a:txBody>
+                  <a:tcPr anchor="ctr"/>
+                </a:tc>
+                <a:tc>
+                  <a:txBody>
+                    <a:bodyPr/>
+                    <a:lstStyle/>
+                    <a:p>
+                      <a:pPr algn="ctr"/>
+                      <a:r>
+                        <a:rPr lang="en-US" sz="3200" b="1" dirty="0"/>
+                        <a:t>Land</a:t>
+                      </a:r>
+                    </a:p>
+                  </a:txBody>
+                  <a:tcPr anchor="ctr"/>
+                </a:tc>
+                <a:extLst>
+                  <a:ext uri="{0D108BD9-81ED-4DB2-BD59-A6C34878D82A}">
+                    <a16:rowId xmlns:a16="http://schemas.microsoft.com/office/drawing/2014/main" val="345930810"/>
+                  </a:ext>
+                </a:extLst>
+              </a:tr>
+              <a:tr h="1594423">
+                <a:tc>
+                  <a:txBody>
+                    <a:bodyPr/>
+                    <a:lstStyle/>
+                    <a:p>
+                      <a:pPr algn="ctr"/>
+                      <a:r>
+                        <a:rPr lang="en-US" sz="3200" b="1" dirty="0"/>
+                        <a:t>Variable</a:t>
+                      </a:r>
+                    </a:p>
+                  </a:txBody>
+                  <a:tcPr anchor="ctr"/>
+                </a:tc>
+                <a:tc>
+                  <a:txBody>
+                    <a:bodyPr/>
+                    <a:lstStyle/>
+                    <a:p>
+                      <a:pPr algn="ctr"/>
+                      <a:r>
+                        <a:rPr lang="en-US" sz="3200" b="1" dirty="0"/>
+                        <a:t>Labor</a:t>
+                      </a:r>
+                    </a:p>
+                  </a:txBody>
+                  <a:tcPr anchor="ctr"/>
+                </a:tc>
+                <a:tc>
+                  <a:txBody>
+                    <a:bodyPr/>
+                    <a:lstStyle/>
+                    <a:p>
+                      <a:pPr algn="ctr"/>
+                      <a:r>
+                        <a:rPr lang="en-US" sz="3200" b="1" dirty="0"/>
+                        <a:t>Labor</a:t>
+                      </a:r>
+                    </a:p>
+                  </a:txBody>
+                  <a:tcPr anchor="ctr"/>
+                </a:tc>
+                <a:extLst>
+                  <a:ext uri="{0D108BD9-81ED-4DB2-BD59-A6C34878D82A}">
+                    <a16:rowId xmlns:a16="http://schemas.microsoft.com/office/drawing/2014/main" val="1095405567"/>
+                  </a:ext>
+                </a:extLst>
+              </a:tr>
+            </a:tbl>
+          </a:graphicData>
+        </a:graphic>
+      </p:graphicFrame>
+    </p:spTree>
+    <p:extLst>
+      <p:ext uri="{BB962C8B-B14F-4D97-AF65-F5344CB8AC3E}">
+        <p14:creationId xmlns:p14="http://schemas.microsoft.com/office/powerpoint/2010/main" val="553159068"/>
+      </p:ext>
+    </p:extLst>
+  </p:cSld>
+  <p:clrMapOvr>
+    <a:masterClrMapping/>
+  </p:clrMapOvr>
+</p:sld>
+</file>
+
 <file path=ppt/slides/slide3.xml><?xml version="1.0" encoding="utf-8"?>
 <p:sld xmlns:a="http://schemas.openxmlformats.org/drawingml/2006/main" xmlns:r="http://schemas.openxmlformats.org/officeDocument/2006/relationships" xmlns:p="http://schemas.openxmlformats.org/presentationml/2006/main">
   <p:cSld>
@@ -14254,6 +14491,750 @@
     <p:extLst>
       <p:ext uri="{BB962C8B-B14F-4D97-AF65-F5344CB8AC3E}">
         <p14:creationId xmlns:p14="http://schemas.microsoft.com/office/powerpoint/2010/main" val="3719891354"/>
+      </p:ext>
+    </p:extLst>
+  </p:cSld>
+  <p:clrMapOvr>
+    <a:masterClrMapping/>
+  </p:clrMapOvr>
+</p:sld>
+</file>
+
+<file path=ppt/slides/slide30.xml><?xml version="1.0" encoding="utf-8"?>
+<p:sld xmlns:a="http://schemas.openxmlformats.org/drawingml/2006/main" xmlns:r="http://schemas.openxmlformats.org/officeDocument/2006/relationships" xmlns:p="http://schemas.openxmlformats.org/presentationml/2006/main">
+  <p:cSld>
+    <p:spTree>
+      <p:nvGrpSpPr>
+        <p:cNvPr id="1" name="">
+          <a:extLst>
+            <a:ext uri="{FF2B5EF4-FFF2-40B4-BE49-F238E27FC236}">
+              <a16:creationId xmlns:a16="http://schemas.microsoft.com/office/drawing/2014/main" id="{C14C0B34-0713-91CA-535E-362E8C30BE85}"/>
+            </a:ext>
+          </a:extLst>
+        </p:cNvPr>
+        <p:cNvGrpSpPr/>
+        <p:nvPr/>
+      </p:nvGrpSpPr>
+      <p:grpSpPr>
+        <a:xfrm>
+          <a:off x="0" y="0"/>
+          <a:ext cx="0" cy="0"/>
+          <a:chOff x="0" y="0"/>
+          <a:chExt cx="0" cy="0"/>
+        </a:xfrm>
+      </p:grpSpPr>
+      <p:graphicFrame>
+        <p:nvGraphicFramePr>
+          <p:cNvPr id="2" name="Table 1">
+            <a:extLst>
+              <a:ext uri="{FF2B5EF4-FFF2-40B4-BE49-F238E27FC236}">
+                <a16:creationId xmlns:a16="http://schemas.microsoft.com/office/drawing/2014/main" id="{2FB5DDD9-BBD6-FCE1-5B3E-B3A08449BFCF}"/>
+              </a:ext>
+            </a:extLst>
+          </p:cNvPr>
+          <p:cNvGraphicFramePr>
+            <a:graphicFrameLocks noGrp="1"/>
+          </p:cNvGraphicFramePr>
+          <p:nvPr>
+            <p:extLst>
+              <p:ext uri="{D42A27DB-BD31-4B8C-83A1-F6EECF244321}">
+                <p14:modId xmlns:p14="http://schemas.microsoft.com/office/powerpoint/2010/main" val="1572162283"/>
+              </p:ext>
+            </p:extLst>
+          </p:nvPr>
+        </p:nvGraphicFramePr>
+        <p:xfrm>
+          <a:off x="3350491" y="945573"/>
+          <a:ext cx="5232400" cy="4367645"/>
+        </p:xfrm>
+        <a:graphic>
+          <a:graphicData uri="http://schemas.openxmlformats.org/drawingml/2006/table">
+            <a:tbl>
+              <a:tblPr bandRow="1">
+                <a:tableStyleId>{BC89EF96-8CEA-46FF-86C4-4CE0E7609802}</a:tableStyleId>
+              </a:tblPr>
+              <a:tblGrid>
+                <a:gridCol w="2616200">
+                  <a:extLst>
+                    <a:ext uri="{9D8B030D-6E8A-4147-A177-3AD203B41FA5}">
+                      <a16:colId xmlns:a16="http://schemas.microsoft.com/office/drawing/2014/main" val="3160644143"/>
+                    </a:ext>
+                  </a:extLst>
+                </a:gridCol>
+                <a:gridCol w="2616200">
+                  <a:extLst>
+                    <a:ext uri="{9D8B030D-6E8A-4147-A177-3AD203B41FA5}">
+                      <a16:colId xmlns:a16="http://schemas.microsoft.com/office/drawing/2014/main" val="3886888139"/>
+                    </a:ext>
+                  </a:extLst>
+                </a:gridCol>
+              </a:tblGrid>
+              <a:tr h="1402069">
+                <a:tc>
+                  <a:txBody>
+                    <a:bodyPr/>
+                    <a:lstStyle/>
+                    <a:p>
+                      <a:pPr algn="ctr"/>
+                      <a:endParaRPr lang="en-US" sz="3200" b="1" dirty="0"/>
+                    </a:p>
+                  </a:txBody>
+                  <a:tcPr anchor="ctr"/>
+                </a:tc>
+                <a:tc>
+                  <a:txBody>
+                    <a:bodyPr/>
+                    <a:lstStyle/>
+                    <a:p>
+                      <a:pPr algn="ctr"/>
+                      <a:r>
+                        <a:rPr lang="en-US" sz="3200" b="1" dirty="0"/>
+                        <a:t>Exports</a:t>
+                      </a:r>
+                    </a:p>
+                  </a:txBody>
+                  <a:tcPr anchor="ctr"/>
+                </a:tc>
+                <a:extLst>
+                  <a:ext uri="{0D108BD9-81ED-4DB2-BD59-A6C34878D82A}">
+                    <a16:rowId xmlns:a16="http://schemas.microsoft.com/office/drawing/2014/main" val="1453696166"/>
+                  </a:ext>
+                </a:extLst>
+              </a:tr>
+              <a:tr h="1563507">
+                <a:tc>
+                  <a:txBody>
+                    <a:bodyPr/>
+                    <a:lstStyle/>
+                    <a:p>
+                      <a:pPr algn="ctr"/>
+                      <a:r>
+                        <a:rPr lang="en-US" sz="3200" b="1" dirty="0"/>
+                        <a:t>Country A</a:t>
+                      </a:r>
+                    </a:p>
+                  </a:txBody>
+                  <a:tcPr anchor="ctr"/>
+                </a:tc>
+                <a:tc>
+                  <a:txBody>
+                    <a:bodyPr/>
+                    <a:lstStyle/>
+                    <a:p>
+                      <a:pPr algn="ctr"/>
+                      <a:r>
+                        <a:rPr lang="en-US" sz="3200" b="1" dirty="0"/>
+                        <a:t>Land-Intensive</a:t>
+                      </a:r>
+                    </a:p>
+                  </a:txBody>
+                  <a:tcPr anchor="ctr"/>
+                </a:tc>
+                <a:extLst>
+                  <a:ext uri="{0D108BD9-81ED-4DB2-BD59-A6C34878D82A}">
+                    <a16:rowId xmlns:a16="http://schemas.microsoft.com/office/drawing/2014/main" val="345930810"/>
+                  </a:ext>
+                </a:extLst>
+              </a:tr>
+              <a:tr h="1402069">
+                <a:tc>
+                  <a:txBody>
+                    <a:bodyPr/>
+                    <a:lstStyle/>
+                    <a:p>
+                      <a:pPr algn="ctr"/>
+                      <a:r>
+                        <a:rPr lang="en-US" sz="3200" b="1" dirty="0"/>
+                        <a:t>Country B</a:t>
+                      </a:r>
+                    </a:p>
+                  </a:txBody>
+                  <a:tcPr anchor="ctr"/>
+                </a:tc>
+                <a:tc>
+                  <a:txBody>
+                    <a:bodyPr/>
+                    <a:lstStyle/>
+                    <a:p>
+                      <a:pPr algn="ctr"/>
+                      <a:r>
+                        <a:rPr lang="en-US" sz="3200" b="1" dirty="0"/>
+                        <a:t>Capital-Intensive</a:t>
+                      </a:r>
+                    </a:p>
+                  </a:txBody>
+                  <a:tcPr anchor="ctr"/>
+                </a:tc>
+                <a:extLst>
+                  <a:ext uri="{0D108BD9-81ED-4DB2-BD59-A6C34878D82A}">
+                    <a16:rowId xmlns:a16="http://schemas.microsoft.com/office/drawing/2014/main" val="1095405567"/>
+                  </a:ext>
+                </a:extLst>
+              </a:tr>
+            </a:tbl>
+          </a:graphicData>
+        </a:graphic>
+      </p:graphicFrame>
+    </p:spTree>
+    <p:extLst>
+      <p:ext uri="{BB962C8B-B14F-4D97-AF65-F5344CB8AC3E}">
+        <p14:creationId xmlns:p14="http://schemas.microsoft.com/office/powerpoint/2010/main" val="1252141873"/>
+      </p:ext>
+    </p:extLst>
+  </p:cSld>
+  <p:clrMapOvr>
+    <a:masterClrMapping/>
+  </p:clrMapOvr>
+</p:sld>
+</file>
+
+<file path=ppt/slides/slide31.xml><?xml version="1.0" encoding="utf-8"?>
+<p:sld xmlns:a="http://schemas.openxmlformats.org/drawingml/2006/main" xmlns:r="http://schemas.openxmlformats.org/officeDocument/2006/relationships" xmlns:p="http://schemas.openxmlformats.org/presentationml/2006/main">
+  <p:cSld>
+    <p:spTree>
+      <p:nvGrpSpPr>
+        <p:cNvPr id="1" name="">
+          <a:extLst>
+            <a:ext uri="{FF2B5EF4-FFF2-40B4-BE49-F238E27FC236}">
+              <a16:creationId xmlns:a16="http://schemas.microsoft.com/office/drawing/2014/main" id="{187A2233-48E5-979E-4DCE-5699B0A5CFEE}"/>
+            </a:ext>
+          </a:extLst>
+        </p:cNvPr>
+        <p:cNvGrpSpPr/>
+        <p:nvPr/>
+      </p:nvGrpSpPr>
+      <p:grpSpPr>
+        <a:xfrm>
+          <a:off x="0" y="0"/>
+          <a:ext cx="0" cy="0"/>
+          <a:chOff x="0" y="0"/>
+          <a:chExt cx="0" cy="0"/>
+        </a:xfrm>
+      </p:grpSpPr>
+      <mc:AlternateContent xmlns:mc="http://schemas.openxmlformats.org/markup-compatibility/2006">
+        <mc:Choice xmlns:a14="http://schemas.microsoft.com/office/drawing/2010/main" Requires="a14">
+          <p:graphicFrame>
+            <p:nvGraphicFramePr>
+              <p:cNvPr id="2" name="Table 1">
+                <a:extLst>
+                  <a:ext uri="{FF2B5EF4-FFF2-40B4-BE49-F238E27FC236}">
+                    <a16:creationId xmlns:a16="http://schemas.microsoft.com/office/drawing/2014/main" id="{536B91F4-02D6-5C1B-4761-3BDF4795AE5C}"/>
+                  </a:ext>
+                </a:extLst>
+              </p:cNvPr>
+              <p:cNvGraphicFramePr>
+                <a:graphicFrameLocks noGrp="1"/>
+              </p:cNvGraphicFramePr>
+              <p:nvPr>
+                <p:extLst>
+                  <p:ext uri="{D42A27DB-BD31-4B8C-83A1-F6EECF244321}">
+                    <p14:modId xmlns:p14="http://schemas.microsoft.com/office/powerpoint/2010/main" val="96173610"/>
+                  </p:ext>
+                </p:extLst>
+              </p:nvPr>
+            </p:nvGraphicFramePr>
+            <p:xfrm>
+              <a:off x="1981200" y="942108"/>
+              <a:ext cx="8236527" cy="4966855"/>
+            </p:xfrm>
+            <a:graphic>
+              <a:graphicData uri="http://schemas.openxmlformats.org/drawingml/2006/table">
+                <a:tbl>
+                  <a:tblPr bandRow="1">
+                    <a:tableStyleId>{BC89EF96-8CEA-46FF-86C4-4CE0E7609802}</a:tableStyleId>
+                  </a:tblPr>
+                  <a:tblGrid>
+                    <a:gridCol w="2745509">
+                      <a:extLst>
+                        <a:ext uri="{9D8B030D-6E8A-4147-A177-3AD203B41FA5}">
+                          <a16:colId xmlns:a16="http://schemas.microsoft.com/office/drawing/2014/main" val="3160644143"/>
+                        </a:ext>
+                      </a:extLst>
+                    </a:gridCol>
+                    <a:gridCol w="2745509">
+                      <a:extLst>
+                        <a:ext uri="{9D8B030D-6E8A-4147-A177-3AD203B41FA5}">
+                          <a16:colId xmlns:a16="http://schemas.microsoft.com/office/drawing/2014/main" val="3886888139"/>
+                        </a:ext>
+                      </a:extLst>
+                    </a:gridCol>
+                    <a:gridCol w="2745509">
+                      <a:extLst>
+                        <a:ext uri="{9D8B030D-6E8A-4147-A177-3AD203B41FA5}">
+                          <a16:colId xmlns:a16="http://schemas.microsoft.com/office/drawing/2014/main" val="2101699905"/>
+                        </a:ext>
+                      </a:extLst>
+                    </a:gridCol>
+                  </a:tblGrid>
+                  <a:tr h="1594423">
+                    <a:tc>
+                      <a:txBody>
+                        <a:bodyPr/>
+                        <a:lstStyle/>
+                        <a:p>
+                          <a:pPr algn="ctr"/>
+                          <a:r>
+                            <a:rPr lang="en-US" sz="3200" b="1" dirty="0"/>
+                            <a:t>Income</a:t>
+                          </a:r>
+                        </a:p>
+                      </a:txBody>
+                      <a:tcPr anchor="ctr"/>
+                    </a:tc>
+                    <a:tc>
+                      <a:txBody>
+                        <a:bodyPr/>
+                        <a:lstStyle/>
+                        <a:p>
+                          <a:pPr algn="ctr"/>
+                          <a:r>
+                            <a:rPr lang="en-US" sz="3200" b="1" dirty="0"/>
+                            <a:t>Capital</a:t>
+                          </a:r>
+                        </a:p>
+                      </a:txBody>
+                      <a:tcPr anchor="ctr"/>
+                    </a:tc>
+                    <a:tc>
+                      <a:txBody>
+                        <a:bodyPr/>
+                        <a:lstStyle/>
+                        <a:p>
+                          <a:pPr algn="ctr"/>
+                          <a:r>
+                            <a:rPr lang="en-US" sz="3200" b="1" dirty="0"/>
+                            <a:t>Land</a:t>
+                          </a:r>
+                        </a:p>
+                      </a:txBody>
+                      <a:tcPr anchor="ctr"/>
+                    </a:tc>
+                    <a:extLst>
+                      <a:ext uri="{0D108BD9-81ED-4DB2-BD59-A6C34878D82A}">
+                        <a16:rowId xmlns:a16="http://schemas.microsoft.com/office/drawing/2014/main" val="1453696166"/>
+                      </a:ext>
+                    </a:extLst>
+                  </a:tr>
+                  <a:tr h="1778009">
+                    <a:tc>
+                      <a:txBody>
+                        <a:bodyPr/>
+                        <a:lstStyle/>
+                        <a:p>
+                          <a:pPr algn="ctr"/>
+                          <a:r>
+                            <a:rPr lang="en-US" sz="3200" b="1" dirty="0"/>
+                            <a:t>Country A</a:t>
+                          </a:r>
+                        </a:p>
+                        <a:p>
+                          <a:pPr algn="ctr"/>
+                          <a:r>
+                            <a:rPr lang="en-US" sz="3200" b="1" dirty="0"/>
+                            <a:t>Owner </a:t>
+                          </a:r>
+                        </a:p>
+                      </a:txBody>
+                      <a:tcPr anchor="ctr"/>
+                    </a:tc>
+                    <a:tc>
+                      <a:txBody>
+                        <a:bodyPr/>
+                        <a:lstStyle/>
+                        <a:p>
+                          <a:pPr algn="ctr"/>
+                          <a14:m>
+                            <m:oMathPara xmlns:m="http://schemas.openxmlformats.org/officeDocument/2006/math">
+                              <m:oMathParaPr>
+                                <m:jc m:val="centerGroup"/>
+                              </m:oMathParaPr>
+                              <m:oMath xmlns:m="http://schemas.openxmlformats.org/officeDocument/2006/math">
+                                <m:r>
+                                  <a:rPr lang="en-US" sz="8000" b="1" i="1" smtClean="0">
+                                    <a:latin typeface="Cambria Math" panose="02040503050406030204" pitchFamily="18" charset="0"/>
+                                  </a:rPr>
+                                  <m:t>↓</m:t>
+                                </m:r>
+                              </m:oMath>
+                            </m:oMathPara>
+                          </a14:m>
+                          <a:endParaRPr lang="en-US" sz="8000" b="1" dirty="0"/>
+                        </a:p>
+                      </a:txBody>
+                      <a:tcPr anchor="ctr"/>
+                    </a:tc>
+                    <a:tc>
+                      <a:txBody>
+                        <a:bodyPr/>
+                        <a:lstStyle/>
+                        <a:p>
+                          <a:pPr marL="0" marR="0" lvl="0" indent="0" algn="ctr" defTabSz="914400" rtl="0" eaLnBrk="1" fontAlgn="auto" latinLnBrk="0" hangingPunct="1">
+                            <a:lnSpc>
+                              <a:spcPct val="100000"/>
+                            </a:lnSpc>
+                            <a:spcBef>
+                              <a:spcPts val="0"/>
+                            </a:spcBef>
+                            <a:spcAft>
+                              <a:spcPts val="0"/>
+                            </a:spcAft>
+                            <a:buClrTx/>
+                            <a:buSzTx/>
+                            <a:buFontTx/>
+                            <a:buNone/>
+                            <a:tabLst/>
+                            <a:defRPr/>
+                          </a:pPr>
+                          <a14:m>
+                            <m:oMathPara xmlns:m="http://schemas.openxmlformats.org/officeDocument/2006/math">
+                              <m:oMathParaPr>
+                                <m:jc m:val="centerGroup"/>
+                              </m:oMathParaPr>
+                              <m:oMath xmlns:m="http://schemas.openxmlformats.org/officeDocument/2006/math">
+                                <m:r>
+                                  <a:rPr lang="en-US" sz="8000" b="1" i="1" smtClean="0">
+                                    <a:latin typeface="Cambria Math" panose="02040503050406030204" pitchFamily="18" charset="0"/>
+                                  </a:rPr>
+                                  <m:t>↑</m:t>
+                                </m:r>
+                              </m:oMath>
+                            </m:oMathPara>
+                          </a14:m>
+                          <a:endParaRPr lang="en-US" sz="8000" b="1" dirty="0"/>
+                        </a:p>
+                      </a:txBody>
+                      <a:tcPr anchor="ctr"/>
+                    </a:tc>
+                    <a:extLst>
+                      <a:ext uri="{0D108BD9-81ED-4DB2-BD59-A6C34878D82A}">
+                        <a16:rowId xmlns:a16="http://schemas.microsoft.com/office/drawing/2014/main" val="345930810"/>
+                      </a:ext>
+                    </a:extLst>
+                  </a:tr>
+                  <a:tr h="1594423">
+                    <a:tc>
+                      <a:txBody>
+                        <a:bodyPr/>
+                        <a:lstStyle/>
+                        <a:p>
+                          <a:pPr algn="ctr"/>
+                          <a:r>
+                            <a:rPr lang="en-US" sz="3200" b="1" dirty="0"/>
+                            <a:t>Country B Owner</a:t>
+                          </a:r>
+                        </a:p>
+                      </a:txBody>
+                      <a:tcPr anchor="ctr"/>
+                    </a:tc>
+                    <a:tc>
+                      <a:txBody>
+                        <a:bodyPr/>
+                        <a:lstStyle/>
+                        <a:p>
+                          <a:pPr algn="ctr"/>
+                          <a14:m>
+                            <m:oMathPara xmlns:m="http://schemas.openxmlformats.org/officeDocument/2006/math">
+                              <m:oMathParaPr>
+                                <m:jc m:val="centerGroup"/>
+                              </m:oMathParaPr>
+                              <m:oMath xmlns:m="http://schemas.openxmlformats.org/officeDocument/2006/math">
+                                <m:r>
+                                  <a:rPr lang="en-US" sz="8000" b="1" i="1" smtClean="0">
+                                    <a:latin typeface="Cambria Math" panose="02040503050406030204" pitchFamily="18" charset="0"/>
+                                  </a:rPr>
+                                  <m:t>↑</m:t>
+                                </m:r>
+                              </m:oMath>
+                            </m:oMathPara>
+                          </a14:m>
+                          <a:endParaRPr lang="en-US" sz="8000" b="1" dirty="0"/>
+                        </a:p>
+                      </a:txBody>
+                      <a:tcPr anchor="ctr"/>
+                    </a:tc>
+                    <a:tc>
+                      <a:txBody>
+                        <a:bodyPr/>
+                        <a:lstStyle/>
+                        <a:p>
+                          <a:pPr marL="0" marR="0" lvl="0" indent="0" algn="ctr" defTabSz="914400" rtl="0" eaLnBrk="1" fontAlgn="auto" latinLnBrk="0" hangingPunct="1">
+                            <a:lnSpc>
+                              <a:spcPct val="100000"/>
+                            </a:lnSpc>
+                            <a:spcBef>
+                              <a:spcPts val="0"/>
+                            </a:spcBef>
+                            <a:spcAft>
+                              <a:spcPts val="0"/>
+                            </a:spcAft>
+                            <a:buClrTx/>
+                            <a:buSzTx/>
+                            <a:buFontTx/>
+                            <a:buNone/>
+                            <a:tabLst/>
+                            <a:defRPr/>
+                          </a:pPr>
+                          <a14:m>
+                            <m:oMathPara xmlns:m="http://schemas.openxmlformats.org/officeDocument/2006/math">
+                              <m:oMathParaPr>
+                                <m:jc m:val="centerGroup"/>
+                              </m:oMathParaPr>
+                              <m:oMath xmlns:m="http://schemas.openxmlformats.org/officeDocument/2006/math">
+                                <m:r>
+                                  <a:rPr lang="en-US" sz="8000" b="1" i="1" smtClean="0">
+                                    <a:latin typeface="Cambria Math" panose="02040503050406030204" pitchFamily="18" charset="0"/>
+                                  </a:rPr>
+                                  <m:t>↓</m:t>
+                                </m:r>
+                              </m:oMath>
+                            </m:oMathPara>
+                          </a14:m>
+                          <a:endParaRPr lang="en-US" sz="8000" b="1" dirty="0"/>
+                        </a:p>
+                      </a:txBody>
+                      <a:tcPr anchor="ctr"/>
+                    </a:tc>
+                    <a:extLst>
+                      <a:ext uri="{0D108BD9-81ED-4DB2-BD59-A6C34878D82A}">
+                        <a16:rowId xmlns:a16="http://schemas.microsoft.com/office/drawing/2014/main" val="1095405567"/>
+                      </a:ext>
+                    </a:extLst>
+                  </a:tr>
+                </a:tbl>
+              </a:graphicData>
+            </a:graphic>
+          </p:graphicFrame>
+        </mc:Choice>
+        <mc:Fallback>
+          <p:graphicFrame>
+            <p:nvGraphicFramePr>
+              <p:cNvPr id="2" name="Table 1">
+                <a:extLst>
+                  <a:ext uri="{FF2B5EF4-FFF2-40B4-BE49-F238E27FC236}">
+                    <a16:creationId xmlns:a16="http://schemas.microsoft.com/office/drawing/2014/main" id="{536B91F4-02D6-5C1B-4761-3BDF4795AE5C}"/>
+                  </a:ext>
+                </a:extLst>
+              </p:cNvPr>
+              <p:cNvGraphicFramePr>
+                <a:graphicFrameLocks noGrp="1"/>
+              </p:cNvGraphicFramePr>
+              <p:nvPr>
+                <p:extLst>
+                  <p:ext uri="{D42A27DB-BD31-4B8C-83A1-F6EECF244321}">
+                    <p14:modId xmlns:p14="http://schemas.microsoft.com/office/powerpoint/2010/main" val="96173610"/>
+                  </p:ext>
+                </p:extLst>
+              </p:nvPr>
+            </p:nvGraphicFramePr>
+            <p:xfrm>
+              <a:off x="1981200" y="942108"/>
+              <a:ext cx="8236527" cy="4966855"/>
+            </p:xfrm>
+            <a:graphic>
+              <a:graphicData uri="http://schemas.openxmlformats.org/drawingml/2006/table">
+                <a:tbl>
+                  <a:tblPr bandRow="1">
+                    <a:tableStyleId>{BC89EF96-8CEA-46FF-86C4-4CE0E7609802}</a:tableStyleId>
+                  </a:tblPr>
+                  <a:tblGrid>
+                    <a:gridCol w="2745509">
+                      <a:extLst>
+                        <a:ext uri="{9D8B030D-6E8A-4147-A177-3AD203B41FA5}">
+                          <a16:colId xmlns:a16="http://schemas.microsoft.com/office/drawing/2014/main" val="3160644143"/>
+                        </a:ext>
+                      </a:extLst>
+                    </a:gridCol>
+                    <a:gridCol w="2745509">
+                      <a:extLst>
+                        <a:ext uri="{9D8B030D-6E8A-4147-A177-3AD203B41FA5}">
+                          <a16:colId xmlns:a16="http://schemas.microsoft.com/office/drawing/2014/main" val="3886888139"/>
+                        </a:ext>
+                      </a:extLst>
+                    </a:gridCol>
+                    <a:gridCol w="2745509">
+                      <a:extLst>
+                        <a:ext uri="{9D8B030D-6E8A-4147-A177-3AD203B41FA5}">
+                          <a16:colId xmlns:a16="http://schemas.microsoft.com/office/drawing/2014/main" val="2101699905"/>
+                        </a:ext>
+                      </a:extLst>
+                    </a:gridCol>
+                  </a:tblGrid>
+                  <a:tr h="1594423">
+                    <a:tc>
+                      <a:txBody>
+                        <a:bodyPr/>
+                        <a:lstStyle/>
+                        <a:p>
+                          <a:pPr algn="ctr"/>
+                          <a:r>
+                            <a:rPr lang="en-US" sz="3200" b="1" dirty="0"/>
+                            <a:t>Income</a:t>
+                          </a:r>
+                        </a:p>
+                      </a:txBody>
+                      <a:tcPr anchor="ctr"/>
+                    </a:tc>
+                    <a:tc>
+                      <a:txBody>
+                        <a:bodyPr/>
+                        <a:lstStyle/>
+                        <a:p>
+                          <a:pPr algn="ctr"/>
+                          <a:r>
+                            <a:rPr lang="en-US" sz="3200" b="1" dirty="0"/>
+                            <a:t>Capital</a:t>
+                          </a:r>
+                        </a:p>
+                      </a:txBody>
+                      <a:tcPr anchor="ctr"/>
+                    </a:tc>
+                    <a:tc>
+                      <a:txBody>
+                        <a:bodyPr/>
+                        <a:lstStyle/>
+                        <a:p>
+                          <a:pPr algn="ctr"/>
+                          <a:r>
+                            <a:rPr lang="en-US" sz="3200" b="1" dirty="0"/>
+                            <a:t>Land</a:t>
+                          </a:r>
+                        </a:p>
+                      </a:txBody>
+                      <a:tcPr anchor="ctr"/>
+                    </a:tc>
+                    <a:extLst>
+                      <a:ext uri="{0D108BD9-81ED-4DB2-BD59-A6C34878D82A}">
+                        <a16:rowId xmlns:a16="http://schemas.microsoft.com/office/drawing/2014/main" val="1453696166"/>
+                      </a:ext>
+                    </a:extLst>
+                  </a:tr>
+                  <a:tr h="1778009">
+                    <a:tc>
+                      <a:txBody>
+                        <a:bodyPr/>
+                        <a:lstStyle/>
+                        <a:p>
+                          <a:pPr algn="ctr"/>
+                          <a:r>
+                            <a:rPr lang="en-US" sz="3200" b="1" dirty="0"/>
+                            <a:t>Country A</a:t>
+                          </a:r>
+                        </a:p>
+                        <a:p>
+                          <a:pPr algn="ctr"/>
+                          <a:r>
+                            <a:rPr lang="en-US" sz="3200" b="1" dirty="0"/>
+                            <a:t>Owner </a:t>
+                          </a:r>
+                        </a:p>
+                      </a:txBody>
+                      <a:tcPr anchor="ctr"/>
+                    </a:tc>
+                    <a:tc>
+                      <a:txBody>
+                        <a:bodyPr/>
+                        <a:lstStyle/>
+                        <a:p>
+                          <a:endParaRPr lang="en-US"/>
+                        </a:p>
+                      </a:txBody>
+                      <a:tcPr anchor="ctr">
+                        <a:blipFill>
+                          <a:blip r:embed="rId2"/>
+                          <a:stretch>
+                            <a:fillRect l="-100667" t="-90068" r="-100667" b="-90411"/>
+                          </a:stretch>
+                        </a:blipFill>
+                      </a:tcPr>
+                    </a:tc>
+                    <a:tc>
+                      <a:txBody>
+                        <a:bodyPr/>
+                        <a:lstStyle/>
+                        <a:p>
+                          <a:endParaRPr lang="en-US"/>
+                        </a:p>
+                      </a:txBody>
+                      <a:tcPr anchor="ctr">
+                        <a:blipFill>
+                          <a:blip r:embed="rId2"/>
+                          <a:stretch>
+                            <a:fillRect l="-200222" t="-90068" r="-443" b="-90411"/>
+                          </a:stretch>
+                        </a:blipFill>
+                      </a:tcPr>
+                    </a:tc>
+                    <a:extLst>
+                      <a:ext uri="{0D108BD9-81ED-4DB2-BD59-A6C34878D82A}">
+                        <a16:rowId xmlns:a16="http://schemas.microsoft.com/office/drawing/2014/main" val="345930810"/>
+                      </a:ext>
+                    </a:extLst>
+                  </a:tr>
+                  <a:tr h="1594423">
+                    <a:tc>
+                      <a:txBody>
+                        <a:bodyPr/>
+                        <a:lstStyle/>
+                        <a:p>
+                          <a:pPr algn="ctr"/>
+                          <a:r>
+                            <a:rPr lang="en-US" sz="3200" b="1" dirty="0"/>
+                            <a:t>Country B Owner</a:t>
+                          </a:r>
+                        </a:p>
+                      </a:txBody>
+                      <a:tcPr anchor="ctr"/>
+                    </a:tc>
+                    <a:tc>
+                      <a:txBody>
+                        <a:bodyPr/>
+                        <a:lstStyle/>
+                        <a:p>
+                          <a:endParaRPr lang="en-US"/>
+                        </a:p>
+                      </a:txBody>
+                      <a:tcPr anchor="ctr">
+                        <a:blipFill>
+                          <a:blip r:embed="rId2"/>
+                          <a:stretch>
+                            <a:fillRect l="-100667" t="-211832" r="-100667" b="-763"/>
+                          </a:stretch>
+                        </a:blipFill>
+                      </a:tcPr>
+                    </a:tc>
+                    <a:tc>
+                      <a:txBody>
+                        <a:bodyPr/>
+                        <a:lstStyle/>
+                        <a:p>
+                          <a:endParaRPr lang="en-US"/>
+                        </a:p>
+                      </a:txBody>
+                      <a:tcPr anchor="ctr">
+                        <a:blipFill>
+                          <a:blip r:embed="rId2"/>
+                          <a:stretch>
+                            <a:fillRect l="-200222" t="-211832" r="-443" b="-763"/>
+                          </a:stretch>
+                        </a:blipFill>
+                      </a:tcPr>
+                    </a:tc>
+                    <a:extLst>
+                      <a:ext uri="{0D108BD9-81ED-4DB2-BD59-A6C34878D82A}">
+                        <a16:rowId xmlns:a16="http://schemas.microsoft.com/office/drawing/2014/main" val="1095405567"/>
+                      </a:ext>
+                    </a:extLst>
+                  </a:tr>
+                </a:tbl>
+              </a:graphicData>
+            </a:graphic>
+          </p:graphicFrame>
+        </mc:Fallback>
+      </mc:AlternateContent>
+    </p:spTree>
+    <p:extLst>
+      <p:ext uri="{BB962C8B-B14F-4D97-AF65-F5344CB8AC3E}">
+        <p14:creationId xmlns:p14="http://schemas.microsoft.com/office/powerpoint/2010/main" val="853277500"/>
       </p:ext>
     </p:extLst>
   </p:cSld>

</xml_diff>

<commit_message>
updated with lecture 03 images
</commit_message>
<xml_diff>
--- a/Slides/graph-creator.pptx
+++ b/Slides/graph-creator.pptx
@@ -36,6 +36,8 @@
     <p:sldId id="281" r:id="rId30"/>
     <p:sldId id="285" r:id="rId31"/>
     <p:sldId id="286" r:id="rId32"/>
+    <p:sldId id="287" r:id="rId33"/>
+    <p:sldId id="288" r:id="rId34"/>
   </p:sldIdLst>
   <p:sldSz cx="12192000" cy="6858000"/>
   <p:notesSz cx="6858000" cy="9144000"/>
@@ -289,7 +291,7 @@
           <a:p>
             <a:fld id="{7F9C3969-815D-4313-AD47-20854D5F097C}" type="datetimeFigureOut">
               <a:rPr lang="en-US" smtClean="0"/>
-              <a:t>10/12/2024</a:t>
+              <a:t>10/20/2024</a:t>
             </a:fld>
             <a:endParaRPr lang="en-US"/>
           </a:p>
@@ -487,7 +489,7 @@
           <a:p>
             <a:fld id="{7F9C3969-815D-4313-AD47-20854D5F097C}" type="datetimeFigureOut">
               <a:rPr lang="en-US" smtClean="0"/>
-              <a:t>10/12/2024</a:t>
+              <a:t>10/20/2024</a:t>
             </a:fld>
             <a:endParaRPr lang="en-US"/>
           </a:p>
@@ -695,7 +697,7 @@
           <a:p>
             <a:fld id="{7F9C3969-815D-4313-AD47-20854D5F097C}" type="datetimeFigureOut">
               <a:rPr lang="en-US" smtClean="0"/>
-              <a:t>10/12/2024</a:t>
+              <a:t>10/20/2024</a:t>
             </a:fld>
             <a:endParaRPr lang="en-US"/>
           </a:p>
@@ -893,7 +895,7 @@
           <a:p>
             <a:fld id="{7F9C3969-815D-4313-AD47-20854D5F097C}" type="datetimeFigureOut">
               <a:rPr lang="en-US" smtClean="0"/>
-              <a:t>10/12/2024</a:t>
+              <a:t>10/20/2024</a:t>
             </a:fld>
             <a:endParaRPr lang="en-US"/>
           </a:p>
@@ -1168,7 +1170,7 @@
           <a:p>
             <a:fld id="{7F9C3969-815D-4313-AD47-20854D5F097C}" type="datetimeFigureOut">
               <a:rPr lang="en-US" smtClean="0"/>
-              <a:t>10/12/2024</a:t>
+              <a:t>10/20/2024</a:t>
             </a:fld>
             <a:endParaRPr lang="en-US"/>
           </a:p>
@@ -1433,7 +1435,7 @@
           <a:p>
             <a:fld id="{7F9C3969-815D-4313-AD47-20854D5F097C}" type="datetimeFigureOut">
               <a:rPr lang="en-US" smtClean="0"/>
-              <a:t>10/12/2024</a:t>
+              <a:t>10/20/2024</a:t>
             </a:fld>
             <a:endParaRPr lang="en-US"/>
           </a:p>
@@ -1845,7 +1847,7 @@
           <a:p>
             <a:fld id="{7F9C3969-815D-4313-AD47-20854D5F097C}" type="datetimeFigureOut">
               <a:rPr lang="en-US" smtClean="0"/>
-              <a:t>10/12/2024</a:t>
+              <a:t>10/20/2024</a:t>
             </a:fld>
             <a:endParaRPr lang="en-US"/>
           </a:p>
@@ -1986,7 +1988,7 @@
           <a:p>
             <a:fld id="{7F9C3969-815D-4313-AD47-20854D5F097C}" type="datetimeFigureOut">
               <a:rPr lang="en-US" smtClean="0"/>
-              <a:t>10/12/2024</a:t>
+              <a:t>10/20/2024</a:t>
             </a:fld>
             <a:endParaRPr lang="en-US"/>
           </a:p>
@@ -2099,7 +2101,7 @@
           <a:p>
             <a:fld id="{7F9C3969-815D-4313-AD47-20854D5F097C}" type="datetimeFigureOut">
               <a:rPr lang="en-US" smtClean="0"/>
-              <a:t>10/12/2024</a:t>
+              <a:t>10/20/2024</a:t>
             </a:fld>
             <a:endParaRPr lang="en-US"/>
           </a:p>
@@ -2410,7 +2412,7 @@
           <a:p>
             <a:fld id="{7F9C3969-815D-4313-AD47-20854D5F097C}" type="datetimeFigureOut">
               <a:rPr lang="en-US" smtClean="0"/>
-              <a:t>10/12/2024</a:t>
+              <a:t>10/20/2024</a:t>
             </a:fld>
             <a:endParaRPr lang="en-US"/>
           </a:p>
@@ -2698,7 +2700,7 @@
           <a:p>
             <a:fld id="{7F9C3969-815D-4313-AD47-20854D5F097C}" type="datetimeFigureOut">
               <a:rPr lang="en-US" smtClean="0"/>
-              <a:t>10/12/2024</a:t>
+              <a:t>10/20/2024</a:t>
             </a:fld>
             <a:endParaRPr lang="en-US"/>
           </a:p>
@@ -2939,7 +2941,7 @@
           <a:p>
             <a:fld id="{7F9C3969-815D-4313-AD47-20854D5F097C}" type="datetimeFigureOut">
               <a:rPr lang="en-US" smtClean="0"/>
-              <a:t>10/12/2024</a:t>
+              <a:t>10/20/2024</a:t>
             </a:fld>
             <a:endParaRPr lang="en-US"/>
           </a:p>
@@ -14711,8 +14713,8 @@
           <a:chExt cx="0" cy="0"/>
         </a:xfrm>
       </p:grpSpPr>
-      <mc:AlternateContent xmlns:mc="http://schemas.openxmlformats.org/markup-compatibility/2006">
-        <mc:Choice xmlns:a14="http://schemas.microsoft.com/office/drawing/2010/main" Requires="a14">
+      <mc:AlternateContent xmlns:mc="http://schemas.openxmlformats.org/markup-compatibility/2006" xmlns:a14="http://schemas.microsoft.com/office/drawing/2010/main">
+        <mc:Choice Requires="a14">
           <p:graphicFrame>
             <p:nvGraphicFramePr>
               <p:cNvPr id="2" name="Table 1">
@@ -15005,7 +15007,7 @@
             </a:graphic>
           </p:graphicFrame>
         </mc:Choice>
-        <mc:Fallback>
+        <mc:Fallback xmlns="">
           <p:graphicFrame>
             <p:nvGraphicFramePr>
               <p:cNvPr id="2" name="Table 1">
@@ -15235,6 +15237,2486 @@
     <p:extLst>
       <p:ext uri="{BB962C8B-B14F-4D97-AF65-F5344CB8AC3E}">
         <p14:creationId xmlns:p14="http://schemas.microsoft.com/office/powerpoint/2010/main" val="853277500"/>
+      </p:ext>
+    </p:extLst>
+  </p:cSld>
+  <p:clrMapOvr>
+    <a:masterClrMapping/>
+  </p:clrMapOvr>
+</p:sld>
+</file>
+
+<file path=ppt/slides/slide32.xml><?xml version="1.0" encoding="utf-8"?>
+<p:sld xmlns:a="http://schemas.openxmlformats.org/drawingml/2006/main" xmlns:r="http://schemas.openxmlformats.org/officeDocument/2006/relationships" xmlns:p="http://schemas.openxmlformats.org/presentationml/2006/main">
+  <p:cSld>
+    <p:spTree>
+      <p:nvGrpSpPr>
+        <p:cNvPr id="1" name=""/>
+        <p:cNvGrpSpPr/>
+        <p:nvPr/>
+      </p:nvGrpSpPr>
+      <p:grpSpPr>
+        <a:xfrm>
+          <a:off x="0" y="0"/>
+          <a:ext cx="0" cy="0"/>
+          <a:chOff x="0" y="0"/>
+          <a:chExt cx="0" cy="0"/>
+        </a:xfrm>
+      </p:grpSpPr>
+      <p:grpSp>
+        <p:nvGrpSpPr>
+          <p:cNvPr id="19" name="Group 18">
+            <a:extLst>
+              <a:ext uri="{FF2B5EF4-FFF2-40B4-BE49-F238E27FC236}">
+                <a16:creationId xmlns:a16="http://schemas.microsoft.com/office/drawing/2014/main" id="{4E6016A1-7D86-8E60-348F-BF548BCDC948}"/>
+              </a:ext>
+            </a:extLst>
+          </p:cNvPr>
+          <p:cNvGrpSpPr/>
+          <p:nvPr/>
+        </p:nvGrpSpPr>
+        <p:grpSpPr>
+          <a:xfrm>
+            <a:off x="2333625" y="3595262"/>
+            <a:ext cx="2834110" cy="2482564"/>
+            <a:chOff x="2333625" y="1600298"/>
+            <a:chExt cx="1160145" cy="4477528"/>
+          </a:xfrm>
+        </p:grpSpPr>
+        <p:cxnSp>
+          <p:nvCxnSpPr>
+            <p:cNvPr id="20" name="Straight Connector 19">
+              <a:extLst>
+                <a:ext uri="{FF2B5EF4-FFF2-40B4-BE49-F238E27FC236}">
+                  <a16:creationId xmlns:a16="http://schemas.microsoft.com/office/drawing/2014/main" id="{503B5133-79F1-8DF6-F715-B7BEB70E5F61}"/>
+                </a:ext>
+              </a:extLst>
+            </p:cNvPr>
+            <p:cNvCxnSpPr>
+              <a:cxnSpLocks/>
+            </p:cNvCxnSpPr>
+            <p:nvPr/>
+          </p:nvCxnSpPr>
+          <p:spPr>
+            <a:xfrm>
+              <a:off x="2333625" y="1600298"/>
+              <a:ext cx="1160145" cy="0"/>
+            </a:xfrm>
+            <a:prstGeom prst="line">
+              <a:avLst/>
+            </a:prstGeom>
+            <a:ln>
+              <a:prstDash val="dash"/>
+            </a:ln>
+          </p:spPr>
+          <p:style>
+            <a:lnRef idx="2">
+              <a:schemeClr val="accent1"/>
+            </a:lnRef>
+            <a:fillRef idx="0">
+              <a:schemeClr val="accent1"/>
+            </a:fillRef>
+            <a:effectRef idx="1">
+              <a:schemeClr val="accent1"/>
+            </a:effectRef>
+            <a:fontRef idx="minor">
+              <a:schemeClr val="tx1"/>
+            </a:fontRef>
+          </p:style>
+        </p:cxnSp>
+        <p:cxnSp>
+          <p:nvCxnSpPr>
+            <p:cNvPr id="21" name="Straight Connector 20">
+              <a:extLst>
+                <a:ext uri="{FF2B5EF4-FFF2-40B4-BE49-F238E27FC236}">
+                  <a16:creationId xmlns:a16="http://schemas.microsoft.com/office/drawing/2014/main" id="{95198D6D-DCC4-3869-2E41-0DFFC523AAC3}"/>
+                </a:ext>
+              </a:extLst>
+            </p:cNvPr>
+            <p:cNvCxnSpPr>
+              <a:cxnSpLocks/>
+            </p:cNvCxnSpPr>
+            <p:nvPr/>
+          </p:nvCxnSpPr>
+          <p:spPr>
+            <a:xfrm>
+              <a:off x="3493770" y="1600298"/>
+              <a:ext cx="0" cy="4477528"/>
+            </a:xfrm>
+            <a:prstGeom prst="line">
+              <a:avLst/>
+            </a:prstGeom>
+            <a:ln>
+              <a:prstDash val="dash"/>
+            </a:ln>
+          </p:spPr>
+          <p:style>
+            <a:lnRef idx="2">
+              <a:schemeClr val="accent1"/>
+            </a:lnRef>
+            <a:fillRef idx="0">
+              <a:schemeClr val="accent1"/>
+            </a:fillRef>
+            <a:effectRef idx="1">
+              <a:schemeClr val="accent1"/>
+            </a:effectRef>
+            <a:fontRef idx="minor">
+              <a:schemeClr val="tx1"/>
+            </a:fontRef>
+          </p:style>
+        </p:cxnSp>
+      </p:grpSp>
+      <p:cxnSp>
+        <p:nvCxnSpPr>
+          <p:cNvPr id="3" name="Straight Connector 2">
+            <a:extLst>
+              <a:ext uri="{FF2B5EF4-FFF2-40B4-BE49-F238E27FC236}">
+                <a16:creationId xmlns:a16="http://schemas.microsoft.com/office/drawing/2014/main" id="{46AA828E-9415-5767-D83A-CBB8CFF31BCE}"/>
+              </a:ext>
+            </a:extLst>
+          </p:cNvPr>
+          <p:cNvCxnSpPr>
+            <a:cxnSpLocks/>
+          </p:cNvCxnSpPr>
+          <p:nvPr/>
+        </p:nvCxnSpPr>
+        <p:spPr>
+          <a:xfrm>
+            <a:off x="2400961" y="1397835"/>
+            <a:ext cx="5461494" cy="4360327"/>
+          </a:xfrm>
+          <a:prstGeom prst="line">
+            <a:avLst/>
+          </a:prstGeom>
+          <a:ln w="57150">
+            <a:solidFill>
+              <a:schemeClr val="accent2">
+                <a:lumMod val="75000"/>
+              </a:schemeClr>
+            </a:solidFill>
+          </a:ln>
+        </p:spPr>
+        <p:style>
+          <a:lnRef idx="2">
+            <a:schemeClr val="accent1"/>
+          </a:lnRef>
+          <a:fillRef idx="0">
+            <a:schemeClr val="accent1"/>
+          </a:fillRef>
+          <a:effectRef idx="1">
+            <a:schemeClr val="accent1"/>
+          </a:effectRef>
+          <a:fontRef idx="minor">
+            <a:schemeClr val="tx1"/>
+          </a:fontRef>
+        </p:style>
+      </p:cxnSp>
+      <p:grpSp>
+        <p:nvGrpSpPr>
+          <p:cNvPr id="4" name="Group 3">
+            <a:extLst>
+              <a:ext uri="{FF2B5EF4-FFF2-40B4-BE49-F238E27FC236}">
+                <a16:creationId xmlns:a16="http://schemas.microsoft.com/office/drawing/2014/main" id="{F1EA1F44-954A-86E6-DA94-B2BC1380DE3E}"/>
+              </a:ext>
+            </a:extLst>
+          </p:cNvPr>
+          <p:cNvGrpSpPr/>
+          <p:nvPr/>
+        </p:nvGrpSpPr>
+        <p:grpSpPr>
+          <a:xfrm>
+            <a:off x="2256508" y="322220"/>
+            <a:ext cx="6601485" cy="5839485"/>
+            <a:chOff x="1023042" y="115432"/>
+            <a:chExt cx="9942214" cy="6627136"/>
+          </a:xfrm>
+        </p:grpSpPr>
+        <p:cxnSp>
+          <p:nvCxnSpPr>
+            <p:cNvPr id="5" name="Straight Connector 4">
+              <a:extLst>
+                <a:ext uri="{FF2B5EF4-FFF2-40B4-BE49-F238E27FC236}">
+                  <a16:creationId xmlns:a16="http://schemas.microsoft.com/office/drawing/2014/main" id="{C4A29792-2242-1F89-749B-9B26F5F25903}"/>
+                </a:ext>
+              </a:extLst>
+            </p:cNvPr>
+            <p:cNvCxnSpPr/>
+            <p:nvPr/>
+          </p:nvCxnSpPr>
+          <p:spPr>
+            <a:xfrm>
+              <a:off x="1032095" y="115432"/>
+              <a:ext cx="0" cy="6627136"/>
+            </a:xfrm>
+            <a:prstGeom prst="line">
+              <a:avLst/>
+            </a:prstGeom>
+            <a:ln w="57150"/>
+          </p:spPr>
+          <p:style>
+            <a:lnRef idx="3">
+              <a:schemeClr val="dk1"/>
+            </a:lnRef>
+            <a:fillRef idx="0">
+              <a:schemeClr val="dk1"/>
+            </a:fillRef>
+            <a:effectRef idx="2">
+              <a:schemeClr val="dk1"/>
+            </a:effectRef>
+            <a:fontRef idx="minor">
+              <a:schemeClr val="tx1"/>
+            </a:fontRef>
+          </p:style>
+        </p:cxnSp>
+        <p:cxnSp>
+          <p:nvCxnSpPr>
+            <p:cNvPr id="6" name="Straight Connector 5">
+              <a:extLst>
+                <a:ext uri="{FF2B5EF4-FFF2-40B4-BE49-F238E27FC236}">
+                  <a16:creationId xmlns:a16="http://schemas.microsoft.com/office/drawing/2014/main" id="{FD14B8F9-CE01-0C5D-9B2C-DF0C09B0D582}"/>
+                </a:ext>
+              </a:extLst>
+            </p:cNvPr>
+            <p:cNvCxnSpPr>
+              <a:cxnSpLocks/>
+            </p:cNvCxnSpPr>
+            <p:nvPr/>
+          </p:nvCxnSpPr>
+          <p:spPr>
+            <a:xfrm flipH="1">
+              <a:off x="1023042" y="6732006"/>
+              <a:ext cx="9942214" cy="0"/>
+            </a:xfrm>
+            <a:prstGeom prst="line">
+              <a:avLst/>
+            </a:prstGeom>
+            <a:ln w="57150"/>
+          </p:spPr>
+          <p:style>
+            <a:lnRef idx="3">
+              <a:schemeClr val="dk1"/>
+            </a:lnRef>
+            <a:fillRef idx="0">
+              <a:schemeClr val="dk1"/>
+            </a:fillRef>
+            <a:effectRef idx="2">
+              <a:schemeClr val="dk1"/>
+            </a:effectRef>
+            <a:fontRef idx="minor">
+              <a:schemeClr val="tx1"/>
+            </a:fontRef>
+          </p:style>
+        </p:cxnSp>
+      </p:grpSp>
+      <p:cxnSp>
+        <p:nvCxnSpPr>
+          <p:cNvPr id="12" name="Straight Connector 11">
+            <a:extLst>
+              <a:ext uri="{FF2B5EF4-FFF2-40B4-BE49-F238E27FC236}">
+                <a16:creationId xmlns:a16="http://schemas.microsoft.com/office/drawing/2014/main" id="{E8478B90-0BB2-55D4-D297-5B11D7E56CD1}"/>
+              </a:ext>
+            </a:extLst>
+          </p:cNvPr>
+          <p:cNvCxnSpPr>
+            <a:cxnSpLocks/>
+          </p:cNvCxnSpPr>
+          <p:nvPr/>
+        </p:nvCxnSpPr>
+        <p:spPr>
+          <a:xfrm flipH="1">
+            <a:off x="2632940" y="1362909"/>
+            <a:ext cx="5229515" cy="4395253"/>
+          </a:xfrm>
+          <a:prstGeom prst="line">
+            <a:avLst/>
+          </a:prstGeom>
+          <a:ln w="57150">
+            <a:solidFill>
+              <a:schemeClr val="accent6">
+                <a:lumMod val="75000"/>
+              </a:schemeClr>
+            </a:solidFill>
+          </a:ln>
+        </p:spPr>
+        <p:style>
+          <a:lnRef idx="2">
+            <a:schemeClr val="accent1"/>
+          </a:lnRef>
+          <a:fillRef idx="0">
+            <a:schemeClr val="accent1"/>
+          </a:fillRef>
+          <a:effectRef idx="1">
+            <a:schemeClr val="accent1"/>
+          </a:effectRef>
+          <a:fontRef idx="minor">
+            <a:schemeClr val="tx1"/>
+          </a:fontRef>
+        </p:style>
+      </p:cxnSp>
+      <mc:AlternateContent xmlns:mc="http://schemas.openxmlformats.org/markup-compatibility/2006">
+        <mc:Choice xmlns:a14="http://schemas.microsoft.com/office/drawing/2010/main" Requires="a14">
+          <p:sp>
+            <p:nvSpPr>
+              <p:cNvPr id="16" name="TextBox 15">
+                <a:extLst>
+                  <a:ext uri="{FF2B5EF4-FFF2-40B4-BE49-F238E27FC236}">
+                    <a16:creationId xmlns:a16="http://schemas.microsoft.com/office/drawing/2014/main" id="{7FF12C73-48D6-AAB3-D77F-3DF5E0F83FB8}"/>
+                  </a:ext>
+                </a:extLst>
+              </p:cNvPr>
+              <p:cNvSpPr txBox="1"/>
+              <p:nvPr/>
+            </p:nvSpPr>
+            <p:spPr>
+              <a:xfrm>
+                <a:off x="7744776" y="1139620"/>
+                <a:ext cx="2112269" cy="523220"/>
+              </a:xfrm>
+              <a:prstGeom prst="rect">
+                <a:avLst/>
+              </a:prstGeom>
+              <a:noFill/>
+            </p:spPr>
+            <p:txBody>
+              <a:bodyPr wrap="square" rtlCol="0">
+                <a:spAutoFit/>
+              </a:bodyPr>
+              <a:lstStyle/>
+              <a:p>
+                <a14:m>
+                  <m:oMathPara xmlns:m="http://schemas.openxmlformats.org/officeDocument/2006/math">
+                    <m:oMathParaPr>
+                      <m:jc m:val="centerGroup"/>
+                    </m:oMathParaPr>
+                    <m:oMath xmlns:m="http://schemas.openxmlformats.org/officeDocument/2006/math">
+                      <m:r>
+                        <a:rPr lang="en-US" sz="2800" b="1" i="1" smtClean="0">
+                          <a:solidFill>
+                            <a:schemeClr val="accent6">
+                              <a:lumMod val="75000"/>
+                            </a:schemeClr>
+                          </a:solidFill>
+                          <a:latin typeface="Cambria Math" panose="02040503050406030204" pitchFamily="18" charset="0"/>
+                          <a:cs typeface="Aharoni" panose="02010803020104030203" pitchFamily="2" charset="-79"/>
+                        </a:rPr>
+                        <m:t>𝑷</m:t>
+                      </m:r>
+                      <m:r>
+                        <a:rPr lang="en-US" sz="2800" b="1" i="1" smtClean="0">
+                          <a:solidFill>
+                            <a:schemeClr val="accent6">
+                              <a:lumMod val="75000"/>
+                            </a:schemeClr>
+                          </a:solidFill>
+                          <a:latin typeface="Cambria Math" panose="02040503050406030204" pitchFamily="18" charset="0"/>
+                          <a:cs typeface="Aharoni" panose="02010803020104030203" pitchFamily="2" charset="-79"/>
+                        </a:rPr>
+                        <m:t>∗</m:t>
+                      </m:r>
+                      <m:r>
+                        <a:rPr lang="en-US" sz="2800" b="1" i="1" smtClean="0">
+                          <a:solidFill>
+                            <a:schemeClr val="accent6">
+                              <a:lumMod val="75000"/>
+                            </a:schemeClr>
+                          </a:solidFill>
+                          <a:latin typeface="Cambria Math" panose="02040503050406030204" pitchFamily="18" charset="0"/>
+                          <a:cs typeface="Aharoni" panose="02010803020104030203" pitchFamily="2" charset="-79"/>
+                        </a:rPr>
+                        <m:t>𝑴𝑷</m:t>
+                      </m:r>
+                      <m:sSub>
+                        <m:sSubPr>
+                          <m:ctrlPr>
+                            <a:rPr lang="en-US" sz="2800" b="1" i="1" smtClean="0">
+                              <a:solidFill>
+                                <a:schemeClr val="accent6">
+                                  <a:lumMod val="75000"/>
+                                </a:schemeClr>
+                              </a:solidFill>
+                              <a:latin typeface="Cambria Math" panose="02040503050406030204" pitchFamily="18" charset="0"/>
+                              <a:cs typeface="Aharoni" panose="02010803020104030203" pitchFamily="2" charset="-79"/>
+                            </a:rPr>
+                          </m:ctrlPr>
+                        </m:sSubPr>
+                        <m:e>
+                          <m:r>
+                            <a:rPr lang="en-US" sz="2800" b="1" i="1" smtClean="0">
+                              <a:solidFill>
+                                <a:schemeClr val="accent6">
+                                  <a:lumMod val="75000"/>
+                                </a:schemeClr>
+                              </a:solidFill>
+                              <a:latin typeface="Cambria Math" panose="02040503050406030204" pitchFamily="18" charset="0"/>
+                              <a:cs typeface="Aharoni" panose="02010803020104030203" pitchFamily="2" charset="-79"/>
+                            </a:rPr>
+                            <m:t>𝑳</m:t>
+                          </m:r>
+                        </m:e>
+                        <m:sub>
+                          <m:r>
+                            <a:rPr lang="en-US" sz="2800" b="1" i="1" smtClean="0">
+                              <a:solidFill>
+                                <a:schemeClr val="accent6">
+                                  <a:lumMod val="75000"/>
+                                </a:schemeClr>
+                              </a:solidFill>
+                              <a:latin typeface="Cambria Math" panose="02040503050406030204" pitchFamily="18" charset="0"/>
+                              <a:cs typeface="Aharoni" panose="02010803020104030203" pitchFamily="2" charset="-79"/>
+                            </a:rPr>
+                            <m:t>𝑿</m:t>
+                          </m:r>
+                        </m:sub>
+                      </m:sSub>
+                    </m:oMath>
+                  </m:oMathPara>
+                </a14:m>
+                <a:endParaRPr lang="en-US" sz="2800" b="1" dirty="0">
+                  <a:solidFill>
+                    <a:schemeClr val="accent6">
+                      <a:lumMod val="75000"/>
+                    </a:schemeClr>
+                  </a:solidFill>
+                  <a:latin typeface="Aharoni" panose="02010803020104030203" pitchFamily="2" charset="-79"/>
+                  <a:cs typeface="Aharoni" panose="02010803020104030203" pitchFamily="2" charset="-79"/>
+                </a:endParaRPr>
+              </a:p>
+            </p:txBody>
+          </p:sp>
+        </mc:Choice>
+        <mc:Fallback>
+          <p:sp>
+            <p:nvSpPr>
+              <p:cNvPr id="16" name="TextBox 15">
+                <a:extLst>
+                  <a:ext uri="{FF2B5EF4-FFF2-40B4-BE49-F238E27FC236}">
+                    <a16:creationId xmlns:a16="http://schemas.microsoft.com/office/drawing/2014/main" id="{7FF12C73-48D6-AAB3-D77F-3DF5E0F83FB8}"/>
+                  </a:ext>
+                </a:extLst>
+              </p:cNvPr>
+              <p:cNvSpPr txBox="1">
+                <a:spLocks noRot="1" noChangeAspect="1" noMove="1" noResize="1" noEditPoints="1" noAdjustHandles="1" noChangeArrowheads="1" noChangeShapeType="1" noTextEdit="1"/>
+              </p:cNvSpPr>
+              <p:nvPr/>
+            </p:nvSpPr>
+            <p:spPr>
+              <a:xfrm>
+                <a:off x="7744776" y="1139620"/>
+                <a:ext cx="2112269" cy="523220"/>
+              </a:xfrm>
+              <a:prstGeom prst="rect">
+                <a:avLst/>
+              </a:prstGeom>
+              <a:blipFill>
+                <a:blip r:embed="rId2"/>
+                <a:stretch>
+                  <a:fillRect/>
+                </a:stretch>
+              </a:blipFill>
+            </p:spPr>
+            <p:txBody>
+              <a:bodyPr/>
+              <a:lstStyle/>
+              <a:p>
+                <a:r>
+                  <a:rPr lang="en-US">
+                    <a:noFill/>
+                  </a:rPr>
+                  <a:t> </a:t>
+                </a:r>
+              </a:p>
+            </p:txBody>
+          </p:sp>
+        </mc:Fallback>
+      </mc:AlternateContent>
+      <mc:AlternateContent xmlns:mc="http://schemas.openxmlformats.org/markup-compatibility/2006">
+        <mc:Choice xmlns:a14="http://schemas.microsoft.com/office/drawing/2010/main" Requires="a14">
+          <p:sp>
+            <p:nvSpPr>
+              <p:cNvPr id="17" name="TextBox 16">
+                <a:extLst>
+                  <a:ext uri="{FF2B5EF4-FFF2-40B4-BE49-F238E27FC236}">
+                    <a16:creationId xmlns:a16="http://schemas.microsoft.com/office/drawing/2014/main" id="{FCE84128-FDB5-15D6-454E-9FA78B6E2655}"/>
+                  </a:ext>
+                </a:extLst>
+              </p:cNvPr>
+              <p:cNvSpPr txBox="1"/>
+              <p:nvPr/>
+            </p:nvSpPr>
+            <p:spPr>
+              <a:xfrm>
+                <a:off x="7744775" y="5479316"/>
+                <a:ext cx="2112269" cy="523220"/>
+              </a:xfrm>
+              <a:prstGeom prst="rect">
+                <a:avLst/>
+              </a:prstGeom>
+              <a:noFill/>
+            </p:spPr>
+            <p:txBody>
+              <a:bodyPr wrap="square" rtlCol="0">
+                <a:spAutoFit/>
+              </a:bodyPr>
+              <a:lstStyle/>
+              <a:p>
+                <a14:m>
+                  <m:oMathPara xmlns:m="http://schemas.openxmlformats.org/officeDocument/2006/math">
+                    <m:oMathParaPr>
+                      <m:jc m:val="centerGroup"/>
+                    </m:oMathParaPr>
+                    <m:oMath xmlns:m="http://schemas.openxmlformats.org/officeDocument/2006/math">
+                      <m:r>
+                        <a:rPr lang="en-US" sz="2800" b="1" i="1" smtClean="0">
+                          <a:solidFill>
+                            <a:schemeClr val="accent2">
+                              <a:lumMod val="75000"/>
+                            </a:schemeClr>
+                          </a:solidFill>
+                          <a:latin typeface="Cambria Math" panose="02040503050406030204" pitchFamily="18" charset="0"/>
+                          <a:cs typeface="Aharoni" panose="02010803020104030203" pitchFamily="2" charset="-79"/>
+                        </a:rPr>
+                        <m:t>𝑷</m:t>
+                      </m:r>
+                      <m:r>
+                        <a:rPr lang="en-US" sz="2800" b="1" i="1" smtClean="0">
+                          <a:solidFill>
+                            <a:schemeClr val="accent2">
+                              <a:lumMod val="75000"/>
+                            </a:schemeClr>
+                          </a:solidFill>
+                          <a:latin typeface="Cambria Math" panose="02040503050406030204" pitchFamily="18" charset="0"/>
+                          <a:cs typeface="Aharoni" panose="02010803020104030203" pitchFamily="2" charset="-79"/>
+                        </a:rPr>
+                        <m:t>∗</m:t>
+                      </m:r>
+                      <m:r>
+                        <a:rPr lang="en-US" sz="2800" b="1" i="1" smtClean="0">
+                          <a:solidFill>
+                            <a:schemeClr val="accent2">
+                              <a:lumMod val="75000"/>
+                            </a:schemeClr>
+                          </a:solidFill>
+                          <a:latin typeface="Cambria Math" panose="02040503050406030204" pitchFamily="18" charset="0"/>
+                          <a:cs typeface="Aharoni" panose="02010803020104030203" pitchFamily="2" charset="-79"/>
+                        </a:rPr>
+                        <m:t>𝑴𝑷</m:t>
+                      </m:r>
+                      <m:sSub>
+                        <m:sSubPr>
+                          <m:ctrlPr>
+                            <a:rPr lang="en-US" sz="2800" b="1" i="1" smtClean="0">
+                              <a:solidFill>
+                                <a:schemeClr val="accent2">
+                                  <a:lumMod val="75000"/>
+                                </a:schemeClr>
+                              </a:solidFill>
+                              <a:latin typeface="Cambria Math" panose="02040503050406030204" pitchFamily="18" charset="0"/>
+                              <a:cs typeface="Aharoni" panose="02010803020104030203" pitchFamily="2" charset="-79"/>
+                            </a:rPr>
+                          </m:ctrlPr>
+                        </m:sSubPr>
+                        <m:e>
+                          <m:r>
+                            <a:rPr lang="en-US" sz="2800" b="1" i="1" smtClean="0">
+                              <a:solidFill>
+                                <a:schemeClr val="accent2">
+                                  <a:lumMod val="75000"/>
+                                </a:schemeClr>
+                              </a:solidFill>
+                              <a:latin typeface="Cambria Math" panose="02040503050406030204" pitchFamily="18" charset="0"/>
+                              <a:cs typeface="Aharoni" panose="02010803020104030203" pitchFamily="2" charset="-79"/>
+                            </a:rPr>
+                            <m:t>𝑳</m:t>
+                          </m:r>
+                        </m:e>
+                        <m:sub>
+                          <m:r>
+                            <a:rPr lang="en-US" sz="2800" b="1" i="1" smtClean="0">
+                              <a:solidFill>
+                                <a:schemeClr val="accent2">
+                                  <a:lumMod val="75000"/>
+                                </a:schemeClr>
+                              </a:solidFill>
+                              <a:latin typeface="Cambria Math" panose="02040503050406030204" pitchFamily="18" charset="0"/>
+                              <a:cs typeface="Aharoni" panose="02010803020104030203" pitchFamily="2" charset="-79"/>
+                            </a:rPr>
+                            <m:t>𝒀</m:t>
+                          </m:r>
+                        </m:sub>
+                      </m:sSub>
+                    </m:oMath>
+                  </m:oMathPara>
+                </a14:m>
+                <a:endParaRPr lang="en-US" sz="2800" b="1" dirty="0">
+                  <a:solidFill>
+                    <a:schemeClr val="accent2">
+                      <a:lumMod val="75000"/>
+                    </a:schemeClr>
+                  </a:solidFill>
+                  <a:latin typeface="Aharoni" panose="02010803020104030203" pitchFamily="2" charset="-79"/>
+                  <a:cs typeface="Aharoni" panose="02010803020104030203" pitchFamily="2" charset="-79"/>
+                </a:endParaRPr>
+              </a:p>
+            </p:txBody>
+          </p:sp>
+        </mc:Choice>
+        <mc:Fallback>
+          <p:sp>
+            <p:nvSpPr>
+              <p:cNvPr id="17" name="TextBox 16">
+                <a:extLst>
+                  <a:ext uri="{FF2B5EF4-FFF2-40B4-BE49-F238E27FC236}">
+                    <a16:creationId xmlns:a16="http://schemas.microsoft.com/office/drawing/2014/main" id="{FCE84128-FDB5-15D6-454E-9FA78B6E2655}"/>
+                  </a:ext>
+                </a:extLst>
+              </p:cNvPr>
+              <p:cNvSpPr txBox="1">
+                <a:spLocks noRot="1" noChangeAspect="1" noMove="1" noResize="1" noEditPoints="1" noAdjustHandles="1" noChangeArrowheads="1" noChangeShapeType="1" noTextEdit="1"/>
+              </p:cNvSpPr>
+              <p:nvPr/>
+            </p:nvSpPr>
+            <p:spPr>
+              <a:xfrm>
+                <a:off x="7744775" y="5479316"/>
+                <a:ext cx="2112269" cy="523220"/>
+              </a:xfrm>
+              <a:prstGeom prst="rect">
+                <a:avLst/>
+              </a:prstGeom>
+              <a:blipFill>
+                <a:blip r:embed="rId3"/>
+                <a:stretch>
+                  <a:fillRect/>
+                </a:stretch>
+              </a:blipFill>
+            </p:spPr>
+            <p:txBody>
+              <a:bodyPr/>
+              <a:lstStyle/>
+              <a:p>
+                <a:r>
+                  <a:rPr lang="en-US">
+                    <a:noFill/>
+                  </a:rPr>
+                  <a:t> </a:t>
+                </a:r>
+              </a:p>
+            </p:txBody>
+          </p:sp>
+        </mc:Fallback>
+      </mc:AlternateContent>
+      <p:sp>
+        <p:nvSpPr>
+          <p:cNvPr id="22" name="Oval 21">
+            <a:extLst>
+              <a:ext uri="{FF2B5EF4-FFF2-40B4-BE49-F238E27FC236}">
+                <a16:creationId xmlns:a16="http://schemas.microsoft.com/office/drawing/2014/main" id="{35922C6C-45E3-BB8A-C2B4-DECD851FB628}"/>
+              </a:ext>
+            </a:extLst>
+          </p:cNvPr>
+          <p:cNvSpPr/>
+          <p:nvPr/>
+        </p:nvSpPr>
+        <p:spPr>
+          <a:xfrm>
+            <a:off x="5072676" y="3520690"/>
+            <a:ext cx="190117" cy="172016"/>
+          </a:xfrm>
+          <a:prstGeom prst="ellipse">
+            <a:avLst/>
+          </a:prstGeom>
+          <a:solidFill>
+            <a:schemeClr val="accent2"/>
+          </a:solidFill>
+          <a:ln>
+            <a:solidFill>
+              <a:schemeClr val="tx1"/>
+            </a:solidFill>
+          </a:ln>
+        </p:spPr>
+        <p:style>
+          <a:lnRef idx="2">
+            <a:schemeClr val="accent1">
+              <a:shade val="15000"/>
+            </a:schemeClr>
+          </a:lnRef>
+          <a:fillRef idx="1">
+            <a:schemeClr val="accent1"/>
+          </a:fillRef>
+          <a:effectRef idx="0">
+            <a:schemeClr val="accent1"/>
+          </a:effectRef>
+          <a:fontRef idx="minor">
+            <a:schemeClr val="lt1"/>
+          </a:fontRef>
+        </p:style>
+        <p:txBody>
+          <a:bodyPr rtlCol="0" anchor="ctr"/>
+          <a:lstStyle/>
+          <a:p>
+            <a:pPr algn="ctr"/>
+            <a:endParaRPr lang="en-US"/>
+          </a:p>
+        </p:txBody>
+      </p:sp>
+      <p:sp>
+        <p:nvSpPr>
+          <p:cNvPr id="23" name="TextBox 22">
+            <a:extLst>
+              <a:ext uri="{FF2B5EF4-FFF2-40B4-BE49-F238E27FC236}">
+                <a16:creationId xmlns:a16="http://schemas.microsoft.com/office/drawing/2014/main" id="{77578C99-BE6E-D101-E5CC-B06411EB1B6D}"/>
+              </a:ext>
+            </a:extLst>
+          </p:cNvPr>
+          <p:cNvSpPr txBox="1"/>
+          <p:nvPr/>
+        </p:nvSpPr>
+        <p:spPr>
+          <a:xfrm>
+            <a:off x="4976584" y="3058666"/>
+            <a:ext cx="310248" cy="461665"/>
+          </a:xfrm>
+          <a:prstGeom prst="rect">
+            <a:avLst/>
+          </a:prstGeom>
+          <a:noFill/>
+        </p:spPr>
+        <p:txBody>
+          <a:bodyPr wrap="square" rtlCol="0">
+            <a:spAutoFit/>
+          </a:bodyPr>
+          <a:lstStyle/>
+          <a:p>
+            <a:r>
+              <a:rPr lang="en-US" sz="2400" dirty="0">
+                <a:latin typeface="Aharoni" panose="02010803020104030203" pitchFamily="2" charset="-79"/>
+                <a:cs typeface="Aharoni" panose="02010803020104030203" pitchFamily="2" charset="-79"/>
+              </a:rPr>
+              <a:t>A</a:t>
+            </a:r>
+          </a:p>
+        </p:txBody>
+      </p:sp>
+      <p:sp>
+        <p:nvSpPr>
+          <p:cNvPr id="24" name="TextBox 23">
+            <a:extLst>
+              <a:ext uri="{FF2B5EF4-FFF2-40B4-BE49-F238E27FC236}">
+                <a16:creationId xmlns:a16="http://schemas.microsoft.com/office/drawing/2014/main" id="{D6E48F35-67D9-092E-A29A-6E92C93D6291}"/>
+              </a:ext>
+            </a:extLst>
+          </p:cNvPr>
+          <p:cNvSpPr txBox="1"/>
+          <p:nvPr/>
+        </p:nvSpPr>
+        <p:spPr>
+          <a:xfrm>
+            <a:off x="8943897" y="5961650"/>
+            <a:ext cx="1919606" cy="400110"/>
+          </a:xfrm>
+          <a:prstGeom prst="rect">
+            <a:avLst/>
+          </a:prstGeom>
+          <a:noFill/>
+        </p:spPr>
+        <p:txBody>
+          <a:bodyPr wrap="square" rtlCol="0">
+            <a:spAutoFit/>
+          </a:bodyPr>
+          <a:lstStyle/>
+          <a:p>
+            <a:r>
+              <a:rPr lang="en-US" sz="2000" dirty="0">
+                <a:latin typeface="Aharoni" panose="02010803020104030203" pitchFamily="2" charset="-79"/>
+                <a:cs typeface="Aharoni" panose="02010803020104030203" pitchFamily="2" charset="-79"/>
+              </a:rPr>
+              <a:t>Labor Supply</a:t>
+            </a:r>
+          </a:p>
+        </p:txBody>
+      </p:sp>
+      <p:sp>
+        <p:nvSpPr>
+          <p:cNvPr id="25" name="TextBox 24">
+            <a:extLst>
+              <a:ext uri="{FF2B5EF4-FFF2-40B4-BE49-F238E27FC236}">
+                <a16:creationId xmlns:a16="http://schemas.microsoft.com/office/drawing/2014/main" id="{AFEAC168-0AE3-2437-66CD-B984D679AA63}"/>
+              </a:ext>
+            </a:extLst>
+          </p:cNvPr>
+          <p:cNvSpPr txBox="1"/>
+          <p:nvPr/>
+        </p:nvSpPr>
+        <p:spPr>
+          <a:xfrm>
+            <a:off x="5012610" y="6184580"/>
+            <a:ext cx="310248" cy="461665"/>
+          </a:xfrm>
+          <a:prstGeom prst="rect">
+            <a:avLst/>
+          </a:prstGeom>
+          <a:noFill/>
+        </p:spPr>
+        <p:txBody>
+          <a:bodyPr wrap="square" rtlCol="0">
+            <a:spAutoFit/>
+          </a:bodyPr>
+          <a:lstStyle/>
+          <a:p>
+            <a:pPr algn="ctr"/>
+            <a:r>
+              <a:rPr lang="en-US" sz="2400" dirty="0">
+                <a:latin typeface="Aharoni" panose="02010803020104030203" pitchFamily="2" charset="-79"/>
+                <a:cs typeface="Aharoni" panose="02010803020104030203" pitchFamily="2" charset="-79"/>
+              </a:rPr>
+              <a:t>L</a:t>
+            </a:r>
+          </a:p>
+        </p:txBody>
+      </p:sp>
+      <p:sp>
+        <p:nvSpPr>
+          <p:cNvPr id="26" name="TextBox 25">
+            <a:extLst>
+              <a:ext uri="{FF2B5EF4-FFF2-40B4-BE49-F238E27FC236}">
+                <a16:creationId xmlns:a16="http://schemas.microsoft.com/office/drawing/2014/main" id="{1D7E76FE-D04A-D8B0-DB61-9499276ABAE0}"/>
+              </a:ext>
+            </a:extLst>
+          </p:cNvPr>
+          <p:cNvSpPr txBox="1"/>
+          <p:nvPr/>
+        </p:nvSpPr>
+        <p:spPr>
+          <a:xfrm>
+            <a:off x="679479" y="122165"/>
+            <a:ext cx="1654146" cy="400110"/>
+          </a:xfrm>
+          <a:prstGeom prst="rect">
+            <a:avLst/>
+          </a:prstGeom>
+          <a:noFill/>
+        </p:spPr>
+        <p:txBody>
+          <a:bodyPr wrap="square" rtlCol="0">
+            <a:spAutoFit/>
+          </a:bodyPr>
+          <a:lstStyle/>
+          <a:p>
+            <a:r>
+              <a:rPr lang="en-US" sz="2000" dirty="0">
+                <a:latin typeface="Aharoni" panose="02010803020104030203" pitchFamily="2" charset="-79"/>
+                <a:cs typeface="Aharoni" panose="02010803020104030203" pitchFamily="2" charset="-79"/>
+              </a:rPr>
+              <a:t>Wages (w)</a:t>
+            </a:r>
+          </a:p>
+        </p:txBody>
+      </p:sp>
+      <p:sp>
+        <p:nvSpPr>
+          <p:cNvPr id="27" name="TextBox 26">
+            <a:extLst>
+              <a:ext uri="{FF2B5EF4-FFF2-40B4-BE49-F238E27FC236}">
+                <a16:creationId xmlns:a16="http://schemas.microsoft.com/office/drawing/2014/main" id="{4C9F127A-FB78-AAF9-FF2F-2217B3F7A1A2}"/>
+              </a:ext>
+            </a:extLst>
+          </p:cNvPr>
+          <p:cNvSpPr txBox="1"/>
+          <p:nvPr/>
+        </p:nvSpPr>
+        <p:spPr>
+          <a:xfrm>
+            <a:off x="1846330" y="3347165"/>
+            <a:ext cx="310248" cy="461665"/>
+          </a:xfrm>
+          <a:prstGeom prst="rect">
+            <a:avLst/>
+          </a:prstGeom>
+          <a:noFill/>
+        </p:spPr>
+        <p:txBody>
+          <a:bodyPr wrap="square" rtlCol="0">
+            <a:spAutoFit/>
+          </a:bodyPr>
+          <a:lstStyle/>
+          <a:p>
+            <a:pPr algn="ctr"/>
+            <a:r>
+              <a:rPr lang="en-US" sz="2400" dirty="0">
+                <a:latin typeface="Aharoni" panose="02010803020104030203" pitchFamily="2" charset="-79"/>
+                <a:cs typeface="Aharoni" panose="02010803020104030203" pitchFamily="2" charset="-79"/>
+              </a:rPr>
+              <a:t>W</a:t>
+            </a:r>
+          </a:p>
+        </p:txBody>
+      </p:sp>
+    </p:spTree>
+    <p:extLst>
+      <p:ext uri="{BB962C8B-B14F-4D97-AF65-F5344CB8AC3E}">
+        <p14:creationId xmlns:p14="http://schemas.microsoft.com/office/powerpoint/2010/main" val="2031650578"/>
+      </p:ext>
+    </p:extLst>
+  </p:cSld>
+  <p:clrMapOvr>
+    <a:masterClrMapping/>
+  </p:clrMapOvr>
+</p:sld>
+</file>
+
+<file path=ppt/slides/slide33.xml><?xml version="1.0" encoding="utf-8"?>
+<p:sld xmlns:a="http://schemas.openxmlformats.org/drawingml/2006/main" xmlns:r="http://schemas.openxmlformats.org/officeDocument/2006/relationships" xmlns:p="http://schemas.openxmlformats.org/presentationml/2006/main">
+  <p:cSld>
+    <p:spTree>
+      <p:nvGrpSpPr>
+        <p:cNvPr id="1" name="">
+          <a:extLst>
+            <a:ext uri="{FF2B5EF4-FFF2-40B4-BE49-F238E27FC236}">
+              <a16:creationId xmlns:a16="http://schemas.microsoft.com/office/drawing/2014/main" id="{842ADD4F-2941-1957-18BA-87AD99450348}"/>
+            </a:ext>
+          </a:extLst>
+        </p:cNvPr>
+        <p:cNvGrpSpPr/>
+        <p:nvPr/>
+      </p:nvGrpSpPr>
+      <p:grpSpPr>
+        <a:xfrm>
+          <a:off x="0" y="0"/>
+          <a:ext cx="0" cy="0"/>
+          <a:chOff x="0" y="0"/>
+          <a:chExt cx="0" cy="0"/>
+        </a:xfrm>
+      </p:grpSpPr>
+      <p:grpSp>
+        <p:nvGrpSpPr>
+          <p:cNvPr id="11" name="Group 10">
+            <a:extLst>
+              <a:ext uri="{FF2B5EF4-FFF2-40B4-BE49-F238E27FC236}">
+                <a16:creationId xmlns:a16="http://schemas.microsoft.com/office/drawing/2014/main" id="{606000A7-64BD-6AA4-3227-09A126FD3FB9}"/>
+              </a:ext>
+            </a:extLst>
+          </p:cNvPr>
+          <p:cNvGrpSpPr/>
+          <p:nvPr/>
+        </p:nvGrpSpPr>
+        <p:grpSpPr>
+          <a:xfrm>
+            <a:off x="2256508" y="4580709"/>
+            <a:ext cx="4126873" cy="1532044"/>
+            <a:chOff x="2333625" y="1600298"/>
+            <a:chExt cx="1160145" cy="4477528"/>
+          </a:xfrm>
+        </p:grpSpPr>
+        <p:cxnSp>
+          <p:nvCxnSpPr>
+            <p:cNvPr id="13" name="Straight Connector 12">
+              <a:extLst>
+                <a:ext uri="{FF2B5EF4-FFF2-40B4-BE49-F238E27FC236}">
+                  <a16:creationId xmlns:a16="http://schemas.microsoft.com/office/drawing/2014/main" id="{E340949B-027E-3420-D05D-427560B3932C}"/>
+                </a:ext>
+              </a:extLst>
+            </p:cNvPr>
+            <p:cNvCxnSpPr>
+              <a:cxnSpLocks/>
+            </p:cNvCxnSpPr>
+            <p:nvPr/>
+          </p:nvCxnSpPr>
+          <p:spPr>
+            <a:xfrm>
+              <a:off x="2333625" y="1600298"/>
+              <a:ext cx="1160145" cy="0"/>
+            </a:xfrm>
+            <a:prstGeom prst="line">
+              <a:avLst/>
+            </a:prstGeom>
+            <a:ln>
+              <a:prstDash val="dash"/>
+            </a:ln>
+          </p:spPr>
+          <p:style>
+            <a:lnRef idx="2">
+              <a:schemeClr val="accent1"/>
+            </a:lnRef>
+            <a:fillRef idx="0">
+              <a:schemeClr val="accent1"/>
+            </a:fillRef>
+            <a:effectRef idx="1">
+              <a:schemeClr val="accent1"/>
+            </a:effectRef>
+            <a:fontRef idx="minor">
+              <a:schemeClr val="tx1"/>
+            </a:fontRef>
+          </p:style>
+        </p:cxnSp>
+        <p:cxnSp>
+          <p:nvCxnSpPr>
+            <p:cNvPr id="14" name="Straight Connector 13">
+              <a:extLst>
+                <a:ext uri="{FF2B5EF4-FFF2-40B4-BE49-F238E27FC236}">
+                  <a16:creationId xmlns:a16="http://schemas.microsoft.com/office/drawing/2014/main" id="{01A4D26F-FFEC-3603-D4D5-72E228B74741}"/>
+                </a:ext>
+              </a:extLst>
+            </p:cNvPr>
+            <p:cNvCxnSpPr>
+              <a:cxnSpLocks/>
+            </p:cNvCxnSpPr>
+            <p:nvPr/>
+          </p:nvCxnSpPr>
+          <p:spPr>
+            <a:xfrm>
+              <a:off x="3493770" y="1600298"/>
+              <a:ext cx="0" cy="4477528"/>
+            </a:xfrm>
+            <a:prstGeom prst="line">
+              <a:avLst/>
+            </a:prstGeom>
+            <a:ln>
+              <a:prstDash val="dash"/>
+            </a:ln>
+          </p:spPr>
+          <p:style>
+            <a:lnRef idx="2">
+              <a:schemeClr val="accent1"/>
+            </a:lnRef>
+            <a:fillRef idx="0">
+              <a:schemeClr val="accent1"/>
+            </a:fillRef>
+            <a:effectRef idx="1">
+              <a:schemeClr val="accent1"/>
+            </a:effectRef>
+            <a:fontRef idx="minor">
+              <a:schemeClr val="tx1"/>
+            </a:fontRef>
+          </p:style>
+        </p:cxnSp>
+      </p:grpSp>
+      <p:grpSp>
+        <p:nvGrpSpPr>
+          <p:cNvPr id="19" name="Group 18">
+            <a:extLst>
+              <a:ext uri="{FF2B5EF4-FFF2-40B4-BE49-F238E27FC236}">
+                <a16:creationId xmlns:a16="http://schemas.microsoft.com/office/drawing/2014/main" id="{8D1301CD-EB67-26AF-CC54-BA253440242E}"/>
+              </a:ext>
+            </a:extLst>
+          </p:cNvPr>
+          <p:cNvGrpSpPr/>
+          <p:nvPr/>
+        </p:nvGrpSpPr>
+        <p:grpSpPr>
+          <a:xfrm>
+            <a:off x="2333625" y="3595262"/>
+            <a:ext cx="2834110" cy="2482564"/>
+            <a:chOff x="2333625" y="1600298"/>
+            <a:chExt cx="1160145" cy="4477528"/>
+          </a:xfrm>
+        </p:grpSpPr>
+        <p:cxnSp>
+          <p:nvCxnSpPr>
+            <p:cNvPr id="20" name="Straight Connector 19">
+              <a:extLst>
+                <a:ext uri="{FF2B5EF4-FFF2-40B4-BE49-F238E27FC236}">
+                  <a16:creationId xmlns:a16="http://schemas.microsoft.com/office/drawing/2014/main" id="{3B04C122-A852-6578-EFF2-DADE2D4E11FB}"/>
+                </a:ext>
+              </a:extLst>
+            </p:cNvPr>
+            <p:cNvCxnSpPr>
+              <a:cxnSpLocks/>
+            </p:cNvCxnSpPr>
+            <p:nvPr/>
+          </p:nvCxnSpPr>
+          <p:spPr>
+            <a:xfrm>
+              <a:off x="2333625" y="1600298"/>
+              <a:ext cx="1160145" cy="0"/>
+            </a:xfrm>
+            <a:prstGeom prst="line">
+              <a:avLst/>
+            </a:prstGeom>
+            <a:ln>
+              <a:prstDash val="dash"/>
+            </a:ln>
+          </p:spPr>
+          <p:style>
+            <a:lnRef idx="2">
+              <a:schemeClr val="accent1"/>
+            </a:lnRef>
+            <a:fillRef idx="0">
+              <a:schemeClr val="accent1"/>
+            </a:fillRef>
+            <a:effectRef idx="1">
+              <a:schemeClr val="accent1"/>
+            </a:effectRef>
+            <a:fontRef idx="minor">
+              <a:schemeClr val="tx1"/>
+            </a:fontRef>
+          </p:style>
+        </p:cxnSp>
+        <p:cxnSp>
+          <p:nvCxnSpPr>
+            <p:cNvPr id="21" name="Straight Connector 20">
+              <a:extLst>
+                <a:ext uri="{FF2B5EF4-FFF2-40B4-BE49-F238E27FC236}">
+                  <a16:creationId xmlns:a16="http://schemas.microsoft.com/office/drawing/2014/main" id="{B5A4EBAD-92BA-2A7B-A601-9918470AEA1F}"/>
+                </a:ext>
+              </a:extLst>
+            </p:cNvPr>
+            <p:cNvCxnSpPr>
+              <a:cxnSpLocks/>
+            </p:cNvCxnSpPr>
+            <p:nvPr/>
+          </p:nvCxnSpPr>
+          <p:spPr>
+            <a:xfrm>
+              <a:off x="3493770" y="1600298"/>
+              <a:ext cx="0" cy="4477528"/>
+            </a:xfrm>
+            <a:prstGeom prst="line">
+              <a:avLst/>
+            </a:prstGeom>
+            <a:ln>
+              <a:prstDash val="dash"/>
+            </a:ln>
+          </p:spPr>
+          <p:style>
+            <a:lnRef idx="2">
+              <a:schemeClr val="accent1"/>
+            </a:lnRef>
+            <a:fillRef idx="0">
+              <a:schemeClr val="accent1"/>
+            </a:fillRef>
+            <a:effectRef idx="1">
+              <a:schemeClr val="accent1"/>
+            </a:effectRef>
+            <a:fontRef idx="minor">
+              <a:schemeClr val="tx1"/>
+            </a:fontRef>
+          </p:style>
+        </p:cxnSp>
+      </p:grpSp>
+      <p:cxnSp>
+        <p:nvCxnSpPr>
+          <p:cNvPr id="3" name="Straight Connector 2">
+            <a:extLst>
+              <a:ext uri="{FF2B5EF4-FFF2-40B4-BE49-F238E27FC236}">
+                <a16:creationId xmlns:a16="http://schemas.microsoft.com/office/drawing/2014/main" id="{D34ED014-547B-2B24-B6A9-65B630F860B6}"/>
+              </a:ext>
+            </a:extLst>
+          </p:cNvPr>
+          <p:cNvCxnSpPr>
+            <a:cxnSpLocks/>
+          </p:cNvCxnSpPr>
+          <p:nvPr/>
+        </p:nvCxnSpPr>
+        <p:spPr>
+          <a:xfrm>
+            <a:off x="2400961" y="1397835"/>
+            <a:ext cx="5461494" cy="4360327"/>
+          </a:xfrm>
+          <a:prstGeom prst="line">
+            <a:avLst/>
+          </a:prstGeom>
+          <a:ln w="57150">
+            <a:solidFill>
+              <a:schemeClr val="accent2">
+                <a:lumMod val="75000"/>
+              </a:schemeClr>
+            </a:solidFill>
+          </a:ln>
+        </p:spPr>
+        <p:style>
+          <a:lnRef idx="2">
+            <a:schemeClr val="accent1"/>
+          </a:lnRef>
+          <a:fillRef idx="0">
+            <a:schemeClr val="accent1"/>
+          </a:fillRef>
+          <a:effectRef idx="1">
+            <a:schemeClr val="accent1"/>
+          </a:effectRef>
+          <a:fontRef idx="minor">
+            <a:schemeClr val="tx1"/>
+          </a:fontRef>
+        </p:style>
+      </p:cxnSp>
+      <p:grpSp>
+        <p:nvGrpSpPr>
+          <p:cNvPr id="4" name="Group 3">
+            <a:extLst>
+              <a:ext uri="{FF2B5EF4-FFF2-40B4-BE49-F238E27FC236}">
+                <a16:creationId xmlns:a16="http://schemas.microsoft.com/office/drawing/2014/main" id="{86743F65-2269-9E02-426B-E264F79B8BDD}"/>
+              </a:ext>
+            </a:extLst>
+          </p:cNvPr>
+          <p:cNvGrpSpPr/>
+          <p:nvPr/>
+        </p:nvGrpSpPr>
+        <p:grpSpPr>
+          <a:xfrm>
+            <a:off x="2256508" y="322220"/>
+            <a:ext cx="6601485" cy="5839485"/>
+            <a:chOff x="1023042" y="115432"/>
+            <a:chExt cx="9942214" cy="6627136"/>
+          </a:xfrm>
+        </p:grpSpPr>
+        <p:cxnSp>
+          <p:nvCxnSpPr>
+            <p:cNvPr id="5" name="Straight Connector 4">
+              <a:extLst>
+                <a:ext uri="{FF2B5EF4-FFF2-40B4-BE49-F238E27FC236}">
+                  <a16:creationId xmlns:a16="http://schemas.microsoft.com/office/drawing/2014/main" id="{BBAE9A81-9BC9-F5B2-84B8-82C7C7F5676B}"/>
+                </a:ext>
+              </a:extLst>
+            </p:cNvPr>
+            <p:cNvCxnSpPr/>
+            <p:nvPr/>
+          </p:nvCxnSpPr>
+          <p:spPr>
+            <a:xfrm>
+              <a:off x="1032095" y="115432"/>
+              <a:ext cx="0" cy="6627136"/>
+            </a:xfrm>
+            <a:prstGeom prst="line">
+              <a:avLst/>
+            </a:prstGeom>
+            <a:ln w="57150"/>
+          </p:spPr>
+          <p:style>
+            <a:lnRef idx="3">
+              <a:schemeClr val="dk1"/>
+            </a:lnRef>
+            <a:fillRef idx="0">
+              <a:schemeClr val="dk1"/>
+            </a:fillRef>
+            <a:effectRef idx="2">
+              <a:schemeClr val="dk1"/>
+            </a:effectRef>
+            <a:fontRef idx="minor">
+              <a:schemeClr val="tx1"/>
+            </a:fontRef>
+          </p:style>
+        </p:cxnSp>
+        <p:cxnSp>
+          <p:nvCxnSpPr>
+            <p:cNvPr id="6" name="Straight Connector 5">
+              <a:extLst>
+                <a:ext uri="{FF2B5EF4-FFF2-40B4-BE49-F238E27FC236}">
+                  <a16:creationId xmlns:a16="http://schemas.microsoft.com/office/drawing/2014/main" id="{92AD2304-1FDC-C5B7-A855-09AE267D3C1B}"/>
+                </a:ext>
+              </a:extLst>
+            </p:cNvPr>
+            <p:cNvCxnSpPr>
+              <a:cxnSpLocks/>
+            </p:cNvCxnSpPr>
+            <p:nvPr/>
+          </p:nvCxnSpPr>
+          <p:spPr>
+            <a:xfrm flipH="1">
+              <a:off x="1023042" y="6732006"/>
+              <a:ext cx="9942214" cy="0"/>
+            </a:xfrm>
+            <a:prstGeom prst="line">
+              <a:avLst/>
+            </a:prstGeom>
+            <a:ln w="57150"/>
+          </p:spPr>
+          <p:style>
+            <a:lnRef idx="3">
+              <a:schemeClr val="dk1"/>
+            </a:lnRef>
+            <a:fillRef idx="0">
+              <a:schemeClr val="dk1"/>
+            </a:fillRef>
+            <a:effectRef idx="2">
+              <a:schemeClr val="dk1"/>
+            </a:effectRef>
+            <a:fontRef idx="minor">
+              <a:schemeClr val="tx1"/>
+            </a:fontRef>
+          </p:style>
+        </p:cxnSp>
+      </p:grpSp>
+      <p:sp>
+        <p:nvSpPr>
+          <p:cNvPr id="9" name="TextBox 8">
+            <a:extLst>
+              <a:ext uri="{FF2B5EF4-FFF2-40B4-BE49-F238E27FC236}">
+                <a16:creationId xmlns:a16="http://schemas.microsoft.com/office/drawing/2014/main" id="{98E59232-CEC2-E19F-54E8-4D2E05D92441}"/>
+              </a:ext>
+            </a:extLst>
+          </p:cNvPr>
+          <p:cNvSpPr txBox="1"/>
+          <p:nvPr/>
+        </p:nvSpPr>
+        <p:spPr>
+          <a:xfrm>
+            <a:off x="679479" y="122165"/>
+            <a:ext cx="1654146" cy="400110"/>
+          </a:xfrm>
+          <a:prstGeom prst="rect">
+            <a:avLst/>
+          </a:prstGeom>
+          <a:noFill/>
+        </p:spPr>
+        <p:txBody>
+          <a:bodyPr wrap="square" rtlCol="0">
+            <a:spAutoFit/>
+          </a:bodyPr>
+          <a:lstStyle/>
+          <a:p>
+            <a:r>
+              <a:rPr lang="en-US" sz="2000" dirty="0">
+                <a:latin typeface="Aharoni" panose="02010803020104030203" pitchFamily="2" charset="-79"/>
+                <a:cs typeface="Aharoni" panose="02010803020104030203" pitchFamily="2" charset="-79"/>
+              </a:rPr>
+              <a:t>Wages (w)</a:t>
+            </a:r>
+          </a:p>
+        </p:txBody>
+      </p:sp>
+      <p:sp>
+        <p:nvSpPr>
+          <p:cNvPr id="10" name="TextBox 9">
+            <a:extLst>
+              <a:ext uri="{FF2B5EF4-FFF2-40B4-BE49-F238E27FC236}">
+                <a16:creationId xmlns:a16="http://schemas.microsoft.com/office/drawing/2014/main" id="{FA3F63CA-3D87-6E81-BE47-868D0DD03581}"/>
+              </a:ext>
+            </a:extLst>
+          </p:cNvPr>
+          <p:cNvSpPr txBox="1"/>
+          <p:nvPr/>
+        </p:nvSpPr>
+        <p:spPr>
+          <a:xfrm>
+            <a:off x="8943897" y="5961650"/>
+            <a:ext cx="1919606" cy="400110"/>
+          </a:xfrm>
+          <a:prstGeom prst="rect">
+            <a:avLst/>
+          </a:prstGeom>
+          <a:noFill/>
+        </p:spPr>
+        <p:txBody>
+          <a:bodyPr wrap="square" rtlCol="0">
+            <a:spAutoFit/>
+          </a:bodyPr>
+          <a:lstStyle/>
+          <a:p>
+            <a:r>
+              <a:rPr lang="en-US" sz="2000" dirty="0">
+                <a:latin typeface="Aharoni" panose="02010803020104030203" pitchFamily="2" charset="-79"/>
+                <a:cs typeface="Aharoni" panose="02010803020104030203" pitchFamily="2" charset="-79"/>
+              </a:rPr>
+              <a:t>Labor Supply</a:t>
+            </a:r>
+          </a:p>
+        </p:txBody>
+      </p:sp>
+      <p:cxnSp>
+        <p:nvCxnSpPr>
+          <p:cNvPr id="12" name="Straight Connector 11">
+            <a:extLst>
+              <a:ext uri="{FF2B5EF4-FFF2-40B4-BE49-F238E27FC236}">
+                <a16:creationId xmlns:a16="http://schemas.microsoft.com/office/drawing/2014/main" id="{EF1897BC-62EB-FB83-F029-66E4F28C0EE8}"/>
+              </a:ext>
+            </a:extLst>
+          </p:cNvPr>
+          <p:cNvCxnSpPr>
+            <a:cxnSpLocks/>
+          </p:cNvCxnSpPr>
+          <p:nvPr/>
+        </p:nvCxnSpPr>
+        <p:spPr>
+          <a:xfrm flipH="1">
+            <a:off x="2632940" y="1362909"/>
+            <a:ext cx="5229515" cy="4395253"/>
+          </a:xfrm>
+          <a:prstGeom prst="line">
+            <a:avLst/>
+          </a:prstGeom>
+          <a:ln w="57150">
+            <a:solidFill>
+              <a:schemeClr val="accent6">
+                <a:lumMod val="75000"/>
+              </a:schemeClr>
+            </a:solidFill>
+          </a:ln>
+        </p:spPr>
+        <p:style>
+          <a:lnRef idx="2">
+            <a:schemeClr val="accent1"/>
+          </a:lnRef>
+          <a:fillRef idx="0">
+            <a:schemeClr val="accent1"/>
+          </a:fillRef>
+          <a:effectRef idx="1">
+            <a:schemeClr val="accent1"/>
+          </a:effectRef>
+          <a:fontRef idx="minor">
+            <a:schemeClr val="tx1"/>
+          </a:fontRef>
+        </p:style>
+      </p:cxnSp>
+      <mc:AlternateContent xmlns:mc="http://schemas.openxmlformats.org/markup-compatibility/2006">
+        <mc:Choice xmlns:a14="http://schemas.microsoft.com/office/drawing/2010/main" Requires="a14">
+          <p:sp>
+            <p:nvSpPr>
+              <p:cNvPr id="16" name="TextBox 15">
+                <a:extLst>
+                  <a:ext uri="{FF2B5EF4-FFF2-40B4-BE49-F238E27FC236}">
+                    <a16:creationId xmlns:a16="http://schemas.microsoft.com/office/drawing/2014/main" id="{88EF5F0C-B94E-9FB2-9B05-10FD5FA14053}"/>
+                  </a:ext>
+                </a:extLst>
+              </p:cNvPr>
+              <p:cNvSpPr txBox="1"/>
+              <p:nvPr/>
+            </p:nvSpPr>
+            <p:spPr>
+              <a:xfrm>
+                <a:off x="7744776" y="1139620"/>
+                <a:ext cx="2112269" cy="523220"/>
+              </a:xfrm>
+              <a:prstGeom prst="rect">
+                <a:avLst/>
+              </a:prstGeom>
+              <a:noFill/>
+            </p:spPr>
+            <p:txBody>
+              <a:bodyPr wrap="square" rtlCol="0">
+                <a:spAutoFit/>
+              </a:bodyPr>
+              <a:lstStyle/>
+              <a:p>
+                <a:pPr/>
+                <a14:m>
+                  <m:oMathPara xmlns:m="http://schemas.openxmlformats.org/officeDocument/2006/math">
+                    <m:oMathParaPr>
+                      <m:jc m:val="centerGroup"/>
+                    </m:oMathParaPr>
+                    <m:oMath xmlns:m="http://schemas.openxmlformats.org/officeDocument/2006/math">
+                      <m:r>
+                        <a:rPr lang="en-US" sz="2800" b="1" i="1" smtClean="0">
+                          <a:solidFill>
+                            <a:schemeClr val="accent6">
+                              <a:lumMod val="75000"/>
+                            </a:schemeClr>
+                          </a:solidFill>
+                          <a:latin typeface="Cambria Math" panose="02040503050406030204" pitchFamily="18" charset="0"/>
+                          <a:cs typeface="Aharoni" panose="02010803020104030203" pitchFamily="2" charset="-79"/>
+                        </a:rPr>
+                        <m:t>𝑷</m:t>
+                      </m:r>
+                      <m:r>
+                        <a:rPr lang="en-US" sz="2800" b="1" i="1" smtClean="0">
+                          <a:solidFill>
+                            <a:schemeClr val="accent6">
+                              <a:lumMod val="75000"/>
+                            </a:schemeClr>
+                          </a:solidFill>
+                          <a:latin typeface="Cambria Math" panose="02040503050406030204" pitchFamily="18" charset="0"/>
+                          <a:cs typeface="Aharoni" panose="02010803020104030203" pitchFamily="2" charset="-79"/>
+                        </a:rPr>
+                        <m:t>∗</m:t>
+                      </m:r>
+                      <m:r>
+                        <a:rPr lang="en-US" sz="2800" b="1" i="1" smtClean="0">
+                          <a:solidFill>
+                            <a:schemeClr val="accent6">
+                              <a:lumMod val="75000"/>
+                            </a:schemeClr>
+                          </a:solidFill>
+                          <a:latin typeface="Cambria Math" panose="02040503050406030204" pitchFamily="18" charset="0"/>
+                          <a:cs typeface="Aharoni" panose="02010803020104030203" pitchFamily="2" charset="-79"/>
+                        </a:rPr>
+                        <m:t>𝑴𝑷</m:t>
+                      </m:r>
+                      <m:sSub>
+                        <m:sSubPr>
+                          <m:ctrlPr>
+                            <a:rPr lang="en-US" sz="2800" b="1" i="1" smtClean="0">
+                              <a:solidFill>
+                                <a:schemeClr val="accent6">
+                                  <a:lumMod val="75000"/>
+                                </a:schemeClr>
+                              </a:solidFill>
+                              <a:latin typeface="Cambria Math" panose="02040503050406030204" pitchFamily="18" charset="0"/>
+                              <a:cs typeface="Aharoni" panose="02010803020104030203" pitchFamily="2" charset="-79"/>
+                            </a:rPr>
+                          </m:ctrlPr>
+                        </m:sSubPr>
+                        <m:e>
+                          <m:r>
+                            <a:rPr lang="en-US" sz="2800" b="1" i="1" smtClean="0">
+                              <a:solidFill>
+                                <a:schemeClr val="accent6">
+                                  <a:lumMod val="75000"/>
+                                </a:schemeClr>
+                              </a:solidFill>
+                              <a:latin typeface="Cambria Math" panose="02040503050406030204" pitchFamily="18" charset="0"/>
+                              <a:cs typeface="Aharoni" panose="02010803020104030203" pitchFamily="2" charset="-79"/>
+                            </a:rPr>
+                            <m:t>𝑳</m:t>
+                          </m:r>
+                        </m:e>
+                        <m:sub>
+                          <m:r>
+                            <a:rPr lang="en-US" sz="2800" b="1" i="1" smtClean="0">
+                              <a:solidFill>
+                                <a:schemeClr val="accent6">
+                                  <a:lumMod val="75000"/>
+                                </a:schemeClr>
+                              </a:solidFill>
+                              <a:latin typeface="Cambria Math" panose="02040503050406030204" pitchFamily="18" charset="0"/>
+                              <a:cs typeface="Aharoni" panose="02010803020104030203" pitchFamily="2" charset="-79"/>
+                            </a:rPr>
+                            <m:t>𝑿</m:t>
+                          </m:r>
+                        </m:sub>
+                      </m:sSub>
+                    </m:oMath>
+                  </m:oMathPara>
+                </a14:m>
+                <a:endParaRPr lang="en-US" sz="2800" b="1" dirty="0">
+                  <a:solidFill>
+                    <a:schemeClr val="accent6">
+                      <a:lumMod val="75000"/>
+                    </a:schemeClr>
+                  </a:solidFill>
+                  <a:latin typeface="Aharoni" panose="02010803020104030203" pitchFamily="2" charset="-79"/>
+                  <a:cs typeface="Aharoni" panose="02010803020104030203" pitchFamily="2" charset="-79"/>
+                </a:endParaRPr>
+              </a:p>
+            </p:txBody>
+          </p:sp>
+        </mc:Choice>
+        <mc:Fallback>
+          <p:sp>
+            <p:nvSpPr>
+              <p:cNvPr id="16" name="TextBox 15">
+                <a:extLst>
+                  <a:ext uri="{FF2B5EF4-FFF2-40B4-BE49-F238E27FC236}">
+                    <a16:creationId xmlns:a16="http://schemas.microsoft.com/office/drawing/2014/main" id="{88EF5F0C-B94E-9FB2-9B05-10FD5FA14053}"/>
+                  </a:ext>
+                </a:extLst>
+              </p:cNvPr>
+              <p:cNvSpPr txBox="1">
+                <a:spLocks noRot="1" noChangeAspect="1" noMove="1" noResize="1" noEditPoints="1" noAdjustHandles="1" noChangeArrowheads="1" noChangeShapeType="1" noTextEdit="1"/>
+              </p:cNvSpPr>
+              <p:nvPr/>
+            </p:nvSpPr>
+            <p:spPr>
+              <a:xfrm>
+                <a:off x="7744776" y="1139620"/>
+                <a:ext cx="2112269" cy="523220"/>
+              </a:xfrm>
+              <a:prstGeom prst="rect">
+                <a:avLst/>
+              </a:prstGeom>
+              <a:blipFill>
+                <a:blip r:embed="rId2"/>
+                <a:stretch>
+                  <a:fillRect/>
+                </a:stretch>
+              </a:blipFill>
+            </p:spPr>
+            <p:txBody>
+              <a:bodyPr/>
+              <a:lstStyle/>
+              <a:p>
+                <a:r>
+                  <a:rPr lang="en-US">
+                    <a:noFill/>
+                  </a:rPr>
+                  <a:t> </a:t>
+                </a:r>
+              </a:p>
+            </p:txBody>
+          </p:sp>
+        </mc:Fallback>
+      </mc:AlternateContent>
+      <mc:AlternateContent xmlns:mc="http://schemas.openxmlformats.org/markup-compatibility/2006">
+        <mc:Choice xmlns:a14="http://schemas.microsoft.com/office/drawing/2010/main" Requires="a14">
+          <p:sp>
+            <p:nvSpPr>
+              <p:cNvPr id="17" name="TextBox 16">
+                <a:extLst>
+                  <a:ext uri="{FF2B5EF4-FFF2-40B4-BE49-F238E27FC236}">
+                    <a16:creationId xmlns:a16="http://schemas.microsoft.com/office/drawing/2014/main" id="{BABCCA21-24C6-B13A-BAF1-952136594764}"/>
+                  </a:ext>
+                </a:extLst>
+              </p:cNvPr>
+              <p:cNvSpPr txBox="1"/>
+              <p:nvPr/>
+            </p:nvSpPr>
+            <p:spPr>
+              <a:xfrm>
+                <a:off x="7744775" y="5479316"/>
+                <a:ext cx="2112269" cy="523220"/>
+              </a:xfrm>
+              <a:prstGeom prst="rect">
+                <a:avLst/>
+              </a:prstGeom>
+              <a:noFill/>
+            </p:spPr>
+            <p:txBody>
+              <a:bodyPr wrap="square" rtlCol="0">
+                <a:spAutoFit/>
+              </a:bodyPr>
+              <a:lstStyle/>
+              <a:p>
+                <a:pPr/>
+                <a14:m>
+                  <m:oMathPara xmlns:m="http://schemas.openxmlformats.org/officeDocument/2006/math">
+                    <m:oMathParaPr>
+                      <m:jc m:val="centerGroup"/>
+                    </m:oMathParaPr>
+                    <m:oMath xmlns:m="http://schemas.openxmlformats.org/officeDocument/2006/math">
+                      <m:r>
+                        <a:rPr lang="en-US" sz="2800" b="1" i="1" smtClean="0">
+                          <a:solidFill>
+                            <a:schemeClr val="accent2">
+                              <a:lumMod val="75000"/>
+                            </a:schemeClr>
+                          </a:solidFill>
+                          <a:latin typeface="Cambria Math" panose="02040503050406030204" pitchFamily="18" charset="0"/>
+                          <a:cs typeface="Aharoni" panose="02010803020104030203" pitchFamily="2" charset="-79"/>
+                        </a:rPr>
+                        <m:t>𝑷</m:t>
+                      </m:r>
+                      <m:r>
+                        <a:rPr lang="en-US" sz="2800" b="1" i="1" smtClean="0">
+                          <a:solidFill>
+                            <a:schemeClr val="accent2">
+                              <a:lumMod val="75000"/>
+                            </a:schemeClr>
+                          </a:solidFill>
+                          <a:latin typeface="Cambria Math" panose="02040503050406030204" pitchFamily="18" charset="0"/>
+                          <a:cs typeface="Aharoni" panose="02010803020104030203" pitchFamily="2" charset="-79"/>
+                        </a:rPr>
+                        <m:t>∗</m:t>
+                      </m:r>
+                      <m:r>
+                        <a:rPr lang="en-US" sz="2800" b="1" i="1" smtClean="0">
+                          <a:solidFill>
+                            <a:schemeClr val="accent2">
+                              <a:lumMod val="75000"/>
+                            </a:schemeClr>
+                          </a:solidFill>
+                          <a:latin typeface="Cambria Math" panose="02040503050406030204" pitchFamily="18" charset="0"/>
+                          <a:cs typeface="Aharoni" panose="02010803020104030203" pitchFamily="2" charset="-79"/>
+                        </a:rPr>
+                        <m:t>𝑴𝑷</m:t>
+                      </m:r>
+                      <m:sSub>
+                        <m:sSubPr>
+                          <m:ctrlPr>
+                            <a:rPr lang="en-US" sz="2800" b="1" i="1" smtClean="0">
+                              <a:solidFill>
+                                <a:schemeClr val="accent2">
+                                  <a:lumMod val="75000"/>
+                                </a:schemeClr>
+                              </a:solidFill>
+                              <a:latin typeface="Cambria Math" panose="02040503050406030204" pitchFamily="18" charset="0"/>
+                              <a:cs typeface="Aharoni" panose="02010803020104030203" pitchFamily="2" charset="-79"/>
+                            </a:rPr>
+                          </m:ctrlPr>
+                        </m:sSubPr>
+                        <m:e>
+                          <m:r>
+                            <a:rPr lang="en-US" sz="2800" b="1" i="1" smtClean="0">
+                              <a:solidFill>
+                                <a:schemeClr val="accent2">
+                                  <a:lumMod val="75000"/>
+                                </a:schemeClr>
+                              </a:solidFill>
+                              <a:latin typeface="Cambria Math" panose="02040503050406030204" pitchFamily="18" charset="0"/>
+                              <a:cs typeface="Aharoni" panose="02010803020104030203" pitchFamily="2" charset="-79"/>
+                            </a:rPr>
+                            <m:t>𝑳</m:t>
+                          </m:r>
+                        </m:e>
+                        <m:sub>
+                          <m:r>
+                            <a:rPr lang="en-US" sz="2800" b="1" i="1" smtClean="0">
+                              <a:solidFill>
+                                <a:schemeClr val="accent2">
+                                  <a:lumMod val="75000"/>
+                                </a:schemeClr>
+                              </a:solidFill>
+                              <a:latin typeface="Cambria Math" panose="02040503050406030204" pitchFamily="18" charset="0"/>
+                              <a:cs typeface="Aharoni" panose="02010803020104030203" pitchFamily="2" charset="-79"/>
+                            </a:rPr>
+                            <m:t>𝒀</m:t>
+                          </m:r>
+                        </m:sub>
+                      </m:sSub>
+                    </m:oMath>
+                  </m:oMathPara>
+                </a14:m>
+                <a:endParaRPr lang="en-US" sz="2800" b="1" dirty="0">
+                  <a:solidFill>
+                    <a:schemeClr val="accent2">
+                      <a:lumMod val="75000"/>
+                    </a:schemeClr>
+                  </a:solidFill>
+                  <a:latin typeface="Aharoni" panose="02010803020104030203" pitchFamily="2" charset="-79"/>
+                  <a:cs typeface="Aharoni" panose="02010803020104030203" pitchFamily="2" charset="-79"/>
+                </a:endParaRPr>
+              </a:p>
+            </p:txBody>
+          </p:sp>
+        </mc:Choice>
+        <mc:Fallback>
+          <p:sp>
+            <p:nvSpPr>
+              <p:cNvPr id="17" name="TextBox 16">
+                <a:extLst>
+                  <a:ext uri="{FF2B5EF4-FFF2-40B4-BE49-F238E27FC236}">
+                    <a16:creationId xmlns:a16="http://schemas.microsoft.com/office/drawing/2014/main" id="{BABCCA21-24C6-B13A-BAF1-952136594764}"/>
+                  </a:ext>
+                </a:extLst>
+              </p:cNvPr>
+              <p:cNvSpPr txBox="1">
+                <a:spLocks noRot="1" noChangeAspect="1" noMove="1" noResize="1" noEditPoints="1" noAdjustHandles="1" noChangeArrowheads="1" noChangeShapeType="1" noTextEdit="1"/>
+              </p:cNvSpPr>
+              <p:nvPr/>
+            </p:nvSpPr>
+            <p:spPr>
+              <a:xfrm>
+                <a:off x="7744775" y="5479316"/>
+                <a:ext cx="2112269" cy="523220"/>
+              </a:xfrm>
+              <a:prstGeom prst="rect">
+                <a:avLst/>
+              </a:prstGeom>
+              <a:blipFill>
+                <a:blip r:embed="rId3"/>
+                <a:stretch>
+                  <a:fillRect/>
+                </a:stretch>
+              </a:blipFill>
+            </p:spPr>
+            <p:txBody>
+              <a:bodyPr/>
+              <a:lstStyle/>
+              <a:p>
+                <a:r>
+                  <a:rPr lang="en-US">
+                    <a:noFill/>
+                  </a:rPr>
+                  <a:t> </a:t>
+                </a:r>
+              </a:p>
+            </p:txBody>
+          </p:sp>
+        </mc:Fallback>
+      </mc:AlternateContent>
+      <p:sp>
+        <p:nvSpPr>
+          <p:cNvPr id="22" name="Oval 21">
+            <a:extLst>
+              <a:ext uri="{FF2B5EF4-FFF2-40B4-BE49-F238E27FC236}">
+                <a16:creationId xmlns:a16="http://schemas.microsoft.com/office/drawing/2014/main" id="{56C9E83F-A31A-5A3B-0561-FFF0532039A0}"/>
+              </a:ext>
+            </a:extLst>
+          </p:cNvPr>
+          <p:cNvSpPr/>
+          <p:nvPr/>
+        </p:nvSpPr>
+        <p:spPr>
+          <a:xfrm>
+            <a:off x="5072676" y="3520690"/>
+            <a:ext cx="190117" cy="172016"/>
+          </a:xfrm>
+          <a:prstGeom prst="ellipse">
+            <a:avLst/>
+          </a:prstGeom>
+          <a:solidFill>
+            <a:schemeClr val="accent2"/>
+          </a:solidFill>
+          <a:ln>
+            <a:solidFill>
+              <a:schemeClr val="tx1"/>
+            </a:solidFill>
+          </a:ln>
+        </p:spPr>
+        <p:style>
+          <a:lnRef idx="2">
+            <a:schemeClr val="accent1">
+              <a:shade val="15000"/>
+            </a:schemeClr>
+          </a:lnRef>
+          <a:fillRef idx="1">
+            <a:schemeClr val="accent1"/>
+          </a:fillRef>
+          <a:effectRef idx="0">
+            <a:schemeClr val="accent1"/>
+          </a:effectRef>
+          <a:fontRef idx="minor">
+            <a:schemeClr val="lt1"/>
+          </a:fontRef>
+        </p:style>
+        <p:txBody>
+          <a:bodyPr rtlCol="0" anchor="ctr"/>
+          <a:lstStyle/>
+          <a:p>
+            <a:pPr algn="ctr"/>
+            <a:endParaRPr lang="en-US"/>
+          </a:p>
+        </p:txBody>
+      </p:sp>
+      <p:sp>
+        <p:nvSpPr>
+          <p:cNvPr id="23" name="TextBox 22">
+            <a:extLst>
+              <a:ext uri="{FF2B5EF4-FFF2-40B4-BE49-F238E27FC236}">
+                <a16:creationId xmlns:a16="http://schemas.microsoft.com/office/drawing/2014/main" id="{79B9987A-66BC-7A06-633F-346D61E9BC92}"/>
+              </a:ext>
+            </a:extLst>
+          </p:cNvPr>
+          <p:cNvSpPr txBox="1"/>
+          <p:nvPr/>
+        </p:nvSpPr>
+        <p:spPr>
+          <a:xfrm>
+            <a:off x="4976584" y="3058666"/>
+            <a:ext cx="310248" cy="461665"/>
+          </a:xfrm>
+          <a:prstGeom prst="rect">
+            <a:avLst/>
+          </a:prstGeom>
+          <a:noFill/>
+        </p:spPr>
+        <p:txBody>
+          <a:bodyPr wrap="square" rtlCol="0">
+            <a:spAutoFit/>
+          </a:bodyPr>
+          <a:lstStyle/>
+          <a:p>
+            <a:r>
+              <a:rPr lang="en-US" sz="2400" dirty="0">
+                <a:latin typeface="Aharoni" panose="02010803020104030203" pitchFamily="2" charset="-79"/>
+                <a:cs typeface="Aharoni" panose="02010803020104030203" pitchFamily="2" charset="-79"/>
+              </a:rPr>
+              <a:t>A</a:t>
+            </a:r>
+          </a:p>
+        </p:txBody>
+      </p:sp>
+      <p:cxnSp>
+        <p:nvCxnSpPr>
+          <p:cNvPr id="2" name="Straight Connector 1">
+            <a:extLst>
+              <a:ext uri="{FF2B5EF4-FFF2-40B4-BE49-F238E27FC236}">
+                <a16:creationId xmlns:a16="http://schemas.microsoft.com/office/drawing/2014/main" id="{5229E3DC-CB55-17DD-D270-E665D81DE2EC}"/>
+              </a:ext>
+            </a:extLst>
+          </p:cNvPr>
+          <p:cNvCxnSpPr>
+            <a:cxnSpLocks/>
+          </p:cNvCxnSpPr>
+          <p:nvPr/>
+        </p:nvCxnSpPr>
+        <p:spPr>
+          <a:xfrm flipH="1">
+            <a:off x="4720046" y="1921055"/>
+            <a:ext cx="4782063" cy="4060396"/>
+          </a:xfrm>
+          <a:prstGeom prst="line">
+            <a:avLst/>
+          </a:prstGeom>
+          <a:ln w="57150">
+            <a:solidFill>
+              <a:srgbClr val="92D050"/>
+            </a:solidFill>
+          </a:ln>
+        </p:spPr>
+        <p:style>
+          <a:lnRef idx="2">
+            <a:schemeClr val="accent1"/>
+          </a:lnRef>
+          <a:fillRef idx="0">
+            <a:schemeClr val="accent1"/>
+          </a:fillRef>
+          <a:effectRef idx="1">
+            <a:schemeClr val="accent1"/>
+          </a:effectRef>
+          <a:fontRef idx="minor">
+            <a:schemeClr val="tx1"/>
+          </a:fontRef>
+        </p:style>
+      </p:cxnSp>
+      <mc:AlternateContent xmlns:mc="http://schemas.openxmlformats.org/markup-compatibility/2006">
+        <mc:Choice xmlns:a14="http://schemas.microsoft.com/office/drawing/2010/main" Requires="a14">
+          <p:sp>
+            <p:nvSpPr>
+              <p:cNvPr id="7" name="TextBox 6">
+                <a:extLst>
+                  <a:ext uri="{FF2B5EF4-FFF2-40B4-BE49-F238E27FC236}">
+                    <a16:creationId xmlns:a16="http://schemas.microsoft.com/office/drawing/2014/main" id="{C42B2F02-5627-75DB-751C-97A1265378E0}"/>
+                  </a:ext>
+                </a:extLst>
+              </p:cNvPr>
+              <p:cNvSpPr txBox="1"/>
+              <p:nvPr/>
+            </p:nvSpPr>
+            <p:spPr>
+              <a:xfrm>
+                <a:off x="9125405" y="2150729"/>
+                <a:ext cx="2112269" cy="523220"/>
+              </a:xfrm>
+              <a:prstGeom prst="rect">
+                <a:avLst/>
+              </a:prstGeom>
+              <a:noFill/>
+            </p:spPr>
+            <p:txBody>
+              <a:bodyPr wrap="square" rtlCol="0">
+                <a:spAutoFit/>
+              </a:bodyPr>
+              <a:lstStyle/>
+              <a:p>
+                <a:pPr/>
+                <a14:m>
+                  <m:oMathPara xmlns:m="http://schemas.openxmlformats.org/officeDocument/2006/math">
+                    <m:oMathParaPr>
+                      <m:jc m:val="centerGroup"/>
+                    </m:oMathParaPr>
+                    <m:oMath xmlns:m="http://schemas.openxmlformats.org/officeDocument/2006/math">
+                      <m:r>
+                        <a:rPr lang="en-US" sz="2800" b="1" i="1" smtClean="0">
+                          <a:solidFill>
+                            <a:schemeClr val="accent6">
+                              <a:lumMod val="60000"/>
+                              <a:lumOff val="40000"/>
+                            </a:schemeClr>
+                          </a:solidFill>
+                          <a:latin typeface="Cambria Math" panose="02040503050406030204" pitchFamily="18" charset="0"/>
+                          <a:cs typeface="Aharoni" panose="02010803020104030203" pitchFamily="2" charset="-79"/>
+                        </a:rPr>
+                        <m:t>𝑷</m:t>
+                      </m:r>
+                      <m:r>
+                        <a:rPr lang="en-US" sz="2800" b="1" i="1" smtClean="0">
+                          <a:solidFill>
+                            <a:schemeClr val="accent6">
+                              <a:lumMod val="60000"/>
+                              <a:lumOff val="40000"/>
+                            </a:schemeClr>
+                          </a:solidFill>
+                          <a:latin typeface="Cambria Math" panose="02040503050406030204" pitchFamily="18" charset="0"/>
+                          <a:cs typeface="Aharoni" panose="02010803020104030203" pitchFamily="2" charset="-79"/>
+                        </a:rPr>
+                        <m:t>∗</m:t>
+                      </m:r>
+                      <m:r>
+                        <a:rPr lang="en-US" sz="2800" b="1" i="1" smtClean="0">
+                          <a:solidFill>
+                            <a:schemeClr val="accent6">
+                              <a:lumMod val="60000"/>
+                              <a:lumOff val="40000"/>
+                            </a:schemeClr>
+                          </a:solidFill>
+                          <a:latin typeface="Cambria Math" panose="02040503050406030204" pitchFamily="18" charset="0"/>
+                          <a:cs typeface="Aharoni" panose="02010803020104030203" pitchFamily="2" charset="-79"/>
+                        </a:rPr>
+                        <m:t>𝑴𝑷</m:t>
+                      </m:r>
+                      <m:sSub>
+                        <m:sSubPr>
+                          <m:ctrlPr>
+                            <a:rPr lang="en-US" sz="2800" b="1" i="1" smtClean="0">
+                              <a:solidFill>
+                                <a:schemeClr val="accent6">
+                                  <a:lumMod val="60000"/>
+                                  <a:lumOff val="40000"/>
+                                </a:schemeClr>
+                              </a:solidFill>
+                              <a:latin typeface="Cambria Math" panose="02040503050406030204" pitchFamily="18" charset="0"/>
+                              <a:cs typeface="Aharoni" panose="02010803020104030203" pitchFamily="2" charset="-79"/>
+                            </a:rPr>
+                          </m:ctrlPr>
+                        </m:sSubPr>
+                        <m:e>
+                          <m:r>
+                            <a:rPr lang="en-US" sz="2800" b="1" i="1" smtClean="0">
+                              <a:solidFill>
+                                <a:schemeClr val="accent6">
+                                  <a:lumMod val="60000"/>
+                                  <a:lumOff val="40000"/>
+                                </a:schemeClr>
+                              </a:solidFill>
+                              <a:latin typeface="Cambria Math" panose="02040503050406030204" pitchFamily="18" charset="0"/>
+                              <a:cs typeface="Aharoni" panose="02010803020104030203" pitchFamily="2" charset="-79"/>
+                            </a:rPr>
+                            <m:t>𝑳</m:t>
+                          </m:r>
+                          <m:r>
+                            <a:rPr lang="en-US" sz="2800" b="1" i="1" smtClean="0">
+                              <a:solidFill>
+                                <a:schemeClr val="accent6">
+                                  <a:lumMod val="60000"/>
+                                  <a:lumOff val="40000"/>
+                                </a:schemeClr>
+                              </a:solidFill>
+                              <a:latin typeface="Cambria Math" panose="02040503050406030204" pitchFamily="18" charset="0"/>
+                              <a:cs typeface="Aharoni" panose="02010803020104030203" pitchFamily="2" charset="-79"/>
+                            </a:rPr>
+                            <m:t>′</m:t>
+                          </m:r>
+                        </m:e>
+                        <m:sub>
+                          <m:r>
+                            <a:rPr lang="en-US" sz="2800" b="1" i="1" smtClean="0">
+                              <a:solidFill>
+                                <a:schemeClr val="accent6">
+                                  <a:lumMod val="60000"/>
+                                  <a:lumOff val="40000"/>
+                                </a:schemeClr>
+                              </a:solidFill>
+                              <a:latin typeface="Cambria Math" panose="02040503050406030204" pitchFamily="18" charset="0"/>
+                              <a:cs typeface="Aharoni" panose="02010803020104030203" pitchFamily="2" charset="-79"/>
+                            </a:rPr>
+                            <m:t>𝑿</m:t>
+                          </m:r>
+                        </m:sub>
+                      </m:sSub>
+                    </m:oMath>
+                  </m:oMathPara>
+                </a14:m>
+                <a:endParaRPr lang="en-US" sz="2800" b="1" dirty="0">
+                  <a:solidFill>
+                    <a:schemeClr val="accent6">
+                      <a:lumMod val="60000"/>
+                      <a:lumOff val="40000"/>
+                    </a:schemeClr>
+                  </a:solidFill>
+                  <a:latin typeface="Aharoni" panose="02010803020104030203" pitchFamily="2" charset="-79"/>
+                  <a:cs typeface="Aharoni" panose="02010803020104030203" pitchFamily="2" charset="-79"/>
+                </a:endParaRPr>
+              </a:p>
+            </p:txBody>
+          </p:sp>
+        </mc:Choice>
+        <mc:Fallback>
+          <p:sp>
+            <p:nvSpPr>
+              <p:cNvPr id="7" name="TextBox 6">
+                <a:extLst>
+                  <a:ext uri="{FF2B5EF4-FFF2-40B4-BE49-F238E27FC236}">
+                    <a16:creationId xmlns:a16="http://schemas.microsoft.com/office/drawing/2014/main" id="{C42B2F02-5627-75DB-751C-97A1265378E0}"/>
+                  </a:ext>
+                </a:extLst>
+              </p:cNvPr>
+              <p:cNvSpPr txBox="1">
+                <a:spLocks noRot="1" noChangeAspect="1" noMove="1" noResize="1" noEditPoints="1" noAdjustHandles="1" noChangeArrowheads="1" noChangeShapeType="1" noTextEdit="1"/>
+              </p:cNvSpPr>
+              <p:nvPr/>
+            </p:nvSpPr>
+            <p:spPr>
+              <a:xfrm>
+                <a:off x="9125405" y="2150729"/>
+                <a:ext cx="2112269" cy="523220"/>
+              </a:xfrm>
+              <a:prstGeom prst="rect">
+                <a:avLst/>
+              </a:prstGeom>
+              <a:blipFill>
+                <a:blip r:embed="rId4"/>
+                <a:stretch>
+                  <a:fillRect/>
+                </a:stretch>
+              </a:blipFill>
+            </p:spPr>
+            <p:txBody>
+              <a:bodyPr/>
+              <a:lstStyle/>
+              <a:p>
+                <a:r>
+                  <a:rPr lang="en-US">
+                    <a:noFill/>
+                  </a:rPr>
+                  <a:t> </a:t>
+                </a:r>
+              </a:p>
+            </p:txBody>
+          </p:sp>
+        </mc:Fallback>
+      </mc:AlternateContent>
+      <p:sp>
+        <p:nvSpPr>
+          <p:cNvPr id="15" name="Oval 14">
+            <a:extLst>
+              <a:ext uri="{FF2B5EF4-FFF2-40B4-BE49-F238E27FC236}">
+                <a16:creationId xmlns:a16="http://schemas.microsoft.com/office/drawing/2014/main" id="{A141FD16-AC83-6D73-4131-6BD26000F7B1}"/>
+              </a:ext>
+            </a:extLst>
+          </p:cNvPr>
+          <p:cNvSpPr/>
+          <p:nvPr/>
+        </p:nvSpPr>
+        <p:spPr>
+          <a:xfrm>
+            <a:off x="6297478" y="4485395"/>
+            <a:ext cx="190117" cy="172016"/>
+          </a:xfrm>
+          <a:prstGeom prst="ellipse">
+            <a:avLst/>
+          </a:prstGeom>
+          <a:solidFill>
+            <a:schemeClr val="accent2"/>
+          </a:solidFill>
+          <a:ln>
+            <a:solidFill>
+              <a:schemeClr val="tx1"/>
+            </a:solidFill>
+          </a:ln>
+        </p:spPr>
+        <p:style>
+          <a:lnRef idx="2">
+            <a:schemeClr val="accent1">
+              <a:shade val="15000"/>
+            </a:schemeClr>
+          </a:lnRef>
+          <a:fillRef idx="1">
+            <a:schemeClr val="accent1"/>
+          </a:fillRef>
+          <a:effectRef idx="0">
+            <a:schemeClr val="accent1"/>
+          </a:effectRef>
+          <a:fontRef idx="minor">
+            <a:schemeClr val="lt1"/>
+          </a:fontRef>
+        </p:style>
+        <p:txBody>
+          <a:bodyPr rtlCol="0" anchor="ctr"/>
+          <a:lstStyle/>
+          <a:p>
+            <a:pPr algn="ctr"/>
+            <a:endParaRPr lang="en-US"/>
+          </a:p>
+        </p:txBody>
+      </p:sp>
+      <p:sp>
+        <p:nvSpPr>
+          <p:cNvPr id="18" name="TextBox 17">
+            <a:extLst>
+              <a:ext uri="{FF2B5EF4-FFF2-40B4-BE49-F238E27FC236}">
+                <a16:creationId xmlns:a16="http://schemas.microsoft.com/office/drawing/2014/main" id="{1655E165-128A-D2E5-83AD-AA51754DD1E6}"/>
+              </a:ext>
+            </a:extLst>
+          </p:cNvPr>
+          <p:cNvSpPr txBox="1"/>
+          <p:nvPr/>
+        </p:nvSpPr>
+        <p:spPr>
+          <a:xfrm>
+            <a:off x="6201386" y="4023371"/>
+            <a:ext cx="310248" cy="461665"/>
+          </a:xfrm>
+          <a:prstGeom prst="rect">
+            <a:avLst/>
+          </a:prstGeom>
+          <a:noFill/>
+        </p:spPr>
+        <p:txBody>
+          <a:bodyPr wrap="square" rtlCol="0">
+            <a:spAutoFit/>
+          </a:bodyPr>
+          <a:lstStyle/>
+          <a:p>
+            <a:r>
+              <a:rPr lang="en-US" sz="2400" dirty="0">
+                <a:latin typeface="Aharoni" panose="02010803020104030203" pitchFamily="2" charset="-79"/>
+                <a:cs typeface="Aharoni" panose="02010803020104030203" pitchFamily="2" charset="-79"/>
+              </a:rPr>
+              <a:t>B</a:t>
+            </a:r>
+          </a:p>
+        </p:txBody>
+      </p:sp>
+      <p:cxnSp>
+        <p:nvCxnSpPr>
+          <p:cNvPr id="25" name="Straight Arrow Connector 24">
+            <a:extLst>
+              <a:ext uri="{FF2B5EF4-FFF2-40B4-BE49-F238E27FC236}">
+                <a16:creationId xmlns:a16="http://schemas.microsoft.com/office/drawing/2014/main" id="{3C623347-ADCA-C9D1-455C-1BBA555DF448}"/>
+              </a:ext>
+            </a:extLst>
+          </p:cNvPr>
+          <p:cNvCxnSpPr/>
+          <p:nvPr/>
+        </p:nvCxnSpPr>
+        <p:spPr>
+          <a:xfrm>
+            <a:off x="6869563" y="2408249"/>
+            <a:ext cx="1750423" cy="0"/>
+          </a:xfrm>
+          <a:prstGeom prst="straightConnector1">
+            <a:avLst/>
+          </a:prstGeom>
+          <a:ln w="57150">
+            <a:tailEnd type="triangle"/>
+          </a:ln>
+        </p:spPr>
+        <p:style>
+          <a:lnRef idx="2">
+            <a:schemeClr val="accent1"/>
+          </a:lnRef>
+          <a:fillRef idx="0">
+            <a:schemeClr val="accent1"/>
+          </a:fillRef>
+          <a:effectRef idx="1">
+            <a:schemeClr val="accent1"/>
+          </a:effectRef>
+          <a:fontRef idx="minor">
+            <a:schemeClr val="tx1"/>
+          </a:fontRef>
+        </p:style>
+      </p:cxnSp>
+      <p:sp>
+        <p:nvSpPr>
+          <p:cNvPr id="26" name="TextBox 25">
+            <a:extLst>
+              <a:ext uri="{FF2B5EF4-FFF2-40B4-BE49-F238E27FC236}">
+                <a16:creationId xmlns:a16="http://schemas.microsoft.com/office/drawing/2014/main" id="{5AACD1C8-06CF-0575-2A60-15F73B1146AA}"/>
+              </a:ext>
+            </a:extLst>
+          </p:cNvPr>
+          <p:cNvSpPr txBox="1"/>
+          <p:nvPr/>
+        </p:nvSpPr>
+        <p:spPr>
+          <a:xfrm>
+            <a:off x="5012610" y="6184580"/>
+            <a:ext cx="310248" cy="461665"/>
+          </a:xfrm>
+          <a:prstGeom prst="rect">
+            <a:avLst/>
+          </a:prstGeom>
+          <a:noFill/>
+        </p:spPr>
+        <p:txBody>
+          <a:bodyPr wrap="square" rtlCol="0">
+            <a:spAutoFit/>
+          </a:bodyPr>
+          <a:lstStyle/>
+          <a:p>
+            <a:pPr algn="ctr"/>
+            <a:r>
+              <a:rPr lang="en-US" sz="2400" dirty="0">
+                <a:latin typeface="Aharoni" panose="02010803020104030203" pitchFamily="2" charset="-79"/>
+                <a:cs typeface="Aharoni" panose="02010803020104030203" pitchFamily="2" charset="-79"/>
+              </a:rPr>
+              <a:t>L</a:t>
+            </a:r>
+          </a:p>
+        </p:txBody>
+      </p:sp>
+      <p:sp>
+        <p:nvSpPr>
+          <p:cNvPr id="27" name="TextBox 26">
+            <a:extLst>
+              <a:ext uri="{FF2B5EF4-FFF2-40B4-BE49-F238E27FC236}">
+                <a16:creationId xmlns:a16="http://schemas.microsoft.com/office/drawing/2014/main" id="{1610A562-8AB2-CE52-D779-01C868D69A5D}"/>
+              </a:ext>
+            </a:extLst>
+          </p:cNvPr>
+          <p:cNvSpPr txBox="1"/>
+          <p:nvPr/>
+        </p:nvSpPr>
+        <p:spPr>
+          <a:xfrm>
+            <a:off x="6136670" y="6184500"/>
+            <a:ext cx="511731" cy="461665"/>
+          </a:xfrm>
+          <a:prstGeom prst="rect">
+            <a:avLst/>
+          </a:prstGeom>
+          <a:noFill/>
+        </p:spPr>
+        <p:txBody>
+          <a:bodyPr wrap="square" rtlCol="0">
+            <a:spAutoFit/>
+          </a:bodyPr>
+          <a:lstStyle/>
+          <a:p>
+            <a:pPr algn="ctr"/>
+            <a:r>
+              <a:rPr lang="en-US" sz="2400" dirty="0">
+                <a:latin typeface="Aharoni" panose="02010803020104030203" pitchFamily="2" charset="-79"/>
+                <a:cs typeface="Aharoni" panose="02010803020104030203" pitchFamily="2" charset="-79"/>
+              </a:rPr>
+              <a:t>L’</a:t>
+            </a:r>
+          </a:p>
+        </p:txBody>
+      </p:sp>
+      <p:sp>
+        <p:nvSpPr>
+          <p:cNvPr id="28" name="TextBox 27">
+            <a:extLst>
+              <a:ext uri="{FF2B5EF4-FFF2-40B4-BE49-F238E27FC236}">
+                <a16:creationId xmlns:a16="http://schemas.microsoft.com/office/drawing/2014/main" id="{B655865B-3DBF-91FF-8F90-A1FD5F9266EB}"/>
+              </a:ext>
+            </a:extLst>
+          </p:cNvPr>
+          <p:cNvSpPr txBox="1"/>
+          <p:nvPr/>
+        </p:nvSpPr>
+        <p:spPr>
+          <a:xfrm>
+            <a:off x="1846330" y="3347165"/>
+            <a:ext cx="310248" cy="461665"/>
+          </a:xfrm>
+          <a:prstGeom prst="rect">
+            <a:avLst/>
+          </a:prstGeom>
+          <a:noFill/>
+        </p:spPr>
+        <p:txBody>
+          <a:bodyPr wrap="square" rtlCol="0">
+            <a:spAutoFit/>
+          </a:bodyPr>
+          <a:lstStyle/>
+          <a:p>
+            <a:pPr algn="ctr"/>
+            <a:r>
+              <a:rPr lang="en-US" sz="2400" dirty="0">
+                <a:latin typeface="Aharoni" panose="02010803020104030203" pitchFamily="2" charset="-79"/>
+                <a:cs typeface="Aharoni" panose="02010803020104030203" pitchFamily="2" charset="-79"/>
+              </a:rPr>
+              <a:t>W</a:t>
+            </a:r>
+          </a:p>
+        </p:txBody>
+      </p:sp>
+      <p:sp>
+        <p:nvSpPr>
+          <p:cNvPr id="29" name="TextBox 28">
+            <a:extLst>
+              <a:ext uri="{FF2B5EF4-FFF2-40B4-BE49-F238E27FC236}">
+                <a16:creationId xmlns:a16="http://schemas.microsoft.com/office/drawing/2014/main" id="{CAD78EBF-9385-C5A9-3F7E-F9A8AED140F8}"/>
+              </a:ext>
+            </a:extLst>
+          </p:cNvPr>
+          <p:cNvSpPr txBox="1"/>
+          <p:nvPr/>
+        </p:nvSpPr>
+        <p:spPr>
+          <a:xfrm>
+            <a:off x="1625525" y="4349876"/>
+            <a:ext cx="706613" cy="461665"/>
+          </a:xfrm>
+          <a:prstGeom prst="rect">
+            <a:avLst/>
+          </a:prstGeom>
+          <a:noFill/>
+        </p:spPr>
+        <p:txBody>
+          <a:bodyPr wrap="square" rtlCol="0">
+            <a:spAutoFit/>
+          </a:bodyPr>
+          <a:lstStyle/>
+          <a:p>
+            <a:pPr algn="ctr"/>
+            <a:r>
+              <a:rPr lang="en-US" sz="2400" dirty="0">
+                <a:latin typeface="Aharoni" panose="02010803020104030203" pitchFamily="2" charset="-79"/>
+                <a:cs typeface="Aharoni" panose="02010803020104030203" pitchFamily="2" charset="-79"/>
+              </a:rPr>
+              <a:t>W’</a:t>
+            </a:r>
+          </a:p>
+        </p:txBody>
+      </p:sp>
+      <p:cxnSp>
+        <p:nvCxnSpPr>
+          <p:cNvPr id="30" name="Straight Arrow Connector 29">
+            <a:extLst>
+              <a:ext uri="{FF2B5EF4-FFF2-40B4-BE49-F238E27FC236}">
+                <a16:creationId xmlns:a16="http://schemas.microsoft.com/office/drawing/2014/main" id="{B192E79B-C86E-22FC-9EDB-5A4EA1A443E3}"/>
+              </a:ext>
+            </a:extLst>
+          </p:cNvPr>
+          <p:cNvCxnSpPr>
+            <a:cxnSpLocks/>
+            <a:stCxn id="26" idx="2"/>
+          </p:cNvCxnSpPr>
+          <p:nvPr/>
+        </p:nvCxnSpPr>
+        <p:spPr>
+          <a:xfrm flipV="1">
+            <a:off x="5167734" y="6646165"/>
+            <a:ext cx="1343900" cy="80"/>
+          </a:xfrm>
+          <a:prstGeom prst="straightConnector1">
+            <a:avLst/>
+          </a:prstGeom>
+          <a:ln w="57150">
+            <a:tailEnd type="triangle"/>
+          </a:ln>
+        </p:spPr>
+        <p:style>
+          <a:lnRef idx="2">
+            <a:schemeClr val="accent1"/>
+          </a:lnRef>
+          <a:fillRef idx="0">
+            <a:schemeClr val="accent1"/>
+          </a:fillRef>
+          <a:effectRef idx="1">
+            <a:schemeClr val="accent1"/>
+          </a:effectRef>
+          <a:fontRef idx="minor">
+            <a:schemeClr val="tx1"/>
+          </a:fontRef>
+        </p:style>
+      </p:cxnSp>
+      <p:cxnSp>
+        <p:nvCxnSpPr>
+          <p:cNvPr id="33" name="Straight Arrow Connector 32">
+            <a:extLst>
+              <a:ext uri="{FF2B5EF4-FFF2-40B4-BE49-F238E27FC236}">
+                <a16:creationId xmlns:a16="http://schemas.microsoft.com/office/drawing/2014/main" id="{C660F2A1-D22E-9942-71C3-4CD1A60F5B00}"/>
+              </a:ext>
+            </a:extLst>
+          </p:cNvPr>
+          <p:cNvCxnSpPr>
+            <a:cxnSpLocks/>
+            <a:endCxn id="29" idx="1"/>
+          </p:cNvCxnSpPr>
+          <p:nvPr/>
+        </p:nvCxnSpPr>
+        <p:spPr>
+          <a:xfrm>
+            <a:off x="1625525" y="3604093"/>
+            <a:ext cx="0" cy="976616"/>
+          </a:xfrm>
+          <a:prstGeom prst="straightConnector1">
+            <a:avLst/>
+          </a:prstGeom>
+          <a:ln w="57150">
+            <a:tailEnd type="triangle"/>
+          </a:ln>
+        </p:spPr>
+        <p:style>
+          <a:lnRef idx="2">
+            <a:schemeClr val="accent1"/>
+          </a:lnRef>
+          <a:fillRef idx="0">
+            <a:schemeClr val="accent1"/>
+          </a:fillRef>
+          <a:effectRef idx="1">
+            <a:schemeClr val="accent1"/>
+          </a:effectRef>
+          <a:fontRef idx="minor">
+            <a:schemeClr val="tx1"/>
+          </a:fontRef>
+        </p:style>
+      </p:cxnSp>
+    </p:spTree>
+    <p:extLst>
+      <p:ext uri="{BB962C8B-B14F-4D97-AF65-F5344CB8AC3E}">
+        <p14:creationId xmlns:p14="http://schemas.microsoft.com/office/powerpoint/2010/main" val="3582265284"/>
       </p:ext>
     </p:extLst>
   </p:cSld>

</xml_diff>

<commit_message>
added images for tariffs lecture
</commit_message>
<xml_diff>
--- a/Slides/graph-creator.pptx
+++ b/Slides/graph-creator.pptx
@@ -45,6 +45,7 @@
     <p:sldId id="293" r:id="rId39"/>
     <p:sldId id="294" r:id="rId40"/>
     <p:sldId id="295" r:id="rId41"/>
+    <p:sldId id="296" r:id="rId42"/>
   </p:sldIdLst>
   <p:sldSz cx="12192000" cy="6858000"/>
   <p:notesSz cx="6858000" cy="9144000"/>
@@ -298,7 +299,7 @@
           <a:p>
             <a:fld id="{7F9C3969-815D-4313-AD47-20854D5F097C}" type="datetimeFigureOut">
               <a:rPr lang="en-US" smtClean="0"/>
-              <a:t>10/27/2024</a:t>
+              <a:t>10/28/2024</a:t>
             </a:fld>
             <a:endParaRPr lang="en-US"/>
           </a:p>
@@ -496,7 +497,7 @@
           <a:p>
             <a:fld id="{7F9C3969-815D-4313-AD47-20854D5F097C}" type="datetimeFigureOut">
               <a:rPr lang="en-US" smtClean="0"/>
-              <a:t>10/27/2024</a:t>
+              <a:t>10/28/2024</a:t>
             </a:fld>
             <a:endParaRPr lang="en-US"/>
           </a:p>
@@ -704,7 +705,7 @@
           <a:p>
             <a:fld id="{7F9C3969-815D-4313-AD47-20854D5F097C}" type="datetimeFigureOut">
               <a:rPr lang="en-US" smtClean="0"/>
-              <a:t>10/27/2024</a:t>
+              <a:t>10/28/2024</a:t>
             </a:fld>
             <a:endParaRPr lang="en-US"/>
           </a:p>
@@ -902,7 +903,7 @@
           <a:p>
             <a:fld id="{7F9C3969-815D-4313-AD47-20854D5F097C}" type="datetimeFigureOut">
               <a:rPr lang="en-US" smtClean="0"/>
-              <a:t>10/27/2024</a:t>
+              <a:t>10/28/2024</a:t>
             </a:fld>
             <a:endParaRPr lang="en-US"/>
           </a:p>
@@ -1177,7 +1178,7 @@
           <a:p>
             <a:fld id="{7F9C3969-815D-4313-AD47-20854D5F097C}" type="datetimeFigureOut">
               <a:rPr lang="en-US" smtClean="0"/>
-              <a:t>10/27/2024</a:t>
+              <a:t>10/28/2024</a:t>
             </a:fld>
             <a:endParaRPr lang="en-US"/>
           </a:p>
@@ -1442,7 +1443,7 @@
           <a:p>
             <a:fld id="{7F9C3969-815D-4313-AD47-20854D5F097C}" type="datetimeFigureOut">
               <a:rPr lang="en-US" smtClean="0"/>
-              <a:t>10/27/2024</a:t>
+              <a:t>10/28/2024</a:t>
             </a:fld>
             <a:endParaRPr lang="en-US"/>
           </a:p>
@@ -1854,7 +1855,7 @@
           <a:p>
             <a:fld id="{7F9C3969-815D-4313-AD47-20854D5F097C}" type="datetimeFigureOut">
               <a:rPr lang="en-US" smtClean="0"/>
-              <a:t>10/27/2024</a:t>
+              <a:t>10/28/2024</a:t>
             </a:fld>
             <a:endParaRPr lang="en-US"/>
           </a:p>
@@ -1995,7 +1996,7 @@
           <a:p>
             <a:fld id="{7F9C3969-815D-4313-AD47-20854D5F097C}" type="datetimeFigureOut">
               <a:rPr lang="en-US" smtClean="0"/>
-              <a:t>10/27/2024</a:t>
+              <a:t>10/28/2024</a:t>
             </a:fld>
             <a:endParaRPr lang="en-US"/>
           </a:p>
@@ -2108,7 +2109,7 @@
           <a:p>
             <a:fld id="{7F9C3969-815D-4313-AD47-20854D5F097C}" type="datetimeFigureOut">
               <a:rPr lang="en-US" smtClean="0"/>
-              <a:t>10/27/2024</a:t>
+              <a:t>10/28/2024</a:t>
             </a:fld>
             <a:endParaRPr lang="en-US"/>
           </a:p>
@@ -2419,7 +2420,7 @@
           <a:p>
             <a:fld id="{7F9C3969-815D-4313-AD47-20854D5F097C}" type="datetimeFigureOut">
               <a:rPr lang="en-US" smtClean="0"/>
-              <a:t>10/27/2024</a:t>
+              <a:t>10/28/2024</a:t>
             </a:fld>
             <a:endParaRPr lang="en-US"/>
           </a:p>
@@ -2707,7 +2708,7 @@
           <a:p>
             <a:fld id="{7F9C3969-815D-4313-AD47-20854D5F097C}" type="datetimeFigureOut">
               <a:rPr lang="en-US" smtClean="0"/>
-              <a:t>10/27/2024</a:t>
+              <a:t>10/28/2024</a:t>
             </a:fld>
             <a:endParaRPr lang="en-US"/>
           </a:p>
@@ -2948,7 +2949,7 @@
           <a:p>
             <a:fld id="{7F9C3969-815D-4313-AD47-20854D5F097C}" type="datetimeFigureOut">
               <a:rPr lang="en-US" smtClean="0"/>
-              <a:t>10/27/2024</a:t>
+              <a:t>10/28/2024</a:t>
             </a:fld>
             <a:endParaRPr lang="en-US"/>
           </a:p>
@@ -18176,8 +18177,8 @@
           </a:p>
         </p:txBody>
       </p:sp>
-      <mc:AlternateContent xmlns:mc="http://schemas.openxmlformats.org/markup-compatibility/2006">
-        <mc:Choice xmlns:a14="http://schemas.microsoft.com/office/drawing/2010/main" Requires="a14">
+      <mc:AlternateContent xmlns:mc="http://schemas.openxmlformats.org/markup-compatibility/2006" xmlns:a14="http://schemas.microsoft.com/office/drawing/2010/main">
+        <mc:Choice Requires="a14">
           <p:sp>
             <p:nvSpPr>
               <p:cNvPr id="20" name="TextBox 19">
@@ -18206,6 +18207,7 @@
               </a:bodyPr>
               <a:lstStyle/>
               <a:p>
+                <a:pPr/>
                 <a14:m>
                   <m:oMathPara xmlns:m="http://schemas.openxmlformats.org/officeDocument/2006/math">
                     <m:oMathParaPr>
@@ -18245,7 +18247,7 @@
             </p:txBody>
           </p:sp>
         </mc:Choice>
-        <mc:Fallback>
+        <mc:Fallback xmlns="">
           <p:sp>
             <p:nvSpPr>
               <p:cNvPr id="20" name="TextBox 19">
@@ -18290,8 +18292,8 @@
           </p:sp>
         </mc:Fallback>
       </mc:AlternateContent>
-      <mc:AlternateContent xmlns:mc="http://schemas.openxmlformats.org/markup-compatibility/2006">
-        <mc:Choice xmlns:a14="http://schemas.microsoft.com/office/drawing/2010/main" Requires="a14">
+      <mc:AlternateContent xmlns:mc="http://schemas.openxmlformats.org/markup-compatibility/2006" xmlns:a14="http://schemas.microsoft.com/office/drawing/2010/main">
+        <mc:Choice Requires="a14">
           <p:sp>
             <p:nvSpPr>
               <p:cNvPr id="21" name="TextBox 20">
@@ -18320,6 +18322,7 @@
               </a:bodyPr>
               <a:lstStyle/>
               <a:p>
+                <a:pPr/>
                 <a14:m>
                   <m:oMathPara xmlns:m="http://schemas.openxmlformats.org/officeDocument/2006/math">
                     <m:oMathParaPr>
@@ -18359,7 +18362,7 @@
             </p:txBody>
           </p:sp>
         </mc:Choice>
-        <mc:Fallback>
+        <mc:Fallback xmlns="">
           <p:sp>
             <p:nvSpPr>
               <p:cNvPr id="21" name="TextBox 20">
@@ -18864,8 +18867,8 @@
           </a:p>
         </p:txBody>
       </p:sp>
-      <mc:AlternateContent xmlns:mc="http://schemas.openxmlformats.org/markup-compatibility/2006">
-        <mc:Choice xmlns:a14="http://schemas.microsoft.com/office/drawing/2010/main" Requires="a14">
+      <mc:AlternateContent xmlns:mc="http://schemas.openxmlformats.org/markup-compatibility/2006" xmlns:a14="http://schemas.microsoft.com/office/drawing/2010/main">
+        <mc:Choice Requires="a14">
           <p:sp>
             <p:nvSpPr>
               <p:cNvPr id="20" name="TextBox 19">
@@ -18934,7 +18937,7 @@
             </p:txBody>
           </p:sp>
         </mc:Choice>
-        <mc:Fallback>
+        <mc:Fallback xmlns="">
           <p:sp>
             <p:nvSpPr>
               <p:cNvPr id="20" name="TextBox 19">
@@ -18979,8 +18982,8 @@
           </p:sp>
         </mc:Fallback>
       </mc:AlternateContent>
-      <mc:AlternateContent xmlns:mc="http://schemas.openxmlformats.org/markup-compatibility/2006">
-        <mc:Choice xmlns:a14="http://schemas.microsoft.com/office/drawing/2010/main" Requires="a14">
+      <mc:AlternateContent xmlns:mc="http://schemas.openxmlformats.org/markup-compatibility/2006" xmlns:a14="http://schemas.microsoft.com/office/drawing/2010/main">
+        <mc:Choice Requires="a14">
           <p:sp>
             <p:nvSpPr>
               <p:cNvPr id="21" name="TextBox 20">
@@ -19049,7 +19052,7 @@
             </p:txBody>
           </p:sp>
         </mc:Choice>
-        <mc:Fallback>
+        <mc:Fallback xmlns="">
           <p:sp>
             <p:nvSpPr>
               <p:cNvPr id="21" name="TextBox 20">
@@ -19888,8 +19891,8 @@
           </a:p>
         </p:txBody>
       </p:sp>
-      <mc:AlternateContent xmlns:mc="http://schemas.openxmlformats.org/markup-compatibility/2006">
-        <mc:Choice xmlns:a14="http://schemas.microsoft.com/office/drawing/2010/main" Requires="a14">
+      <mc:AlternateContent xmlns:mc="http://schemas.openxmlformats.org/markup-compatibility/2006" xmlns:a14="http://schemas.microsoft.com/office/drawing/2010/main">
+        <mc:Choice Requires="a14">
           <p:sp>
             <p:nvSpPr>
               <p:cNvPr id="20" name="TextBox 19">
@@ -19958,7 +19961,7 @@
             </p:txBody>
           </p:sp>
         </mc:Choice>
-        <mc:Fallback>
+        <mc:Fallback xmlns="">
           <p:sp>
             <p:nvSpPr>
               <p:cNvPr id="20" name="TextBox 19">
@@ -20003,8 +20006,8 @@
           </p:sp>
         </mc:Fallback>
       </mc:AlternateContent>
-      <mc:AlternateContent xmlns:mc="http://schemas.openxmlformats.org/markup-compatibility/2006">
-        <mc:Choice xmlns:a14="http://schemas.microsoft.com/office/drawing/2010/main" Requires="a14">
+      <mc:AlternateContent xmlns:mc="http://schemas.openxmlformats.org/markup-compatibility/2006" xmlns:a14="http://schemas.microsoft.com/office/drawing/2010/main">
+        <mc:Choice Requires="a14">
           <p:sp>
             <p:nvSpPr>
               <p:cNvPr id="21" name="TextBox 20">
@@ -20081,7 +20084,7 @@
             </p:txBody>
           </p:sp>
         </mc:Choice>
-        <mc:Fallback>
+        <mc:Fallback xmlns="">
           <p:sp>
             <p:nvSpPr>
               <p:cNvPr id="21" name="TextBox 20">
@@ -20167,8 +20170,8 @@
           </a:fontRef>
         </p:style>
       </p:cxnSp>
-      <mc:AlternateContent xmlns:mc="http://schemas.openxmlformats.org/markup-compatibility/2006">
-        <mc:Choice xmlns:a14="http://schemas.microsoft.com/office/drawing/2010/main" Requires="a14">
+      <mc:AlternateContent xmlns:mc="http://schemas.openxmlformats.org/markup-compatibility/2006" xmlns:a14="http://schemas.microsoft.com/office/drawing/2010/main">
+        <mc:Choice Requires="a14">
           <p:sp>
             <p:nvSpPr>
               <p:cNvPr id="8" name="TextBox 7">
@@ -20245,7 +20248,7 @@
             </p:txBody>
           </p:sp>
         </mc:Choice>
-        <mc:Fallback>
+        <mc:Fallback xmlns="">
           <p:sp>
             <p:nvSpPr>
               <p:cNvPr id="8" name="TextBox 7">
@@ -20290,8 +20293,8 @@
           </p:sp>
         </mc:Fallback>
       </mc:AlternateContent>
-      <mc:AlternateContent xmlns:mc="http://schemas.openxmlformats.org/markup-compatibility/2006">
-        <mc:Choice xmlns:a14="http://schemas.microsoft.com/office/drawing/2010/main" Requires="a14">
+      <mc:AlternateContent xmlns:mc="http://schemas.openxmlformats.org/markup-compatibility/2006" xmlns:a14="http://schemas.microsoft.com/office/drawing/2010/main">
+        <mc:Choice Requires="a14">
           <p:sp>
             <p:nvSpPr>
               <p:cNvPr id="9" name="TextBox 8">
@@ -20360,7 +20363,7 @@
             </p:txBody>
           </p:sp>
         </mc:Choice>
-        <mc:Fallback>
+        <mc:Fallback xmlns="">
           <p:sp>
             <p:nvSpPr>
               <p:cNvPr id="9" name="TextBox 8">
@@ -20970,8 +20973,8 @@
           </a:p>
         </p:txBody>
       </p:sp>
-      <mc:AlternateContent xmlns:mc="http://schemas.openxmlformats.org/markup-compatibility/2006">
-        <mc:Choice xmlns:a14="http://schemas.microsoft.com/office/drawing/2010/main" Requires="a14">
+      <mc:AlternateContent xmlns:mc="http://schemas.openxmlformats.org/markup-compatibility/2006" xmlns:a14="http://schemas.microsoft.com/office/drawing/2010/main">
+        <mc:Choice Requires="a14">
           <p:sp>
             <p:nvSpPr>
               <p:cNvPr id="20" name="TextBox 19">
@@ -21040,7 +21043,7 @@
             </p:txBody>
           </p:sp>
         </mc:Choice>
-        <mc:Fallback>
+        <mc:Fallback xmlns="">
           <p:sp>
             <p:nvSpPr>
               <p:cNvPr id="20" name="TextBox 19">
@@ -21085,8 +21088,8 @@
           </p:sp>
         </mc:Fallback>
       </mc:AlternateContent>
-      <mc:AlternateContent xmlns:mc="http://schemas.openxmlformats.org/markup-compatibility/2006">
-        <mc:Choice xmlns:a14="http://schemas.microsoft.com/office/drawing/2010/main" Requires="a14">
+      <mc:AlternateContent xmlns:mc="http://schemas.openxmlformats.org/markup-compatibility/2006" xmlns:a14="http://schemas.microsoft.com/office/drawing/2010/main">
+        <mc:Choice Requires="a14">
           <p:sp>
             <p:nvSpPr>
               <p:cNvPr id="21" name="TextBox 20">
@@ -21163,7 +21166,7 @@
             </p:txBody>
           </p:sp>
         </mc:Choice>
-        <mc:Fallback>
+        <mc:Fallback xmlns="">
           <p:sp>
             <p:nvSpPr>
               <p:cNvPr id="21" name="TextBox 20">
@@ -21249,8 +21252,8 @@
           </a:fontRef>
         </p:style>
       </p:cxnSp>
-      <mc:AlternateContent xmlns:mc="http://schemas.openxmlformats.org/markup-compatibility/2006">
-        <mc:Choice xmlns:a14="http://schemas.microsoft.com/office/drawing/2010/main" Requires="a14">
+      <mc:AlternateContent xmlns:mc="http://schemas.openxmlformats.org/markup-compatibility/2006" xmlns:a14="http://schemas.microsoft.com/office/drawing/2010/main">
+        <mc:Choice Requires="a14">
           <p:sp>
             <p:nvSpPr>
               <p:cNvPr id="8" name="TextBox 7">
@@ -21327,7 +21330,7 @@
             </p:txBody>
           </p:sp>
         </mc:Choice>
-        <mc:Fallback>
+        <mc:Fallback xmlns="">
           <p:sp>
             <p:nvSpPr>
               <p:cNvPr id="8" name="TextBox 7">
@@ -21372,8 +21375,8 @@
           </p:sp>
         </mc:Fallback>
       </mc:AlternateContent>
-      <mc:AlternateContent xmlns:mc="http://schemas.openxmlformats.org/markup-compatibility/2006">
-        <mc:Choice xmlns:a14="http://schemas.microsoft.com/office/drawing/2010/main" Requires="a14">
+      <mc:AlternateContent xmlns:mc="http://schemas.openxmlformats.org/markup-compatibility/2006" xmlns:a14="http://schemas.microsoft.com/office/drawing/2010/main">
+        <mc:Choice Requires="a14">
           <p:sp>
             <p:nvSpPr>
               <p:cNvPr id="9" name="TextBox 8">
@@ -21442,7 +21445,7 @@
             </p:txBody>
           </p:sp>
         </mc:Choice>
-        <mc:Fallback>
+        <mc:Fallback xmlns="">
           <p:sp>
             <p:nvSpPr>
               <p:cNvPr id="9" name="TextBox 8">
@@ -22050,8 +22053,8 @@
           </a:p>
         </p:txBody>
       </p:sp>
-      <mc:AlternateContent xmlns:mc="http://schemas.openxmlformats.org/markup-compatibility/2006">
-        <mc:Choice xmlns:a14="http://schemas.microsoft.com/office/drawing/2010/main" Requires="a14">
+      <mc:AlternateContent xmlns:mc="http://schemas.openxmlformats.org/markup-compatibility/2006" xmlns:a14="http://schemas.microsoft.com/office/drawing/2010/main">
+        <mc:Choice Requires="a14">
           <p:sp>
             <p:nvSpPr>
               <p:cNvPr id="20" name="TextBox 19">
@@ -22120,7 +22123,7 @@
             </p:txBody>
           </p:sp>
         </mc:Choice>
-        <mc:Fallback>
+        <mc:Fallback xmlns="">
           <p:sp>
             <p:nvSpPr>
               <p:cNvPr id="20" name="TextBox 19">
@@ -22165,8 +22168,8 @@
           </p:sp>
         </mc:Fallback>
       </mc:AlternateContent>
-      <mc:AlternateContent xmlns:mc="http://schemas.openxmlformats.org/markup-compatibility/2006">
-        <mc:Choice xmlns:a14="http://schemas.microsoft.com/office/drawing/2010/main" Requires="a14">
+      <mc:AlternateContent xmlns:mc="http://schemas.openxmlformats.org/markup-compatibility/2006" xmlns:a14="http://schemas.microsoft.com/office/drawing/2010/main">
+        <mc:Choice Requires="a14">
           <p:sp>
             <p:nvSpPr>
               <p:cNvPr id="21" name="TextBox 20">
@@ -22243,7 +22246,7 @@
             </p:txBody>
           </p:sp>
         </mc:Choice>
-        <mc:Fallback>
+        <mc:Fallback xmlns="">
           <p:sp>
             <p:nvSpPr>
               <p:cNvPr id="21" name="TextBox 20">
@@ -22329,8 +22332,8 @@
           </a:fontRef>
         </p:style>
       </p:cxnSp>
-      <mc:AlternateContent xmlns:mc="http://schemas.openxmlformats.org/markup-compatibility/2006">
-        <mc:Choice xmlns:a14="http://schemas.microsoft.com/office/drawing/2010/main" Requires="a14">
+      <mc:AlternateContent xmlns:mc="http://schemas.openxmlformats.org/markup-compatibility/2006" xmlns:a14="http://schemas.microsoft.com/office/drawing/2010/main">
+        <mc:Choice Requires="a14">
           <p:sp>
             <p:nvSpPr>
               <p:cNvPr id="8" name="TextBox 7">
@@ -22407,7 +22410,7 @@
             </p:txBody>
           </p:sp>
         </mc:Choice>
-        <mc:Fallback>
+        <mc:Fallback xmlns="">
           <p:sp>
             <p:nvSpPr>
               <p:cNvPr id="8" name="TextBox 7">
@@ -22452,8 +22455,8 @@
           </p:sp>
         </mc:Fallback>
       </mc:AlternateContent>
-      <mc:AlternateContent xmlns:mc="http://schemas.openxmlformats.org/markup-compatibility/2006">
-        <mc:Choice xmlns:a14="http://schemas.microsoft.com/office/drawing/2010/main" Requires="a14">
+      <mc:AlternateContent xmlns:mc="http://schemas.openxmlformats.org/markup-compatibility/2006" xmlns:a14="http://schemas.microsoft.com/office/drawing/2010/main">
+        <mc:Choice Requires="a14">
           <p:sp>
             <p:nvSpPr>
               <p:cNvPr id="9" name="TextBox 8">
@@ -22522,7 +22525,7 @@
             </p:txBody>
           </p:sp>
         </mc:Choice>
-        <mc:Fallback>
+        <mc:Fallback xmlns="">
           <p:sp>
             <p:nvSpPr>
               <p:cNvPr id="9" name="TextBox 8">
@@ -22711,8 +22714,8 @@
           </a:fontRef>
         </p:style>
       </p:cxnSp>
-      <mc:AlternateContent xmlns:mc="http://schemas.openxmlformats.org/markup-compatibility/2006">
-        <mc:Choice xmlns:a14="http://schemas.microsoft.com/office/drawing/2010/main" Requires="a14">
+      <mc:AlternateContent xmlns:mc="http://schemas.openxmlformats.org/markup-compatibility/2006" xmlns:a14="http://schemas.microsoft.com/office/drawing/2010/main">
+        <mc:Choice Requires="a14">
           <p:sp>
             <p:nvSpPr>
               <p:cNvPr id="24" name="TextBox 23">
@@ -22777,13 +22780,7 @@
                             <a:rPr lang="en-US" sz="2800" b="0" i="1" smtClean="0">
                               <a:latin typeface="Cambria Math" panose="02040503050406030204" pitchFamily="18" charset="0"/>
                             </a:rPr>
-                            <m:t>∗</m:t>
-                          </m:r>
-                          <m:r>
-                            <a:rPr lang="en-US" sz="2800" b="0" i="1" smtClean="0">
-                              <a:latin typeface="Cambria Math" panose="02040503050406030204" pitchFamily="18" charset="0"/>
-                            </a:rPr>
-                            <m:t> </m:t>
+                            <m:t>∗ </m:t>
                           </m:r>
                         </m:sup>
                       </m:sSubSup>
@@ -22795,7 +22792,7 @@
             </p:txBody>
           </p:sp>
         </mc:Choice>
-        <mc:Fallback>
+        <mc:Fallback xmlns="">
           <p:sp>
             <p:nvSpPr>
               <p:cNvPr id="24" name="TextBox 23">
@@ -22840,8 +22837,8 @@
           </p:sp>
         </mc:Fallback>
       </mc:AlternateContent>
-      <mc:AlternateContent xmlns:mc="http://schemas.openxmlformats.org/markup-compatibility/2006">
-        <mc:Choice xmlns:a14="http://schemas.microsoft.com/office/drawing/2010/main" Requires="a14">
+      <mc:AlternateContent xmlns:mc="http://schemas.openxmlformats.org/markup-compatibility/2006" xmlns:a14="http://schemas.microsoft.com/office/drawing/2010/main">
+        <mc:Choice Requires="a14">
           <p:sp>
             <p:nvSpPr>
               <p:cNvPr id="25" name="TextBox 24">
@@ -22906,13 +22903,7 @@
                             <a:rPr lang="en-US" sz="2800" b="0" i="1" smtClean="0">
                               <a:latin typeface="Cambria Math" panose="02040503050406030204" pitchFamily="18" charset="0"/>
                             </a:rPr>
-                            <m:t>∗</m:t>
-                          </m:r>
-                          <m:r>
-                            <a:rPr lang="en-US" sz="2800" b="0" i="1" smtClean="0">
-                              <a:latin typeface="Cambria Math" panose="02040503050406030204" pitchFamily="18" charset="0"/>
-                            </a:rPr>
-                            <m:t> </m:t>
+                            <m:t>∗ </m:t>
                           </m:r>
                         </m:sup>
                       </m:sSubSup>
@@ -22924,7 +22915,7 @@
             </p:txBody>
           </p:sp>
         </mc:Choice>
-        <mc:Fallback>
+        <mc:Fallback xmlns="">
           <p:sp>
             <p:nvSpPr>
               <p:cNvPr id="25" name="TextBox 24">
@@ -22969,8 +22960,8 @@
           </p:sp>
         </mc:Fallback>
       </mc:AlternateContent>
-      <mc:AlternateContent xmlns:mc="http://schemas.openxmlformats.org/markup-compatibility/2006">
-        <mc:Choice xmlns:a14="http://schemas.microsoft.com/office/drawing/2010/main" Requires="a14">
+      <mc:AlternateContent xmlns:mc="http://schemas.openxmlformats.org/markup-compatibility/2006" xmlns:a14="http://schemas.microsoft.com/office/drawing/2010/main">
+        <mc:Choice Requires="a14">
           <p:sp>
             <p:nvSpPr>
               <p:cNvPr id="26" name="TextBox 25">
@@ -23039,7 +23030,7 @@
             </p:txBody>
           </p:sp>
         </mc:Choice>
-        <mc:Fallback>
+        <mc:Fallback xmlns="">
           <p:sp>
             <p:nvSpPr>
               <p:cNvPr id="26" name="TextBox 25">
@@ -23129,8 +23120,8 @@
           </a:fontRef>
         </p:style>
       </p:cxnSp>
-      <mc:AlternateContent xmlns:mc="http://schemas.openxmlformats.org/markup-compatibility/2006">
-        <mc:Choice xmlns:a14="http://schemas.microsoft.com/office/drawing/2010/main" Requires="a14">
+      <mc:AlternateContent xmlns:mc="http://schemas.openxmlformats.org/markup-compatibility/2006" xmlns:a14="http://schemas.microsoft.com/office/drawing/2010/main">
+        <mc:Choice Requires="a14">
           <p:sp>
             <p:nvSpPr>
               <p:cNvPr id="30" name="TextBox 29">
@@ -23207,7 +23198,7 @@
             </p:txBody>
           </p:sp>
         </mc:Choice>
-        <mc:Fallback>
+        <mc:Fallback xmlns="">
           <p:sp>
             <p:nvSpPr>
               <p:cNvPr id="30" name="TextBox 29">
@@ -23658,8 +23649,8 @@
           </p:style>
         </p:cxnSp>
       </p:grpSp>
-      <mc:AlternateContent xmlns:mc="http://schemas.openxmlformats.org/markup-compatibility/2006">
-        <mc:Choice xmlns:a14="http://schemas.microsoft.com/office/drawing/2010/main" Requires="a14">
+      <mc:AlternateContent xmlns:mc="http://schemas.openxmlformats.org/markup-compatibility/2006" xmlns:a14="http://schemas.microsoft.com/office/drawing/2010/main">
+        <mc:Choice Requires="a14">
           <p:sp>
             <p:nvSpPr>
               <p:cNvPr id="20" name="TextBox 19">
@@ -23728,7 +23719,7 @@
             </p:txBody>
           </p:sp>
         </mc:Choice>
-        <mc:Fallback>
+        <mc:Fallback xmlns="">
           <p:sp>
             <p:nvSpPr>
               <p:cNvPr id="20" name="TextBox 19">
@@ -23773,8 +23764,8 @@
           </p:sp>
         </mc:Fallback>
       </mc:AlternateContent>
-      <mc:AlternateContent xmlns:mc="http://schemas.openxmlformats.org/markup-compatibility/2006">
-        <mc:Choice xmlns:a14="http://schemas.microsoft.com/office/drawing/2010/main" Requires="a14">
+      <mc:AlternateContent xmlns:mc="http://schemas.openxmlformats.org/markup-compatibility/2006" xmlns:a14="http://schemas.microsoft.com/office/drawing/2010/main">
+        <mc:Choice Requires="a14">
           <p:sp>
             <p:nvSpPr>
               <p:cNvPr id="21" name="TextBox 20">
@@ -23851,7 +23842,7 @@
             </p:txBody>
           </p:sp>
         </mc:Choice>
-        <mc:Fallback>
+        <mc:Fallback xmlns="">
           <p:sp>
             <p:nvSpPr>
               <p:cNvPr id="21" name="TextBox 20">
@@ -23937,8 +23928,8 @@
           </a:fontRef>
         </p:style>
       </p:cxnSp>
-      <mc:AlternateContent xmlns:mc="http://schemas.openxmlformats.org/markup-compatibility/2006">
-        <mc:Choice xmlns:a14="http://schemas.microsoft.com/office/drawing/2010/main" Requires="a14">
+      <mc:AlternateContent xmlns:mc="http://schemas.openxmlformats.org/markup-compatibility/2006" xmlns:a14="http://schemas.microsoft.com/office/drawing/2010/main">
+        <mc:Choice Requires="a14">
           <p:sp>
             <p:nvSpPr>
               <p:cNvPr id="8" name="TextBox 7">
@@ -24015,7 +24006,7 @@
             </p:txBody>
           </p:sp>
         </mc:Choice>
-        <mc:Fallback>
+        <mc:Fallback xmlns="">
           <p:sp>
             <p:nvSpPr>
               <p:cNvPr id="8" name="TextBox 7">
@@ -24204,8 +24195,8 @@
           </a:fontRef>
         </p:style>
       </p:cxnSp>
-      <mc:AlternateContent xmlns:mc="http://schemas.openxmlformats.org/markup-compatibility/2006">
-        <mc:Choice xmlns:a14="http://schemas.microsoft.com/office/drawing/2010/main" Requires="a14">
+      <mc:AlternateContent xmlns:mc="http://schemas.openxmlformats.org/markup-compatibility/2006" xmlns:a14="http://schemas.microsoft.com/office/drawing/2010/main">
+        <mc:Choice Requires="a14">
           <p:sp>
             <p:nvSpPr>
               <p:cNvPr id="24" name="TextBox 23">
@@ -24282,7 +24273,7 @@
             </p:txBody>
           </p:sp>
         </mc:Choice>
-        <mc:Fallback>
+        <mc:Fallback xmlns="">
           <p:sp>
             <p:nvSpPr>
               <p:cNvPr id="24" name="TextBox 23">
@@ -24327,8 +24318,8 @@
           </p:sp>
         </mc:Fallback>
       </mc:AlternateContent>
-      <mc:AlternateContent xmlns:mc="http://schemas.openxmlformats.org/markup-compatibility/2006">
-        <mc:Choice xmlns:a14="http://schemas.microsoft.com/office/drawing/2010/main" Requires="a14">
+      <mc:AlternateContent xmlns:mc="http://schemas.openxmlformats.org/markup-compatibility/2006" xmlns:a14="http://schemas.microsoft.com/office/drawing/2010/main">
+        <mc:Choice Requires="a14">
           <p:sp>
             <p:nvSpPr>
               <p:cNvPr id="25" name="TextBox 24">
@@ -24405,7 +24396,7 @@
             </p:txBody>
           </p:sp>
         </mc:Choice>
-        <mc:Fallback>
+        <mc:Fallback xmlns="">
           <p:sp>
             <p:nvSpPr>
               <p:cNvPr id="25" name="TextBox 24">
@@ -24450,8 +24441,8 @@
           </p:sp>
         </mc:Fallback>
       </mc:AlternateContent>
-      <mc:AlternateContent xmlns:mc="http://schemas.openxmlformats.org/markup-compatibility/2006">
-        <mc:Choice xmlns:a14="http://schemas.microsoft.com/office/drawing/2010/main" Requires="a14">
+      <mc:AlternateContent xmlns:mc="http://schemas.openxmlformats.org/markup-compatibility/2006" xmlns:a14="http://schemas.microsoft.com/office/drawing/2010/main">
+        <mc:Choice Requires="a14">
           <p:sp>
             <p:nvSpPr>
               <p:cNvPr id="30" name="TextBox 29">
@@ -24528,7 +24519,7 @@
             </p:txBody>
           </p:sp>
         </mc:Choice>
-        <mc:Fallback>
+        <mc:Fallback xmlns="">
           <p:sp>
             <p:nvSpPr>
               <p:cNvPr id="30" name="TextBox 29">
@@ -24573,8 +24564,8 @@
           </p:sp>
         </mc:Fallback>
       </mc:AlternateContent>
-      <mc:AlternateContent xmlns:mc="http://schemas.openxmlformats.org/markup-compatibility/2006">
-        <mc:Choice xmlns:a14="http://schemas.microsoft.com/office/drawing/2010/main" Requires="a14">
+      <mc:AlternateContent xmlns:mc="http://schemas.openxmlformats.org/markup-compatibility/2006" xmlns:a14="http://schemas.microsoft.com/office/drawing/2010/main">
+        <mc:Choice Requires="a14">
           <p:sp>
             <p:nvSpPr>
               <p:cNvPr id="22" name="TextBox 21">
@@ -24651,7 +24642,7 @@
             </p:txBody>
           </p:sp>
         </mc:Choice>
-        <mc:Fallback>
+        <mc:Fallback xmlns="">
           <p:sp>
             <p:nvSpPr>
               <p:cNvPr id="22" name="TextBox 21">
@@ -24696,8 +24687,8 @@
           </p:sp>
         </mc:Fallback>
       </mc:AlternateContent>
-      <mc:AlternateContent xmlns:mc="http://schemas.openxmlformats.org/markup-compatibility/2006">
-        <mc:Choice xmlns:a14="http://schemas.microsoft.com/office/drawing/2010/main" Requires="a14">
+      <mc:AlternateContent xmlns:mc="http://schemas.openxmlformats.org/markup-compatibility/2006" xmlns:a14="http://schemas.microsoft.com/office/drawing/2010/main">
+        <mc:Choice Requires="a14">
           <p:sp>
             <p:nvSpPr>
               <p:cNvPr id="23" name="TextBox 22">
@@ -24774,7 +24765,7 @@
             </p:txBody>
           </p:sp>
         </mc:Choice>
-        <mc:Fallback>
+        <mc:Fallback xmlns="">
           <p:sp>
             <p:nvSpPr>
               <p:cNvPr id="23" name="TextBox 22">
@@ -24819,8 +24810,8 @@
           </p:sp>
         </mc:Fallback>
       </mc:AlternateContent>
-      <mc:AlternateContent xmlns:mc="http://schemas.openxmlformats.org/markup-compatibility/2006">
-        <mc:Choice xmlns:a14="http://schemas.microsoft.com/office/drawing/2010/main" Requires="a14">
+      <mc:AlternateContent xmlns:mc="http://schemas.openxmlformats.org/markup-compatibility/2006" xmlns:a14="http://schemas.microsoft.com/office/drawing/2010/main">
+        <mc:Choice Requires="a14">
           <p:sp>
             <p:nvSpPr>
               <p:cNvPr id="27" name="TextBox 26">
@@ -24897,7 +24888,7 @@
             </p:txBody>
           </p:sp>
         </mc:Choice>
-        <mc:Fallback>
+        <mc:Fallback xmlns="">
           <p:sp>
             <p:nvSpPr>
               <p:cNvPr id="27" name="TextBox 26">
@@ -24942,8 +24933,8 @@
           </p:sp>
         </mc:Fallback>
       </mc:AlternateContent>
-      <mc:AlternateContent xmlns:mc="http://schemas.openxmlformats.org/markup-compatibility/2006">
-        <mc:Choice xmlns:a14="http://schemas.microsoft.com/office/drawing/2010/main" Requires="a14">
+      <mc:AlternateContent xmlns:mc="http://schemas.openxmlformats.org/markup-compatibility/2006" xmlns:a14="http://schemas.microsoft.com/office/drawing/2010/main">
+        <mc:Choice Requires="a14">
           <p:sp>
             <p:nvSpPr>
               <p:cNvPr id="29" name="TextBox 28">
@@ -25020,7 +25011,7 @@
             </p:txBody>
           </p:sp>
         </mc:Choice>
-        <mc:Fallback>
+        <mc:Fallback xmlns="">
           <p:sp>
             <p:nvSpPr>
               <p:cNvPr id="29" name="TextBox 28">
@@ -25065,8 +25056,8 @@
           </p:sp>
         </mc:Fallback>
       </mc:AlternateContent>
-      <mc:AlternateContent xmlns:mc="http://schemas.openxmlformats.org/markup-compatibility/2006">
-        <mc:Choice xmlns:a14="http://schemas.microsoft.com/office/drawing/2010/main" Requires="a14">
+      <mc:AlternateContent xmlns:mc="http://schemas.openxmlformats.org/markup-compatibility/2006" xmlns:a14="http://schemas.microsoft.com/office/drawing/2010/main">
+        <mc:Choice Requires="a14">
           <p:sp>
             <p:nvSpPr>
               <p:cNvPr id="31" name="TextBox 30">
@@ -25116,7 +25107,7 @@
             </p:txBody>
           </p:sp>
         </mc:Choice>
-        <mc:Fallback>
+        <mc:Fallback xmlns="">
           <p:sp>
             <p:nvSpPr>
               <p:cNvPr id="31" name="TextBox 30">
@@ -25161,8 +25152,8 @@
           </p:sp>
         </mc:Fallback>
       </mc:AlternateContent>
-      <mc:AlternateContent xmlns:mc="http://schemas.openxmlformats.org/markup-compatibility/2006">
-        <mc:Choice xmlns:a14="http://schemas.microsoft.com/office/drawing/2010/main" Requires="a14">
+      <mc:AlternateContent xmlns:mc="http://schemas.openxmlformats.org/markup-compatibility/2006" xmlns:a14="http://schemas.microsoft.com/office/drawing/2010/main">
+        <mc:Choice Requires="a14">
           <p:sp>
             <p:nvSpPr>
               <p:cNvPr id="32" name="TextBox 31">
@@ -25239,7 +25230,7 @@
             </p:txBody>
           </p:sp>
         </mc:Choice>
-        <mc:Fallback>
+        <mc:Fallback xmlns="">
           <p:sp>
             <p:nvSpPr>
               <p:cNvPr id="32" name="TextBox 31">
@@ -25284,8 +25275,8 @@
           </p:sp>
         </mc:Fallback>
       </mc:AlternateContent>
-      <mc:AlternateContent xmlns:mc="http://schemas.openxmlformats.org/markup-compatibility/2006">
-        <mc:Choice xmlns:a14="http://schemas.microsoft.com/office/drawing/2010/main" Requires="a14">
+      <mc:AlternateContent xmlns:mc="http://schemas.openxmlformats.org/markup-compatibility/2006" xmlns:a14="http://schemas.microsoft.com/office/drawing/2010/main">
+        <mc:Choice Requires="a14">
           <p:sp>
             <p:nvSpPr>
               <p:cNvPr id="37" name="TextBox 36">
@@ -25354,7 +25345,7 @@
             </p:txBody>
           </p:sp>
         </mc:Choice>
-        <mc:Fallback>
+        <mc:Fallback xmlns="">
           <p:sp>
             <p:nvSpPr>
               <p:cNvPr id="37" name="TextBox 36">
@@ -26532,8 +26523,8 @@
           </p:style>
         </p:cxnSp>
       </p:grpSp>
-      <mc:AlternateContent xmlns:mc="http://schemas.openxmlformats.org/markup-compatibility/2006">
-        <mc:Choice xmlns:a14="http://schemas.microsoft.com/office/drawing/2010/main" Requires="a14">
+      <mc:AlternateContent xmlns:mc="http://schemas.openxmlformats.org/markup-compatibility/2006" xmlns:a14="http://schemas.microsoft.com/office/drawing/2010/main">
+        <mc:Choice Requires="a14">
           <p:sp>
             <p:nvSpPr>
               <p:cNvPr id="20" name="TextBox 19">
@@ -26602,7 +26593,7 @@
             </p:txBody>
           </p:sp>
         </mc:Choice>
-        <mc:Fallback>
+        <mc:Fallback xmlns="">
           <p:sp>
             <p:nvSpPr>
               <p:cNvPr id="20" name="TextBox 19">
@@ -26647,8 +26638,8 @@
           </p:sp>
         </mc:Fallback>
       </mc:AlternateContent>
-      <mc:AlternateContent xmlns:mc="http://schemas.openxmlformats.org/markup-compatibility/2006">
-        <mc:Choice xmlns:a14="http://schemas.microsoft.com/office/drawing/2010/main" Requires="a14">
+      <mc:AlternateContent xmlns:mc="http://schemas.openxmlformats.org/markup-compatibility/2006" xmlns:a14="http://schemas.microsoft.com/office/drawing/2010/main">
+        <mc:Choice Requires="a14">
           <p:sp>
             <p:nvSpPr>
               <p:cNvPr id="21" name="TextBox 20">
@@ -26725,7 +26716,7 @@
             </p:txBody>
           </p:sp>
         </mc:Choice>
-        <mc:Fallback>
+        <mc:Fallback xmlns="">
           <p:sp>
             <p:nvSpPr>
               <p:cNvPr id="21" name="TextBox 20">
@@ -26811,8 +26802,8 @@
           </a:fontRef>
         </p:style>
       </p:cxnSp>
-      <mc:AlternateContent xmlns:mc="http://schemas.openxmlformats.org/markup-compatibility/2006">
-        <mc:Choice xmlns:a14="http://schemas.microsoft.com/office/drawing/2010/main" Requires="a14">
+      <mc:AlternateContent xmlns:mc="http://schemas.openxmlformats.org/markup-compatibility/2006" xmlns:a14="http://schemas.microsoft.com/office/drawing/2010/main">
+        <mc:Choice Requires="a14">
           <p:sp>
             <p:nvSpPr>
               <p:cNvPr id="8" name="TextBox 7">
@@ -26889,7 +26880,7 @@
             </p:txBody>
           </p:sp>
         </mc:Choice>
-        <mc:Fallback>
+        <mc:Fallback xmlns="">
           <p:sp>
             <p:nvSpPr>
               <p:cNvPr id="8" name="TextBox 7">
@@ -26934,8 +26925,8 @@
           </p:sp>
         </mc:Fallback>
       </mc:AlternateContent>
-      <mc:AlternateContent xmlns:mc="http://schemas.openxmlformats.org/markup-compatibility/2006">
-        <mc:Choice xmlns:a14="http://schemas.microsoft.com/office/drawing/2010/main" Requires="a14">
+      <mc:AlternateContent xmlns:mc="http://schemas.openxmlformats.org/markup-compatibility/2006" xmlns:a14="http://schemas.microsoft.com/office/drawing/2010/main">
+        <mc:Choice Requires="a14">
           <p:sp>
             <p:nvSpPr>
               <p:cNvPr id="9" name="TextBox 8">
@@ -27004,7 +26995,7 @@
             </p:txBody>
           </p:sp>
         </mc:Choice>
-        <mc:Fallback>
+        <mc:Fallback xmlns="">
           <p:sp>
             <p:nvSpPr>
               <p:cNvPr id="9" name="TextBox 8">
@@ -27193,8 +27184,8 @@
           </a:fontRef>
         </p:style>
       </p:cxnSp>
-      <mc:AlternateContent xmlns:mc="http://schemas.openxmlformats.org/markup-compatibility/2006">
-        <mc:Choice xmlns:a14="http://schemas.microsoft.com/office/drawing/2010/main" Requires="a14">
+      <mc:AlternateContent xmlns:mc="http://schemas.openxmlformats.org/markup-compatibility/2006" xmlns:a14="http://schemas.microsoft.com/office/drawing/2010/main">
+        <mc:Choice Requires="a14">
           <p:sp>
             <p:nvSpPr>
               <p:cNvPr id="24" name="TextBox 23">
@@ -27271,7 +27262,7 @@
             </p:txBody>
           </p:sp>
         </mc:Choice>
-        <mc:Fallback>
+        <mc:Fallback xmlns="">
           <p:sp>
             <p:nvSpPr>
               <p:cNvPr id="24" name="TextBox 23">
@@ -27316,8 +27307,8 @@
           </p:sp>
         </mc:Fallback>
       </mc:AlternateContent>
-      <mc:AlternateContent xmlns:mc="http://schemas.openxmlformats.org/markup-compatibility/2006">
-        <mc:Choice xmlns:a14="http://schemas.microsoft.com/office/drawing/2010/main" Requires="a14">
+      <mc:AlternateContent xmlns:mc="http://schemas.openxmlformats.org/markup-compatibility/2006" xmlns:a14="http://schemas.microsoft.com/office/drawing/2010/main">
+        <mc:Choice Requires="a14">
           <p:sp>
             <p:nvSpPr>
               <p:cNvPr id="25" name="TextBox 24">
@@ -27394,7 +27385,7 @@
             </p:txBody>
           </p:sp>
         </mc:Choice>
-        <mc:Fallback>
+        <mc:Fallback xmlns="">
           <p:sp>
             <p:nvSpPr>
               <p:cNvPr id="25" name="TextBox 24">
@@ -27439,8 +27430,8 @@
           </p:sp>
         </mc:Fallback>
       </mc:AlternateContent>
-      <mc:AlternateContent xmlns:mc="http://schemas.openxmlformats.org/markup-compatibility/2006">
-        <mc:Choice xmlns:a14="http://schemas.microsoft.com/office/drawing/2010/main" Requires="a14">
+      <mc:AlternateContent xmlns:mc="http://schemas.openxmlformats.org/markup-compatibility/2006" xmlns:a14="http://schemas.microsoft.com/office/drawing/2010/main">
+        <mc:Choice Requires="a14">
           <p:sp>
             <p:nvSpPr>
               <p:cNvPr id="30" name="TextBox 29">
@@ -27517,7 +27508,7 @@
             </p:txBody>
           </p:sp>
         </mc:Choice>
-        <mc:Fallback>
+        <mc:Fallback xmlns="">
           <p:sp>
             <p:nvSpPr>
               <p:cNvPr id="30" name="TextBox 29">
@@ -27562,8 +27553,8 @@
           </p:sp>
         </mc:Fallback>
       </mc:AlternateContent>
-      <mc:AlternateContent xmlns:mc="http://schemas.openxmlformats.org/markup-compatibility/2006">
-        <mc:Choice xmlns:a14="http://schemas.microsoft.com/office/drawing/2010/main" Requires="a14">
+      <mc:AlternateContent xmlns:mc="http://schemas.openxmlformats.org/markup-compatibility/2006" xmlns:a14="http://schemas.microsoft.com/office/drawing/2010/main">
+        <mc:Choice Requires="a14">
           <p:sp>
             <p:nvSpPr>
               <p:cNvPr id="22" name="TextBox 21">
@@ -27640,7 +27631,7 @@
             </p:txBody>
           </p:sp>
         </mc:Choice>
-        <mc:Fallback>
+        <mc:Fallback xmlns="">
           <p:sp>
             <p:nvSpPr>
               <p:cNvPr id="22" name="TextBox 21">
@@ -27685,8 +27676,8 @@
           </p:sp>
         </mc:Fallback>
       </mc:AlternateContent>
-      <mc:AlternateContent xmlns:mc="http://schemas.openxmlformats.org/markup-compatibility/2006">
-        <mc:Choice xmlns:a14="http://schemas.microsoft.com/office/drawing/2010/main" Requires="a14">
+      <mc:AlternateContent xmlns:mc="http://schemas.openxmlformats.org/markup-compatibility/2006" xmlns:a14="http://schemas.microsoft.com/office/drawing/2010/main">
+        <mc:Choice Requires="a14">
           <p:sp>
             <p:nvSpPr>
               <p:cNvPr id="23" name="TextBox 22">
@@ -27763,7 +27754,7 @@
             </p:txBody>
           </p:sp>
         </mc:Choice>
-        <mc:Fallback>
+        <mc:Fallback xmlns="">
           <p:sp>
             <p:nvSpPr>
               <p:cNvPr id="23" name="TextBox 22">
@@ -27808,8 +27799,8 @@
           </p:sp>
         </mc:Fallback>
       </mc:AlternateContent>
-      <mc:AlternateContent xmlns:mc="http://schemas.openxmlformats.org/markup-compatibility/2006">
-        <mc:Choice xmlns:a14="http://schemas.microsoft.com/office/drawing/2010/main" Requires="a14">
+      <mc:AlternateContent xmlns:mc="http://schemas.openxmlformats.org/markup-compatibility/2006" xmlns:a14="http://schemas.microsoft.com/office/drawing/2010/main">
+        <mc:Choice Requires="a14">
           <p:sp>
             <p:nvSpPr>
               <p:cNvPr id="27" name="TextBox 26">
@@ -27886,7 +27877,7 @@
             </p:txBody>
           </p:sp>
         </mc:Choice>
-        <mc:Fallback>
+        <mc:Fallback xmlns="">
           <p:sp>
             <p:nvSpPr>
               <p:cNvPr id="27" name="TextBox 26">
@@ -27931,8 +27922,8 @@
           </p:sp>
         </mc:Fallback>
       </mc:AlternateContent>
-      <mc:AlternateContent xmlns:mc="http://schemas.openxmlformats.org/markup-compatibility/2006">
-        <mc:Choice xmlns:a14="http://schemas.microsoft.com/office/drawing/2010/main" Requires="a14">
+      <mc:AlternateContent xmlns:mc="http://schemas.openxmlformats.org/markup-compatibility/2006" xmlns:a14="http://schemas.microsoft.com/office/drawing/2010/main">
+        <mc:Choice Requires="a14">
           <p:sp>
             <p:nvSpPr>
               <p:cNvPr id="29" name="TextBox 28">
@@ -28009,7 +28000,7 @@
             </p:txBody>
           </p:sp>
         </mc:Choice>
-        <mc:Fallback>
+        <mc:Fallback xmlns="">
           <p:sp>
             <p:nvSpPr>
               <p:cNvPr id="29" name="TextBox 28">
@@ -28054,8 +28045,8 @@
           </p:sp>
         </mc:Fallback>
       </mc:AlternateContent>
-      <mc:AlternateContent xmlns:mc="http://schemas.openxmlformats.org/markup-compatibility/2006">
-        <mc:Choice xmlns:a14="http://schemas.microsoft.com/office/drawing/2010/main" Requires="a14">
+      <mc:AlternateContent xmlns:mc="http://schemas.openxmlformats.org/markup-compatibility/2006" xmlns:a14="http://schemas.microsoft.com/office/drawing/2010/main">
+        <mc:Choice Requires="a14">
           <p:sp>
             <p:nvSpPr>
               <p:cNvPr id="31" name="TextBox 30">
@@ -28105,7 +28096,7 @@
             </p:txBody>
           </p:sp>
         </mc:Choice>
-        <mc:Fallback>
+        <mc:Fallback xmlns="">
           <p:sp>
             <p:nvSpPr>
               <p:cNvPr id="31" name="TextBox 30">
@@ -28150,8 +28141,8 @@
           </p:sp>
         </mc:Fallback>
       </mc:AlternateContent>
-      <mc:AlternateContent xmlns:mc="http://schemas.openxmlformats.org/markup-compatibility/2006">
-        <mc:Choice xmlns:a14="http://schemas.microsoft.com/office/drawing/2010/main" Requires="a14">
+      <mc:AlternateContent xmlns:mc="http://schemas.openxmlformats.org/markup-compatibility/2006" xmlns:a14="http://schemas.microsoft.com/office/drawing/2010/main">
+        <mc:Choice Requires="a14">
           <p:sp>
             <p:nvSpPr>
               <p:cNvPr id="32" name="TextBox 31">
@@ -28228,7 +28219,7 @@
             </p:txBody>
           </p:sp>
         </mc:Choice>
-        <mc:Fallback>
+        <mc:Fallback xmlns="">
           <p:sp>
             <p:nvSpPr>
               <p:cNvPr id="32" name="TextBox 31">
@@ -28273,8 +28264,8 @@
           </p:sp>
         </mc:Fallback>
       </mc:AlternateContent>
-      <mc:AlternateContent xmlns:mc="http://schemas.openxmlformats.org/markup-compatibility/2006">
-        <mc:Choice xmlns:a14="http://schemas.microsoft.com/office/drawing/2010/main" Requires="a14">
+      <mc:AlternateContent xmlns:mc="http://schemas.openxmlformats.org/markup-compatibility/2006" xmlns:a14="http://schemas.microsoft.com/office/drawing/2010/main">
+        <mc:Choice Requires="a14">
           <p:sp>
             <p:nvSpPr>
               <p:cNvPr id="19" name="TextBox 18">
@@ -28343,7 +28334,7 @@
             </p:txBody>
           </p:sp>
         </mc:Choice>
-        <mc:Fallback>
+        <mc:Fallback xmlns="">
           <p:sp>
             <p:nvSpPr>
               <p:cNvPr id="19" name="TextBox 18">
@@ -28392,6 +28383,2268 @@
     <p:extLst>
       <p:ext uri="{BB962C8B-B14F-4D97-AF65-F5344CB8AC3E}">
         <p14:creationId xmlns:p14="http://schemas.microsoft.com/office/powerpoint/2010/main" val="2575525724"/>
+      </p:ext>
+    </p:extLst>
+  </p:cSld>
+  <p:clrMapOvr>
+    <a:masterClrMapping/>
+  </p:clrMapOvr>
+</p:sld>
+</file>
+
+<file path=ppt/slides/slide41.xml><?xml version="1.0" encoding="utf-8"?>
+<p:sld xmlns:a="http://schemas.openxmlformats.org/drawingml/2006/main" xmlns:r="http://schemas.openxmlformats.org/officeDocument/2006/relationships" xmlns:p="http://schemas.openxmlformats.org/presentationml/2006/main">
+  <p:cSld>
+    <p:spTree>
+      <p:nvGrpSpPr>
+        <p:cNvPr id="1" name="">
+          <a:extLst>
+            <a:ext uri="{FF2B5EF4-FFF2-40B4-BE49-F238E27FC236}">
+              <a16:creationId xmlns:a16="http://schemas.microsoft.com/office/drawing/2014/main" id="{D5D582E8-5542-1986-146D-352F7B3F5571}"/>
+            </a:ext>
+          </a:extLst>
+        </p:cNvPr>
+        <p:cNvGrpSpPr/>
+        <p:nvPr/>
+      </p:nvGrpSpPr>
+      <p:grpSpPr>
+        <a:xfrm>
+          <a:off x="0" y="0"/>
+          <a:ext cx="0" cy="0"/>
+          <a:chOff x="0" y="0"/>
+          <a:chExt cx="0" cy="0"/>
+        </a:xfrm>
+      </p:grpSpPr>
+      <p:cxnSp>
+        <p:nvCxnSpPr>
+          <p:cNvPr id="3" name="Straight Connector 2">
+            <a:extLst>
+              <a:ext uri="{FF2B5EF4-FFF2-40B4-BE49-F238E27FC236}">
+                <a16:creationId xmlns:a16="http://schemas.microsoft.com/office/drawing/2014/main" id="{9D050350-49DA-9625-2C90-0A91D975DA3A}"/>
+              </a:ext>
+            </a:extLst>
+          </p:cNvPr>
+          <p:cNvCxnSpPr>
+            <a:cxnSpLocks/>
+          </p:cNvCxnSpPr>
+          <p:nvPr/>
+        </p:nvCxnSpPr>
+        <p:spPr>
+          <a:xfrm>
+            <a:off x="2298071" y="1191491"/>
+            <a:ext cx="7503087" cy="4019893"/>
+          </a:xfrm>
+          <a:prstGeom prst="line">
+            <a:avLst/>
+          </a:prstGeom>
+          <a:ln w="57150">
+            <a:solidFill>
+              <a:srgbClr val="C00000"/>
+            </a:solidFill>
+          </a:ln>
+        </p:spPr>
+        <p:style>
+          <a:lnRef idx="2">
+            <a:schemeClr val="accent1"/>
+          </a:lnRef>
+          <a:fillRef idx="0">
+            <a:schemeClr val="accent1"/>
+          </a:fillRef>
+          <a:effectRef idx="1">
+            <a:schemeClr val="accent1"/>
+          </a:effectRef>
+          <a:fontRef idx="minor">
+            <a:schemeClr val="tx1"/>
+          </a:fontRef>
+        </p:style>
+      </p:cxnSp>
+      <p:grpSp>
+        <p:nvGrpSpPr>
+          <p:cNvPr id="4" name="Group 3">
+            <a:extLst>
+              <a:ext uri="{FF2B5EF4-FFF2-40B4-BE49-F238E27FC236}">
+                <a16:creationId xmlns:a16="http://schemas.microsoft.com/office/drawing/2014/main" id="{1A09D1A2-89AD-AD93-8293-86E15A52E04E}"/>
+              </a:ext>
+            </a:extLst>
+          </p:cNvPr>
+          <p:cNvGrpSpPr/>
+          <p:nvPr/>
+        </p:nvGrpSpPr>
+        <p:grpSpPr>
+          <a:xfrm>
+            <a:off x="2298071" y="509257"/>
+            <a:ext cx="6601485" cy="5839485"/>
+            <a:chOff x="1023042" y="115432"/>
+            <a:chExt cx="9942214" cy="6627136"/>
+          </a:xfrm>
+        </p:grpSpPr>
+        <p:cxnSp>
+          <p:nvCxnSpPr>
+            <p:cNvPr id="5" name="Straight Connector 4">
+              <a:extLst>
+                <a:ext uri="{FF2B5EF4-FFF2-40B4-BE49-F238E27FC236}">
+                  <a16:creationId xmlns:a16="http://schemas.microsoft.com/office/drawing/2014/main" id="{E67D345A-D0EA-1092-D73D-17723B64F788}"/>
+                </a:ext>
+              </a:extLst>
+            </p:cNvPr>
+            <p:cNvCxnSpPr/>
+            <p:nvPr/>
+          </p:nvCxnSpPr>
+          <p:spPr>
+            <a:xfrm>
+              <a:off x="1032095" y="115432"/>
+              <a:ext cx="0" cy="6627136"/>
+            </a:xfrm>
+            <a:prstGeom prst="line">
+              <a:avLst/>
+            </a:prstGeom>
+            <a:ln w="57150"/>
+          </p:spPr>
+          <p:style>
+            <a:lnRef idx="3">
+              <a:schemeClr val="dk1"/>
+            </a:lnRef>
+            <a:fillRef idx="0">
+              <a:schemeClr val="dk1"/>
+            </a:fillRef>
+            <a:effectRef idx="2">
+              <a:schemeClr val="dk1"/>
+            </a:effectRef>
+            <a:fontRef idx="minor">
+              <a:schemeClr val="tx1"/>
+            </a:fontRef>
+          </p:style>
+        </p:cxnSp>
+        <p:cxnSp>
+          <p:nvCxnSpPr>
+            <p:cNvPr id="6" name="Straight Connector 5">
+              <a:extLst>
+                <a:ext uri="{FF2B5EF4-FFF2-40B4-BE49-F238E27FC236}">
+                  <a16:creationId xmlns:a16="http://schemas.microsoft.com/office/drawing/2014/main" id="{609F2D5A-5F56-AED4-3C9B-19A856D1DEE3}"/>
+                </a:ext>
+              </a:extLst>
+            </p:cNvPr>
+            <p:cNvCxnSpPr>
+              <a:cxnSpLocks/>
+            </p:cNvCxnSpPr>
+            <p:nvPr/>
+          </p:nvCxnSpPr>
+          <p:spPr>
+            <a:xfrm flipH="1">
+              <a:off x="1023042" y="6732006"/>
+              <a:ext cx="9942214" cy="0"/>
+            </a:xfrm>
+            <a:prstGeom prst="line">
+              <a:avLst/>
+            </a:prstGeom>
+            <a:ln w="57150"/>
+          </p:spPr>
+          <p:style>
+            <a:lnRef idx="3">
+              <a:schemeClr val="dk1"/>
+            </a:lnRef>
+            <a:fillRef idx="0">
+              <a:schemeClr val="dk1"/>
+            </a:fillRef>
+            <a:effectRef idx="2">
+              <a:schemeClr val="dk1"/>
+            </a:effectRef>
+            <a:fontRef idx="minor">
+              <a:schemeClr val="tx1"/>
+            </a:fontRef>
+          </p:style>
+        </p:cxnSp>
+      </p:grpSp>
+      <p:sp>
+        <p:nvSpPr>
+          <p:cNvPr id="7" name="TextBox 6">
+            <a:extLst>
+              <a:ext uri="{FF2B5EF4-FFF2-40B4-BE49-F238E27FC236}">
+                <a16:creationId xmlns:a16="http://schemas.microsoft.com/office/drawing/2014/main" id="{D053C649-E6A2-47BF-74CA-85E537DF91CC}"/>
+              </a:ext>
+            </a:extLst>
+          </p:cNvPr>
+          <p:cNvSpPr txBox="1"/>
+          <p:nvPr/>
+        </p:nvSpPr>
+        <p:spPr>
+          <a:xfrm>
+            <a:off x="1191492" y="324591"/>
+            <a:ext cx="1106580" cy="523220"/>
+          </a:xfrm>
+          <a:prstGeom prst="rect">
+            <a:avLst/>
+          </a:prstGeom>
+          <a:noFill/>
+        </p:spPr>
+        <p:txBody>
+          <a:bodyPr wrap="square" rtlCol="0">
+            <a:spAutoFit/>
+          </a:bodyPr>
+          <a:lstStyle/>
+          <a:p>
+            <a:r>
+              <a:rPr lang="en-US" sz="2800" dirty="0">
+                <a:latin typeface="Aharoni" panose="02010803020104030203" pitchFamily="2" charset="-79"/>
+                <a:cs typeface="Aharoni" panose="02010803020104030203" pitchFamily="2" charset="-79"/>
+              </a:rPr>
+              <a:t>Price</a:t>
+            </a:r>
+            <a:endParaRPr lang="en-US" sz="2800" b="1" dirty="0">
+              <a:latin typeface="Aharoni" panose="02010803020104030203" pitchFamily="2" charset="-79"/>
+              <a:cs typeface="Aharoni" panose="02010803020104030203" pitchFamily="2" charset="-79"/>
+            </a:endParaRPr>
+          </a:p>
+        </p:txBody>
+      </p:sp>
+      <p:sp>
+        <p:nvSpPr>
+          <p:cNvPr id="11" name="TextBox 10">
+            <a:extLst>
+              <a:ext uri="{FF2B5EF4-FFF2-40B4-BE49-F238E27FC236}">
+                <a16:creationId xmlns:a16="http://schemas.microsoft.com/office/drawing/2014/main" id="{FFAF043B-D77D-3220-4CFB-F41928D76453}"/>
+              </a:ext>
+            </a:extLst>
+          </p:cNvPr>
+          <p:cNvSpPr txBox="1"/>
+          <p:nvPr/>
+        </p:nvSpPr>
+        <p:spPr>
+          <a:xfrm>
+            <a:off x="8899555" y="6077825"/>
+            <a:ext cx="1775371" cy="523220"/>
+          </a:xfrm>
+          <a:prstGeom prst="rect">
+            <a:avLst/>
+          </a:prstGeom>
+          <a:noFill/>
+        </p:spPr>
+        <p:txBody>
+          <a:bodyPr wrap="square" rtlCol="0">
+            <a:spAutoFit/>
+          </a:bodyPr>
+          <a:lstStyle/>
+          <a:p>
+            <a:r>
+              <a:rPr lang="en-US" sz="2800" dirty="0">
+                <a:latin typeface="Aharoni" panose="02010803020104030203" pitchFamily="2" charset="-79"/>
+                <a:cs typeface="Aharoni" panose="02010803020104030203" pitchFamily="2" charset="-79"/>
+              </a:rPr>
+              <a:t>Quantity</a:t>
+            </a:r>
+            <a:endParaRPr lang="en-US" sz="2800" b="1" dirty="0">
+              <a:latin typeface="Aharoni" panose="02010803020104030203" pitchFamily="2" charset="-79"/>
+              <a:cs typeface="Aharoni" panose="02010803020104030203" pitchFamily="2" charset="-79"/>
+            </a:endParaRPr>
+          </a:p>
+        </p:txBody>
+      </p:sp>
+      <p:cxnSp>
+        <p:nvCxnSpPr>
+          <p:cNvPr id="12" name="Straight Connector 11">
+            <a:extLst>
+              <a:ext uri="{FF2B5EF4-FFF2-40B4-BE49-F238E27FC236}">
+                <a16:creationId xmlns:a16="http://schemas.microsoft.com/office/drawing/2014/main" id="{27122D2B-6A99-4812-11F7-D84092921778}"/>
+              </a:ext>
+            </a:extLst>
+          </p:cNvPr>
+          <p:cNvCxnSpPr>
+            <a:cxnSpLocks/>
+          </p:cNvCxnSpPr>
+          <p:nvPr/>
+        </p:nvCxnSpPr>
+        <p:spPr>
+          <a:xfrm flipV="1">
+            <a:off x="2310093" y="426128"/>
+            <a:ext cx="5621480" cy="5482836"/>
+          </a:xfrm>
+          <a:prstGeom prst="line">
+            <a:avLst/>
+          </a:prstGeom>
+          <a:ln w="57150">
+            <a:solidFill>
+              <a:schemeClr val="accent6"/>
+            </a:solidFill>
+          </a:ln>
+        </p:spPr>
+        <p:style>
+          <a:lnRef idx="2">
+            <a:schemeClr val="accent1"/>
+          </a:lnRef>
+          <a:fillRef idx="0">
+            <a:schemeClr val="accent1"/>
+          </a:fillRef>
+          <a:effectRef idx="1">
+            <a:schemeClr val="accent1"/>
+          </a:effectRef>
+          <a:fontRef idx="minor">
+            <a:schemeClr val="tx1"/>
+          </a:fontRef>
+        </p:style>
+      </p:cxnSp>
+      <p:grpSp>
+        <p:nvGrpSpPr>
+          <p:cNvPr id="16" name="Group 15">
+            <a:extLst>
+              <a:ext uri="{FF2B5EF4-FFF2-40B4-BE49-F238E27FC236}">
+                <a16:creationId xmlns:a16="http://schemas.microsoft.com/office/drawing/2014/main" id="{8B7F04CD-0B27-A68C-8E36-C3119BF0068D}"/>
+              </a:ext>
+            </a:extLst>
+          </p:cNvPr>
+          <p:cNvGrpSpPr/>
+          <p:nvPr/>
+        </p:nvGrpSpPr>
+        <p:grpSpPr>
+          <a:xfrm>
+            <a:off x="2298071" y="4381053"/>
+            <a:ext cx="5917980" cy="1949071"/>
+            <a:chOff x="2333625" y="1600298"/>
+            <a:chExt cx="1160145" cy="4477528"/>
+          </a:xfrm>
+        </p:grpSpPr>
+        <p:cxnSp>
+          <p:nvCxnSpPr>
+            <p:cNvPr id="17" name="Straight Connector 16">
+              <a:extLst>
+                <a:ext uri="{FF2B5EF4-FFF2-40B4-BE49-F238E27FC236}">
+                  <a16:creationId xmlns:a16="http://schemas.microsoft.com/office/drawing/2014/main" id="{B8598EF4-DC12-1684-8839-8C590D9C7C92}"/>
+                </a:ext>
+              </a:extLst>
+            </p:cNvPr>
+            <p:cNvCxnSpPr>
+              <a:cxnSpLocks/>
+            </p:cNvCxnSpPr>
+            <p:nvPr/>
+          </p:nvCxnSpPr>
+          <p:spPr>
+            <a:xfrm>
+              <a:off x="2333625" y="1600298"/>
+              <a:ext cx="1160145" cy="0"/>
+            </a:xfrm>
+            <a:prstGeom prst="line">
+              <a:avLst/>
+            </a:prstGeom>
+            <a:ln>
+              <a:prstDash val="dash"/>
+            </a:ln>
+          </p:spPr>
+          <p:style>
+            <a:lnRef idx="2">
+              <a:schemeClr val="accent1"/>
+            </a:lnRef>
+            <a:fillRef idx="0">
+              <a:schemeClr val="accent1"/>
+            </a:fillRef>
+            <a:effectRef idx="1">
+              <a:schemeClr val="accent1"/>
+            </a:effectRef>
+            <a:fontRef idx="minor">
+              <a:schemeClr val="tx1"/>
+            </a:fontRef>
+          </p:style>
+        </p:cxnSp>
+        <p:cxnSp>
+          <p:nvCxnSpPr>
+            <p:cNvPr id="18" name="Straight Connector 17">
+              <a:extLst>
+                <a:ext uri="{FF2B5EF4-FFF2-40B4-BE49-F238E27FC236}">
+                  <a16:creationId xmlns:a16="http://schemas.microsoft.com/office/drawing/2014/main" id="{328DD4C2-F830-187B-0D12-D84B807916B2}"/>
+                </a:ext>
+              </a:extLst>
+            </p:cNvPr>
+            <p:cNvCxnSpPr>
+              <a:cxnSpLocks/>
+            </p:cNvCxnSpPr>
+            <p:nvPr/>
+          </p:nvCxnSpPr>
+          <p:spPr>
+            <a:xfrm>
+              <a:off x="3493770" y="1600298"/>
+              <a:ext cx="0" cy="4477528"/>
+            </a:xfrm>
+            <a:prstGeom prst="line">
+              <a:avLst/>
+            </a:prstGeom>
+            <a:ln>
+              <a:prstDash val="dash"/>
+            </a:ln>
+          </p:spPr>
+          <p:style>
+            <a:lnRef idx="2">
+              <a:schemeClr val="accent1"/>
+            </a:lnRef>
+            <a:fillRef idx="0">
+              <a:schemeClr val="accent1"/>
+            </a:fillRef>
+            <a:effectRef idx="1">
+              <a:schemeClr val="accent1"/>
+            </a:effectRef>
+            <a:fontRef idx="minor">
+              <a:schemeClr val="tx1"/>
+            </a:fontRef>
+          </p:style>
+        </p:cxnSp>
+      </p:grpSp>
+      <mc:AlternateContent xmlns:mc="http://schemas.openxmlformats.org/markup-compatibility/2006">
+        <mc:Choice xmlns:a14="http://schemas.microsoft.com/office/drawing/2010/main" Requires="a14">
+          <p:sp>
+            <p:nvSpPr>
+              <p:cNvPr id="20" name="TextBox 19">
+                <a:extLst>
+                  <a:ext uri="{FF2B5EF4-FFF2-40B4-BE49-F238E27FC236}">
+                    <a16:creationId xmlns:a16="http://schemas.microsoft.com/office/drawing/2014/main" id="{0381C7B3-098A-F8DE-170B-0B2D7F2F7748}"/>
+                  </a:ext>
+                </a:extLst>
+              </p:cNvPr>
+              <p:cNvSpPr txBox="1"/>
+              <p:nvPr/>
+            </p:nvSpPr>
+            <p:spPr>
+              <a:xfrm>
+                <a:off x="1619238" y="2604401"/>
+                <a:ext cx="575479" cy="553998"/>
+              </a:xfrm>
+              <a:prstGeom prst="rect">
+                <a:avLst/>
+              </a:prstGeom>
+              <a:noFill/>
+            </p:spPr>
+            <p:txBody>
+              <a:bodyPr wrap="none" lIns="0" tIns="0" rIns="0" bIns="0" rtlCol="0">
+                <a:spAutoFit/>
+              </a:bodyPr>
+              <a:lstStyle/>
+              <a:p>
+                <a:pPr/>
+                <a14:m>
+                  <m:oMathPara xmlns:m="http://schemas.openxmlformats.org/officeDocument/2006/math">
+                    <m:oMathParaPr>
+                      <m:jc m:val="centerGroup"/>
+                    </m:oMathParaPr>
+                    <m:oMath xmlns:m="http://schemas.openxmlformats.org/officeDocument/2006/math">
+                      <m:sSup>
+                        <m:sSupPr>
+                          <m:ctrlPr>
+                            <a:rPr lang="en-US" sz="3600" b="0" i="1" smtClean="0">
+                              <a:latin typeface="Cambria Math" panose="02040503050406030204" pitchFamily="18" charset="0"/>
+                            </a:rPr>
+                          </m:ctrlPr>
+                        </m:sSupPr>
+                        <m:e>
+                          <m:r>
+                            <a:rPr lang="en-US" sz="3600" b="0" i="1" smtClean="0">
+                              <a:latin typeface="Cambria Math" panose="02040503050406030204" pitchFamily="18" charset="0"/>
+                            </a:rPr>
+                            <m:t>𝑃</m:t>
+                          </m:r>
+                        </m:e>
+                        <m:sup>
+                          <m:r>
+                            <a:rPr lang="en-US" sz="3600" b="0" i="1" smtClean="0">
+                              <a:latin typeface="Cambria Math" panose="02040503050406030204" pitchFamily="18" charset="0"/>
+                            </a:rPr>
+                            <m:t>∗</m:t>
+                          </m:r>
+                        </m:sup>
+                      </m:sSup>
+                    </m:oMath>
+                  </m:oMathPara>
+                </a14:m>
+                <a:endParaRPr lang="en-US" sz="3600" dirty="0"/>
+              </a:p>
+            </p:txBody>
+          </p:sp>
+        </mc:Choice>
+        <mc:Fallback>
+          <p:sp>
+            <p:nvSpPr>
+              <p:cNvPr id="20" name="TextBox 19">
+                <a:extLst>
+                  <a:ext uri="{FF2B5EF4-FFF2-40B4-BE49-F238E27FC236}">
+                    <a16:creationId xmlns:a16="http://schemas.microsoft.com/office/drawing/2014/main" id="{0381C7B3-098A-F8DE-170B-0B2D7F2F7748}"/>
+                  </a:ext>
+                </a:extLst>
+              </p:cNvPr>
+              <p:cNvSpPr txBox="1">
+                <a:spLocks noRot="1" noChangeAspect="1" noMove="1" noResize="1" noEditPoints="1" noAdjustHandles="1" noChangeArrowheads="1" noChangeShapeType="1" noTextEdit="1"/>
+              </p:cNvSpPr>
+              <p:nvPr/>
+            </p:nvSpPr>
+            <p:spPr>
+              <a:xfrm>
+                <a:off x="1619238" y="2604401"/>
+                <a:ext cx="575479" cy="553998"/>
+              </a:xfrm>
+              <a:prstGeom prst="rect">
+                <a:avLst/>
+              </a:prstGeom>
+              <a:blipFill>
+                <a:blip r:embed="rId2"/>
+                <a:stretch>
+                  <a:fillRect/>
+                </a:stretch>
+              </a:blipFill>
+            </p:spPr>
+            <p:txBody>
+              <a:bodyPr/>
+              <a:lstStyle/>
+              <a:p>
+                <a:r>
+                  <a:rPr lang="en-US">
+                    <a:noFill/>
+                  </a:rPr>
+                  <a:t> </a:t>
+                </a:r>
+              </a:p>
+            </p:txBody>
+          </p:sp>
+        </mc:Fallback>
+      </mc:AlternateContent>
+      <mc:AlternateContent xmlns:mc="http://schemas.openxmlformats.org/markup-compatibility/2006">
+        <mc:Choice xmlns:a14="http://schemas.microsoft.com/office/drawing/2010/main" Requires="a14">
+          <p:sp>
+            <p:nvSpPr>
+              <p:cNvPr id="21" name="TextBox 20">
+                <a:extLst>
+                  <a:ext uri="{FF2B5EF4-FFF2-40B4-BE49-F238E27FC236}">
+                    <a16:creationId xmlns:a16="http://schemas.microsoft.com/office/drawing/2014/main" id="{3CFE0F40-5F85-C46E-0801-5D66633550C9}"/>
+                  </a:ext>
+                </a:extLst>
+              </p:cNvPr>
+              <p:cNvSpPr txBox="1"/>
+              <p:nvPr/>
+            </p:nvSpPr>
+            <p:spPr>
+              <a:xfrm>
+                <a:off x="3571332" y="6363892"/>
+                <a:ext cx="575479" cy="430887"/>
+              </a:xfrm>
+              <a:prstGeom prst="rect">
+                <a:avLst/>
+              </a:prstGeom>
+              <a:noFill/>
+            </p:spPr>
+            <p:txBody>
+              <a:bodyPr wrap="square" lIns="0" tIns="0" rIns="0" bIns="0" rtlCol="0">
+                <a:spAutoFit/>
+              </a:bodyPr>
+              <a:lstStyle/>
+              <a:p>
+                <a:pPr/>
+                <a14:m>
+                  <m:oMathPara xmlns:m="http://schemas.openxmlformats.org/officeDocument/2006/math">
+                    <m:oMathParaPr>
+                      <m:jc m:val="centerGroup"/>
+                    </m:oMathParaPr>
+                    <m:oMath xmlns:m="http://schemas.openxmlformats.org/officeDocument/2006/math">
+                      <m:sSubSup>
+                        <m:sSubSupPr>
+                          <m:ctrlPr>
+                            <a:rPr lang="en-US" sz="2800" b="0" i="1" smtClean="0">
+                              <a:latin typeface="Cambria Math" panose="02040503050406030204" pitchFamily="18" charset="0"/>
+                            </a:rPr>
+                          </m:ctrlPr>
+                        </m:sSubSupPr>
+                        <m:e>
+                          <m:r>
+                            <a:rPr lang="en-US" sz="2800" b="0" i="1" smtClean="0">
+                              <a:latin typeface="Cambria Math" panose="02040503050406030204" pitchFamily="18" charset="0"/>
+                            </a:rPr>
+                            <m:t>𝑄</m:t>
+                          </m:r>
+                        </m:e>
+                        <m:sub>
+                          <m:r>
+                            <a:rPr lang="en-US" sz="2800" b="0" i="1" smtClean="0">
+                              <a:latin typeface="Cambria Math" panose="02040503050406030204" pitchFamily="18" charset="0"/>
+                            </a:rPr>
+                            <m:t>1</m:t>
+                          </m:r>
+                        </m:sub>
+                        <m:sup>
+                          <m:r>
+                            <a:rPr lang="en-US" sz="2800" b="0" i="1" smtClean="0">
+                              <a:latin typeface="Cambria Math" panose="02040503050406030204" pitchFamily="18" charset="0"/>
+                            </a:rPr>
+                            <m:t> </m:t>
+                          </m:r>
+                        </m:sup>
+                      </m:sSubSup>
+                    </m:oMath>
+                  </m:oMathPara>
+                </a14:m>
+                <a:endParaRPr lang="en-US" sz="2800" dirty="0"/>
+              </a:p>
+            </p:txBody>
+          </p:sp>
+        </mc:Choice>
+        <mc:Fallback>
+          <p:sp>
+            <p:nvSpPr>
+              <p:cNvPr id="21" name="TextBox 20">
+                <a:extLst>
+                  <a:ext uri="{FF2B5EF4-FFF2-40B4-BE49-F238E27FC236}">
+                    <a16:creationId xmlns:a16="http://schemas.microsoft.com/office/drawing/2014/main" id="{3CFE0F40-5F85-C46E-0801-5D66633550C9}"/>
+                  </a:ext>
+                </a:extLst>
+              </p:cNvPr>
+              <p:cNvSpPr txBox="1">
+                <a:spLocks noRot="1" noChangeAspect="1" noMove="1" noResize="1" noEditPoints="1" noAdjustHandles="1" noChangeArrowheads="1" noChangeShapeType="1" noTextEdit="1"/>
+              </p:cNvSpPr>
+              <p:nvPr/>
+            </p:nvSpPr>
+            <p:spPr>
+              <a:xfrm>
+                <a:off x="3571332" y="6363892"/>
+                <a:ext cx="575479" cy="430887"/>
+              </a:xfrm>
+              <a:prstGeom prst="rect">
+                <a:avLst/>
+              </a:prstGeom>
+              <a:blipFill>
+                <a:blip r:embed="rId3"/>
+                <a:stretch>
+                  <a:fillRect/>
+                </a:stretch>
+              </a:blipFill>
+            </p:spPr>
+            <p:txBody>
+              <a:bodyPr/>
+              <a:lstStyle/>
+              <a:p>
+                <a:r>
+                  <a:rPr lang="en-US">
+                    <a:noFill/>
+                  </a:rPr>
+                  <a:t> </a:t>
+                </a:r>
+              </a:p>
+            </p:txBody>
+          </p:sp>
+        </mc:Fallback>
+      </mc:AlternateContent>
+      <p:cxnSp>
+        <p:nvCxnSpPr>
+          <p:cNvPr id="2" name="Straight Connector 1">
+            <a:extLst>
+              <a:ext uri="{FF2B5EF4-FFF2-40B4-BE49-F238E27FC236}">
+                <a16:creationId xmlns:a16="http://schemas.microsoft.com/office/drawing/2014/main" id="{CC3F52C2-6859-662C-9230-A954F383E29D}"/>
+              </a:ext>
+            </a:extLst>
+          </p:cNvPr>
+          <p:cNvCxnSpPr>
+            <a:cxnSpLocks/>
+          </p:cNvCxnSpPr>
+          <p:nvPr/>
+        </p:nvCxnSpPr>
+        <p:spPr>
+          <a:xfrm>
+            <a:off x="3854002" y="4420005"/>
+            <a:ext cx="0" cy="1894194"/>
+          </a:xfrm>
+          <a:prstGeom prst="line">
+            <a:avLst/>
+          </a:prstGeom>
+          <a:ln>
+            <a:prstDash val="dash"/>
+          </a:ln>
+        </p:spPr>
+        <p:style>
+          <a:lnRef idx="2">
+            <a:schemeClr val="accent1"/>
+          </a:lnRef>
+          <a:fillRef idx="0">
+            <a:schemeClr val="accent1"/>
+          </a:fillRef>
+          <a:effectRef idx="1">
+            <a:schemeClr val="accent1"/>
+          </a:effectRef>
+          <a:fontRef idx="minor">
+            <a:schemeClr val="tx1"/>
+          </a:fontRef>
+        </p:style>
+      </p:cxnSp>
+      <mc:AlternateContent xmlns:mc="http://schemas.openxmlformats.org/markup-compatibility/2006">
+        <mc:Choice xmlns:a14="http://schemas.microsoft.com/office/drawing/2010/main" Requires="a14">
+          <p:sp>
+            <p:nvSpPr>
+              <p:cNvPr id="8" name="TextBox 7">
+                <a:extLst>
+                  <a:ext uri="{FF2B5EF4-FFF2-40B4-BE49-F238E27FC236}">
+                    <a16:creationId xmlns:a16="http://schemas.microsoft.com/office/drawing/2014/main" id="{22536AD8-BF20-1246-4E18-9E71A2F5016A}"/>
+                  </a:ext>
+                </a:extLst>
+              </p:cNvPr>
+              <p:cNvSpPr txBox="1"/>
+              <p:nvPr/>
+            </p:nvSpPr>
+            <p:spPr>
+              <a:xfrm>
+                <a:off x="7931573" y="6317583"/>
+                <a:ext cx="575479" cy="430887"/>
+              </a:xfrm>
+              <a:prstGeom prst="rect">
+                <a:avLst/>
+              </a:prstGeom>
+              <a:noFill/>
+            </p:spPr>
+            <p:txBody>
+              <a:bodyPr wrap="square" lIns="0" tIns="0" rIns="0" bIns="0" rtlCol="0">
+                <a:spAutoFit/>
+              </a:bodyPr>
+              <a:lstStyle/>
+              <a:p>
+                <a:pPr/>
+                <a14:m>
+                  <m:oMathPara xmlns:m="http://schemas.openxmlformats.org/officeDocument/2006/math">
+                    <m:oMathParaPr>
+                      <m:jc m:val="centerGroup"/>
+                    </m:oMathParaPr>
+                    <m:oMath xmlns:m="http://schemas.openxmlformats.org/officeDocument/2006/math">
+                      <m:sSubSup>
+                        <m:sSubSupPr>
+                          <m:ctrlPr>
+                            <a:rPr lang="en-US" sz="2800" b="0" i="1" smtClean="0">
+                              <a:latin typeface="Cambria Math" panose="02040503050406030204" pitchFamily="18" charset="0"/>
+                            </a:rPr>
+                          </m:ctrlPr>
+                        </m:sSubSupPr>
+                        <m:e>
+                          <m:r>
+                            <a:rPr lang="en-US" sz="2800" b="0" i="1" smtClean="0">
+                              <a:latin typeface="Cambria Math" panose="02040503050406030204" pitchFamily="18" charset="0"/>
+                            </a:rPr>
+                            <m:t>𝑄</m:t>
+                          </m:r>
+                        </m:e>
+                        <m:sub>
+                          <m:r>
+                            <a:rPr lang="en-US" sz="2800" b="0" i="1" smtClean="0">
+                              <a:latin typeface="Cambria Math" panose="02040503050406030204" pitchFamily="18" charset="0"/>
+                            </a:rPr>
+                            <m:t>2</m:t>
+                          </m:r>
+                        </m:sub>
+                        <m:sup>
+                          <m:r>
+                            <a:rPr lang="en-US" sz="2800" b="0" i="1" smtClean="0">
+                              <a:latin typeface="Cambria Math" panose="02040503050406030204" pitchFamily="18" charset="0"/>
+                            </a:rPr>
+                            <m:t> </m:t>
+                          </m:r>
+                        </m:sup>
+                      </m:sSubSup>
+                    </m:oMath>
+                  </m:oMathPara>
+                </a14:m>
+                <a:endParaRPr lang="en-US" sz="2800" dirty="0"/>
+              </a:p>
+            </p:txBody>
+          </p:sp>
+        </mc:Choice>
+        <mc:Fallback>
+          <p:sp>
+            <p:nvSpPr>
+              <p:cNvPr id="8" name="TextBox 7">
+                <a:extLst>
+                  <a:ext uri="{FF2B5EF4-FFF2-40B4-BE49-F238E27FC236}">
+                    <a16:creationId xmlns:a16="http://schemas.microsoft.com/office/drawing/2014/main" id="{22536AD8-BF20-1246-4E18-9E71A2F5016A}"/>
+                  </a:ext>
+                </a:extLst>
+              </p:cNvPr>
+              <p:cNvSpPr txBox="1">
+                <a:spLocks noRot="1" noChangeAspect="1" noMove="1" noResize="1" noEditPoints="1" noAdjustHandles="1" noChangeArrowheads="1" noChangeShapeType="1" noTextEdit="1"/>
+              </p:cNvSpPr>
+              <p:nvPr/>
+            </p:nvSpPr>
+            <p:spPr>
+              <a:xfrm>
+                <a:off x="7931573" y="6317583"/>
+                <a:ext cx="575479" cy="430887"/>
+              </a:xfrm>
+              <a:prstGeom prst="rect">
+                <a:avLst/>
+              </a:prstGeom>
+              <a:blipFill>
+                <a:blip r:embed="rId4"/>
+                <a:stretch>
+                  <a:fillRect/>
+                </a:stretch>
+              </a:blipFill>
+            </p:spPr>
+            <p:txBody>
+              <a:bodyPr/>
+              <a:lstStyle/>
+              <a:p>
+                <a:r>
+                  <a:rPr lang="en-US">
+                    <a:noFill/>
+                  </a:rPr>
+                  <a:t> </a:t>
+                </a:r>
+              </a:p>
+            </p:txBody>
+          </p:sp>
+        </mc:Fallback>
+      </mc:AlternateContent>
+      <mc:AlternateContent xmlns:mc="http://schemas.openxmlformats.org/markup-compatibility/2006">
+        <mc:Choice xmlns:a14="http://schemas.microsoft.com/office/drawing/2010/main" Requires="a14">
+          <p:sp>
+            <p:nvSpPr>
+              <p:cNvPr id="9" name="TextBox 8">
+                <a:extLst>
+                  <a:ext uri="{FF2B5EF4-FFF2-40B4-BE49-F238E27FC236}">
+                    <a16:creationId xmlns:a16="http://schemas.microsoft.com/office/drawing/2014/main" id="{26B0F5A9-4E22-602E-5878-BE990D26E06C}"/>
+                  </a:ext>
+                </a:extLst>
+              </p:cNvPr>
+              <p:cNvSpPr txBox="1"/>
+              <p:nvPr/>
+            </p:nvSpPr>
+            <p:spPr>
+              <a:xfrm>
+                <a:off x="1497599" y="4143006"/>
+                <a:ext cx="748795" cy="553998"/>
+              </a:xfrm>
+              <a:prstGeom prst="rect">
+                <a:avLst/>
+              </a:prstGeom>
+              <a:noFill/>
+            </p:spPr>
+            <p:txBody>
+              <a:bodyPr wrap="none" lIns="0" tIns="0" rIns="0" bIns="0" rtlCol="0">
+                <a:spAutoFit/>
+              </a:bodyPr>
+              <a:lstStyle/>
+              <a:p>
+                <a:pPr/>
+                <a14:m>
+                  <m:oMathPara xmlns:m="http://schemas.openxmlformats.org/officeDocument/2006/math">
+                    <m:oMathParaPr>
+                      <m:jc m:val="centerGroup"/>
+                    </m:oMathParaPr>
+                    <m:oMath xmlns:m="http://schemas.openxmlformats.org/officeDocument/2006/math">
+                      <m:sSup>
+                        <m:sSupPr>
+                          <m:ctrlPr>
+                            <a:rPr lang="en-US" sz="3600" b="0" i="1" smtClean="0">
+                              <a:latin typeface="Cambria Math" panose="02040503050406030204" pitchFamily="18" charset="0"/>
+                            </a:rPr>
+                          </m:ctrlPr>
+                        </m:sSupPr>
+                        <m:e>
+                          <m:r>
+                            <a:rPr lang="en-US" sz="3600" b="0" i="1" smtClean="0">
+                              <a:latin typeface="Cambria Math" panose="02040503050406030204" pitchFamily="18" charset="0"/>
+                            </a:rPr>
+                            <m:t>𝑃</m:t>
+                          </m:r>
+                        </m:e>
+                        <m:sup>
+                          <m:r>
+                            <a:rPr lang="en-US" sz="3600" b="0" i="1" smtClean="0">
+                              <a:latin typeface="Cambria Math" panose="02040503050406030204" pitchFamily="18" charset="0"/>
+                            </a:rPr>
+                            <m:t>𝑊</m:t>
+                          </m:r>
+                        </m:sup>
+                      </m:sSup>
+                    </m:oMath>
+                  </m:oMathPara>
+                </a14:m>
+                <a:endParaRPr lang="en-US" sz="3600" dirty="0"/>
+              </a:p>
+            </p:txBody>
+          </p:sp>
+        </mc:Choice>
+        <mc:Fallback>
+          <p:sp>
+            <p:nvSpPr>
+              <p:cNvPr id="9" name="TextBox 8">
+                <a:extLst>
+                  <a:ext uri="{FF2B5EF4-FFF2-40B4-BE49-F238E27FC236}">
+                    <a16:creationId xmlns:a16="http://schemas.microsoft.com/office/drawing/2014/main" id="{26B0F5A9-4E22-602E-5878-BE990D26E06C}"/>
+                  </a:ext>
+                </a:extLst>
+              </p:cNvPr>
+              <p:cNvSpPr txBox="1">
+                <a:spLocks noRot="1" noChangeAspect="1" noMove="1" noResize="1" noEditPoints="1" noAdjustHandles="1" noChangeArrowheads="1" noChangeShapeType="1" noTextEdit="1"/>
+              </p:cNvSpPr>
+              <p:nvPr/>
+            </p:nvSpPr>
+            <p:spPr>
+              <a:xfrm>
+                <a:off x="1497599" y="4143006"/>
+                <a:ext cx="748795" cy="553998"/>
+              </a:xfrm>
+              <a:prstGeom prst="rect">
+                <a:avLst/>
+              </a:prstGeom>
+              <a:blipFill>
+                <a:blip r:embed="rId5"/>
+                <a:stretch>
+                  <a:fillRect/>
+                </a:stretch>
+              </a:blipFill>
+            </p:spPr>
+            <p:txBody>
+              <a:bodyPr/>
+              <a:lstStyle/>
+              <a:p>
+                <a:r>
+                  <a:rPr lang="en-US">
+                    <a:noFill/>
+                  </a:rPr>
+                  <a:t> </a:t>
+                </a:r>
+              </a:p>
+            </p:txBody>
+          </p:sp>
+        </mc:Fallback>
+      </mc:AlternateContent>
+      <p:grpSp>
+        <p:nvGrpSpPr>
+          <p:cNvPr id="10" name="Group 9">
+            <a:extLst>
+              <a:ext uri="{FF2B5EF4-FFF2-40B4-BE49-F238E27FC236}">
+                <a16:creationId xmlns:a16="http://schemas.microsoft.com/office/drawing/2014/main" id="{2B80FBF4-C842-79B3-61D6-B14FDB1183E1}"/>
+              </a:ext>
+            </a:extLst>
+          </p:cNvPr>
+          <p:cNvGrpSpPr/>
+          <p:nvPr/>
+        </p:nvGrpSpPr>
+        <p:grpSpPr>
+          <a:xfrm>
+            <a:off x="2310091" y="3623155"/>
+            <a:ext cx="4510637" cy="2691044"/>
+            <a:chOff x="2333625" y="1600298"/>
+            <a:chExt cx="1160145" cy="4477528"/>
+          </a:xfrm>
+        </p:grpSpPr>
+        <p:cxnSp>
+          <p:nvCxnSpPr>
+            <p:cNvPr id="13" name="Straight Connector 12">
+              <a:extLst>
+                <a:ext uri="{FF2B5EF4-FFF2-40B4-BE49-F238E27FC236}">
+                  <a16:creationId xmlns:a16="http://schemas.microsoft.com/office/drawing/2014/main" id="{75B95D20-00A9-6E72-5672-DD1825E78471}"/>
+                </a:ext>
+              </a:extLst>
+            </p:cNvPr>
+            <p:cNvCxnSpPr>
+              <a:cxnSpLocks/>
+            </p:cNvCxnSpPr>
+            <p:nvPr/>
+          </p:nvCxnSpPr>
+          <p:spPr>
+            <a:xfrm>
+              <a:off x="2333625" y="1600298"/>
+              <a:ext cx="1160145" cy="0"/>
+            </a:xfrm>
+            <a:prstGeom prst="line">
+              <a:avLst/>
+            </a:prstGeom>
+            <a:ln>
+              <a:prstDash val="dash"/>
+            </a:ln>
+          </p:spPr>
+          <p:style>
+            <a:lnRef idx="2">
+              <a:schemeClr val="accent1"/>
+            </a:lnRef>
+            <a:fillRef idx="0">
+              <a:schemeClr val="accent1"/>
+            </a:fillRef>
+            <a:effectRef idx="1">
+              <a:schemeClr val="accent1"/>
+            </a:effectRef>
+            <a:fontRef idx="minor">
+              <a:schemeClr val="tx1"/>
+            </a:fontRef>
+          </p:style>
+        </p:cxnSp>
+        <p:cxnSp>
+          <p:nvCxnSpPr>
+            <p:cNvPr id="14" name="Straight Connector 13">
+              <a:extLst>
+                <a:ext uri="{FF2B5EF4-FFF2-40B4-BE49-F238E27FC236}">
+                  <a16:creationId xmlns:a16="http://schemas.microsoft.com/office/drawing/2014/main" id="{E4F6A9FF-5C31-FEF0-D269-5F94DE3D0B41}"/>
+                </a:ext>
+              </a:extLst>
+            </p:cNvPr>
+            <p:cNvCxnSpPr>
+              <a:cxnSpLocks/>
+            </p:cNvCxnSpPr>
+            <p:nvPr/>
+          </p:nvCxnSpPr>
+          <p:spPr>
+            <a:xfrm>
+              <a:off x="3493770" y="1600298"/>
+              <a:ext cx="0" cy="4477528"/>
+            </a:xfrm>
+            <a:prstGeom prst="line">
+              <a:avLst/>
+            </a:prstGeom>
+            <a:ln>
+              <a:prstDash val="dash"/>
+            </a:ln>
+          </p:spPr>
+          <p:style>
+            <a:lnRef idx="2">
+              <a:schemeClr val="accent1"/>
+            </a:lnRef>
+            <a:fillRef idx="0">
+              <a:schemeClr val="accent1"/>
+            </a:fillRef>
+            <a:effectRef idx="1">
+              <a:schemeClr val="accent1"/>
+            </a:effectRef>
+            <a:fontRef idx="minor">
+              <a:schemeClr val="tx1"/>
+            </a:fontRef>
+          </p:style>
+        </p:cxnSp>
+      </p:grpSp>
+      <p:cxnSp>
+        <p:nvCxnSpPr>
+          <p:cNvPr id="15" name="Straight Connector 14">
+            <a:extLst>
+              <a:ext uri="{FF2B5EF4-FFF2-40B4-BE49-F238E27FC236}">
+                <a16:creationId xmlns:a16="http://schemas.microsoft.com/office/drawing/2014/main" id="{4BEDF3AA-0AD4-908C-8D0C-D0ADFF0E2B1D}"/>
+              </a:ext>
+            </a:extLst>
+          </p:cNvPr>
+          <p:cNvCxnSpPr>
+            <a:cxnSpLocks/>
+          </p:cNvCxnSpPr>
+          <p:nvPr/>
+        </p:nvCxnSpPr>
+        <p:spPr>
+          <a:xfrm>
+            <a:off x="4616114" y="3665627"/>
+            <a:ext cx="0" cy="2683115"/>
+          </a:xfrm>
+          <a:prstGeom prst="line">
+            <a:avLst/>
+          </a:prstGeom>
+          <a:ln>
+            <a:prstDash val="dash"/>
+          </a:ln>
+        </p:spPr>
+        <p:style>
+          <a:lnRef idx="2">
+            <a:schemeClr val="accent1"/>
+          </a:lnRef>
+          <a:fillRef idx="0">
+            <a:schemeClr val="accent1"/>
+          </a:fillRef>
+          <a:effectRef idx="1">
+            <a:schemeClr val="accent1"/>
+          </a:effectRef>
+          <a:fontRef idx="minor">
+            <a:schemeClr val="tx1"/>
+          </a:fontRef>
+        </p:style>
+      </p:cxnSp>
+      <mc:AlternateContent xmlns:mc="http://schemas.openxmlformats.org/markup-compatibility/2006">
+        <mc:Choice xmlns:a14="http://schemas.microsoft.com/office/drawing/2010/main" Requires="a14">
+          <p:sp>
+            <p:nvSpPr>
+              <p:cNvPr id="24" name="TextBox 23">
+                <a:extLst>
+                  <a:ext uri="{FF2B5EF4-FFF2-40B4-BE49-F238E27FC236}">
+                    <a16:creationId xmlns:a16="http://schemas.microsoft.com/office/drawing/2014/main" id="{ACA87060-264B-7893-FF2A-C409432501C6}"/>
+                  </a:ext>
+                </a:extLst>
+              </p:cNvPr>
+              <p:cNvSpPr txBox="1"/>
+              <p:nvPr/>
+            </p:nvSpPr>
+            <p:spPr>
+              <a:xfrm>
+                <a:off x="6484936" y="6367290"/>
+                <a:ext cx="575479" cy="447815"/>
+              </a:xfrm>
+              <a:prstGeom prst="rect">
+                <a:avLst/>
+              </a:prstGeom>
+              <a:noFill/>
+            </p:spPr>
+            <p:txBody>
+              <a:bodyPr wrap="square" lIns="0" tIns="0" rIns="0" bIns="0" rtlCol="0">
+                <a:spAutoFit/>
+              </a:bodyPr>
+              <a:lstStyle/>
+              <a:p>
+                <a:pPr/>
+                <a14:m>
+                  <m:oMathPara xmlns:m="http://schemas.openxmlformats.org/officeDocument/2006/math">
+                    <m:oMathParaPr>
+                      <m:jc m:val="centerGroup"/>
+                    </m:oMathParaPr>
+                    <m:oMath xmlns:m="http://schemas.openxmlformats.org/officeDocument/2006/math">
+                      <m:sSubSup>
+                        <m:sSubSupPr>
+                          <m:ctrlPr>
+                            <a:rPr lang="en-US" sz="2800" b="0" i="1" smtClean="0">
+                              <a:latin typeface="Cambria Math" panose="02040503050406030204" pitchFamily="18" charset="0"/>
+                            </a:rPr>
+                          </m:ctrlPr>
+                        </m:sSubSupPr>
+                        <m:e>
+                          <m:r>
+                            <a:rPr lang="en-US" sz="2800" b="0" i="1" smtClean="0">
+                              <a:latin typeface="Cambria Math" panose="02040503050406030204" pitchFamily="18" charset="0"/>
+                            </a:rPr>
+                            <m:t>𝑄</m:t>
+                          </m:r>
+                        </m:e>
+                        <m:sub>
+                          <m:r>
+                            <a:rPr lang="en-US" sz="2800" b="0" i="1" smtClean="0">
+                              <a:latin typeface="Cambria Math" panose="02040503050406030204" pitchFamily="18" charset="0"/>
+                            </a:rPr>
+                            <m:t>2</m:t>
+                          </m:r>
+                        </m:sub>
+                        <m:sup>
+                          <m:r>
+                            <a:rPr lang="en-US" sz="2800" b="0" i="1" smtClean="0">
+                              <a:latin typeface="Cambria Math" panose="02040503050406030204" pitchFamily="18" charset="0"/>
+                            </a:rPr>
+                            <m:t>∗ </m:t>
+                          </m:r>
+                        </m:sup>
+                      </m:sSubSup>
+                    </m:oMath>
+                  </m:oMathPara>
+                </a14:m>
+                <a:endParaRPr lang="en-US" sz="2800" dirty="0"/>
+              </a:p>
+            </p:txBody>
+          </p:sp>
+        </mc:Choice>
+        <mc:Fallback>
+          <p:sp>
+            <p:nvSpPr>
+              <p:cNvPr id="24" name="TextBox 23">
+                <a:extLst>
+                  <a:ext uri="{FF2B5EF4-FFF2-40B4-BE49-F238E27FC236}">
+                    <a16:creationId xmlns:a16="http://schemas.microsoft.com/office/drawing/2014/main" id="{ACA87060-264B-7893-FF2A-C409432501C6}"/>
+                  </a:ext>
+                </a:extLst>
+              </p:cNvPr>
+              <p:cNvSpPr txBox="1">
+                <a:spLocks noRot="1" noChangeAspect="1" noMove="1" noResize="1" noEditPoints="1" noAdjustHandles="1" noChangeArrowheads="1" noChangeShapeType="1" noTextEdit="1"/>
+              </p:cNvSpPr>
+              <p:nvPr/>
+            </p:nvSpPr>
+            <p:spPr>
+              <a:xfrm>
+                <a:off x="6484936" y="6367290"/>
+                <a:ext cx="575479" cy="447815"/>
+              </a:xfrm>
+              <a:prstGeom prst="rect">
+                <a:avLst/>
+              </a:prstGeom>
+              <a:blipFill>
+                <a:blip r:embed="rId6"/>
+                <a:stretch>
+                  <a:fillRect/>
+                </a:stretch>
+              </a:blipFill>
+            </p:spPr>
+            <p:txBody>
+              <a:bodyPr/>
+              <a:lstStyle/>
+              <a:p>
+                <a:r>
+                  <a:rPr lang="en-US">
+                    <a:noFill/>
+                  </a:rPr>
+                  <a:t> </a:t>
+                </a:r>
+              </a:p>
+            </p:txBody>
+          </p:sp>
+        </mc:Fallback>
+      </mc:AlternateContent>
+      <mc:AlternateContent xmlns:mc="http://schemas.openxmlformats.org/markup-compatibility/2006">
+        <mc:Choice xmlns:a14="http://schemas.microsoft.com/office/drawing/2010/main" Requires="a14">
+          <p:sp>
+            <p:nvSpPr>
+              <p:cNvPr id="25" name="TextBox 24">
+                <a:extLst>
+                  <a:ext uri="{FF2B5EF4-FFF2-40B4-BE49-F238E27FC236}">
+                    <a16:creationId xmlns:a16="http://schemas.microsoft.com/office/drawing/2014/main" id="{04B265EC-E794-3218-A12B-2AD9579EBE3E}"/>
+                  </a:ext>
+                </a:extLst>
+              </p:cNvPr>
+              <p:cNvSpPr txBox="1"/>
+              <p:nvPr/>
+            </p:nvSpPr>
+            <p:spPr>
+              <a:xfrm>
+                <a:off x="4277669" y="6355568"/>
+                <a:ext cx="575479" cy="447815"/>
+              </a:xfrm>
+              <a:prstGeom prst="rect">
+                <a:avLst/>
+              </a:prstGeom>
+              <a:noFill/>
+            </p:spPr>
+            <p:txBody>
+              <a:bodyPr wrap="square" lIns="0" tIns="0" rIns="0" bIns="0" rtlCol="0">
+                <a:spAutoFit/>
+              </a:bodyPr>
+              <a:lstStyle/>
+              <a:p>
+                <a:pPr/>
+                <a14:m>
+                  <m:oMathPara xmlns:m="http://schemas.openxmlformats.org/officeDocument/2006/math">
+                    <m:oMathParaPr>
+                      <m:jc m:val="centerGroup"/>
+                    </m:oMathParaPr>
+                    <m:oMath xmlns:m="http://schemas.openxmlformats.org/officeDocument/2006/math">
+                      <m:sSubSup>
+                        <m:sSubSupPr>
+                          <m:ctrlPr>
+                            <a:rPr lang="en-US" sz="2800" b="0" i="1" smtClean="0">
+                              <a:latin typeface="Cambria Math" panose="02040503050406030204" pitchFamily="18" charset="0"/>
+                            </a:rPr>
+                          </m:ctrlPr>
+                        </m:sSubSupPr>
+                        <m:e>
+                          <m:r>
+                            <a:rPr lang="en-US" sz="2800" b="0" i="1" smtClean="0">
+                              <a:latin typeface="Cambria Math" panose="02040503050406030204" pitchFamily="18" charset="0"/>
+                            </a:rPr>
+                            <m:t>𝑄</m:t>
+                          </m:r>
+                        </m:e>
+                        <m:sub>
+                          <m:r>
+                            <a:rPr lang="en-US" sz="2800" b="0" i="1" smtClean="0">
+                              <a:latin typeface="Cambria Math" panose="02040503050406030204" pitchFamily="18" charset="0"/>
+                            </a:rPr>
+                            <m:t>1</m:t>
+                          </m:r>
+                        </m:sub>
+                        <m:sup>
+                          <m:r>
+                            <a:rPr lang="en-US" sz="2800" b="0" i="1" smtClean="0">
+                              <a:latin typeface="Cambria Math" panose="02040503050406030204" pitchFamily="18" charset="0"/>
+                            </a:rPr>
+                            <m:t>∗ </m:t>
+                          </m:r>
+                        </m:sup>
+                      </m:sSubSup>
+                    </m:oMath>
+                  </m:oMathPara>
+                </a14:m>
+                <a:endParaRPr lang="en-US" sz="2800" dirty="0"/>
+              </a:p>
+            </p:txBody>
+          </p:sp>
+        </mc:Choice>
+        <mc:Fallback>
+          <p:sp>
+            <p:nvSpPr>
+              <p:cNvPr id="25" name="TextBox 24">
+                <a:extLst>
+                  <a:ext uri="{FF2B5EF4-FFF2-40B4-BE49-F238E27FC236}">
+                    <a16:creationId xmlns:a16="http://schemas.microsoft.com/office/drawing/2014/main" id="{04B265EC-E794-3218-A12B-2AD9579EBE3E}"/>
+                  </a:ext>
+                </a:extLst>
+              </p:cNvPr>
+              <p:cNvSpPr txBox="1">
+                <a:spLocks noRot="1" noChangeAspect="1" noMove="1" noResize="1" noEditPoints="1" noAdjustHandles="1" noChangeArrowheads="1" noChangeShapeType="1" noTextEdit="1"/>
+              </p:cNvSpPr>
+              <p:nvPr/>
+            </p:nvSpPr>
+            <p:spPr>
+              <a:xfrm>
+                <a:off x="4277669" y="6355568"/>
+                <a:ext cx="575479" cy="447815"/>
+              </a:xfrm>
+              <a:prstGeom prst="rect">
+                <a:avLst/>
+              </a:prstGeom>
+              <a:blipFill>
+                <a:blip r:embed="rId7"/>
+                <a:stretch>
+                  <a:fillRect/>
+                </a:stretch>
+              </a:blipFill>
+            </p:spPr>
+            <p:txBody>
+              <a:bodyPr/>
+              <a:lstStyle/>
+              <a:p>
+                <a:r>
+                  <a:rPr lang="en-US">
+                    <a:noFill/>
+                  </a:rPr>
+                  <a:t> </a:t>
+                </a:r>
+              </a:p>
+            </p:txBody>
+          </p:sp>
+        </mc:Fallback>
+      </mc:AlternateContent>
+      <mc:AlternateContent xmlns:mc="http://schemas.openxmlformats.org/markup-compatibility/2006">
+        <mc:Choice xmlns:a14="http://schemas.microsoft.com/office/drawing/2010/main" Requires="a14">
+          <p:sp>
+            <p:nvSpPr>
+              <p:cNvPr id="30" name="TextBox 29">
+                <a:extLst>
+                  <a:ext uri="{FF2B5EF4-FFF2-40B4-BE49-F238E27FC236}">
+                    <a16:creationId xmlns:a16="http://schemas.microsoft.com/office/drawing/2014/main" id="{C7B8570D-AD64-DC75-96F3-C630F69C0CE2}"/>
+                  </a:ext>
+                </a:extLst>
+              </p:cNvPr>
+              <p:cNvSpPr txBox="1"/>
+              <p:nvPr/>
+            </p:nvSpPr>
+            <p:spPr>
+              <a:xfrm>
+                <a:off x="2957865" y="2998112"/>
+                <a:ext cx="575479" cy="440377"/>
+              </a:xfrm>
+              <a:prstGeom prst="rect">
+                <a:avLst/>
+              </a:prstGeom>
+              <a:noFill/>
+            </p:spPr>
+            <p:txBody>
+              <a:bodyPr wrap="square" lIns="0" tIns="0" rIns="0" bIns="0" rtlCol="0">
+                <a:spAutoFit/>
+              </a:bodyPr>
+              <a:lstStyle/>
+              <a:p>
+                <a:pPr/>
+                <a14:m>
+                  <m:oMathPara xmlns:m="http://schemas.openxmlformats.org/officeDocument/2006/math">
+                    <m:oMathParaPr>
+                      <m:jc m:val="centerGroup"/>
+                    </m:oMathParaPr>
+                    <m:oMath xmlns:m="http://schemas.openxmlformats.org/officeDocument/2006/math">
+                      <m:sSubSup>
+                        <m:sSubSupPr>
+                          <m:ctrlPr>
+                            <a:rPr lang="en-US" sz="2800" b="0" i="1" smtClean="0">
+                              <a:latin typeface="Cambria Math" panose="02040503050406030204" pitchFamily="18" charset="0"/>
+                            </a:rPr>
+                          </m:ctrlPr>
+                        </m:sSubSupPr>
+                        <m:e>
+                          <m:r>
+                            <a:rPr lang="en-US" sz="2800" b="0" i="1" smtClean="0">
+                              <a:latin typeface="Cambria Math" panose="02040503050406030204" pitchFamily="18" charset="0"/>
+                            </a:rPr>
+                            <m:t>𝑒</m:t>
+                          </m:r>
+                        </m:e>
+                        <m:sub>
+                          <m:r>
+                            <a:rPr lang="en-US" sz="2800" b="0" i="1" smtClean="0">
+                              <a:latin typeface="Cambria Math" panose="02040503050406030204" pitchFamily="18" charset="0"/>
+                            </a:rPr>
+                            <m:t> </m:t>
+                          </m:r>
+                        </m:sub>
+                        <m:sup>
+                          <m:r>
+                            <a:rPr lang="en-US" sz="2800" b="0" i="1" smtClean="0">
+                              <a:latin typeface="Cambria Math" panose="02040503050406030204" pitchFamily="18" charset="0"/>
+                            </a:rPr>
+                            <m:t> </m:t>
+                          </m:r>
+                        </m:sup>
+                      </m:sSubSup>
+                    </m:oMath>
+                  </m:oMathPara>
+                </a14:m>
+                <a:endParaRPr lang="en-US" sz="2800" dirty="0"/>
+              </a:p>
+            </p:txBody>
+          </p:sp>
+        </mc:Choice>
+        <mc:Fallback>
+          <p:sp>
+            <p:nvSpPr>
+              <p:cNvPr id="30" name="TextBox 29">
+                <a:extLst>
+                  <a:ext uri="{FF2B5EF4-FFF2-40B4-BE49-F238E27FC236}">
+                    <a16:creationId xmlns:a16="http://schemas.microsoft.com/office/drawing/2014/main" id="{C7B8570D-AD64-DC75-96F3-C630F69C0CE2}"/>
+                  </a:ext>
+                </a:extLst>
+              </p:cNvPr>
+              <p:cNvSpPr txBox="1">
+                <a:spLocks noRot="1" noChangeAspect="1" noMove="1" noResize="1" noEditPoints="1" noAdjustHandles="1" noChangeArrowheads="1" noChangeShapeType="1" noTextEdit="1"/>
+              </p:cNvSpPr>
+              <p:nvPr/>
+            </p:nvSpPr>
+            <p:spPr>
+              <a:xfrm>
+                <a:off x="2957865" y="2998112"/>
+                <a:ext cx="575479" cy="440377"/>
+              </a:xfrm>
+              <a:prstGeom prst="rect">
+                <a:avLst/>
+              </a:prstGeom>
+              <a:blipFill>
+                <a:blip r:embed="rId8"/>
+                <a:stretch>
+                  <a:fillRect/>
+                </a:stretch>
+              </a:blipFill>
+            </p:spPr>
+            <p:txBody>
+              <a:bodyPr/>
+              <a:lstStyle/>
+              <a:p>
+                <a:r>
+                  <a:rPr lang="en-US">
+                    <a:noFill/>
+                  </a:rPr>
+                  <a:t> </a:t>
+                </a:r>
+              </a:p>
+            </p:txBody>
+          </p:sp>
+        </mc:Fallback>
+      </mc:AlternateContent>
+      <mc:AlternateContent xmlns:mc="http://schemas.openxmlformats.org/markup-compatibility/2006">
+        <mc:Choice xmlns:a14="http://schemas.microsoft.com/office/drawing/2010/main" Requires="a14">
+          <p:sp>
+            <p:nvSpPr>
+              <p:cNvPr id="22" name="TextBox 21">
+                <a:extLst>
+                  <a:ext uri="{FF2B5EF4-FFF2-40B4-BE49-F238E27FC236}">
+                    <a16:creationId xmlns:a16="http://schemas.microsoft.com/office/drawing/2014/main" id="{390955CE-98C0-8D59-D080-E6D4BC1AAD8A}"/>
+                  </a:ext>
+                </a:extLst>
+              </p:cNvPr>
+              <p:cNvSpPr txBox="1"/>
+              <p:nvPr/>
+            </p:nvSpPr>
+            <p:spPr>
+              <a:xfrm>
+                <a:off x="5257061" y="3077565"/>
+                <a:ext cx="575479" cy="440377"/>
+              </a:xfrm>
+              <a:prstGeom prst="rect">
+                <a:avLst/>
+              </a:prstGeom>
+              <a:noFill/>
+            </p:spPr>
+            <p:txBody>
+              <a:bodyPr wrap="square" lIns="0" tIns="0" rIns="0" bIns="0" rtlCol="0">
+                <a:spAutoFit/>
+              </a:bodyPr>
+              <a:lstStyle/>
+              <a:p>
+                <a:pPr/>
+                <a14:m>
+                  <m:oMathPara xmlns:m="http://schemas.openxmlformats.org/officeDocument/2006/math">
+                    <m:oMathParaPr>
+                      <m:jc m:val="centerGroup"/>
+                    </m:oMathParaPr>
+                    <m:oMath xmlns:m="http://schemas.openxmlformats.org/officeDocument/2006/math">
+                      <m:sSubSup>
+                        <m:sSubSupPr>
+                          <m:ctrlPr>
+                            <a:rPr lang="en-US" sz="2800" b="0" i="1" smtClean="0">
+                              <a:latin typeface="Cambria Math" panose="02040503050406030204" pitchFamily="18" charset="0"/>
+                            </a:rPr>
+                          </m:ctrlPr>
+                        </m:sSubSupPr>
+                        <m:e>
+                          <m:r>
+                            <a:rPr lang="en-US" sz="2800" b="0" i="1" smtClean="0">
+                              <a:latin typeface="Cambria Math" panose="02040503050406030204" pitchFamily="18" charset="0"/>
+                            </a:rPr>
+                            <m:t>𝑓</m:t>
+                          </m:r>
+                        </m:e>
+                        <m:sub>
+                          <m:r>
+                            <a:rPr lang="en-US" sz="2800" b="0" i="1" smtClean="0">
+                              <a:latin typeface="Cambria Math" panose="02040503050406030204" pitchFamily="18" charset="0"/>
+                            </a:rPr>
+                            <m:t> </m:t>
+                          </m:r>
+                        </m:sub>
+                        <m:sup>
+                          <m:r>
+                            <a:rPr lang="en-US" sz="2800" b="0" i="1" smtClean="0">
+                              <a:latin typeface="Cambria Math" panose="02040503050406030204" pitchFamily="18" charset="0"/>
+                            </a:rPr>
+                            <m:t> </m:t>
+                          </m:r>
+                        </m:sup>
+                      </m:sSubSup>
+                    </m:oMath>
+                  </m:oMathPara>
+                </a14:m>
+                <a:endParaRPr lang="en-US" sz="2800" dirty="0"/>
+              </a:p>
+            </p:txBody>
+          </p:sp>
+        </mc:Choice>
+        <mc:Fallback>
+          <p:sp>
+            <p:nvSpPr>
+              <p:cNvPr id="22" name="TextBox 21">
+                <a:extLst>
+                  <a:ext uri="{FF2B5EF4-FFF2-40B4-BE49-F238E27FC236}">
+                    <a16:creationId xmlns:a16="http://schemas.microsoft.com/office/drawing/2014/main" id="{390955CE-98C0-8D59-D080-E6D4BC1AAD8A}"/>
+                  </a:ext>
+                </a:extLst>
+              </p:cNvPr>
+              <p:cNvSpPr txBox="1">
+                <a:spLocks noRot="1" noChangeAspect="1" noMove="1" noResize="1" noEditPoints="1" noAdjustHandles="1" noChangeArrowheads="1" noChangeShapeType="1" noTextEdit="1"/>
+              </p:cNvSpPr>
+              <p:nvPr/>
+            </p:nvSpPr>
+            <p:spPr>
+              <a:xfrm>
+                <a:off x="5257061" y="3077565"/>
+                <a:ext cx="575479" cy="440377"/>
+              </a:xfrm>
+              <a:prstGeom prst="rect">
+                <a:avLst/>
+              </a:prstGeom>
+              <a:blipFill>
+                <a:blip r:embed="rId9"/>
+                <a:stretch>
+                  <a:fillRect/>
+                </a:stretch>
+              </a:blipFill>
+            </p:spPr>
+            <p:txBody>
+              <a:bodyPr/>
+              <a:lstStyle/>
+              <a:p>
+                <a:r>
+                  <a:rPr lang="en-US">
+                    <a:noFill/>
+                  </a:rPr>
+                  <a:t> </a:t>
+                </a:r>
+              </a:p>
+            </p:txBody>
+          </p:sp>
+        </mc:Fallback>
+      </mc:AlternateContent>
+      <mc:AlternateContent xmlns:mc="http://schemas.openxmlformats.org/markup-compatibility/2006">
+        <mc:Choice xmlns:a14="http://schemas.microsoft.com/office/drawing/2010/main" Requires="a14">
+          <p:sp>
+            <p:nvSpPr>
+              <p:cNvPr id="23" name="TextBox 22">
+                <a:extLst>
+                  <a:ext uri="{FF2B5EF4-FFF2-40B4-BE49-F238E27FC236}">
+                    <a16:creationId xmlns:a16="http://schemas.microsoft.com/office/drawing/2014/main" id="{5DF54123-AE23-4E7B-B342-605611E94C11}"/>
+                  </a:ext>
+                </a:extLst>
+              </p:cNvPr>
+              <p:cNvSpPr txBox="1"/>
+              <p:nvPr/>
+            </p:nvSpPr>
+            <p:spPr>
+              <a:xfrm>
+                <a:off x="2959988" y="3738928"/>
+                <a:ext cx="575479" cy="440377"/>
+              </a:xfrm>
+              <a:prstGeom prst="rect">
+                <a:avLst/>
+              </a:prstGeom>
+              <a:noFill/>
+            </p:spPr>
+            <p:txBody>
+              <a:bodyPr wrap="square" lIns="0" tIns="0" rIns="0" bIns="0" rtlCol="0">
+                <a:spAutoFit/>
+              </a:bodyPr>
+              <a:lstStyle/>
+              <a:p>
+                <a:pPr/>
+                <a14:m>
+                  <m:oMathPara xmlns:m="http://schemas.openxmlformats.org/officeDocument/2006/math">
+                    <m:oMathParaPr>
+                      <m:jc m:val="centerGroup"/>
+                    </m:oMathParaPr>
+                    <m:oMath xmlns:m="http://schemas.openxmlformats.org/officeDocument/2006/math">
+                      <m:sSubSup>
+                        <m:sSubSupPr>
+                          <m:ctrlPr>
+                            <a:rPr lang="en-US" sz="2800" b="0" i="1" smtClean="0">
+                              <a:latin typeface="Cambria Math" panose="02040503050406030204" pitchFamily="18" charset="0"/>
+                            </a:rPr>
+                          </m:ctrlPr>
+                        </m:sSubSupPr>
+                        <m:e>
+                          <m:r>
+                            <a:rPr lang="en-US" sz="2800" b="0" i="1" smtClean="0">
+                              <a:latin typeface="Cambria Math" panose="02040503050406030204" pitchFamily="18" charset="0"/>
+                            </a:rPr>
+                            <m:t>𝑎</m:t>
+                          </m:r>
+                        </m:e>
+                        <m:sub>
+                          <m:r>
+                            <a:rPr lang="en-US" sz="2800" b="0" i="1" smtClean="0">
+                              <a:latin typeface="Cambria Math" panose="02040503050406030204" pitchFamily="18" charset="0"/>
+                            </a:rPr>
+                            <m:t> </m:t>
+                          </m:r>
+                        </m:sub>
+                        <m:sup>
+                          <m:r>
+                            <a:rPr lang="en-US" sz="2800" b="0" i="1" smtClean="0">
+                              <a:latin typeface="Cambria Math" panose="02040503050406030204" pitchFamily="18" charset="0"/>
+                            </a:rPr>
+                            <m:t> </m:t>
+                          </m:r>
+                        </m:sup>
+                      </m:sSubSup>
+                    </m:oMath>
+                  </m:oMathPara>
+                </a14:m>
+                <a:endParaRPr lang="en-US" sz="2800" dirty="0"/>
+              </a:p>
+            </p:txBody>
+          </p:sp>
+        </mc:Choice>
+        <mc:Fallback>
+          <p:sp>
+            <p:nvSpPr>
+              <p:cNvPr id="23" name="TextBox 22">
+                <a:extLst>
+                  <a:ext uri="{FF2B5EF4-FFF2-40B4-BE49-F238E27FC236}">
+                    <a16:creationId xmlns:a16="http://schemas.microsoft.com/office/drawing/2014/main" id="{5DF54123-AE23-4E7B-B342-605611E94C11}"/>
+                  </a:ext>
+                </a:extLst>
+              </p:cNvPr>
+              <p:cNvSpPr txBox="1">
+                <a:spLocks noRot="1" noChangeAspect="1" noMove="1" noResize="1" noEditPoints="1" noAdjustHandles="1" noChangeArrowheads="1" noChangeShapeType="1" noTextEdit="1"/>
+              </p:cNvSpPr>
+              <p:nvPr/>
+            </p:nvSpPr>
+            <p:spPr>
+              <a:xfrm>
+                <a:off x="2959988" y="3738928"/>
+                <a:ext cx="575479" cy="440377"/>
+              </a:xfrm>
+              <a:prstGeom prst="rect">
+                <a:avLst/>
+              </a:prstGeom>
+              <a:blipFill>
+                <a:blip r:embed="rId10"/>
+                <a:stretch>
+                  <a:fillRect/>
+                </a:stretch>
+              </a:blipFill>
+            </p:spPr>
+            <p:txBody>
+              <a:bodyPr/>
+              <a:lstStyle/>
+              <a:p>
+                <a:r>
+                  <a:rPr lang="en-US">
+                    <a:noFill/>
+                  </a:rPr>
+                  <a:t> </a:t>
+                </a:r>
+              </a:p>
+            </p:txBody>
+          </p:sp>
+        </mc:Fallback>
+      </mc:AlternateContent>
+      <mc:AlternateContent xmlns:mc="http://schemas.openxmlformats.org/markup-compatibility/2006">
+        <mc:Choice xmlns:a14="http://schemas.microsoft.com/office/drawing/2010/main" Requires="a14">
+          <p:sp>
+            <p:nvSpPr>
+              <p:cNvPr id="27" name="TextBox 26">
+                <a:extLst>
+                  <a:ext uri="{FF2B5EF4-FFF2-40B4-BE49-F238E27FC236}">
+                    <a16:creationId xmlns:a16="http://schemas.microsoft.com/office/drawing/2014/main" id="{DEC9F510-77D0-80B5-E755-50CA6A2203DE}"/>
+                  </a:ext>
+                </a:extLst>
+              </p:cNvPr>
+              <p:cNvSpPr txBox="1"/>
+              <p:nvPr/>
+            </p:nvSpPr>
+            <p:spPr>
+              <a:xfrm>
+                <a:off x="4146216" y="3974936"/>
+                <a:ext cx="575479" cy="369332"/>
+              </a:xfrm>
+              <a:prstGeom prst="rect">
+                <a:avLst/>
+              </a:prstGeom>
+              <a:noFill/>
+            </p:spPr>
+            <p:txBody>
+              <a:bodyPr wrap="square" lIns="0" tIns="0" rIns="0" bIns="0" rtlCol="0">
+                <a:spAutoFit/>
+              </a:bodyPr>
+              <a:lstStyle/>
+              <a:p>
+                <a:pPr/>
+                <a14:m>
+                  <m:oMathPara xmlns:m="http://schemas.openxmlformats.org/officeDocument/2006/math">
+                    <m:oMathParaPr>
+                      <m:jc m:val="centerGroup"/>
+                    </m:oMathParaPr>
+                    <m:oMath xmlns:m="http://schemas.openxmlformats.org/officeDocument/2006/math">
+                      <m:sSubSup>
+                        <m:sSubSupPr>
+                          <m:ctrlPr>
+                            <a:rPr lang="en-US" sz="2400" b="0" i="1" smtClean="0">
+                              <a:latin typeface="Cambria Math" panose="02040503050406030204" pitchFamily="18" charset="0"/>
+                            </a:rPr>
+                          </m:ctrlPr>
+                        </m:sSubSupPr>
+                        <m:e>
+                          <m:r>
+                            <a:rPr lang="en-US" sz="2400" b="0" i="1" smtClean="0">
+                              <a:latin typeface="Cambria Math" panose="02040503050406030204" pitchFamily="18" charset="0"/>
+                            </a:rPr>
+                            <m:t>𝑏</m:t>
+                          </m:r>
+                        </m:e>
+                        <m:sub>
+                          <m:r>
+                            <a:rPr lang="en-US" sz="2400" b="0" i="1" smtClean="0">
+                              <a:latin typeface="Cambria Math" panose="02040503050406030204" pitchFamily="18" charset="0"/>
+                            </a:rPr>
+                            <m:t> </m:t>
+                          </m:r>
+                        </m:sub>
+                        <m:sup>
+                          <m:r>
+                            <a:rPr lang="en-US" sz="2400" b="0" i="1" smtClean="0">
+                              <a:latin typeface="Cambria Math" panose="02040503050406030204" pitchFamily="18" charset="0"/>
+                            </a:rPr>
+                            <m:t> </m:t>
+                          </m:r>
+                        </m:sup>
+                      </m:sSubSup>
+                    </m:oMath>
+                  </m:oMathPara>
+                </a14:m>
+                <a:endParaRPr lang="en-US" sz="2400" dirty="0"/>
+              </a:p>
+            </p:txBody>
+          </p:sp>
+        </mc:Choice>
+        <mc:Fallback>
+          <p:sp>
+            <p:nvSpPr>
+              <p:cNvPr id="27" name="TextBox 26">
+                <a:extLst>
+                  <a:ext uri="{FF2B5EF4-FFF2-40B4-BE49-F238E27FC236}">
+                    <a16:creationId xmlns:a16="http://schemas.microsoft.com/office/drawing/2014/main" id="{DEC9F510-77D0-80B5-E755-50CA6A2203DE}"/>
+                  </a:ext>
+                </a:extLst>
+              </p:cNvPr>
+              <p:cNvSpPr txBox="1">
+                <a:spLocks noRot="1" noChangeAspect="1" noMove="1" noResize="1" noEditPoints="1" noAdjustHandles="1" noChangeArrowheads="1" noChangeShapeType="1" noTextEdit="1"/>
+              </p:cNvSpPr>
+              <p:nvPr/>
+            </p:nvSpPr>
+            <p:spPr>
+              <a:xfrm>
+                <a:off x="4146216" y="3974936"/>
+                <a:ext cx="575479" cy="369332"/>
+              </a:xfrm>
+              <a:prstGeom prst="rect">
+                <a:avLst/>
+              </a:prstGeom>
+              <a:blipFill>
+                <a:blip r:embed="rId11"/>
+                <a:stretch>
+                  <a:fillRect b="-4918"/>
+                </a:stretch>
+              </a:blipFill>
+            </p:spPr>
+            <p:txBody>
+              <a:bodyPr/>
+              <a:lstStyle/>
+              <a:p>
+                <a:r>
+                  <a:rPr lang="en-US">
+                    <a:noFill/>
+                  </a:rPr>
+                  <a:t> </a:t>
+                </a:r>
+              </a:p>
+            </p:txBody>
+          </p:sp>
+        </mc:Fallback>
+      </mc:AlternateContent>
+      <mc:AlternateContent xmlns:mc="http://schemas.openxmlformats.org/markup-compatibility/2006">
+        <mc:Choice xmlns:a14="http://schemas.microsoft.com/office/drawing/2010/main" Requires="a14">
+          <p:sp>
+            <p:nvSpPr>
+              <p:cNvPr id="29" name="TextBox 28">
+                <a:extLst>
+                  <a:ext uri="{FF2B5EF4-FFF2-40B4-BE49-F238E27FC236}">
+                    <a16:creationId xmlns:a16="http://schemas.microsoft.com/office/drawing/2014/main" id="{02E8985F-3B92-9C6D-2F04-C250B1A91605}"/>
+                  </a:ext>
+                </a:extLst>
+              </p:cNvPr>
+              <p:cNvSpPr txBox="1"/>
+              <p:nvPr/>
+            </p:nvSpPr>
+            <p:spPr>
+              <a:xfrm>
+                <a:off x="5257060" y="3754748"/>
+                <a:ext cx="575479" cy="440377"/>
+              </a:xfrm>
+              <a:prstGeom prst="rect">
+                <a:avLst/>
+              </a:prstGeom>
+              <a:noFill/>
+            </p:spPr>
+            <p:txBody>
+              <a:bodyPr wrap="square" lIns="0" tIns="0" rIns="0" bIns="0" rtlCol="0">
+                <a:spAutoFit/>
+              </a:bodyPr>
+              <a:lstStyle/>
+              <a:p>
+                <a:pPr/>
+                <a14:m>
+                  <m:oMathPara xmlns:m="http://schemas.openxmlformats.org/officeDocument/2006/math">
+                    <m:oMathParaPr>
+                      <m:jc m:val="centerGroup"/>
+                    </m:oMathParaPr>
+                    <m:oMath xmlns:m="http://schemas.openxmlformats.org/officeDocument/2006/math">
+                      <m:sSubSup>
+                        <m:sSubSupPr>
+                          <m:ctrlPr>
+                            <a:rPr lang="en-US" sz="2800" b="0" i="1" smtClean="0">
+                              <a:latin typeface="Cambria Math" panose="02040503050406030204" pitchFamily="18" charset="0"/>
+                            </a:rPr>
+                          </m:ctrlPr>
+                        </m:sSubSupPr>
+                        <m:e>
+                          <m:r>
+                            <a:rPr lang="en-US" sz="2800" b="0" i="1" smtClean="0">
+                              <a:latin typeface="Cambria Math" panose="02040503050406030204" pitchFamily="18" charset="0"/>
+                            </a:rPr>
+                            <m:t>𝑐</m:t>
+                          </m:r>
+                        </m:e>
+                        <m:sub>
+                          <m:r>
+                            <a:rPr lang="en-US" sz="2800" b="0" i="1" smtClean="0">
+                              <a:latin typeface="Cambria Math" panose="02040503050406030204" pitchFamily="18" charset="0"/>
+                            </a:rPr>
+                            <m:t> </m:t>
+                          </m:r>
+                        </m:sub>
+                        <m:sup>
+                          <m:r>
+                            <a:rPr lang="en-US" sz="2800" b="0" i="1" smtClean="0">
+                              <a:latin typeface="Cambria Math" panose="02040503050406030204" pitchFamily="18" charset="0"/>
+                            </a:rPr>
+                            <m:t> </m:t>
+                          </m:r>
+                        </m:sup>
+                      </m:sSubSup>
+                    </m:oMath>
+                  </m:oMathPara>
+                </a14:m>
+                <a:endParaRPr lang="en-US" sz="2800" dirty="0"/>
+              </a:p>
+            </p:txBody>
+          </p:sp>
+        </mc:Choice>
+        <mc:Fallback>
+          <p:sp>
+            <p:nvSpPr>
+              <p:cNvPr id="29" name="TextBox 28">
+                <a:extLst>
+                  <a:ext uri="{FF2B5EF4-FFF2-40B4-BE49-F238E27FC236}">
+                    <a16:creationId xmlns:a16="http://schemas.microsoft.com/office/drawing/2014/main" id="{02E8985F-3B92-9C6D-2F04-C250B1A91605}"/>
+                  </a:ext>
+                </a:extLst>
+              </p:cNvPr>
+              <p:cNvSpPr txBox="1">
+                <a:spLocks noRot="1" noChangeAspect="1" noMove="1" noResize="1" noEditPoints="1" noAdjustHandles="1" noChangeArrowheads="1" noChangeShapeType="1" noTextEdit="1"/>
+              </p:cNvSpPr>
+              <p:nvPr/>
+            </p:nvSpPr>
+            <p:spPr>
+              <a:xfrm>
+                <a:off x="5257060" y="3754748"/>
+                <a:ext cx="575479" cy="440377"/>
+              </a:xfrm>
+              <a:prstGeom prst="rect">
+                <a:avLst/>
+              </a:prstGeom>
+              <a:blipFill>
+                <a:blip r:embed="rId12"/>
+                <a:stretch>
+                  <a:fillRect/>
+                </a:stretch>
+              </a:blipFill>
+            </p:spPr>
+            <p:txBody>
+              <a:bodyPr/>
+              <a:lstStyle/>
+              <a:p>
+                <a:r>
+                  <a:rPr lang="en-US">
+                    <a:noFill/>
+                  </a:rPr>
+                  <a:t> </a:t>
+                </a:r>
+              </a:p>
+            </p:txBody>
+          </p:sp>
+        </mc:Fallback>
+      </mc:AlternateContent>
+      <mc:AlternateContent xmlns:mc="http://schemas.openxmlformats.org/markup-compatibility/2006">
+        <mc:Choice xmlns:a14="http://schemas.microsoft.com/office/drawing/2010/main" Requires="a14">
+          <p:sp>
+            <p:nvSpPr>
+              <p:cNvPr id="31" name="TextBox 30">
+                <a:extLst>
+                  <a:ext uri="{FF2B5EF4-FFF2-40B4-BE49-F238E27FC236}">
+                    <a16:creationId xmlns:a16="http://schemas.microsoft.com/office/drawing/2014/main" id="{4C97CCFD-A4A0-F764-67B3-3760239CEBAE}"/>
+                  </a:ext>
+                </a:extLst>
+              </p:cNvPr>
+              <p:cNvSpPr txBox="1"/>
+              <p:nvPr/>
+            </p:nvSpPr>
+            <p:spPr>
+              <a:xfrm>
+                <a:off x="2520020" y="4643152"/>
+                <a:ext cx="575479" cy="440377"/>
+              </a:xfrm>
+              <a:prstGeom prst="rect">
+                <a:avLst/>
+              </a:prstGeom>
+              <a:noFill/>
+            </p:spPr>
+            <p:txBody>
+              <a:bodyPr wrap="square" lIns="0" tIns="0" rIns="0" bIns="0" rtlCol="0">
+                <a:spAutoFit/>
+              </a:bodyPr>
+              <a:lstStyle/>
+              <a:p>
+                <a:pPr/>
+                <a14:m>
+                  <m:oMathPara xmlns:m="http://schemas.openxmlformats.org/officeDocument/2006/math">
+                    <m:oMathParaPr>
+                      <m:jc m:val="centerGroup"/>
+                    </m:oMathParaPr>
+                    <m:oMath xmlns:m="http://schemas.openxmlformats.org/officeDocument/2006/math">
+                      <m:r>
+                        <a:rPr lang="en-US" sz="2800" b="0" i="1" smtClean="0">
+                          <a:latin typeface="Cambria Math" panose="02040503050406030204" pitchFamily="18" charset="0"/>
+                        </a:rPr>
+                        <m:t>𝑔</m:t>
+                      </m:r>
+                    </m:oMath>
+                  </m:oMathPara>
+                </a14:m>
+                <a:endParaRPr lang="en-US" sz="2800" dirty="0"/>
+              </a:p>
+            </p:txBody>
+          </p:sp>
+        </mc:Choice>
+        <mc:Fallback>
+          <p:sp>
+            <p:nvSpPr>
+              <p:cNvPr id="31" name="TextBox 30">
+                <a:extLst>
+                  <a:ext uri="{FF2B5EF4-FFF2-40B4-BE49-F238E27FC236}">
+                    <a16:creationId xmlns:a16="http://schemas.microsoft.com/office/drawing/2014/main" id="{4C97CCFD-A4A0-F764-67B3-3760239CEBAE}"/>
+                  </a:ext>
+                </a:extLst>
+              </p:cNvPr>
+              <p:cNvSpPr txBox="1">
+                <a:spLocks noRot="1" noChangeAspect="1" noMove="1" noResize="1" noEditPoints="1" noAdjustHandles="1" noChangeArrowheads="1" noChangeShapeType="1" noTextEdit="1"/>
+              </p:cNvSpPr>
+              <p:nvPr/>
+            </p:nvSpPr>
+            <p:spPr>
+              <a:xfrm>
+                <a:off x="2520020" y="4643152"/>
+                <a:ext cx="575479" cy="440377"/>
+              </a:xfrm>
+              <a:prstGeom prst="rect">
+                <a:avLst/>
+              </a:prstGeom>
+              <a:blipFill>
+                <a:blip r:embed="rId13"/>
+                <a:stretch>
+                  <a:fillRect/>
+                </a:stretch>
+              </a:blipFill>
+            </p:spPr>
+            <p:txBody>
+              <a:bodyPr/>
+              <a:lstStyle/>
+              <a:p>
+                <a:r>
+                  <a:rPr lang="en-US">
+                    <a:noFill/>
+                  </a:rPr>
+                  <a:t> </a:t>
+                </a:r>
+              </a:p>
+            </p:txBody>
+          </p:sp>
+        </mc:Fallback>
+      </mc:AlternateContent>
+      <mc:AlternateContent xmlns:mc="http://schemas.openxmlformats.org/markup-compatibility/2006">
+        <mc:Choice xmlns:a14="http://schemas.microsoft.com/office/drawing/2010/main" Requires="a14">
+          <p:sp>
+            <p:nvSpPr>
+              <p:cNvPr id="32" name="TextBox 31">
+                <a:extLst>
+                  <a:ext uri="{FF2B5EF4-FFF2-40B4-BE49-F238E27FC236}">
+                    <a16:creationId xmlns:a16="http://schemas.microsoft.com/office/drawing/2014/main" id="{57AE6AAD-9416-6827-5977-669091F978C3}"/>
+                  </a:ext>
+                </a:extLst>
+              </p:cNvPr>
+              <p:cNvSpPr txBox="1"/>
+              <p:nvPr/>
+            </p:nvSpPr>
+            <p:spPr>
+              <a:xfrm>
+                <a:off x="6861038" y="3913690"/>
+                <a:ext cx="575479" cy="369332"/>
+              </a:xfrm>
+              <a:prstGeom prst="rect">
+                <a:avLst/>
+              </a:prstGeom>
+              <a:noFill/>
+            </p:spPr>
+            <p:txBody>
+              <a:bodyPr wrap="square" lIns="0" tIns="0" rIns="0" bIns="0" rtlCol="0">
+                <a:spAutoFit/>
+              </a:bodyPr>
+              <a:lstStyle/>
+              <a:p>
+                <a:pPr/>
+                <a14:m>
+                  <m:oMathPara xmlns:m="http://schemas.openxmlformats.org/officeDocument/2006/math">
+                    <m:oMathParaPr>
+                      <m:jc m:val="centerGroup"/>
+                    </m:oMathParaPr>
+                    <m:oMath xmlns:m="http://schemas.openxmlformats.org/officeDocument/2006/math">
+                      <m:sSubSup>
+                        <m:sSubSupPr>
+                          <m:ctrlPr>
+                            <a:rPr lang="en-US" sz="2400" b="0" i="1" smtClean="0">
+                              <a:latin typeface="Cambria Math" panose="02040503050406030204" pitchFamily="18" charset="0"/>
+                            </a:rPr>
+                          </m:ctrlPr>
+                        </m:sSubSupPr>
+                        <m:e>
+                          <m:r>
+                            <a:rPr lang="en-US" sz="2400" b="0" i="1" smtClean="0">
+                              <a:latin typeface="Cambria Math" panose="02040503050406030204" pitchFamily="18" charset="0"/>
+                            </a:rPr>
+                            <m:t>𝑑</m:t>
+                          </m:r>
+                        </m:e>
+                        <m:sub>
+                          <m:r>
+                            <a:rPr lang="en-US" sz="2400" b="0" i="1" smtClean="0">
+                              <a:latin typeface="Cambria Math" panose="02040503050406030204" pitchFamily="18" charset="0"/>
+                            </a:rPr>
+                            <m:t> </m:t>
+                          </m:r>
+                        </m:sub>
+                        <m:sup>
+                          <m:r>
+                            <a:rPr lang="en-US" sz="2400" b="0" i="1" smtClean="0">
+                              <a:latin typeface="Cambria Math" panose="02040503050406030204" pitchFamily="18" charset="0"/>
+                            </a:rPr>
+                            <m:t> </m:t>
+                          </m:r>
+                        </m:sup>
+                      </m:sSubSup>
+                    </m:oMath>
+                  </m:oMathPara>
+                </a14:m>
+                <a:endParaRPr lang="en-US" sz="2400" dirty="0"/>
+              </a:p>
+            </p:txBody>
+          </p:sp>
+        </mc:Choice>
+        <mc:Fallback>
+          <p:sp>
+            <p:nvSpPr>
+              <p:cNvPr id="32" name="TextBox 31">
+                <a:extLst>
+                  <a:ext uri="{FF2B5EF4-FFF2-40B4-BE49-F238E27FC236}">
+                    <a16:creationId xmlns:a16="http://schemas.microsoft.com/office/drawing/2014/main" id="{57AE6AAD-9416-6827-5977-669091F978C3}"/>
+                  </a:ext>
+                </a:extLst>
+              </p:cNvPr>
+              <p:cNvSpPr txBox="1">
+                <a:spLocks noRot="1" noChangeAspect="1" noMove="1" noResize="1" noEditPoints="1" noAdjustHandles="1" noChangeArrowheads="1" noChangeShapeType="1" noTextEdit="1"/>
+              </p:cNvSpPr>
+              <p:nvPr/>
+            </p:nvSpPr>
+            <p:spPr>
+              <a:xfrm>
+                <a:off x="6861038" y="3913690"/>
+                <a:ext cx="575479" cy="369332"/>
+              </a:xfrm>
+              <a:prstGeom prst="rect">
+                <a:avLst/>
+              </a:prstGeom>
+              <a:blipFill>
+                <a:blip r:embed="rId14"/>
+                <a:stretch>
+                  <a:fillRect b="-4918"/>
+                </a:stretch>
+              </a:blipFill>
+            </p:spPr>
+            <p:txBody>
+              <a:bodyPr/>
+              <a:lstStyle/>
+              <a:p>
+                <a:r>
+                  <a:rPr lang="en-US">
+                    <a:noFill/>
+                  </a:rPr>
+                  <a:t> </a:t>
+                </a:r>
+              </a:p>
+            </p:txBody>
+          </p:sp>
+        </mc:Fallback>
+      </mc:AlternateContent>
+      <mc:AlternateContent xmlns:mc="http://schemas.openxmlformats.org/markup-compatibility/2006">
+        <mc:Choice xmlns:a14="http://schemas.microsoft.com/office/drawing/2010/main" Requires="a14">
+          <p:sp>
+            <p:nvSpPr>
+              <p:cNvPr id="19" name="TextBox 18">
+                <a:extLst>
+                  <a:ext uri="{FF2B5EF4-FFF2-40B4-BE49-F238E27FC236}">
+                    <a16:creationId xmlns:a16="http://schemas.microsoft.com/office/drawing/2014/main" id="{E80FE139-3740-5920-F609-FC349D93F236}"/>
+                  </a:ext>
+                </a:extLst>
+              </p:cNvPr>
+              <p:cNvSpPr txBox="1"/>
+              <p:nvPr/>
+            </p:nvSpPr>
+            <p:spPr>
+              <a:xfrm>
+                <a:off x="1570513" y="3348577"/>
+                <a:ext cx="570091" cy="553998"/>
+              </a:xfrm>
+              <a:prstGeom prst="rect">
+                <a:avLst/>
+              </a:prstGeom>
+              <a:noFill/>
+            </p:spPr>
+            <p:txBody>
+              <a:bodyPr wrap="none" lIns="0" tIns="0" rIns="0" bIns="0" rtlCol="0">
+                <a:spAutoFit/>
+              </a:bodyPr>
+              <a:lstStyle/>
+              <a:p>
+                <a:pPr/>
+                <a14:m>
+                  <m:oMathPara xmlns:m="http://schemas.openxmlformats.org/officeDocument/2006/math">
+                    <m:oMathParaPr>
+                      <m:jc m:val="centerGroup"/>
+                    </m:oMathParaPr>
+                    <m:oMath xmlns:m="http://schemas.openxmlformats.org/officeDocument/2006/math">
+                      <m:sSup>
+                        <m:sSupPr>
+                          <m:ctrlPr>
+                            <a:rPr lang="en-US" sz="3600" b="0" i="1" smtClean="0">
+                              <a:latin typeface="Cambria Math" panose="02040503050406030204" pitchFamily="18" charset="0"/>
+                            </a:rPr>
+                          </m:ctrlPr>
+                        </m:sSupPr>
+                        <m:e>
+                          <m:r>
+                            <a:rPr lang="en-US" sz="3600" b="0" i="1" smtClean="0">
+                              <a:latin typeface="Cambria Math" panose="02040503050406030204" pitchFamily="18" charset="0"/>
+                            </a:rPr>
+                            <m:t>𝑃</m:t>
+                          </m:r>
+                        </m:e>
+                        <m:sup>
+                          <m:r>
+                            <a:rPr lang="en-US" sz="3600" b="0" i="1" smtClean="0">
+                              <a:latin typeface="Cambria Math" panose="02040503050406030204" pitchFamily="18" charset="0"/>
+                            </a:rPr>
+                            <m:t>𝑡</m:t>
+                          </m:r>
+                        </m:sup>
+                      </m:sSup>
+                    </m:oMath>
+                  </m:oMathPara>
+                </a14:m>
+                <a:endParaRPr lang="en-US" sz="3600" dirty="0"/>
+              </a:p>
+            </p:txBody>
+          </p:sp>
+        </mc:Choice>
+        <mc:Fallback>
+          <p:sp>
+            <p:nvSpPr>
+              <p:cNvPr id="19" name="TextBox 18">
+                <a:extLst>
+                  <a:ext uri="{FF2B5EF4-FFF2-40B4-BE49-F238E27FC236}">
+                    <a16:creationId xmlns:a16="http://schemas.microsoft.com/office/drawing/2014/main" id="{E80FE139-3740-5920-F609-FC349D93F236}"/>
+                  </a:ext>
+                </a:extLst>
+              </p:cNvPr>
+              <p:cNvSpPr txBox="1">
+                <a:spLocks noRot="1" noChangeAspect="1" noMove="1" noResize="1" noEditPoints="1" noAdjustHandles="1" noChangeArrowheads="1" noChangeShapeType="1" noTextEdit="1"/>
+              </p:cNvSpPr>
+              <p:nvPr/>
+            </p:nvSpPr>
+            <p:spPr>
+              <a:xfrm>
+                <a:off x="1570513" y="3348577"/>
+                <a:ext cx="570091" cy="553998"/>
+              </a:xfrm>
+              <a:prstGeom prst="rect">
+                <a:avLst/>
+              </a:prstGeom>
+              <a:blipFill>
+                <a:blip r:embed="rId15"/>
+                <a:stretch>
+                  <a:fillRect/>
+                </a:stretch>
+              </a:blipFill>
+            </p:spPr>
+            <p:txBody>
+              <a:bodyPr/>
+              <a:lstStyle/>
+              <a:p>
+                <a:r>
+                  <a:rPr lang="en-US">
+                    <a:noFill/>
+                  </a:rPr>
+                  <a:t> </a:t>
+                </a:r>
+              </a:p>
+            </p:txBody>
+          </p:sp>
+        </mc:Fallback>
+      </mc:AlternateContent>
+    </p:spTree>
+    <p:extLst>
+      <p:ext uri="{BB962C8B-B14F-4D97-AF65-F5344CB8AC3E}">
+        <p14:creationId xmlns:p14="http://schemas.microsoft.com/office/powerpoint/2010/main" val="3284314384"/>
       </p:ext>
     </p:extLst>
   </p:cSld>

</xml_diff>

<commit_message>
added tables for protection example
</commit_message>
<xml_diff>
--- a/Slides/graph-creator.pptx
+++ b/Slides/graph-creator.pptx
@@ -46,6 +46,10 @@
     <p:sldId id="294" r:id="rId40"/>
     <p:sldId id="295" r:id="rId41"/>
     <p:sldId id="296" r:id="rId42"/>
+    <p:sldId id="297" r:id="rId43"/>
+    <p:sldId id="298" r:id="rId44"/>
+    <p:sldId id="299" r:id="rId45"/>
+    <p:sldId id="300" r:id="rId46"/>
   </p:sldIdLst>
   <p:sldSz cx="12192000" cy="6858000"/>
   <p:notesSz cx="6858000" cy="9144000"/>
@@ -299,7 +303,7 @@
           <a:p>
             <a:fld id="{7F9C3969-815D-4313-AD47-20854D5F097C}" type="datetimeFigureOut">
               <a:rPr lang="en-US" smtClean="0"/>
-              <a:t>10/28/2024</a:t>
+              <a:t>10/29/2024</a:t>
             </a:fld>
             <a:endParaRPr lang="en-US"/>
           </a:p>
@@ -497,7 +501,7 @@
           <a:p>
             <a:fld id="{7F9C3969-815D-4313-AD47-20854D5F097C}" type="datetimeFigureOut">
               <a:rPr lang="en-US" smtClean="0"/>
-              <a:t>10/28/2024</a:t>
+              <a:t>10/29/2024</a:t>
             </a:fld>
             <a:endParaRPr lang="en-US"/>
           </a:p>
@@ -705,7 +709,7 @@
           <a:p>
             <a:fld id="{7F9C3969-815D-4313-AD47-20854D5F097C}" type="datetimeFigureOut">
               <a:rPr lang="en-US" smtClean="0"/>
-              <a:t>10/28/2024</a:t>
+              <a:t>10/29/2024</a:t>
             </a:fld>
             <a:endParaRPr lang="en-US"/>
           </a:p>
@@ -903,7 +907,7 @@
           <a:p>
             <a:fld id="{7F9C3969-815D-4313-AD47-20854D5F097C}" type="datetimeFigureOut">
               <a:rPr lang="en-US" smtClean="0"/>
-              <a:t>10/28/2024</a:t>
+              <a:t>10/29/2024</a:t>
             </a:fld>
             <a:endParaRPr lang="en-US"/>
           </a:p>
@@ -1178,7 +1182,7 @@
           <a:p>
             <a:fld id="{7F9C3969-815D-4313-AD47-20854D5F097C}" type="datetimeFigureOut">
               <a:rPr lang="en-US" smtClean="0"/>
-              <a:t>10/28/2024</a:t>
+              <a:t>10/29/2024</a:t>
             </a:fld>
             <a:endParaRPr lang="en-US"/>
           </a:p>
@@ -1443,7 +1447,7 @@
           <a:p>
             <a:fld id="{7F9C3969-815D-4313-AD47-20854D5F097C}" type="datetimeFigureOut">
               <a:rPr lang="en-US" smtClean="0"/>
-              <a:t>10/28/2024</a:t>
+              <a:t>10/29/2024</a:t>
             </a:fld>
             <a:endParaRPr lang="en-US"/>
           </a:p>
@@ -1855,7 +1859,7 @@
           <a:p>
             <a:fld id="{7F9C3969-815D-4313-AD47-20854D5F097C}" type="datetimeFigureOut">
               <a:rPr lang="en-US" smtClean="0"/>
-              <a:t>10/28/2024</a:t>
+              <a:t>10/29/2024</a:t>
             </a:fld>
             <a:endParaRPr lang="en-US"/>
           </a:p>
@@ -1996,7 +2000,7 @@
           <a:p>
             <a:fld id="{7F9C3969-815D-4313-AD47-20854D5F097C}" type="datetimeFigureOut">
               <a:rPr lang="en-US" smtClean="0"/>
-              <a:t>10/28/2024</a:t>
+              <a:t>10/29/2024</a:t>
             </a:fld>
             <a:endParaRPr lang="en-US"/>
           </a:p>
@@ -2109,7 +2113,7 @@
           <a:p>
             <a:fld id="{7F9C3969-815D-4313-AD47-20854D5F097C}" type="datetimeFigureOut">
               <a:rPr lang="en-US" smtClean="0"/>
-              <a:t>10/28/2024</a:t>
+              <a:t>10/29/2024</a:t>
             </a:fld>
             <a:endParaRPr lang="en-US"/>
           </a:p>
@@ -2420,7 +2424,7 @@
           <a:p>
             <a:fld id="{7F9C3969-815D-4313-AD47-20854D5F097C}" type="datetimeFigureOut">
               <a:rPr lang="en-US" smtClean="0"/>
-              <a:t>10/28/2024</a:t>
+              <a:t>10/29/2024</a:t>
             </a:fld>
             <a:endParaRPr lang="en-US"/>
           </a:p>
@@ -2708,7 +2712,7 @@
           <a:p>
             <a:fld id="{7F9C3969-815D-4313-AD47-20854D5F097C}" type="datetimeFigureOut">
               <a:rPr lang="en-US" smtClean="0"/>
-              <a:t>10/28/2024</a:t>
+              <a:t>10/29/2024</a:t>
             </a:fld>
             <a:endParaRPr lang="en-US"/>
           </a:p>
@@ -2949,7 +2953,7 @@
           <a:p>
             <a:fld id="{7F9C3969-815D-4313-AD47-20854D5F097C}" type="datetimeFigureOut">
               <a:rPr lang="en-US" smtClean="0"/>
-              <a:t>10/28/2024</a:t>
+              <a:t>10/29/2024</a:t>
             </a:fld>
             <a:endParaRPr lang="en-US"/>
           </a:p>
@@ -28785,8 +28789,8 @@
           </p:style>
         </p:cxnSp>
       </p:grpSp>
-      <mc:AlternateContent xmlns:mc="http://schemas.openxmlformats.org/markup-compatibility/2006">
-        <mc:Choice xmlns:a14="http://schemas.microsoft.com/office/drawing/2010/main" Requires="a14">
+      <mc:AlternateContent xmlns:mc="http://schemas.openxmlformats.org/markup-compatibility/2006" xmlns:a14="http://schemas.microsoft.com/office/drawing/2010/main">
+        <mc:Choice Requires="a14">
           <p:sp>
             <p:nvSpPr>
               <p:cNvPr id="20" name="TextBox 19">
@@ -28855,7 +28859,7 @@
             </p:txBody>
           </p:sp>
         </mc:Choice>
-        <mc:Fallback>
+        <mc:Fallback xmlns="">
           <p:sp>
             <p:nvSpPr>
               <p:cNvPr id="20" name="TextBox 19">
@@ -28900,8 +28904,8 @@
           </p:sp>
         </mc:Fallback>
       </mc:AlternateContent>
-      <mc:AlternateContent xmlns:mc="http://schemas.openxmlformats.org/markup-compatibility/2006">
-        <mc:Choice xmlns:a14="http://schemas.microsoft.com/office/drawing/2010/main" Requires="a14">
+      <mc:AlternateContent xmlns:mc="http://schemas.openxmlformats.org/markup-compatibility/2006" xmlns:a14="http://schemas.microsoft.com/office/drawing/2010/main">
+        <mc:Choice Requires="a14">
           <p:sp>
             <p:nvSpPr>
               <p:cNvPr id="21" name="TextBox 20">
@@ -28978,7 +28982,7 @@
             </p:txBody>
           </p:sp>
         </mc:Choice>
-        <mc:Fallback>
+        <mc:Fallback xmlns="">
           <p:sp>
             <p:nvSpPr>
               <p:cNvPr id="21" name="TextBox 20">
@@ -29064,8 +29068,8 @@
           </a:fontRef>
         </p:style>
       </p:cxnSp>
-      <mc:AlternateContent xmlns:mc="http://schemas.openxmlformats.org/markup-compatibility/2006">
-        <mc:Choice xmlns:a14="http://schemas.microsoft.com/office/drawing/2010/main" Requires="a14">
+      <mc:AlternateContent xmlns:mc="http://schemas.openxmlformats.org/markup-compatibility/2006" xmlns:a14="http://schemas.microsoft.com/office/drawing/2010/main">
+        <mc:Choice Requires="a14">
           <p:sp>
             <p:nvSpPr>
               <p:cNvPr id="8" name="TextBox 7">
@@ -29142,7 +29146,7 @@
             </p:txBody>
           </p:sp>
         </mc:Choice>
-        <mc:Fallback>
+        <mc:Fallback xmlns="">
           <p:sp>
             <p:nvSpPr>
               <p:cNvPr id="8" name="TextBox 7">
@@ -29187,8 +29191,8 @@
           </p:sp>
         </mc:Fallback>
       </mc:AlternateContent>
-      <mc:AlternateContent xmlns:mc="http://schemas.openxmlformats.org/markup-compatibility/2006">
-        <mc:Choice xmlns:a14="http://schemas.microsoft.com/office/drawing/2010/main" Requires="a14">
+      <mc:AlternateContent xmlns:mc="http://schemas.openxmlformats.org/markup-compatibility/2006" xmlns:a14="http://schemas.microsoft.com/office/drawing/2010/main">
+        <mc:Choice Requires="a14">
           <p:sp>
             <p:nvSpPr>
               <p:cNvPr id="9" name="TextBox 8">
@@ -29257,7 +29261,7 @@
             </p:txBody>
           </p:sp>
         </mc:Choice>
-        <mc:Fallback>
+        <mc:Fallback xmlns="">
           <p:sp>
             <p:nvSpPr>
               <p:cNvPr id="9" name="TextBox 8">
@@ -29446,8 +29450,8 @@
           </a:fontRef>
         </p:style>
       </p:cxnSp>
-      <mc:AlternateContent xmlns:mc="http://schemas.openxmlformats.org/markup-compatibility/2006">
-        <mc:Choice xmlns:a14="http://schemas.microsoft.com/office/drawing/2010/main" Requires="a14">
+      <mc:AlternateContent xmlns:mc="http://schemas.openxmlformats.org/markup-compatibility/2006" xmlns:a14="http://schemas.microsoft.com/office/drawing/2010/main">
+        <mc:Choice Requires="a14">
           <p:sp>
             <p:nvSpPr>
               <p:cNvPr id="24" name="TextBox 23">
@@ -29524,7 +29528,7 @@
             </p:txBody>
           </p:sp>
         </mc:Choice>
-        <mc:Fallback>
+        <mc:Fallback xmlns="">
           <p:sp>
             <p:nvSpPr>
               <p:cNvPr id="24" name="TextBox 23">
@@ -29569,8 +29573,8 @@
           </p:sp>
         </mc:Fallback>
       </mc:AlternateContent>
-      <mc:AlternateContent xmlns:mc="http://schemas.openxmlformats.org/markup-compatibility/2006">
-        <mc:Choice xmlns:a14="http://schemas.microsoft.com/office/drawing/2010/main" Requires="a14">
+      <mc:AlternateContent xmlns:mc="http://schemas.openxmlformats.org/markup-compatibility/2006" xmlns:a14="http://schemas.microsoft.com/office/drawing/2010/main">
+        <mc:Choice Requires="a14">
           <p:sp>
             <p:nvSpPr>
               <p:cNvPr id="25" name="TextBox 24">
@@ -29647,7 +29651,7 @@
             </p:txBody>
           </p:sp>
         </mc:Choice>
-        <mc:Fallback>
+        <mc:Fallback xmlns="">
           <p:sp>
             <p:nvSpPr>
               <p:cNvPr id="25" name="TextBox 24">
@@ -29692,8 +29696,8 @@
           </p:sp>
         </mc:Fallback>
       </mc:AlternateContent>
-      <mc:AlternateContent xmlns:mc="http://schemas.openxmlformats.org/markup-compatibility/2006">
-        <mc:Choice xmlns:a14="http://schemas.microsoft.com/office/drawing/2010/main" Requires="a14">
+      <mc:AlternateContent xmlns:mc="http://schemas.openxmlformats.org/markup-compatibility/2006" xmlns:a14="http://schemas.microsoft.com/office/drawing/2010/main">
+        <mc:Choice Requires="a14">
           <p:sp>
             <p:nvSpPr>
               <p:cNvPr id="30" name="TextBox 29">
@@ -29770,7 +29774,7 @@
             </p:txBody>
           </p:sp>
         </mc:Choice>
-        <mc:Fallback>
+        <mc:Fallback xmlns="">
           <p:sp>
             <p:nvSpPr>
               <p:cNvPr id="30" name="TextBox 29">
@@ -29815,8 +29819,8 @@
           </p:sp>
         </mc:Fallback>
       </mc:AlternateContent>
-      <mc:AlternateContent xmlns:mc="http://schemas.openxmlformats.org/markup-compatibility/2006">
-        <mc:Choice xmlns:a14="http://schemas.microsoft.com/office/drawing/2010/main" Requires="a14">
+      <mc:AlternateContent xmlns:mc="http://schemas.openxmlformats.org/markup-compatibility/2006" xmlns:a14="http://schemas.microsoft.com/office/drawing/2010/main">
+        <mc:Choice Requires="a14">
           <p:sp>
             <p:nvSpPr>
               <p:cNvPr id="22" name="TextBox 21">
@@ -29893,7 +29897,7 @@
             </p:txBody>
           </p:sp>
         </mc:Choice>
-        <mc:Fallback>
+        <mc:Fallback xmlns="">
           <p:sp>
             <p:nvSpPr>
               <p:cNvPr id="22" name="TextBox 21">
@@ -29938,8 +29942,8 @@
           </p:sp>
         </mc:Fallback>
       </mc:AlternateContent>
-      <mc:AlternateContent xmlns:mc="http://schemas.openxmlformats.org/markup-compatibility/2006">
-        <mc:Choice xmlns:a14="http://schemas.microsoft.com/office/drawing/2010/main" Requires="a14">
+      <mc:AlternateContent xmlns:mc="http://schemas.openxmlformats.org/markup-compatibility/2006" xmlns:a14="http://schemas.microsoft.com/office/drawing/2010/main">
+        <mc:Choice Requires="a14">
           <p:sp>
             <p:nvSpPr>
               <p:cNvPr id="23" name="TextBox 22">
@@ -30016,7 +30020,7 @@
             </p:txBody>
           </p:sp>
         </mc:Choice>
-        <mc:Fallback>
+        <mc:Fallback xmlns="">
           <p:sp>
             <p:nvSpPr>
               <p:cNvPr id="23" name="TextBox 22">
@@ -30061,8 +30065,8 @@
           </p:sp>
         </mc:Fallback>
       </mc:AlternateContent>
-      <mc:AlternateContent xmlns:mc="http://schemas.openxmlformats.org/markup-compatibility/2006">
-        <mc:Choice xmlns:a14="http://schemas.microsoft.com/office/drawing/2010/main" Requires="a14">
+      <mc:AlternateContent xmlns:mc="http://schemas.openxmlformats.org/markup-compatibility/2006" xmlns:a14="http://schemas.microsoft.com/office/drawing/2010/main">
+        <mc:Choice Requires="a14">
           <p:sp>
             <p:nvSpPr>
               <p:cNvPr id="27" name="TextBox 26">
@@ -30139,7 +30143,7 @@
             </p:txBody>
           </p:sp>
         </mc:Choice>
-        <mc:Fallback>
+        <mc:Fallback xmlns="">
           <p:sp>
             <p:nvSpPr>
               <p:cNvPr id="27" name="TextBox 26">
@@ -30184,8 +30188,8 @@
           </p:sp>
         </mc:Fallback>
       </mc:AlternateContent>
-      <mc:AlternateContent xmlns:mc="http://schemas.openxmlformats.org/markup-compatibility/2006">
-        <mc:Choice xmlns:a14="http://schemas.microsoft.com/office/drawing/2010/main" Requires="a14">
+      <mc:AlternateContent xmlns:mc="http://schemas.openxmlformats.org/markup-compatibility/2006" xmlns:a14="http://schemas.microsoft.com/office/drawing/2010/main">
+        <mc:Choice Requires="a14">
           <p:sp>
             <p:nvSpPr>
               <p:cNvPr id="29" name="TextBox 28">
@@ -30262,7 +30266,7 @@
             </p:txBody>
           </p:sp>
         </mc:Choice>
-        <mc:Fallback>
+        <mc:Fallback xmlns="">
           <p:sp>
             <p:nvSpPr>
               <p:cNvPr id="29" name="TextBox 28">
@@ -30307,8 +30311,8 @@
           </p:sp>
         </mc:Fallback>
       </mc:AlternateContent>
-      <mc:AlternateContent xmlns:mc="http://schemas.openxmlformats.org/markup-compatibility/2006">
-        <mc:Choice xmlns:a14="http://schemas.microsoft.com/office/drawing/2010/main" Requires="a14">
+      <mc:AlternateContent xmlns:mc="http://schemas.openxmlformats.org/markup-compatibility/2006" xmlns:a14="http://schemas.microsoft.com/office/drawing/2010/main">
+        <mc:Choice Requires="a14">
           <p:sp>
             <p:nvSpPr>
               <p:cNvPr id="31" name="TextBox 30">
@@ -30358,7 +30362,7 @@
             </p:txBody>
           </p:sp>
         </mc:Choice>
-        <mc:Fallback>
+        <mc:Fallback xmlns="">
           <p:sp>
             <p:nvSpPr>
               <p:cNvPr id="31" name="TextBox 30">
@@ -30403,8 +30407,8 @@
           </p:sp>
         </mc:Fallback>
       </mc:AlternateContent>
-      <mc:AlternateContent xmlns:mc="http://schemas.openxmlformats.org/markup-compatibility/2006">
-        <mc:Choice xmlns:a14="http://schemas.microsoft.com/office/drawing/2010/main" Requires="a14">
+      <mc:AlternateContent xmlns:mc="http://schemas.openxmlformats.org/markup-compatibility/2006" xmlns:a14="http://schemas.microsoft.com/office/drawing/2010/main">
+        <mc:Choice Requires="a14">
           <p:sp>
             <p:nvSpPr>
               <p:cNvPr id="32" name="TextBox 31">
@@ -30481,7 +30485,7 @@
             </p:txBody>
           </p:sp>
         </mc:Choice>
-        <mc:Fallback>
+        <mc:Fallback xmlns="">
           <p:sp>
             <p:nvSpPr>
               <p:cNvPr id="32" name="TextBox 31">
@@ -30526,8 +30530,8 @@
           </p:sp>
         </mc:Fallback>
       </mc:AlternateContent>
-      <mc:AlternateContent xmlns:mc="http://schemas.openxmlformats.org/markup-compatibility/2006">
-        <mc:Choice xmlns:a14="http://schemas.microsoft.com/office/drawing/2010/main" Requires="a14">
+      <mc:AlternateContent xmlns:mc="http://schemas.openxmlformats.org/markup-compatibility/2006" xmlns:a14="http://schemas.microsoft.com/office/drawing/2010/main">
+        <mc:Choice Requires="a14">
           <p:sp>
             <p:nvSpPr>
               <p:cNvPr id="19" name="TextBox 18">
@@ -30596,7 +30600,7 @@
             </p:txBody>
           </p:sp>
         </mc:Choice>
-        <mc:Fallback>
+        <mc:Fallback xmlns="">
           <p:sp>
             <p:nvSpPr>
               <p:cNvPr id="19" name="TextBox 18">
@@ -30645,6 +30649,1756 @@
     <p:extLst>
       <p:ext uri="{BB962C8B-B14F-4D97-AF65-F5344CB8AC3E}">
         <p14:creationId xmlns:p14="http://schemas.microsoft.com/office/powerpoint/2010/main" val="3284314384"/>
+      </p:ext>
+    </p:extLst>
+  </p:cSld>
+  <p:clrMapOvr>
+    <a:masterClrMapping/>
+  </p:clrMapOvr>
+</p:sld>
+</file>
+
+<file path=ppt/slides/slide42.xml><?xml version="1.0" encoding="utf-8"?>
+<p:sld xmlns:a="http://schemas.openxmlformats.org/drawingml/2006/main" xmlns:r="http://schemas.openxmlformats.org/officeDocument/2006/relationships" xmlns:p="http://schemas.openxmlformats.org/presentationml/2006/main">
+  <p:cSld>
+    <p:spTree>
+      <p:nvGrpSpPr>
+        <p:cNvPr id="1" name=""/>
+        <p:cNvGrpSpPr/>
+        <p:nvPr/>
+      </p:nvGrpSpPr>
+      <p:grpSpPr>
+        <a:xfrm>
+          <a:off x="0" y="0"/>
+          <a:ext cx="0" cy="0"/>
+          <a:chOff x="0" y="0"/>
+          <a:chExt cx="0" cy="0"/>
+        </a:xfrm>
+      </p:grpSpPr>
+      <p:graphicFrame>
+        <p:nvGraphicFramePr>
+          <p:cNvPr id="2" name="Table 1">
+            <a:extLst>
+              <a:ext uri="{FF2B5EF4-FFF2-40B4-BE49-F238E27FC236}">
+                <a16:creationId xmlns:a16="http://schemas.microsoft.com/office/drawing/2014/main" id="{E278D47B-FC93-1D32-C404-959528FC9675}"/>
+              </a:ext>
+            </a:extLst>
+          </p:cNvPr>
+          <p:cNvGraphicFramePr>
+            <a:graphicFrameLocks noGrp="1"/>
+          </p:cNvGraphicFramePr>
+          <p:nvPr>
+            <p:extLst>
+              <p:ext uri="{D42A27DB-BD31-4B8C-83A1-F6EECF244321}">
+                <p14:modId xmlns:p14="http://schemas.microsoft.com/office/powerpoint/2010/main" val="1741846873"/>
+              </p:ext>
+            </p:extLst>
+          </p:nvPr>
+        </p:nvGraphicFramePr>
+        <p:xfrm>
+          <a:off x="1125682" y="105988"/>
+          <a:ext cx="9940636" cy="6087684"/>
+        </p:xfrm>
+        <a:graphic>
+          <a:graphicData uri="http://schemas.openxmlformats.org/drawingml/2006/table">
+            <a:tbl>
+              <a:tblPr firstRow="1" bandRow="1">
+                <a:tableStyleId>{5C22544A-7EE6-4342-B048-85BDC9FD1C3A}</a:tableStyleId>
+              </a:tblPr>
+              <a:tblGrid>
+                <a:gridCol w="2485159">
+                  <a:extLst>
+                    <a:ext uri="{9D8B030D-6E8A-4147-A177-3AD203B41FA5}">
+                      <a16:colId xmlns:a16="http://schemas.microsoft.com/office/drawing/2014/main" val="4215559265"/>
+                    </a:ext>
+                  </a:extLst>
+                </a:gridCol>
+                <a:gridCol w="2485159">
+                  <a:extLst>
+                    <a:ext uri="{9D8B030D-6E8A-4147-A177-3AD203B41FA5}">
+                      <a16:colId xmlns:a16="http://schemas.microsoft.com/office/drawing/2014/main" val="2002386934"/>
+                    </a:ext>
+                  </a:extLst>
+                </a:gridCol>
+                <a:gridCol w="2485159">
+                  <a:extLst>
+                    <a:ext uri="{9D8B030D-6E8A-4147-A177-3AD203B41FA5}">
+                      <a16:colId xmlns:a16="http://schemas.microsoft.com/office/drawing/2014/main" val="3592116414"/>
+                    </a:ext>
+                  </a:extLst>
+                </a:gridCol>
+                <a:gridCol w="2485159">
+                  <a:extLst>
+                    <a:ext uri="{9D8B030D-6E8A-4147-A177-3AD203B41FA5}">
+                      <a16:colId xmlns:a16="http://schemas.microsoft.com/office/drawing/2014/main" val="1928638502"/>
+                    </a:ext>
+                  </a:extLst>
+                </a:gridCol>
+              </a:tblGrid>
+              <a:tr h="1179021">
+                <a:tc>
+                  <a:txBody>
+                    <a:bodyPr/>
+                    <a:lstStyle/>
+                    <a:p>
+                      <a:pPr algn="ctr"/>
+                      <a:r>
+                        <a:rPr lang="en-US" sz="2800" b="1" dirty="0">
+                          <a:latin typeface="Franklin Gothic Medium Cond" panose="020B0606030402020204" pitchFamily="34" charset="0"/>
+                        </a:rPr>
+                        <a:t>VARIABLE</a:t>
+                      </a:r>
+                    </a:p>
+                  </a:txBody>
+                  <a:tcPr anchor="ctr"/>
+                </a:tc>
+                <a:tc>
+                  <a:txBody>
+                    <a:bodyPr/>
+                    <a:lstStyle/>
+                    <a:p>
+                      <a:pPr algn="ctr"/>
+                      <a:r>
+                        <a:rPr lang="en-US" sz="2800" dirty="0">
+                          <a:latin typeface="Franklin Gothic Medium Cond" panose="020B0606030402020204" pitchFamily="34" charset="0"/>
+                        </a:rPr>
+                        <a:t>NO TARIFF</a:t>
+                      </a:r>
+                    </a:p>
+                  </a:txBody>
+                  <a:tcPr anchor="ctr"/>
+                </a:tc>
+                <a:tc>
+                  <a:txBody>
+                    <a:bodyPr/>
+                    <a:lstStyle/>
+                    <a:p>
+                      <a:pPr algn="ctr"/>
+                      <a:r>
+                        <a:rPr lang="en-US" sz="2800" dirty="0">
+                          <a:latin typeface="Franklin Gothic Medium Cond" panose="020B0606030402020204" pitchFamily="34" charset="0"/>
+                        </a:rPr>
+                        <a:t>40% TARIFF ON FINAL GOOD</a:t>
+                      </a:r>
+                    </a:p>
+                  </a:txBody>
+                  <a:tcPr anchor="ctr"/>
+                </a:tc>
+                <a:tc>
+                  <a:txBody>
+                    <a:bodyPr/>
+                    <a:lstStyle/>
+                    <a:p>
+                      <a:pPr algn="ctr"/>
+                      <a:r>
+                        <a:rPr lang="en-US" sz="2800" dirty="0">
+                          <a:latin typeface="Franklin Gothic Medium Cond" panose="020B0606030402020204" pitchFamily="34" charset="0"/>
+                        </a:rPr>
+                        <a:t>+10% TARIFF, INTERMEDIATE GOOD</a:t>
+                      </a:r>
+                    </a:p>
+                  </a:txBody>
+                  <a:tcPr anchor="ctr"/>
+                </a:tc>
+                <a:extLst>
+                  <a:ext uri="{0D108BD9-81ED-4DB2-BD59-A6C34878D82A}">
+                    <a16:rowId xmlns:a16="http://schemas.microsoft.com/office/drawing/2014/main" val="3858227597"/>
+                  </a:ext>
+                </a:extLst>
+              </a:tr>
+              <a:tr h="1179021">
+                <a:tc>
+                  <a:txBody>
+                    <a:bodyPr/>
+                    <a:lstStyle/>
+                    <a:p>
+                      <a:r>
+                        <a:rPr lang="en-US" sz="2800" dirty="0">
+                          <a:latin typeface="Franklin Gothic Medium Cond" panose="020B0606030402020204" pitchFamily="34" charset="0"/>
+                        </a:rPr>
+                        <a:t>DOMESTIC PRICE OF GOOD</a:t>
+                      </a:r>
+                    </a:p>
+                  </a:txBody>
+                  <a:tcPr anchor="ctr"/>
+                </a:tc>
+                <a:tc>
+                  <a:txBody>
+                    <a:bodyPr/>
+                    <a:lstStyle/>
+                    <a:p>
+                      <a:pPr algn="ctr"/>
+                      <a:r>
+                        <a:rPr lang="en-US" sz="4000" dirty="0">
+                          <a:latin typeface="Franklin Gothic Medium Cond" panose="020B0606030402020204" pitchFamily="34" charset="0"/>
+                        </a:rPr>
+                        <a:t>5,000</a:t>
+                      </a:r>
+                    </a:p>
+                  </a:txBody>
+                  <a:tcPr anchor="ctr"/>
+                </a:tc>
+                <a:tc>
+                  <a:txBody>
+                    <a:bodyPr/>
+                    <a:lstStyle/>
+                    <a:p>
+                      <a:pPr algn="ctr"/>
+                      <a:endParaRPr lang="en-US" sz="4000" dirty="0">
+                        <a:latin typeface="Franklin Gothic Medium Cond" panose="020B0606030402020204" pitchFamily="34" charset="0"/>
+                      </a:endParaRPr>
+                    </a:p>
+                  </a:txBody>
+                  <a:tcPr anchor="ctr"/>
+                </a:tc>
+                <a:tc>
+                  <a:txBody>
+                    <a:bodyPr/>
+                    <a:lstStyle/>
+                    <a:p>
+                      <a:pPr algn="ctr"/>
+                      <a:endParaRPr lang="en-US" sz="4000" dirty="0">
+                        <a:latin typeface="Franklin Gothic Medium Cond" panose="020B0606030402020204" pitchFamily="34" charset="0"/>
+                      </a:endParaRPr>
+                    </a:p>
+                  </a:txBody>
+                  <a:tcPr anchor="ctr"/>
+                </a:tc>
+                <a:extLst>
+                  <a:ext uri="{0D108BD9-81ED-4DB2-BD59-A6C34878D82A}">
+                    <a16:rowId xmlns:a16="http://schemas.microsoft.com/office/drawing/2014/main" val="992890936"/>
+                  </a:ext>
+                </a:extLst>
+              </a:tr>
+              <a:tr h="1179021">
+                <a:tc>
+                  <a:txBody>
+                    <a:bodyPr/>
+                    <a:lstStyle/>
+                    <a:p>
+                      <a:r>
+                        <a:rPr lang="en-US" sz="2800" dirty="0">
+                          <a:latin typeface="Franklin Gothic Medium Cond" panose="020B0606030402020204" pitchFamily="34" charset="0"/>
+                        </a:rPr>
+                        <a:t>VALUE OF IMPORTED INPUT</a:t>
+                      </a:r>
+                    </a:p>
+                  </a:txBody>
+                  <a:tcPr anchor="ctr"/>
+                </a:tc>
+                <a:tc>
+                  <a:txBody>
+                    <a:bodyPr/>
+                    <a:lstStyle/>
+                    <a:p>
+                      <a:pPr algn="ctr"/>
+                      <a:r>
+                        <a:rPr lang="en-US" sz="4000" dirty="0">
+                          <a:latin typeface="Franklin Gothic Medium Cond" panose="020B0606030402020204" pitchFamily="34" charset="0"/>
+                        </a:rPr>
+                        <a:t>400</a:t>
+                      </a:r>
+                    </a:p>
+                  </a:txBody>
+                  <a:tcPr anchor="ctr"/>
+                </a:tc>
+                <a:tc>
+                  <a:txBody>
+                    <a:bodyPr/>
+                    <a:lstStyle/>
+                    <a:p>
+                      <a:pPr algn="ctr"/>
+                      <a:endParaRPr lang="en-US" sz="4000" dirty="0">
+                        <a:latin typeface="Franklin Gothic Medium Cond" panose="020B0606030402020204" pitchFamily="34" charset="0"/>
+                      </a:endParaRPr>
+                    </a:p>
+                  </a:txBody>
+                  <a:tcPr anchor="ctr"/>
+                </a:tc>
+                <a:tc>
+                  <a:txBody>
+                    <a:bodyPr/>
+                    <a:lstStyle/>
+                    <a:p>
+                      <a:pPr algn="ctr"/>
+                      <a:endParaRPr lang="en-US" sz="4000" dirty="0">
+                        <a:latin typeface="Franklin Gothic Medium Cond" panose="020B0606030402020204" pitchFamily="34" charset="0"/>
+                      </a:endParaRPr>
+                    </a:p>
+                  </a:txBody>
+                  <a:tcPr anchor="ctr"/>
+                </a:tc>
+                <a:extLst>
+                  <a:ext uri="{0D108BD9-81ED-4DB2-BD59-A6C34878D82A}">
+                    <a16:rowId xmlns:a16="http://schemas.microsoft.com/office/drawing/2014/main" val="965898327"/>
+                  </a:ext>
+                </a:extLst>
+              </a:tr>
+              <a:tr h="1179021">
+                <a:tc>
+                  <a:txBody>
+                    <a:bodyPr/>
+                    <a:lstStyle/>
+                    <a:p>
+                      <a:r>
+                        <a:rPr lang="en-US" sz="2800" dirty="0">
+                          <a:latin typeface="Franklin Gothic Medium Cond" panose="020B0606030402020204" pitchFamily="34" charset="0"/>
+                        </a:rPr>
+                        <a:t>DOMESTIC VALUE-ADDED</a:t>
+                      </a:r>
+                    </a:p>
+                  </a:txBody>
+                  <a:tcPr anchor="ctr"/>
+                </a:tc>
+                <a:tc>
+                  <a:txBody>
+                    <a:bodyPr/>
+                    <a:lstStyle/>
+                    <a:p>
+                      <a:pPr algn="ctr"/>
+                      <a:r>
+                        <a:rPr lang="en-US" sz="4000" dirty="0">
+                          <a:latin typeface="Franklin Gothic Medium Cond" panose="020B0606030402020204" pitchFamily="34" charset="0"/>
+                        </a:rPr>
+                        <a:t>4,600</a:t>
+                      </a:r>
+                    </a:p>
+                  </a:txBody>
+                  <a:tcPr anchor="ctr"/>
+                </a:tc>
+                <a:tc>
+                  <a:txBody>
+                    <a:bodyPr/>
+                    <a:lstStyle/>
+                    <a:p>
+                      <a:pPr algn="ctr"/>
+                      <a:endParaRPr lang="en-US" sz="4000">
+                        <a:latin typeface="Franklin Gothic Medium Cond" panose="020B0606030402020204" pitchFamily="34" charset="0"/>
+                      </a:endParaRPr>
+                    </a:p>
+                  </a:txBody>
+                  <a:tcPr anchor="ctr"/>
+                </a:tc>
+                <a:tc>
+                  <a:txBody>
+                    <a:bodyPr/>
+                    <a:lstStyle/>
+                    <a:p>
+                      <a:pPr algn="ctr"/>
+                      <a:endParaRPr lang="en-US" sz="4000" dirty="0">
+                        <a:latin typeface="Franklin Gothic Medium Cond" panose="020B0606030402020204" pitchFamily="34" charset="0"/>
+                      </a:endParaRPr>
+                    </a:p>
+                  </a:txBody>
+                  <a:tcPr anchor="ctr"/>
+                </a:tc>
+                <a:extLst>
+                  <a:ext uri="{0D108BD9-81ED-4DB2-BD59-A6C34878D82A}">
+                    <a16:rowId xmlns:a16="http://schemas.microsoft.com/office/drawing/2014/main" val="1252150911"/>
+                  </a:ext>
+                </a:extLst>
+              </a:tr>
+              <a:tr h="1179021">
+                <a:tc>
+                  <a:txBody>
+                    <a:bodyPr/>
+                    <a:lstStyle/>
+                    <a:p>
+                      <a:r>
+                        <a:rPr lang="en-US" sz="2800" dirty="0">
+                          <a:latin typeface="Franklin Gothic Medium Cond" panose="020B0606030402020204" pitchFamily="34" charset="0"/>
+                        </a:rPr>
+                        <a:t>EFFECTIVE RP, %</a:t>
+                      </a:r>
+                    </a:p>
+                  </a:txBody>
+                  <a:tcPr anchor="ctr"/>
+                </a:tc>
+                <a:tc>
+                  <a:txBody>
+                    <a:bodyPr/>
+                    <a:lstStyle/>
+                    <a:p>
+                      <a:pPr algn="ctr"/>
+                      <a:r>
+                        <a:rPr lang="en-US" sz="4000" dirty="0">
+                          <a:latin typeface="Franklin Gothic Medium Cond" panose="020B0606030402020204" pitchFamily="34" charset="0"/>
+                        </a:rPr>
+                        <a:t>0</a:t>
+                      </a:r>
+                    </a:p>
+                  </a:txBody>
+                  <a:tcPr anchor="ctr"/>
+                </a:tc>
+                <a:tc>
+                  <a:txBody>
+                    <a:bodyPr/>
+                    <a:lstStyle/>
+                    <a:p>
+                      <a:pPr algn="ctr"/>
+                      <a:endParaRPr lang="en-US" sz="4000">
+                        <a:latin typeface="Franklin Gothic Medium Cond" panose="020B0606030402020204" pitchFamily="34" charset="0"/>
+                      </a:endParaRPr>
+                    </a:p>
+                  </a:txBody>
+                  <a:tcPr anchor="ctr"/>
+                </a:tc>
+                <a:tc>
+                  <a:txBody>
+                    <a:bodyPr/>
+                    <a:lstStyle/>
+                    <a:p>
+                      <a:pPr algn="ctr"/>
+                      <a:endParaRPr lang="en-US" sz="4000" dirty="0">
+                        <a:latin typeface="Franklin Gothic Medium Cond" panose="020B0606030402020204" pitchFamily="34" charset="0"/>
+                      </a:endParaRPr>
+                    </a:p>
+                  </a:txBody>
+                  <a:tcPr anchor="ctr"/>
+                </a:tc>
+                <a:extLst>
+                  <a:ext uri="{0D108BD9-81ED-4DB2-BD59-A6C34878D82A}">
+                    <a16:rowId xmlns:a16="http://schemas.microsoft.com/office/drawing/2014/main" val="2405215946"/>
+                  </a:ext>
+                </a:extLst>
+              </a:tr>
+            </a:tbl>
+          </a:graphicData>
+        </a:graphic>
+      </p:graphicFrame>
+    </p:spTree>
+    <p:extLst>
+      <p:ext uri="{BB962C8B-B14F-4D97-AF65-F5344CB8AC3E}">
+        <p14:creationId xmlns:p14="http://schemas.microsoft.com/office/powerpoint/2010/main" val="2168021195"/>
+      </p:ext>
+    </p:extLst>
+  </p:cSld>
+  <p:clrMapOvr>
+    <a:masterClrMapping/>
+  </p:clrMapOvr>
+</p:sld>
+</file>
+
+<file path=ppt/slides/slide43.xml><?xml version="1.0" encoding="utf-8"?>
+<p:sld xmlns:a="http://schemas.openxmlformats.org/drawingml/2006/main" xmlns:r="http://schemas.openxmlformats.org/officeDocument/2006/relationships" xmlns:p="http://schemas.openxmlformats.org/presentationml/2006/main">
+  <p:cSld>
+    <p:spTree>
+      <p:nvGrpSpPr>
+        <p:cNvPr id="1" name="">
+          <a:extLst>
+            <a:ext uri="{FF2B5EF4-FFF2-40B4-BE49-F238E27FC236}">
+              <a16:creationId xmlns:a16="http://schemas.microsoft.com/office/drawing/2014/main" id="{DEB58884-E486-60B6-8972-6947B4F4AA7F}"/>
+            </a:ext>
+          </a:extLst>
+        </p:cNvPr>
+        <p:cNvGrpSpPr/>
+        <p:nvPr/>
+      </p:nvGrpSpPr>
+      <p:grpSpPr>
+        <a:xfrm>
+          <a:off x="0" y="0"/>
+          <a:ext cx="0" cy="0"/>
+          <a:chOff x="0" y="0"/>
+          <a:chExt cx="0" cy="0"/>
+        </a:xfrm>
+      </p:grpSpPr>
+      <p:graphicFrame>
+        <p:nvGraphicFramePr>
+          <p:cNvPr id="2" name="Table 1">
+            <a:extLst>
+              <a:ext uri="{FF2B5EF4-FFF2-40B4-BE49-F238E27FC236}">
+                <a16:creationId xmlns:a16="http://schemas.microsoft.com/office/drawing/2014/main" id="{2198A65E-6E7E-3197-629C-01588684A792}"/>
+              </a:ext>
+            </a:extLst>
+          </p:cNvPr>
+          <p:cNvGraphicFramePr>
+            <a:graphicFrameLocks noGrp="1"/>
+          </p:cNvGraphicFramePr>
+          <p:nvPr>
+            <p:extLst>
+              <p:ext uri="{D42A27DB-BD31-4B8C-83A1-F6EECF244321}">
+                <p14:modId xmlns:p14="http://schemas.microsoft.com/office/powerpoint/2010/main" val="1185481319"/>
+              </p:ext>
+            </p:extLst>
+          </p:nvPr>
+        </p:nvGraphicFramePr>
+        <p:xfrm>
+          <a:off x="1125682" y="105988"/>
+          <a:ext cx="9940636" cy="6087684"/>
+        </p:xfrm>
+        <a:graphic>
+          <a:graphicData uri="http://schemas.openxmlformats.org/drawingml/2006/table">
+            <a:tbl>
+              <a:tblPr firstRow="1" bandRow="1">
+                <a:tableStyleId>{5C22544A-7EE6-4342-B048-85BDC9FD1C3A}</a:tableStyleId>
+              </a:tblPr>
+              <a:tblGrid>
+                <a:gridCol w="2485159">
+                  <a:extLst>
+                    <a:ext uri="{9D8B030D-6E8A-4147-A177-3AD203B41FA5}">
+                      <a16:colId xmlns:a16="http://schemas.microsoft.com/office/drawing/2014/main" val="4215559265"/>
+                    </a:ext>
+                  </a:extLst>
+                </a:gridCol>
+                <a:gridCol w="2485159">
+                  <a:extLst>
+                    <a:ext uri="{9D8B030D-6E8A-4147-A177-3AD203B41FA5}">
+                      <a16:colId xmlns:a16="http://schemas.microsoft.com/office/drawing/2014/main" val="2002386934"/>
+                    </a:ext>
+                  </a:extLst>
+                </a:gridCol>
+                <a:gridCol w="2485159">
+                  <a:extLst>
+                    <a:ext uri="{9D8B030D-6E8A-4147-A177-3AD203B41FA5}">
+                      <a16:colId xmlns:a16="http://schemas.microsoft.com/office/drawing/2014/main" val="3592116414"/>
+                    </a:ext>
+                  </a:extLst>
+                </a:gridCol>
+                <a:gridCol w="2485159">
+                  <a:extLst>
+                    <a:ext uri="{9D8B030D-6E8A-4147-A177-3AD203B41FA5}">
+                      <a16:colId xmlns:a16="http://schemas.microsoft.com/office/drawing/2014/main" val="1928638502"/>
+                    </a:ext>
+                  </a:extLst>
+                </a:gridCol>
+              </a:tblGrid>
+              <a:tr h="1179021">
+                <a:tc>
+                  <a:txBody>
+                    <a:bodyPr/>
+                    <a:lstStyle/>
+                    <a:p>
+                      <a:pPr algn="ctr"/>
+                      <a:r>
+                        <a:rPr lang="en-US" sz="2800" b="1" dirty="0">
+                          <a:latin typeface="Franklin Gothic Medium Cond" panose="020B0606030402020204" pitchFamily="34" charset="0"/>
+                        </a:rPr>
+                        <a:t>VARIABLE</a:t>
+                      </a:r>
+                    </a:p>
+                  </a:txBody>
+                  <a:tcPr anchor="ctr"/>
+                </a:tc>
+                <a:tc>
+                  <a:txBody>
+                    <a:bodyPr/>
+                    <a:lstStyle/>
+                    <a:p>
+                      <a:pPr algn="ctr"/>
+                      <a:r>
+                        <a:rPr lang="en-US" sz="2800" dirty="0">
+                          <a:latin typeface="Franklin Gothic Medium Cond" panose="020B0606030402020204" pitchFamily="34" charset="0"/>
+                        </a:rPr>
+                        <a:t>NO TARIFF</a:t>
+                      </a:r>
+                    </a:p>
+                  </a:txBody>
+                  <a:tcPr anchor="ctr"/>
+                </a:tc>
+                <a:tc>
+                  <a:txBody>
+                    <a:bodyPr/>
+                    <a:lstStyle/>
+                    <a:p>
+                      <a:pPr algn="ctr"/>
+                      <a:r>
+                        <a:rPr lang="en-US" sz="2800" dirty="0">
+                          <a:latin typeface="Franklin Gothic Medium Cond" panose="020B0606030402020204" pitchFamily="34" charset="0"/>
+                        </a:rPr>
+                        <a:t>40% TARIFF ON FINAL GOOD</a:t>
+                      </a:r>
+                    </a:p>
+                  </a:txBody>
+                  <a:tcPr anchor="ctr"/>
+                </a:tc>
+                <a:tc>
+                  <a:txBody>
+                    <a:bodyPr/>
+                    <a:lstStyle/>
+                    <a:p>
+                      <a:pPr algn="ctr"/>
+                      <a:r>
+                        <a:rPr lang="en-US" sz="2800" dirty="0">
+                          <a:latin typeface="Franklin Gothic Medium Cond" panose="020B0606030402020204" pitchFamily="34" charset="0"/>
+                        </a:rPr>
+                        <a:t>+10% TARIFF, INTERMEDIATE GOOD</a:t>
+                      </a:r>
+                    </a:p>
+                  </a:txBody>
+                  <a:tcPr anchor="ctr"/>
+                </a:tc>
+                <a:extLst>
+                  <a:ext uri="{0D108BD9-81ED-4DB2-BD59-A6C34878D82A}">
+                    <a16:rowId xmlns:a16="http://schemas.microsoft.com/office/drawing/2014/main" val="3858227597"/>
+                  </a:ext>
+                </a:extLst>
+              </a:tr>
+              <a:tr h="1179021">
+                <a:tc>
+                  <a:txBody>
+                    <a:bodyPr/>
+                    <a:lstStyle/>
+                    <a:p>
+                      <a:r>
+                        <a:rPr lang="en-US" sz="2800" dirty="0">
+                          <a:latin typeface="Franklin Gothic Medium Cond" panose="020B0606030402020204" pitchFamily="34" charset="0"/>
+                        </a:rPr>
+                        <a:t>DOMESTIC PRICE OF GOOD</a:t>
+                      </a:r>
+                    </a:p>
+                  </a:txBody>
+                  <a:tcPr anchor="ctr"/>
+                </a:tc>
+                <a:tc>
+                  <a:txBody>
+                    <a:bodyPr/>
+                    <a:lstStyle/>
+                    <a:p>
+                      <a:pPr algn="ctr"/>
+                      <a:r>
+                        <a:rPr lang="en-US" sz="4000" dirty="0">
+                          <a:latin typeface="Franklin Gothic Medium Cond" panose="020B0606030402020204" pitchFamily="34" charset="0"/>
+                        </a:rPr>
+                        <a:t>5,000</a:t>
+                      </a:r>
+                    </a:p>
+                  </a:txBody>
+                  <a:tcPr anchor="ctr"/>
+                </a:tc>
+                <a:tc>
+                  <a:txBody>
+                    <a:bodyPr/>
+                    <a:lstStyle/>
+                    <a:p>
+                      <a:pPr algn="ctr"/>
+                      <a:r>
+                        <a:rPr lang="en-US" sz="4000" dirty="0">
+                          <a:latin typeface="Franklin Gothic Medium Cond" panose="020B0606030402020204" pitchFamily="34" charset="0"/>
+                        </a:rPr>
+                        <a:t>7,000</a:t>
+                      </a:r>
+                    </a:p>
+                  </a:txBody>
+                  <a:tcPr anchor="ctr"/>
+                </a:tc>
+                <a:tc>
+                  <a:txBody>
+                    <a:bodyPr/>
+                    <a:lstStyle/>
+                    <a:p>
+                      <a:pPr algn="ctr"/>
+                      <a:endParaRPr lang="en-US" sz="4000" dirty="0">
+                        <a:latin typeface="Franklin Gothic Medium Cond" panose="020B0606030402020204" pitchFamily="34" charset="0"/>
+                      </a:endParaRPr>
+                    </a:p>
+                  </a:txBody>
+                  <a:tcPr anchor="ctr"/>
+                </a:tc>
+                <a:extLst>
+                  <a:ext uri="{0D108BD9-81ED-4DB2-BD59-A6C34878D82A}">
+                    <a16:rowId xmlns:a16="http://schemas.microsoft.com/office/drawing/2014/main" val="992890936"/>
+                  </a:ext>
+                </a:extLst>
+              </a:tr>
+              <a:tr h="1179021">
+                <a:tc>
+                  <a:txBody>
+                    <a:bodyPr/>
+                    <a:lstStyle/>
+                    <a:p>
+                      <a:r>
+                        <a:rPr lang="en-US" sz="2800" dirty="0">
+                          <a:latin typeface="Franklin Gothic Medium Cond" panose="020B0606030402020204" pitchFamily="34" charset="0"/>
+                        </a:rPr>
+                        <a:t>VALUE OF IMPORTED INPUT</a:t>
+                      </a:r>
+                    </a:p>
+                  </a:txBody>
+                  <a:tcPr anchor="ctr"/>
+                </a:tc>
+                <a:tc>
+                  <a:txBody>
+                    <a:bodyPr/>
+                    <a:lstStyle/>
+                    <a:p>
+                      <a:pPr algn="ctr"/>
+                      <a:r>
+                        <a:rPr lang="en-US" sz="4000" dirty="0">
+                          <a:latin typeface="Franklin Gothic Medium Cond" panose="020B0606030402020204" pitchFamily="34" charset="0"/>
+                        </a:rPr>
+                        <a:t>400</a:t>
+                      </a:r>
+                    </a:p>
+                  </a:txBody>
+                  <a:tcPr anchor="ctr"/>
+                </a:tc>
+                <a:tc>
+                  <a:txBody>
+                    <a:bodyPr/>
+                    <a:lstStyle/>
+                    <a:p>
+                      <a:pPr algn="ctr"/>
+                      <a:r>
+                        <a:rPr lang="en-US" sz="4000" dirty="0">
+                          <a:latin typeface="Franklin Gothic Medium Cond" panose="020B0606030402020204" pitchFamily="34" charset="0"/>
+                        </a:rPr>
+                        <a:t>400</a:t>
+                      </a:r>
+                    </a:p>
+                  </a:txBody>
+                  <a:tcPr anchor="ctr"/>
+                </a:tc>
+                <a:tc>
+                  <a:txBody>
+                    <a:bodyPr/>
+                    <a:lstStyle/>
+                    <a:p>
+                      <a:pPr algn="ctr"/>
+                      <a:endParaRPr lang="en-US" sz="4000" dirty="0">
+                        <a:latin typeface="Franklin Gothic Medium Cond" panose="020B0606030402020204" pitchFamily="34" charset="0"/>
+                      </a:endParaRPr>
+                    </a:p>
+                  </a:txBody>
+                  <a:tcPr anchor="ctr"/>
+                </a:tc>
+                <a:extLst>
+                  <a:ext uri="{0D108BD9-81ED-4DB2-BD59-A6C34878D82A}">
+                    <a16:rowId xmlns:a16="http://schemas.microsoft.com/office/drawing/2014/main" val="965898327"/>
+                  </a:ext>
+                </a:extLst>
+              </a:tr>
+              <a:tr h="1179021">
+                <a:tc>
+                  <a:txBody>
+                    <a:bodyPr/>
+                    <a:lstStyle/>
+                    <a:p>
+                      <a:r>
+                        <a:rPr lang="en-US" sz="2800" dirty="0">
+                          <a:latin typeface="Franklin Gothic Medium Cond" panose="020B0606030402020204" pitchFamily="34" charset="0"/>
+                        </a:rPr>
+                        <a:t>DOMESTIC VALUE-ADDED</a:t>
+                      </a:r>
+                    </a:p>
+                  </a:txBody>
+                  <a:tcPr anchor="ctr"/>
+                </a:tc>
+                <a:tc>
+                  <a:txBody>
+                    <a:bodyPr/>
+                    <a:lstStyle/>
+                    <a:p>
+                      <a:pPr algn="ctr"/>
+                      <a:r>
+                        <a:rPr lang="en-US" sz="4000" dirty="0">
+                          <a:latin typeface="Franklin Gothic Medium Cond" panose="020B0606030402020204" pitchFamily="34" charset="0"/>
+                        </a:rPr>
+                        <a:t>4,600</a:t>
+                      </a:r>
+                    </a:p>
+                  </a:txBody>
+                  <a:tcPr anchor="ctr"/>
+                </a:tc>
+                <a:tc>
+                  <a:txBody>
+                    <a:bodyPr/>
+                    <a:lstStyle/>
+                    <a:p>
+                      <a:pPr algn="ctr"/>
+                      <a:r>
+                        <a:rPr lang="en-US" sz="4000" dirty="0">
+                          <a:latin typeface="Franklin Gothic Medium Cond" panose="020B0606030402020204" pitchFamily="34" charset="0"/>
+                        </a:rPr>
+                        <a:t>6,600</a:t>
+                      </a:r>
+                    </a:p>
+                  </a:txBody>
+                  <a:tcPr anchor="ctr"/>
+                </a:tc>
+                <a:tc>
+                  <a:txBody>
+                    <a:bodyPr/>
+                    <a:lstStyle/>
+                    <a:p>
+                      <a:pPr algn="ctr"/>
+                      <a:endParaRPr lang="en-US" sz="4000" dirty="0">
+                        <a:latin typeface="Franklin Gothic Medium Cond" panose="020B0606030402020204" pitchFamily="34" charset="0"/>
+                      </a:endParaRPr>
+                    </a:p>
+                  </a:txBody>
+                  <a:tcPr anchor="ctr"/>
+                </a:tc>
+                <a:extLst>
+                  <a:ext uri="{0D108BD9-81ED-4DB2-BD59-A6C34878D82A}">
+                    <a16:rowId xmlns:a16="http://schemas.microsoft.com/office/drawing/2014/main" val="1252150911"/>
+                  </a:ext>
+                </a:extLst>
+              </a:tr>
+              <a:tr h="1179021">
+                <a:tc>
+                  <a:txBody>
+                    <a:bodyPr/>
+                    <a:lstStyle/>
+                    <a:p>
+                      <a:r>
+                        <a:rPr lang="en-US" sz="2800" dirty="0">
+                          <a:latin typeface="Franklin Gothic Medium Cond" panose="020B0606030402020204" pitchFamily="34" charset="0"/>
+                        </a:rPr>
+                        <a:t>EFFECTIVE RP, %</a:t>
+                      </a:r>
+                    </a:p>
+                  </a:txBody>
+                  <a:tcPr anchor="ctr"/>
+                </a:tc>
+                <a:tc>
+                  <a:txBody>
+                    <a:bodyPr/>
+                    <a:lstStyle/>
+                    <a:p>
+                      <a:pPr algn="ctr"/>
+                      <a:r>
+                        <a:rPr lang="en-US" sz="4000" dirty="0">
+                          <a:latin typeface="Franklin Gothic Medium Cond" panose="020B0606030402020204" pitchFamily="34" charset="0"/>
+                        </a:rPr>
+                        <a:t>0</a:t>
+                      </a:r>
+                    </a:p>
+                  </a:txBody>
+                  <a:tcPr anchor="ctr"/>
+                </a:tc>
+                <a:tc>
+                  <a:txBody>
+                    <a:bodyPr/>
+                    <a:lstStyle/>
+                    <a:p>
+                      <a:pPr algn="ctr"/>
+                      <a:r>
+                        <a:rPr lang="en-US" sz="4000" dirty="0">
+                          <a:latin typeface="Franklin Gothic Medium Cond" panose="020B0606030402020204" pitchFamily="34" charset="0"/>
+                        </a:rPr>
+                        <a:t>43.5</a:t>
+                      </a:r>
+                    </a:p>
+                  </a:txBody>
+                  <a:tcPr anchor="ctr"/>
+                </a:tc>
+                <a:tc>
+                  <a:txBody>
+                    <a:bodyPr/>
+                    <a:lstStyle/>
+                    <a:p>
+                      <a:pPr algn="ctr"/>
+                      <a:endParaRPr lang="en-US" sz="4000" dirty="0">
+                        <a:latin typeface="Franklin Gothic Medium Cond" panose="020B0606030402020204" pitchFamily="34" charset="0"/>
+                      </a:endParaRPr>
+                    </a:p>
+                  </a:txBody>
+                  <a:tcPr anchor="ctr"/>
+                </a:tc>
+                <a:extLst>
+                  <a:ext uri="{0D108BD9-81ED-4DB2-BD59-A6C34878D82A}">
+                    <a16:rowId xmlns:a16="http://schemas.microsoft.com/office/drawing/2014/main" val="2405215946"/>
+                  </a:ext>
+                </a:extLst>
+              </a:tr>
+            </a:tbl>
+          </a:graphicData>
+        </a:graphic>
+      </p:graphicFrame>
+    </p:spTree>
+    <p:extLst>
+      <p:ext uri="{BB962C8B-B14F-4D97-AF65-F5344CB8AC3E}">
+        <p14:creationId xmlns:p14="http://schemas.microsoft.com/office/powerpoint/2010/main" val="3792864269"/>
+      </p:ext>
+    </p:extLst>
+  </p:cSld>
+  <p:clrMapOvr>
+    <a:masterClrMapping/>
+  </p:clrMapOvr>
+</p:sld>
+</file>
+
+<file path=ppt/slides/slide44.xml><?xml version="1.0" encoding="utf-8"?>
+<p:sld xmlns:a="http://schemas.openxmlformats.org/drawingml/2006/main" xmlns:r="http://schemas.openxmlformats.org/officeDocument/2006/relationships" xmlns:p="http://schemas.openxmlformats.org/presentationml/2006/main">
+  <p:cSld>
+    <p:spTree>
+      <p:nvGrpSpPr>
+        <p:cNvPr id="1" name="">
+          <a:extLst>
+            <a:ext uri="{FF2B5EF4-FFF2-40B4-BE49-F238E27FC236}">
+              <a16:creationId xmlns:a16="http://schemas.microsoft.com/office/drawing/2014/main" id="{6D59D0BE-6E7E-39EB-E6FD-7A7FAA139348}"/>
+            </a:ext>
+          </a:extLst>
+        </p:cNvPr>
+        <p:cNvGrpSpPr/>
+        <p:nvPr/>
+      </p:nvGrpSpPr>
+      <p:grpSpPr>
+        <a:xfrm>
+          <a:off x="0" y="0"/>
+          <a:ext cx="0" cy="0"/>
+          <a:chOff x="0" y="0"/>
+          <a:chExt cx="0" cy="0"/>
+        </a:xfrm>
+      </p:grpSpPr>
+      <p:graphicFrame>
+        <p:nvGraphicFramePr>
+          <p:cNvPr id="2" name="Table 1">
+            <a:extLst>
+              <a:ext uri="{FF2B5EF4-FFF2-40B4-BE49-F238E27FC236}">
+                <a16:creationId xmlns:a16="http://schemas.microsoft.com/office/drawing/2014/main" id="{438629D2-17E6-676B-2546-94A3AD5B7C90}"/>
+              </a:ext>
+            </a:extLst>
+          </p:cNvPr>
+          <p:cNvGraphicFramePr>
+            <a:graphicFrameLocks noGrp="1"/>
+          </p:cNvGraphicFramePr>
+          <p:nvPr>
+            <p:extLst>
+              <p:ext uri="{D42A27DB-BD31-4B8C-83A1-F6EECF244321}">
+                <p14:modId xmlns:p14="http://schemas.microsoft.com/office/powerpoint/2010/main" val="2884106694"/>
+              </p:ext>
+            </p:extLst>
+          </p:nvPr>
+        </p:nvGraphicFramePr>
+        <p:xfrm>
+          <a:off x="1125682" y="105988"/>
+          <a:ext cx="9940636" cy="6087684"/>
+        </p:xfrm>
+        <a:graphic>
+          <a:graphicData uri="http://schemas.openxmlformats.org/drawingml/2006/table">
+            <a:tbl>
+              <a:tblPr firstRow="1" bandRow="1">
+                <a:tableStyleId>{5C22544A-7EE6-4342-B048-85BDC9FD1C3A}</a:tableStyleId>
+              </a:tblPr>
+              <a:tblGrid>
+                <a:gridCol w="2485159">
+                  <a:extLst>
+                    <a:ext uri="{9D8B030D-6E8A-4147-A177-3AD203B41FA5}">
+                      <a16:colId xmlns:a16="http://schemas.microsoft.com/office/drawing/2014/main" val="4215559265"/>
+                    </a:ext>
+                  </a:extLst>
+                </a:gridCol>
+                <a:gridCol w="2485159">
+                  <a:extLst>
+                    <a:ext uri="{9D8B030D-6E8A-4147-A177-3AD203B41FA5}">
+                      <a16:colId xmlns:a16="http://schemas.microsoft.com/office/drawing/2014/main" val="2002386934"/>
+                    </a:ext>
+                  </a:extLst>
+                </a:gridCol>
+                <a:gridCol w="2485159">
+                  <a:extLst>
+                    <a:ext uri="{9D8B030D-6E8A-4147-A177-3AD203B41FA5}">
+                      <a16:colId xmlns:a16="http://schemas.microsoft.com/office/drawing/2014/main" val="3592116414"/>
+                    </a:ext>
+                  </a:extLst>
+                </a:gridCol>
+                <a:gridCol w="2485159">
+                  <a:extLst>
+                    <a:ext uri="{9D8B030D-6E8A-4147-A177-3AD203B41FA5}">
+                      <a16:colId xmlns:a16="http://schemas.microsoft.com/office/drawing/2014/main" val="1928638502"/>
+                    </a:ext>
+                  </a:extLst>
+                </a:gridCol>
+              </a:tblGrid>
+              <a:tr h="1179021">
+                <a:tc>
+                  <a:txBody>
+                    <a:bodyPr/>
+                    <a:lstStyle/>
+                    <a:p>
+                      <a:pPr algn="ctr"/>
+                      <a:r>
+                        <a:rPr lang="en-US" sz="2800" b="1" dirty="0">
+                          <a:latin typeface="Franklin Gothic Medium Cond" panose="020B0606030402020204" pitchFamily="34" charset="0"/>
+                        </a:rPr>
+                        <a:t>VARIABLE</a:t>
+                      </a:r>
+                    </a:p>
+                  </a:txBody>
+                  <a:tcPr anchor="ctr"/>
+                </a:tc>
+                <a:tc>
+                  <a:txBody>
+                    <a:bodyPr/>
+                    <a:lstStyle/>
+                    <a:p>
+                      <a:pPr algn="ctr"/>
+                      <a:r>
+                        <a:rPr lang="en-US" sz="2800" dirty="0">
+                          <a:latin typeface="Franklin Gothic Medium Cond" panose="020B0606030402020204" pitchFamily="34" charset="0"/>
+                        </a:rPr>
+                        <a:t>NO TARIFF</a:t>
+                      </a:r>
+                    </a:p>
+                  </a:txBody>
+                  <a:tcPr anchor="ctr"/>
+                </a:tc>
+                <a:tc>
+                  <a:txBody>
+                    <a:bodyPr/>
+                    <a:lstStyle/>
+                    <a:p>
+                      <a:pPr algn="ctr"/>
+                      <a:r>
+                        <a:rPr lang="en-US" sz="2800" dirty="0">
+                          <a:latin typeface="Franklin Gothic Medium Cond" panose="020B0606030402020204" pitchFamily="34" charset="0"/>
+                        </a:rPr>
+                        <a:t>40% TARIFF ON FINAL GOOD</a:t>
+                      </a:r>
+                    </a:p>
+                  </a:txBody>
+                  <a:tcPr anchor="ctr"/>
+                </a:tc>
+                <a:tc>
+                  <a:txBody>
+                    <a:bodyPr/>
+                    <a:lstStyle/>
+                    <a:p>
+                      <a:pPr algn="ctr"/>
+                      <a:r>
+                        <a:rPr lang="en-US" sz="2800" dirty="0">
+                          <a:latin typeface="Franklin Gothic Medium Cond" panose="020B0606030402020204" pitchFamily="34" charset="0"/>
+                        </a:rPr>
+                        <a:t>+10% TARIFF, INTERMEDIATE GOOD</a:t>
+                      </a:r>
+                    </a:p>
+                  </a:txBody>
+                  <a:tcPr anchor="ctr"/>
+                </a:tc>
+                <a:extLst>
+                  <a:ext uri="{0D108BD9-81ED-4DB2-BD59-A6C34878D82A}">
+                    <a16:rowId xmlns:a16="http://schemas.microsoft.com/office/drawing/2014/main" val="3858227597"/>
+                  </a:ext>
+                </a:extLst>
+              </a:tr>
+              <a:tr h="1179021">
+                <a:tc>
+                  <a:txBody>
+                    <a:bodyPr/>
+                    <a:lstStyle/>
+                    <a:p>
+                      <a:r>
+                        <a:rPr lang="en-US" sz="2800" dirty="0">
+                          <a:latin typeface="Franklin Gothic Medium Cond" panose="020B0606030402020204" pitchFamily="34" charset="0"/>
+                        </a:rPr>
+                        <a:t>DOMESTIC PRICE OF GOOD</a:t>
+                      </a:r>
+                    </a:p>
+                  </a:txBody>
+                  <a:tcPr anchor="ctr"/>
+                </a:tc>
+                <a:tc>
+                  <a:txBody>
+                    <a:bodyPr/>
+                    <a:lstStyle/>
+                    <a:p>
+                      <a:pPr algn="ctr"/>
+                      <a:r>
+                        <a:rPr lang="en-US" sz="4000" dirty="0">
+                          <a:latin typeface="Franklin Gothic Medium Cond" panose="020B0606030402020204" pitchFamily="34" charset="0"/>
+                        </a:rPr>
+                        <a:t>5,000</a:t>
+                      </a:r>
+                    </a:p>
+                  </a:txBody>
+                  <a:tcPr anchor="ctr"/>
+                </a:tc>
+                <a:tc>
+                  <a:txBody>
+                    <a:bodyPr/>
+                    <a:lstStyle/>
+                    <a:p>
+                      <a:pPr algn="ctr"/>
+                      <a:endParaRPr lang="en-US" sz="4000" dirty="0">
+                        <a:latin typeface="Franklin Gothic Medium Cond" panose="020B0606030402020204" pitchFamily="34" charset="0"/>
+                      </a:endParaRPr>
+                    </a:p>
+                  </a:txBody>
+                  <a:tcPr anchor="ctr"/>
+                </a:tc>
+                <a:tc>
+                  <a:txBody>
+                    <a:bodyPr/>
+                    <a:lstStyle/>
+                    <a:p>
+                      <a:pPr algn="ctr"/>
+                      <a:r>
+                        <a:rPr lang="en-US" sz="4000" dirty="0">
+                          <a:latin typeface="Franklin Gothic Medium Cond" panose="020B0606030402020204" pitchFamily="34" charset="0"/>
+                        </a:rPr>
+                        <a:t>7,000</a:t>
+                      </a:r>
+                    </a:p>
+                  </a:txBody>
+                  <a:tcPr anchor="ctr"/>
+                </a:tc>
+                <a:extLst>
+                  <a:ext uri="{0D108BD9-81ED-4DB2-BD59-A6C34878D82A}">
+                    <a16:rowId xmlns:a16="http://schemas.microsoft.com/office/drawing/2014/main" val="992890936"/>
+                  </a:ext>
+                </a:extLst>
+              </a:tr>
+              <a:tr h="1179021">
+                <a:tc>
+                  <a:txBody>
+                    <a:bodyPr/>
+                    <a:lstStyle/>
+                    <a:p>
+                      <a:r>
+                        <a:rPr lang="en-US" sz="2800" dirty="0">
+                          <a:latin typeface="Franklin Gothic Medium Cond" panose="020B0606030402020204" pitchFamily="34" charset="0"/>
+                        </a:rPr>
+                        <a:t>VALUE OF IMPORTED INPUT</a:t>
+                      </a:r>
+                    </a:p>
+                  </a:txBody>
+                  <a:tcPr anchor="ctr"/>
+                </a:tc>
+                <a:tc>
+                  <a:txBody>
+                    <a:bodyPr/>
+                    <a:lstStyle/>
+                    <a:p>
+                      <a:pPr algn="ctr"/>
+                      <a:r>
+                        <a:rPr lang="en-US" sz="4000" dirty="0">
+                          <a:latin typeface="Franklin Gothic Medium Cond" panose="020B0606030402020204" pitchFamily="34" charset="0"/>
+                        </a:rPr>
+                        <a:t>400</a:t>
+                      </a:r>
+                    </a:p>
+                  </a:txBody>
+                  <a:tcPr anchor="ctr"/>
+                </a:tc>
+                <a:tc>
+                  <a:txBody>
+                    <a:bodyPr/>
+                    <a:lstStyle/>
+                    <a:p>
+                      <a:pPr algn="ctr"/>
+                      <a:endParaRPr lang="en-US" sz="4000" dirty="0">
+                        <a:latin typeface="Franklin Gothic Medium Cond" panose="020B0606030402020204" pitchFamily="34" charset="0"/>
+                      </a:endParaRPr>
+                    </a:p>
+                  </a:txBody>
+                  <a:tcPr anchor="ctr"/>
+                </a:tc>
+                <a:tc>
+                  <a:txBody>
+                    <a:bodyPr/>
+                    <a:lstStyle/>
+                    <a:p>
+                      <a:pPr algn="ctr"/>
+                      <a:r>
+                        <a:rPr lang="en-US" sz="4000" dirty="0">
+                          <a:latin typeface="Franklin Gothic Medium Cond" panose="020B0606030402020204" pitchFamily="34" charset="0"/>
+                        </a:rPr>
+                        <a:t>440</a:t>
+                      </a:r>
+                    </a:p>
+                  </a:txBody>
+                  <a:tcPr anchor="ctr"/>
+                </a:tc>
+                <a:extLst>
+                  <a:ext uri="{0D108BD9-81ED-4DB2-BD59-A6C34878D82A}">
+                    <a16:rowId xmlns:a16="http://schemas.microsoft.com/office/drawing/2014/main" val="965898327"/>
+                  </a:ext>
+                </a:extLst>
+              </a:tr>
+              <a:tr h="1179021">
+                <a:tc>
+                  <a:txBody>
+                    <a:bodyPr/>
+                    <a:lstStyle/>
+                    <a:p>
+                      <a:r>
+                        <a:rPr lang="en-US" sz="2800" dirty="0">
+                          <a:latin typeface="Franklin Gothic Medium Cond" panose="020B0606030402020204" pitchFamily="34" charset="0"/>
+                        </a:rPr>
+                        <a:t>DOMESTIC VALUE-ADDED</a:t>
+                      </a:r>
+                    </a:p>
+                  </a:txBody>
+                  <a:tcPr anchor="ctr"/>
+                </a:tc>
+                <a:tc>
+                  <a:txBody>
+                    <a:bodyPr/>
+                    <a:lstStyle/>
+                    <a:p>
+                      <a:pPr algn="ctr"/>
+                      <a:r>
+                        <a:rPr lang="en-US" sz="4000" dirty="0">
+                          <a:latin typeface="Franklin Gothic Medium Cond" panose="020B0606030402020204" pitchFamily="34" charset="0"/>
+                        </a:rPr>
+                        <a:t>4,600</a:t>
+                      </a:r>
+                    </a:p>
+                  </a:txBody>
+                  <a:tcPr anchor="ctr"/>
+                </a:tc>
+                <a:tc>
+                  <a:txBody>
+                    <a:bodyPr/>
+                    <a:lstStyle/>
+                    <a:p>
+                      <a:pPr algn="ctr"/>
+                      <a:endParaRPr lang="en-US" sz="4000" dirty="0">
+                        <a:latin typeface="Franklin Gothic Medium Cond" panose="020B0606030402020204" pitchFamily="34" charset="0"/>
+                      </a:endParaRPr>
+                    </a:p>
+                  </a:txBody>
+                  <a:tcPr anchor="ctr"/>
+                </a:tc>
+                <a:tc>
+                  <a:txBody>
+                    <a:bodyPr/>
+                    <a:lstStyle/>
+                    <a:p>
+                      <a:pPr algn="ctr"/>
+                      <a:r>
+                        <a:rPr lang="en-US" sz="4000" dirty="0">
+                          <a:latin typeface="Franklin Gothic Medium Cond" panose="020B0606030402020204" pitchFamily="34" charset="0"/>
+                        </a:rPr>
+                        <a:t>6,560</a:t>
+                      </a:r>
+                    </a:p>
+                  </a:txBody>
+                  <a:tcPr anchor="ctr"/>
+                </a:tc>
+                <a:extLst>
+                  <a:ext uri="{0D108BD9-81ED-4DB2-BD59-A6C34878D82A}">
+                    <a16:rowId xmlns:a16="http://schemas.microsoft.com/office/drawing/2014/main" val="1252150911"/>
+                  </a:ext>
+                </a:extLst>
+              </a:tr>
+              <a:tr h="1179021">
+                <a:tc>
+                  <a:txBody>
+                    <a:bodyPr/>
+                    <a:lstStyle/>
+                    <a:p>
+                      <a:r>
+                        <a:rPr lang="en-US" sz="2800" dirty="0">
+                          <a:latin typeface="Franklin Gothic Medium Cond" panose="020B0606030402020204" pitchFamily="34" charset="0"/>
+                        </a:rPr>
+                        <a:t>EFFECTIVE RP, %</a:t>
+                      </a:r>
+                    </a:p>
+                  </a:txBody>
+                  <a:tcPr anchor="ctr"/>
+                </a:tc>
+                <a:tc>
+                  <a:txBody>
+                    <a:bodyPr/>
+                    <a:lstStyle/>
+                    <a:p>
+                      <a:pPr algn="ctr"/>
+                      <a:r>
+                        <a:rPr lang="en-US" sz="4000" dirty="0">
+                          <a:latin typeface="Franklin Gothic Medium Cond" panose="020B0606030402020204" pitchFamily="34" charset="0"/>
+                        </a:rPr>
+                        <a:t>0</a:t>
+                      </a:r>
+                    </a:p>
+                  </a:txBody>
+                  <a:tcPr anchor="ctr"/>
+                </a:tc>
+                <a:tc>
+                  <a:txBody>
+                    <a:bodyPr/>
+                    <a:lstStyle/>
+                    <a:p>
+                      <a:pPr algn="ctr"/>
+                      <a:endParaRPr lang="en-US" sz="4000" dirty="0">
+                        <a:latin typeface="Franklin Gothic Medium Cond" panose="020B0606030402020204" pitchFamily="34" charset="0"/>
+                      </a:endParaRPr>
+                    </a:p>
+                  </a:txBody>
+                  <a:tcPr anchor="ctr"/>
+                </a:tc>
+                <a:tc>
+                  <a:txBody>
+                    <a:bodyPr/>
+                    <a:lstStyle/>
+                    <a:p>
+                      <a:pPr algn="ctr"/>
+                      <a:r>
+                        <a:rPr lang="en-US" sz="4000" dirty="0">
+                          <a:latin typeface="Franklin Gothic Medium Cond" panose="020B0606030402020204" pitchFamily="34" charset="0"/>
+                        </a:rPr>
+                        <a:t>42.6</a:t>
+                      </a:r>
+                    </a:p>
+                  </a:txBody>
+                  <a:tcPr anchor="ctr"/>
+                </a:tc>
+                <a:extLst>
+                  <a:ext uri="{0D108BD9-81ED-4DB2-BD59-A6C34878D82A}">
+                    <a16:rowId xmlns:a16="http://schemas.microsoft.com/office/drawing/2014/main" val="2405215946"/>
+                  </a:ext>
+                </a:extLst>
+              </a:tr>
+            </a:tbl>
+          </a:graphicData>
+        </a:graphic>
+      </p:graphicFrame>
+    </p:spTree>
+    <p:extLst>
+      <p:ext uri="{BB962C8B-B14F-4D97-AF65-F5344CB8AC3E}">
+        <p14:creationId xmlns:p14="http://schemas.microsoft.com/office/powerpoint/2010/main" val="4112748035"/>
+      </p:ext>
+    </p:extLst>
+  </p:cSld>
+  <p:clrMapOvr>
+    <a:masterClrMapping/>
+  </p:clrMapOvr>
+</p:sld>
+</file>
+
+<file path=ppt/slides/slide45.xml><?xml version="1.0" encoding="utf-8"?>
+<p:sld xmlns:a="http://schemas.openxmlformats.org/drawingml/2006/main" xmlns:r="http://schemas.openxmlformats.org/officeDocument/2006/relationships" xmlns:p="http://schemas.openxmlformats.org/presentationml/2006/main">
+  <p:cSld>
+    <p:spTree>
+      <p:nvGrpSpPr>
+        <p:cNvPr id="1" name="">
+          <a:extLst>
+            <a:ext uri="{FF2B5EF4-FFF2-40B4-BE49-F238E27FC236}">
+              <a16:creationId xmlns:a16="http://schemas.microsoft.com/office/drawing/2014/main" id="{73A73020-04FE-9B1E-ED0E-FBA7205071E7}"/>
+            </a:ext>
+          </a:extLst>
+        </p:cNvPr>
+        <p:cNvGrpSpPr/>
+        <p:nvPr/>
+      </p:nvGrpSpPr>
+      <p:grpSpPr>
+        <a:xfrm>
+          <a:off x="0" y="0"/>
+          <a:ext cx="0" cy="0"/>
+          <a:chOff x="0" y="0"/>
+          <a:chExt cx="0" cy="0"/>
+        </a:xfrm>
+      </p:grpSpPr>
+      <p:graphicFrame>
+        <p:nvGraphicFramePr>
+          <p:cNvPr id="2" name="Table 1">
+            <a:extLst>
+              <a:ext uri="{FF2B5EF4-FFF2-40B4-BE49-F238E27FC236}">
+                <a16:creationId xmlns:a16="http://schemas.microsoft.com/office/drawing/2014/main" id="{C15AB685-4100-1C67-F7D1-742D5E6F47A6}"/>
+              </a:ext>
+            </a:extLst>
+          </p:cNvPr>
+          <p:cNvGraphicFramePr>
+            <a:graphicFrameLocks noGrp="1"/>
+          </p:cNvGraphicFramePr>
+          <p:nvPr>
+            <p:extLst>
+              <p:ext uri="{D42A27DB-BD31-4B8C-83A1-F6EECF244321}">
+                <p14:modId xmlns:p14="http://schemas.microsoft.com/office/powerpoint/2010/main" val="1850944017"/>
+              </p:ext>
+            </p:extLst>
+          </p:nvPr>
+        </p:nvGraphicFramePr>
+        <p:xfrm>
+          <a:off x="1125682" y="105988"/>
+          <a:ext cx="9940636" cy="6087684"/>
+        </p:xfrm>
+        <a:graphic>
+          <a:graphicData uri="http://schemas.openxmlformats.org/drawingml/2006/table">
+            <a:tbl>
+              <a:tblPr firstRow="1" bandRow="1">
+                <a:tableStyleId>{5C22544A-7EE6-4342-B048-85BDC9FD1C3A}</a:tableStyleId>
+              </a:tblPr>
+              <a:tblGrid>
+                <a:gridCol w="2485159">
+                  <a:extLst>
+                    <a:ext uri="{9D8B030D-6E8A-4147-A177-3AD203B41FA5}">
+                      <a16:colId xmlns:a16="http://schemas.microsoft.com/office/drawing/2014/main" val="4215559265"/>
+                    </a:ext>
+                  </a:extLst>
+                </a:gridCol>
+                <a:gridCol w="2485159">
+                  <a:extLst>
+                    <a:ext uri="{9D8B030D-6E8A-4147-A177-3AD203B41FA5}">
+                      <a16:colId xmlns:a16="http://schemas.microsoft.com/office/drawing/2014/main" val="2002386934"/>
+                    </a:ext>
+                  </a:extLst>
+                </a:gridCol>
+                <a:gridCol w="2485159">
+                  <a:extLst>
+                    <a:ext uri="{9D8B030D-6E8A-4147-A177-3AD203B41FA5}">
+                      <a16:colId xmlns:a16="http://schemas.microsoft.com/office/drawing/2014/main" val="3592116414"/>
+                    </a:ext>
+                  </a:extLst>
+                </a:gridCol>
+                <a:gridCol w="2485159">
+                  <a:extLst>
+                    <a:ext uri="{9D8B030D-6E8A-4147-A177-3AD203B41FA5}">
+                      <a16:colId xmlns:a16="http://schemas.microsoft.com/office/drawing/2014/main" val="1928638502"/>
+                    </a:ext>
+                  </a:extLst>
+                </a:gridCol>
+              </a:tblGrid>
+              <a:tr h="1179021">
+                <a:tc>
+                  <a:txBody>
+                    <a:bodyPr/>
+                    <a:lstStyle/>
+                    <a:p>
+                      <a:pPr algn="ctr"/>
+                      <a:r>
+                        <a:rPr lang="en-US" sz="2800" b="1" dirty="0">
+                          <a:latin typeface="Franklin Gothic Medium Cond" panose="020B0606030402020204" pitchFamily="34" charset="0"/>
+                        </a:rPr>
+                        <a:t>VARIABLE</a:t>
+                      </a:r>
+                    </a:p>
+                  </a:txBody>
+                  <a:tcPr anchor="ctr"/>
+                </a:tc>
+                <a:tc>
+                  <a:txBody>
+                    <a:bodyPr/>
+                    <a:lstStyle/>
+                    <a:p>
+                      <a:pPr algn="ctr"/>
+                      <a:r>
+                        <a:rPr lang="en-US" sz="2800" dirty="0">
+                          <a:latin typeface="Franklin Gothic Medium Cond" panose="020B0606030402020204" pitchFamily="34" charset="0"/>
+                        </a:rPr>
+                        <a:t>NO TARIFF</a:t>
+                      </a:r>
+                    </a:p>
+                  </a:txBody>
+                  <a:tcPr anchor="ctr"/>
+                </a:tc>
+                <a:tc>
+                  <a:txBody>
+                    <a:bodyPr/>
+                    <a:lstStyle/>
+                    <a:p>
+                      <a:pPr algn="ctr"/>
+                      <a:r>
+                        <a:rPr lang="en-US" sz="2800" dirty="0">
+                          <a:latin typeface="Franklin Gothic Medium Cond" panose="020B0606030402020204" pitchFamily="34" charset="0"/>
+                        </a:rPr>
+                        <a:t>40% TARIFF ON FINAL GOOD</a:t>
+                      </a:r>
+                    </a:p>
+                  </a:txBody>
+                  <a:tcPr anchor="ctr"/>
+                </a:tc>
+                <a:tc>
+                  <a:txBody>
+                    <a:bodyPr/>
+                    <a:lstStyle/>
+                    <a:p>
+                      <a:pPr algn="ctr"/>
+                      <a:r>
+                        <a:rPr lang="en-US" sz="2800" dirty="0">
+                          <a:latin typeface="Franklin Gothic Medium Cond" panose="020B0606030402020204" pitchFamily="34" charset="0"/>
+                        </a:rPr>
+                        <a:t>+10% TARIFF, INTERMEDIATE GOOD</a:t>
+                      </a:r>
+                    </a:p>
+                  </a:txBody>
+                  <a:tcPr anchor="ctr"/>
+                </a:tc>
+                <a:extLst>
+                  <a:ext uri="{0D108BD9-81ED-4DB2-BD59-A6C34878D82A}">
+                    <a16:rowId xmlns:a16="http://schemas.microsoft.com/office/drawing/2014/main" val="3858227597"/>
+                  </a:ext>
+                </a:extLst>
+              </a:tr>
+              <a:tr h="1179021">
+                <a:tc>
+                  <a:txBody>
+                    <a:bodyPr/>
+                    <a:lstStyle/>
+                    <a:p>
+                      <a:r>
+                        <a:rPr lang="en-US" sz="2800" dirty="0">
+                          <a:latin typeface="Franklin Gothic Medium Cond" panose="020B0606030402020204" pitchFamily="34" charset="0"/>
+                        </a:rPr>
+                        <a:t>DOMESTIC PRICE OF GOOD</a:t>
+                      </a:r>
+                    </a:p>
+                  </a:txBody>
+                  <a:tcPr anchor="ctr"/>
+                </a:tc>
+                <a:tc>
+                  <a:txBody>
+                    <a:bodyPr/>
+                    <a:lstStyle/>
+                    <a:p>
+                      <a:pPr algn="ctr"/>
+                      <a:r>
+                        <a:rPr lang="en-US" sz="4000" dirty="0">
+                          <a:latin typeface="Franklin Gothic Medium Cond" panose="020B0606030402020204" pitchFamily="34" charset="0"/>
+                        </a:rPr>
+                        <a:t>5,000</a:t>
+                      </a:r>
+                    </a:p>
+                  </a:txBody>
+                  <a:tcPr anchor="ctr"/>
+                </a:tc>
+                <a:tc>
+                  <a:txBody>
+                    <a:bodyPr/>
+                    <a:lstStyle/>
+                    <a:p>
+                      <a:pPr algn="ctr"/>
+                      <a:r>
+                        <a:rPr lang="en-US" sz="4000" dirty="0">
+                          <a:latin typeface="Franklin Gothic Medium Cond" panose="020B0606030402020204" pitchFamily="34" charset="0"/>
+                        </a:rPr>
+                        <a:t>7,000</a:t>
+                      </a:r>
+                    </a:p>
+                  </a:txBody>
+                  <a:tcPr anchor="ctr"/>
+                </a:tc>
+                <a:tc>
+                  <a:txBody>
+                    <a:bodyPr/>
+                    <a:lstStyle/>
+                    <a:p>
+                      <a:pPr algn="ctr"/>
+                      <a:r>
+                        <a:rPr lang="en-US" sz="4000" dirty="0">
+                          <a:latin typeface="Franklin Gothic Medium Cond" panose="020B0606030402020204" pitchFamily="34" charset="0"/>
+                        </a:rPr>
+                        <a:t>7,000</a:t>
+                      </a:r>
+                    </a:p>
+                  </a:txBody>
+                  <a:tcPr anchor="ctr"/>
+                </a:tc>
+                <a:extLst>
+                  <a:ext uri="{0D108BD9-81ED-4DB2-BD59-A6C34878D82A}">
+                    <a16:rowId xmlns:a16="http://schemas.microsoft.com/office/drawing/2014/main" val="992890936"/>
+                  </a:ext>
+                </a:extLst>
+              </a:tr>
+              <a:tr h="1179021">
+                <a:tc>
+                  <a:txBody>
+                    <a:bodyPr/>
+                    <a:lstStyle/>
+                    <a:p>
+                      <a:r>
+                        <a:rPr lang="en-US" sz="2800" dirty="0">
+                          <a:latin typeface="Franklin Gothic Medium Cond" panose="020B0606030402020204" pitchFamily="34" charset="0"/>
+                        </a:rPr>
+                        <a:t>VALUE OF IMPORTED INPUT</a:t>
+                      </a:r>
+                    </a:p>
+                  </a:txBody>
+                  <a:tcPr anchor="ctr"/>
+                </a:tc>
+                <a:tc>
+                  <a:txBody>
+                    <a:bodyPr/>
+                    <a:lstStyle/>
+                    <a:p>
+                      <a:pPr algn="ctr"/>
+                      <a:r>
+                        <a:rPr lang="en-US" sz="4000" dirty="0">
+                          <a:latin typeface="Franklin Gothic Medium Cond" panose="020B0606030402020204" pitchFamily="34" charset="0"/>
+                        </a:rPr>
+                        <a:t>400</a:t>
+                      </a:r>
+                    </a:p>
+                  </a:txBody>
+                  <a:tcPr anchor="ctr"/>
+                </a:tc>
+                <a:tc>
+                  <a:txBody>
+                    <a:bodyPr/>
+                    <a:lstStyle/>
+                    <a:p>
+                      <a:pPr algn="ctr"/>
+                      <a:r>
+                        <a:rPr lang="en-US" sz="4000" dirty="0">
+                          <a:latin typeface="Franklin Gothic Medium Cond" panose="020B0606030402020204" pitchFamily="34" charset="0"/>
+                        </a:rPr>
+                        <a:t>400</a:t>
+                      </a:r>
+                    </a:p>
+                  </a:txBody>
+                  <a:tcPr anchor="ctr"/>
+                </a:tc>
+                <a:tc>
+                  <a:txBody>
+                    <a:bodyPr/>
+                    <a:lstStyle/>
+                    <a:p>
+                      <a:pPr algn="ctr"/>
+                      <a:r>
+                        <a:rPr lang="en-US" sz="4000" dirty="0">
+                          <a:latin typeface="Franklin Gothic Medium Cond" panose="020B0606030402020204" pitchFamily="34" charset="0"/>
+                        </a:rPr>
+                        <a:t>440</a:t>
+                      </a:r>
+                    </a:p>
+                  </a:txBody>
+                  <a:tcPr anchor="ctr"/>
+                </a:tc>
+                <a:extLst>
+                  <a:ext uri="{0D108BD9-81ED-4DB2-BD59-A6C34878D82A}">
+                    <a16:rowId xmlns:a16="http://schemas.microsoft.com/office/drawing/2014/main" val="965898327"/>
+                  </a:ext>
+                </a:extLst>
+              </a:tr>
+              <a:tr h="1179021">
+                <a:tc>
+                  <a:txBody>
+                    <a:bodyPr/>
+                    <a:lstStyle/>
+                    <a:p>
+                      <a:r>
+                        <a:rPr lang="en-US" sz="2800" dirty="0">
+                          <a:latin typeface="Franklin Gothic Medium Cond" panose="020B0606030402020204" pitchFamily="34" charset="0"/>
+                        </a:rPr>
+                        <a:t>DOMESTIC VALUE-ADDED</a:t>
+                      </a:r>
+                    </a:p>
+                  </a:txBody>
+                  <a:tcPr anchor="ctr"/>
+                </a:tc>
+                <a:tc>
+                  <a:txBody>
+                    <a:bodyPr/>
+                    <a:lstStyle/>
+                    <a:p>
+                      <a:pPr algn="ctr"/>
+                      <a:r>
+                        <a:rPr lang="en-US" sz="4000" dirty="0">
+                          <a:latin typeface="Franklin Gothic Medium Cond" panose="020B0606030402020204" pitchFamily="34" charset="0"/>
+                        </a:rPr>
+                        <a:t>4,600</a:t>
+                      </a:r>
+                    </a:p>
+                  </a:txBody>
+                  <a:tcPr anchor="ctr"/>
+                </a:tc>
+                <a:tc>
+                  <a:txBody>
+                    <a:bodyPr/>
+                    <a:lstStyle/>
+                    <a:p>
+                      <a:pPr algn="ctr"/>
+                      <a:r>
+                        <a:rPr lang="en-US" sz="4000" dirty="0">
+                          <a:latin typeface="Franklin Gothic Medium Cond" panose="020B0606030402020204" pitchFamily="34" charset="0"/>
+                        </a:rPr>
+                        <a:t>6,600</a:t>
+                      </a:r>
+                    </a:p>
+                  </a:txBody>
+                  <a:tcPr anchor="ctr"/>
+                </a:tc>
+                <a:tc>
+                  <a:txBody>
+                    <a:bodyPr/>
+                    <a:lstStyle/>
+                    <a:p>
+                      <a:pPr algn="ctr"/>
+                      <a:r>
+                        <a:rPr lang="en-US" sz="4000" dirty="0">
+                          <a:latin typeface="Franklin Gothic Medium Cond" panose="020B0606030402020204" pitchFamily="34" charset="0"/>
+                        </a:rPr>
+                        <a:t>6,560</a:t>
+                      </a:r>
+                    </a:p>
+                  </a:txBody>
+                  <a:tcPr anchor="ctr"/>
+                </a:tc>
+                <a:extLst>
+                  <a:ext uri="{0D108BD9-81ED-4DB2-BD59-A6C34878D82A}">
+                    <a16:rowId xmlns:a16="http://schemas.microsoft.com/office/drawing/2014/main" val="1252150911"/>
+                  </a:ext>
+                </a:extLst>
+              </a:tr>
+              <a:tr h="1179021">
+                <a:tc>
+                  <a:txBody>
+                    <a:bodyPr/>
+                    <a:lstStyle/>
+                    <a:p>
+                      <a:r>
+                        <a:rPr lang="en-US" sz="2800" dirty="0">
+                          <a:latin typeface="Franklin Gothic Medium Cond" panose="020B0606030402020204" pitchFamily="34" charset="0"/>
+                        </a:rPr>
+                        <a:t>EFFECTIVE RP, %</a:t>
+                      </a:r>
+                    </a:p>
+                  </a:txBody>
+                  <a:tcPr anchor="ctr"/>
+                </a:tc>
+                <a:tc>
+                  <a:txBody>
+                    <a:bodyPr/>
+                    <a:lstStyle/>
+                    <a:p>
+                      <a:pPr algn="ctr"/>
+                      <a:r>
+                        <a:rPr lang="en-US" sz="4000" dirty="0">
+                          <a:latin typeface="Franklin Gothic Medium Cond" panose="020B0606030402020204" pitchFamily="34" charset="0"/>
+                        </a:rPr>
+                        <a:t>0</a:t>
+                      </a:r>
+                    </a:p>
+                  </a:txBody>
+                  <a:tcPr anchor="ctr"/>
+                </a:tc>
+                <a:tc>
+                  <a:txBody>
+                    <a:bodyPr/>
+                    <a:lstStyle/>
+                    <a:p>
+                      <a:pPr algn="ctr"/>
+                      <a:r>
+                        <a:rPr lang="en-US" sz="4000" dirty="0">
+                          <a:latin typeface="Franklin Gothic Medium Cond" panose="020B0606030402020204" pitchFamily="34" charset="0"/>
+                        </a:rPr>
+                        <a:t>43.5</a:t>
+                      </a:r>
+                    </a:p>
+                  </a:txBody>
+                  <a:tcPr anchor="ctr"/>
+                </a:tc>
+                <a:tc>
+                  <a:txBody>
+                    <a:bodyPr/>
+                    <a:lstStyle/>
+                    <a:p>
+                      <a:pPr algn="ctr"/>
+                      <a:r>
+                        <a:rPr lang="en-US" sz="4000" dirty="0">
+                          <a:latin typeface="Franklin Gothic Medium Cond" panose="020B0606030402020204" pitchFamily="34" charset="0"/>
+                        </a:rPr>
+                        <a:t>42.6</a:t>
+                      </a:r>
+                    </a:p>
+                  </a:txBody>
+                  <a:tcPr anchor="ctr"/>
+                </a:tc>
+                <a:extLst>
+                  <a:ext uri="{0D108BD9-81ED-4DB2-BD59-A6C34878D82A}">
+                    <a16:rowId xmlns:a16="http://schemas.microsoft.com/office/drawing/2014/main" val="2405215946"/>
+                  </a:ext>
+                </a:extLst>
+              </a:tr>
+            </a:tbl>
+          </a:graphicData>
+        </a:graphic>
+      </p:graphicFrame>
+    </p:spTree>
+    <p:extLst>
+      <p:ext uri="{BB962C8B-B14F-4D97-AF65-F5344CB8AC3E}">
+        <p14:creationId xmlns:p14="http://schemas.microsoft.com/office/powerpoint/2010/main" val="1026324053"/>
       </p:ext>
     </p:extLst>
   </p:cSld>

</xml_diff>

<commit_message>
updated graph creator document
</commit_message>
<xml_diff>
--- a/Slides/graph-creator.pptx
+++ b/Slides/graph-creator.pptx
@@ -50,6 +50,10 @@
     <p:sldId id="298" r:id="rId44"/>
     <p:sldId id="299" r:id="rId45"/>
     <p:sldId id="300" r:id="rId46"/>
+    <p:sldId id="301" r:id="rId47"/>
+    <p:sldId id="302" r:id="rId48"/>
+    <p:sldId id="303" r:id="rId49"/>
+    <p:sldId id="304" r:id="rId50"/>
   </p:sldIdLst>
   <p:sldSz cx="12192000" cy="6858000"/>
   <p:notesSz cx="6858000" cy="9144000"/>
@@ -303,7 +307,7 @@
           <a:p>
             <a:fld id="{7F9C3969-815D-4313-AD47-20854D5F097C}" type="datetimeFigureOut">
               <a:rPr lang="en-US" smtClean="0"/>
-              <a:t>10/29/2024</a:t>
+              <a:t>11/3/2024</a:t>
             </a:fld>
             <a:endParaRPr lang="en-US"/>
           </a:p>
@@ -501,7 +505,7 @@
           <a:p>
             <a:fld id="{7F9C3969-815D-4313-AD47-20854D5F097C}" type="datetimeFigureOut">
               <a:rPr lang="en-US" smtClean="0"/>
-              <a:t>10/29/2024</a:t>
+              <a:t>11/3/2024</a:t>
             </a:fld>
             <a:endParaRPr lang="en-US"/>
           </a:p>
@@ -709,7 +713,7 @@
           <a:p>
             <a:fld id="{7F9C3969-815D-4313-AD47-20854D5F097C}" type="datetimeFigureOut">
               <a:rPr lang="en-US" smtClean="0"/>
-              <a:t>10/29/2024</a:t>
+              <a:t>11/3/2024</a:t>
             </a:fld>
             <a:endParaRPr lang="en-US"/>
           </a:p>
@@ -907,7 +911,7 @@
           <a:p>
             <a:fld id="{7F9C3969-815D-4313-AD47-20854D5F097C}" type="datetimeFigureOut">
               <a:rPr lang="en-US" smtClean="0"/>
-              <a:t>10/29/2024</a:t>
+              <a:t>11/3/2024</a:t>
             </a:fld>
             <a:endParaRPr lang="en-US"/>
           </a:p>
@@ -1182,7 +1186,7 @@
           <a:p>
             <a:fld id="{7F9C3969-815D-4313-AD47-20854D5F097C}" type="datetimeFigureOut">
               <a:rPr lang="en-US" smtClean="0"/>
-              <a:t>10/29/2024</a:t>
+              <a:t>11/3/2024</a:t>
             </a:fld>
             <a:endParaRPr lang="en-US"/>
           </a:p>
@@ -1447,7 +1451,7 @@
           <a:p>
             <a:fld id="{7F9C3969-815D-4313-AD47-20854D5F097C}" type="datetimeFigureOut">
               <a:rPr lang="en-US" smtClean="0"/>
-              <a:t>10/29/2024</a:t>
+              <a:t>11/3/2024</a:t>
             </a:fld>
             <a:endParaRPr lang="en-US"/>
           </a:p>
@@ -1859,7 +1863,7 @@
           <a:p>
             <a:fld id="{7F9C3969-815D-4313-AD47-20854D5F097C}" type="datetimeFigureOut">
               <a:rPr lang="en-US" smtClean="0"/>
-              <a:t>10/29/2024</a:t>
+              <a:t>11/3/2024</a:t>
             </a:fld>
             <a:endParaRPr lang="en-US"/>
           </a:p>
@@ -2000,7 +2004,7 @@
           <a:p>
             <a:fld id="{7F9C3969-815D-4313-AD47-20854D5F097C}" type="datetimeFigureOut">
               <a:rPr lang="en-US" smtClean="0"/>
-              <a:t>10/29/2024</a:t>
+              <a:t>11/3/2024</a:t>
             </a:fld>
             <a:endParaRPr lang="en-US"/>
           </a:p>
@@ -2113,7 +2117,7 @@
           <a:p>
             <a:fld id="{7F9C3969-815D-4313-AD47-20854D5F097C}" type="datetimeFigureOut">
               <a:rPr lang="en-US" smtClean="0"/>
-              <a:t>10/29/2024</a:t>
+              <a:t>11/3/2024</a:t>
             </a:fld>
             <a:endParaRPr lang="en-US"/>
           </a:p>
@@ -2424,7 +2428,7 @@
           <a:p>
             <a:fld id="{7F9C3969-815D-4313-AD47-20854D5F097C}" type="datetimeFigureOut">
               <a:rPr lang="en-US" smtClean="0"/>
-              <a:t>10/29/2024</a:t>
+              <a:t>11/3/2024</a:t>
             </a:fld>
             <a:endParaRPr lang="en-US"/>
           </a:p>
@@ -2712,7 +2716,7 @@
           <a:p>
             <a:fld id="{7F9C3969-815D-4313-AD47-20854D5F097C}" type="datetimeFigureOut">
               <a:rPr lang="en-US" smtClean="0"/>
-              <a:t>10/29/2024</a:t>
+              <a:t>11/3/2024</a:t>
             </a:fld>
             <a:endParaRPr lang="en-US"/>
           </a:p>
@@ -2953,7 +2957,7 @@
           <a:p>
             <a:fld id="{7F9C3969-815D-4313-AD47-20854D5F097C}" type="datetimeFigureOut">
               <a:rPr lang="en-US" smtClean="0"/>
-              <a:t>10/29/2024</a:t>
+              <a:t>11/3/2024</a:t>
             </a:fld>
             <a:endParaRPr lang="en-US"/>
           </a:p>
@@ -32408,6 +32412,2905 @@
 </p:sld>
 </file>
 
+<file path=ppt/slides/slide46.xml><?xml version="1.0" encoding="utf-8"?>
+<p:sld xmlns:a="http://schemas.openxmlformats.org/drawingml/2006/main" xmlns:r="http://schemas.openxmlformats.org/officeDocument/2006/relationships" xmlns:p="http://schemas.openxmlformats.org/presentationml/2006/main">
+  <p:cSld>
+    <p:spTree>
+      <p:nvGrpSpPr>
+        <p:cNvPr id="1" name="">
+          <a:extLst>
+            <a:ext uri="{FF2B5EF4-FFF2-40B4-BE49-F238E27FC236}">
+              <a16:creationId xmlns:a16="http://schemas.microsoft.com/office/drawing/2014/main" id="{6BA13095-F95F-09FA-C2C9-498E348C283A}"/>
+            </a:ext>
+          </a:extLst>
+        </p:cNvPr>
+        <p:cNvGrpSpPr/>
+        <p:nvPr/>
+      </p:nvGrpSpPr>
+      <p:grpSpPr>
+        <a:xfrm>
+          <a:off x="0" y="0"/>
+          <a:ext cx="0" cy="0"/>
+          <a:chOff x="0" y="0"/>
+          <a:chExt cx="0" cy="0"/>
+        </a:xfrm>
+      </p:grpSpPr>
+      <p:cxnSp>
+        <p:nvCxnSpPr>
+          <p:cNvPr id="3" name="Straight Connector 2">
+            <a:extLst>
+              <a:ext uri="{FF2B5EF4-FFF2-40B4-BE49-F238E27FC236}">
+                <a16:creationId xmlns:a16="http://schemas.microsoft.com/office/drawing/2014/main" id="{97E52CFF-0208-DE3B-6B4B-6D029A9F962B}"/>
+              </a:ext>
+            </a:extLst>
+          </p:cNvPr>
+          <p:cNvCxnSpPr>
+            <a:cxnSpLocks/>
+          </p:cNvCxnSpPr>
+          <p:nvPr/>
+        </p:nvCxnSpPr>
+        <p:spPr>
+          <a:xfrm>
+            <a:off x="2298071" y="1191491"/>
+            <a:ext cx="6430293" cy="4717473"/>
+          </a:xfrm>
+          <a:prstGeom prst="line">
+            <a:avLst/>
+          </a:prstGeom>
+          <a:ln w="57150">
+            <a:solidFill>
+              <a:srgbClr val="C00000"/>
+            </a:solidFill>
+          </a:ln>
+        </p:spPr>
+        <p:style>
+          <a:lnRef idx="2">
+            <a:schemeClr val="accent1"/>
+          </a:lnRef>
+          <a:fillRef idx="0">
+            <a:schemeClr val="accent1"/>
+          </a:fillRef>
+          <a:effectRef idx="1">
+            <a:schemeClr val="accent1"/>
+          </a:effectRef>
+          <a:fontRef idx="minor">
+            <a:schemeClr val="tx1"/>
+          </a:fontRef>
+        </p:style>
+      </p:cxnSp>
+      <p:grpSp>
+        <p:nvGrpSpPr>
+          <p:cNvPr id="4" name="Group 3">
+            <a:extLst>
+              <a:ext uri="{FF2B5EF4-FFF2-40B4-BE49-F238E27FC236}">
+                <a16:creationId xmlns:a16="http://schemas.microsoft.com/office/drawing/2014/main" id="{CE29D56B-9D74-622E-5F16-09EE272B39A0}"/>
+              </a:ext>
+            </a:extLst>
+          </p:cNvPr>
+          <p:cNvGrpSpPr/>
+          <p:nvPr/>
+        </p:nvGrpSpPr>
+        <p:grpSpPr>
+          <a:xfrm>
+            <a:off x="2298071" y="509257"/>
+            <a:ext cx="6601485" cy="5839485"/>
+            <a:chOff x="1023042" y="115432"/>
+            <a:chExt cx="9942214" cy="6627136"/>
+          </a:xfrm>
+        </p:grpSpPr>
+        <p:cxnSp>
+          <p:nvCxnSpPr>
+            <p:cNvPr id="5" name="Straight Connector 4">
+              <a:extLst>
+                <a:ext uri="{FF2B5EF4-FFF2-40B4-BE49-F238E27FC236}">
+                  <a16:creationId xmlns:a16="http://schemas.microsoft.com/office/drawing/2014/main" id="{7E1EEC9E-79B0-12C5-95E5-D0F2124B641A}"/>
+                </a:ext>
+              </a:extLst>
+            </p:cNvPr>
+            <p:cNvCxnSpPr/>
+            <p:nvPr/>
+          </p:nvCxnSpPr>
+          <p:spPr>
+            <a:xfrm>
+              <a:off x="1032095" y="115432"/>
+              <a:ext cx="0" cy="6627136"/>
+            </a:xfrm>
+            <a:prstGeom prst="line">
+              <a:avLst/>
+            </a:prstGeom>
+            <a:ln w="57150"/>
+          </p:spPr>
+          <p:style>
+            <a:lnRef idx="3">
+              <a:schemeClr val="dk1"/>
+            </a:lnRef>
+            <a:fillRef idx="0">
+              <a:schemeClr val="dk1"/>
+            </a:fillRef>
+            <a:effectRef idx="2">
+              <a:schemeClr val="dk1"/>
+            </a:effectRef>
+            <a:fontRef idx="minor">
+              <a:schemeClr val="tx1"/>
+            </a:fontRef>
+          </p:style>
+        </p:cxnSp>
+        <p:cxnSp>
+          <p:nvCxnSpPr>
+            <p:cNvPr id="6" name="Straight Connector 5">
+              <a:extLst>
+                <a:ext uri="{FF2B5EF4-FFF2-40B4-BE49-F238E27FC236}">
+                  <a16:creationId xmlns:a16="http://schemas.microsoft.com/office/drawing/2014/main" id="{6F21C3C3-B486-EEA2-D24A-759EDB64D549}"/>
+                </a:ext>
+              </a:extLst>
+            </p:cNvPr>
+            <p:cNvCxnSpPr>
+              <a:cxnSpLocks/>
+            </p:cNvCxnSpPr>
+            <p:nvPr/>
+          </p:nvCxnSpPr>
+          <p:spPr>
+            <a:xfrm flipH="1">
+              <a:off x="1023042" y="6732006"/>
+              <a:ext cx="9942214" cy="0"/>
+            </a:xfrm>
+            <a:prstGeom prst="line">
+              <a:avLst/>
+            </a:prstGeom>
+            <a:ln w="57150"/>
+          </p:spPr>
+          <p:style>
+            <a:lnRef idx="3">
+              <a:schemeClr val="dk1"/>
+            </a:lnRef>
+            <a:fillRef idx="0">
+              <a:schemeClr val="dk1"/>
+            </a:fillRef>
+            <a:effectRef idx="2">
+              <a:schemeClr val="dk1"/>
+            </a:effectRef>
+            <a:fontRef idx="minor">
+              <a:schemeClr val="tx1"/>
+            </a:fontRef>
+          </p:style>
+        </p:cxnSp>
+      </p:grpSp>
+      <p:sp>
+        <p:nvSpPr>
+          <p:cNvPr id="7" name="TextBox 6">
+            <a:extLst>
+              <a:ext uri="{FF2B5EF4-FFF2-40B4-BE49-F238E27FC236}">
+                <a16:creationId xmlns:a16="http://schemas.microsoft.com/office/drawing/2014/main" id="{CF5A2208-EB6E-8BFD-E438-3291D2F32CF6}"/>
+              </a:ext>
+            </a:extLst>
+          </p:cNvPr>
+          <p:cNvSpPr txBox="1"/>
+          <p:nvPr/>
+        </p:nvSpPr>
+        <p:spPr>
+          <a:xfrm>
+            <a:off x="1191492" y="324591"/>
+            <a:ext cx="1106580" cy="523220"/>
+          </a:xfrm>
+          <a:prstGeom prst="rect">
+            <a:avLst/>
+          </a:prstGeom>
+          <a:noFill/>
+        </p:spPr>
+        <p:txBody>
+          <a:bodyPr wrap="square" rtlCol="0">
+            <a:spAutoFit/>
+          </a:bodyPr>
+          <a:lstStyle/>
+          <a:p>
+            <a:r>
+              <a:rPr lang="en-US" sz="2800" dirty="0">
+                <a:latin typeface="Aharoni" panose="02010803020104030203" pitchFamily="2" charset="-79"/>
+                <a:cs typeface="Aharoni" panose="02010803020104030203" pitchFamily="2" charset="-79"/>
+              </a:rPr>
+              <a:t>Price</a:t>
+            </a:r>
+            <a:endParaRPr lang="en-US" sz="2800" b="1" dirty="0">
+              <a:latin typeface="Aharoni" panose="02010803020104030203" pitchFamily="2" charset="-79"/>
+              <a:cs typeface="Aharoni" panose="02010803020104030203" pitchFamily="2" charset="-79"/>
+            </a:endParaRPr>
+          </a:p>
+        </p:txBody>
+      </p:sp>
+      <p:sp>
+        <p:nvSpPr>
+          <p:cNvPr id="11" name="TextBox 10">
+            <a:extLst>
+              <a:ext uri="{FF2B5EF4-FFF2-40B4-BE49-F238E27FC236}">
+                <a16:creationId xmlns:a16="http://schemas.microsoft.com/office/drawing/2014/main" id="{257FFD85-8F8D-BB1E-05DD-501818B2637D}"/>
+              </a:ext>
+            </a:extLst>
+          </p:cNvPr>
+          <p:cNvSpPr txBox="1"/>
+          <p:nvPr/>
+        </p:nvSpPr>
+        <p:spPr>
+          <a:xfrm>
+            <a:off x="8899555" y="6077825"/>
+            <a:ext cx="1775371" cy="523220"/>
+          </a:xfrm>
+          <a:prstGeom prst="rect">
+            <a:avLst/>
+          </a:prstGeom>
+          <a:noFill/>
+        </p:spPr>
+        <p:txBody>
+          <a:bodyPr wrap="square" rtlCol="0">
+            <a:spAutoFit/>
+          </a:bodyPr>
+          <a:lstStyle/>
+          <a:p>
+            <a:r>
+              <a:rPr lang="en-US" sz="2800" dirty="0">
+                <a:latin typeface="Aharoni" panose="02010803020104030203" pitchFamily="2" charset="-79"/>
+                <a:cs typeface="Aharoni" panose="02010803020104030203" pitchFamily="2" charset="-79"/>
+              </a:rPr>
+              <a:t>Quantity</a:t>
+            </a:r>
+            <a:endParaRPr lang="en-US" sz="2800" b="1" dirty="0">
+              <a:latin typeface="Aharoni" panose="02010803020104030203" pitchFamily="2" charset="-79"/>
+              <a:cs typeface="Aharoni" panose="02010803020104030203" pitchFamily="2" charset="-79"/>
+            </a:endParaRPr>
+          </a:p>
+        </p:txBody>
+      </p:sp>
+      <p:cxnSp>
+        <p:nvCxnSpPr>
+          <p:cNvPr id="12" name="Straight Connector 11">
+            <a:extLst>
+              <a:ext uri="{FF2B5EF4-FFF2-40B4-BE49-F238E27FC236}">
+                <a16:creationId xmlns:a16="http://schemas.microsoft.com/office/drawing/2014/main" id="{CD4B38DB-DF70-5A95-7142-1F339BD0D9CE}"/>
+              </a:ext>
+            </a:extLst>
+          </p:cNvPr>
+          <p:cNvCxnSpPr>
+            <a:cxnSpLocks/>
+          </p:cNvCxnSpPr>
+          <p:nvPr/>
+        </p:nvCxnSpPr>
+        <p:spPr>
+          <a:xfrm flipV="1">
+            <a:off x="2310093" y="1032164"/>
+            <a:ext cx="6321289" cy="4876800"/>
+          </a:xfrm>
+          <a:prstGeom prst="line">
+            <a:avLst/>
+          </a:prstGeom>
+          <a:ln w="57150">
+            <a:solidFill>
+              <a:schemeClr val="accent6"/>
+            </a:solidFill>
+          </a:ln>
+        </p:spPr>
+        <p:style>
+          <a:lnRef idx="2">
+            <a:schemeClr val="accent1"/>
+          </a:lnRef>
+          <a:fillRef idx="0">
+            <a:schemeClr val="accent1"/>
+          </a:fillRef>
+          <a:effectRef idx="1">
+            <a:schemeClr val="accent1"/>
+          </a:effectRef>
+          <a:fontRef idx="minor">
+            <a:schemeClr val="tx1"/>
+          </a:fontRef>
+        </p:style>
+      </p:cxnSp>
+      <p:grpSp>
+        <p:nvGrpSpPr>
+          <p:cNvPr id="16" name="Group 15">
+            <a:extLst>
+              <a:ext uri="{FF2B5EF4-FFF2-40B4-BE49-F238E27FC236}">
+                <a16:creationId xmlns:a16="http://schemas.microsoft.com/office/drawing/2014/main" id="{ECCF05B4-3070-67FC-03FB-7A9175EFE8B9}"/>
+              </a:ext>
+            </a:extLst>
+          </p:cNvPr>
+          <p:cNvGrpSpPr/>
+          <p:nvPr/>
+        </p:nvGrpSpPr>
+        <p:grpSpPr>
+          <a:xfrm>
+            <a:off x="2298071" y="4882853"/>
+            <a:ext cx="5040777" cy="1447271"/>
+            <a:chOff x="2333625" y="1600298"/>
+            <a:chExt cx="1160145" cy="4477528"/>
+          </a:xfrm>
+        </p:grpSpPr>
+        <p:cxnSp>
+          <p:nvCxnSpPr>
+            <p:cNvPr id="17" name="Straight Connector 16">
+              <a:extLst>
+                <a:ext uri="{FF2B5EF4-FFF2-40B4-BE49-F238E27FC236}">
+                  <a16:creationId xmlns:a16="http://schemas.microsoft.com/office/drawing/2014/main" id="{C21219F4-EB78-6F62-0CE3-27134C4C5A72}"/>
+                </a:ext>
+              </a:extLst>
+            </p:cNvPr>
+            <p:cNvCxnSpPr>
+              <a:cxnSpLocks/>
+            </p:cNvCxnSpPr>
+            <p:nvPr/>
+          </p:nvCxnSpPr>
+          <p:spPr>
+            <a:xfrm>
+              <a:off x="2333625" y="1600298"/>
+              <a:ext cx="1160145" cy="0"/>
+            </a:xfrm>
+            <a:prstGeom prst="line">
+              <a:avLst/>
+            </a:prstGeom>
+            <a:ln>
+              <a:prstDash val="dash"/>
+            </a:ln>
+          </p:spPr>
+          <p:style>
+            <a:lnRef idx="2">
+              <a:schemeClr val="accent1"/>
+            </a:lnRef>
+            <a:fillRef idx="0">
+              <a:schemeClr val="accent1"/>
+            </a:fillRef>
+            <a:effectRef idx="1">
+              <a:schemeClr val="accent1"/>
+            </a:effectRef>
+            <a:fontRef idx="minor">
+              <a:schemeClr val="tx1"/>
+            </a:fontRef>
+          </p:style>
+        </p:cxnSp>
+        <p:cxnSp>
+          <p:nvCxnSpPr>
+            <p:cNvPr id="18" name="Straight Connector 17">
+              <a:extLst>
+                <a:ext uri="{FF2B5EF4-FFF2-40B4-BE49-F238E27FC236}">
+                  <a16:creationId xmlns:a16="http://schemas.microsoft.com/office/drawing/2014/main" id="{418D6020-0154-F56C-1FD3-641E9E80AD62}"/>
+                </a:ext>
+              </a:extLst>
+            </p:cNvPr>
+            <p:cNvCxnSpPr>
+              <a:cxnSpLocks/>
+            </p:cNvCxnSpPr>
+            <p:nvPr/>
+          </p:nvCxnSpPr>
+          <p:spPr>
+            <a:xfrm>
+              <a:off x="3493770" y="1600298"/>
+              <a:ext cx="0" cy="4477528"/>
+            </a:xfrm>
+            <a:prstGeom prst="line">
+              <a:avLst/>
+            </a:prstGeom>
+            <a:ln>
+              <a:prstDash val="dash"/>
+            </a:ln>
+          </p:spPr>
+          <p:style>
+            <a:lnRef idx="2">
+              <a:schemeClr val="accent1"/>
+            </a:lnRef>
+            <a:fillRef idx="0">
+              <a:schemeClr val="accent1"/>
+            </a:fillRef>
+            <a:effectRef idx="1">
+              <a:schemeClr val="accent1"/>
+            </a:effectRef>
+            <a:fontRef idx="minor">
+              <a:schemeClr val="tx1"/>
+            </a:fontRef>
+          </p:style>
+        </p:cxnSp>
+      </p:grpSp>
+      <mc:AlternateContent xmlns:mc="http://schemas.openxmlformats.org/markup-compatibility/2006">
+        <mc:Choice xmlns:a14="http://schemas.microsoft.com/office/drawing/2010/main" Requires="a14">
+          <p:sp>
+            <p:nvSpPr>
+              <p:cNvPr id="20" name="TextBox 19">
+                <a:extLst>
+                  <a:ext uri="{FF2B5EF4-FFF2-40B4-BE49-F238E27FC236}">
+                    <a16:creationId xmlns:a16="http://schemas.microsoft.com/office/drawing/2014/main" id="{2D4D252C-D144-CD2E-5AA7-3F74DCD4BAEA}"/>
+                  </a:ext>
+                </a:extLst>
+              </p:cNvPr>
+              <p:cNvSpPr txBox="1"/>
+              <p:nvPr/>
+            </p:nvSpPr>
+            <p:spPr>
+              <a:xfrm>
+                <a:off x="1625610" y="3210301"/>
+                <a:ext cx="575479" cy="553998"/>
+              </a:xfrm>
+              <a:prstGeom prst="rect">
+                <a:avLst/>
+              </a:prstGeom>
+              <a:noFill/>
+            </p:spPr>
+            <p:txBody>
+              <a:bodyPr wrap="none" lIns="0" tIns="0" rIns="0" bIns="0" rtlCol="0">
+                <a:spAutoFit/>
+              </a:bodyPr>
+              <a:lstStyle/>
+              <a:p>
+                <a:pPr/>
+                <a14:m>
+                  <m:oMathPara xmlns:m="http://schemas.openxmlformats.org/officeDocument/2006/math">
+                    <m:oMathParaPr>
+                      <m:jc m:val="centerGroup"/>
+                    </m:oMathParaPr>
+                    <m:oMath xmlns:m="http://schemas.openxmlformats.org/officeDocument/2006/math">
+                      <m:sSup>
+                        <m:sSupPr>
+                          <m:ctrlPr>
+                            <a:rPr lang="en-US" sz="3600" b="0" i="1" smtClean="0">
+                              <a:latin typeface="Cambria Math" panose="02040503050406030204" pitchFamily="18" charset="0"/>
+                            </a:rPr>
+                          </m:ctrlPr>
+                        </m:sSupPr>
+                        <m:e>
+                          <m:r>
+                            <a:rPr lang="en-US" sz="3600" b="0" i="1" smtClean="0">
+                              <a:latin typeface="Cambria Math" panose="02040503050406030204" pitchFamily="18" charset="0"/>
+                            </a:rPr>
+                            <m:t>𝑃</m:t>
+                          </m:r>
+                        </m:e>
+                        <m:sup>
+                          <m:r>
+                            <a:rPr lang="en-US" sz="3600" b="0" i="1" smtClean="0">
+                              <a:latin typeface="Cambria Math" panose="02040503050406030204" pitchFamily="18" charset="0"/>
+                            </a:rPr>
+                            <m:t>∗</m:t>
+                          </m:r>
+                        </m:sup>
+                      </m:sSup>
+                    </m:oMath>
+                  </m:oMathPara>
+                </a14:m>
+                <a:endParaRPr lang="en-US" sz="3600" dirty="0"/>
+              </a:p>
+            </p:txBody>
+          </p:sp>
+        </mc:Choice>
+        <mc:Fallback>
+          <p:sp>
+            <p:nvSpPr>
+              <p:cNvPr id="20" name="TextBox 19">
+                <a:extLst>
+                  <a:ext uri="{FF2B5EF4-FFF2-40B4-BE49-F238E27FC236}">
+                    <a16:creationId xmlns:a16="http://schemas.microsoft.com/office/drawing/2014/main" id="{2D4D252C-D144-CD2E-5AA7-3F74DCD4BAEA}"/>
+                  </a:ext>
+                </a:extLst>
+              </p:cNvPr>
+              <p:cNvSpPr txBox="1">
+                <a:spLocks noRot="1" noChangeAspect="1" noMove="1" noResize="1" noEditPoints="1" noAdjustHandles="1" noChangeArrowheads="1" noChangeShapeType="1" noTextEdit="1"/>
+              </p:cNvSpPr>
+              <p:nvPr/>
+            </p:nvSpPr>
+            <p:spPr>
+              <a:xfrm>
+                <a:off x="1625610" y="3210301"/>
+                <a:ext cx="575479" cy="553998"/>
+              </a:xfrm>
+              <a:prstGeom prst="rect">
+                <a:avLst/>
+              </a:prstGeom>
+              <a:blipFill>
+                <a:blip r:embed="rId2"/>
+                <a:stretch>
+                  <a:fillRect/>
+                </a:stretch>
+              </a:blipFill>
+            </p:spPr>
+            <p:txBody>
+              <a:bodyPr/>
+              <a:lstStyle/>
+              <a:p>
+                <a:r>
+                  <a:rPr lang="en-US">
+                    <a:noFill/>
+                  </a:rPr>
+                  <a:t> </a:t>
+                </a:r>
+              </a:p>
+            </p:txBody>
+          </p:sp>
+        </mc:Fallback>
+      </mc:AlternateContent>
+      <mc:AlternateContent xmlns:mc="http://schemas.openxmlformats.org/markup-compatibility/2006">
+        <mc:Choice xmlns:a14="http://schemas.microsoft.com/office/drawing/2010/main" Requires="a14">
+          <p:sp>
+            <p:nvSpPr>
+              <p:cNvPr id="21" name="TextBox 20">
+                <a:extLst>
+                  <a:ext uri="{FF2B5EF4-FFF2-40B4-BE49-F238E27FC236}">
+                    <a16:creationId xmlns:a16="http://schemas.microsoft.com/office/drawing/2014/main" id="{ABB09AA8-FA1E-EF79-DC8E-3CF5A900EB60}"/>
+                  </a:ext>
+                </a:extLst>
+              </p:cNvPr>
+              <p:cNvSpPr txBox="1"/>
+              <p:nvPr/>
+            </p:nvSpPr>
+            <p:spPr>
+              <a:xfrm>
+                <a:off x="3465633" y="6330124"/>
+                <a:ext cx="575479" cy="553998"/>
+              </a:xfrm>
+              <a:prstGeom prst="rect">
+                <a:avLst/>
+              </a:prstGeom>
+              <a:noFill/>
+            </p:spPr>
+            <p:txBody>
+              <a:bodyPr wrap="square" lIns="0" tIns="0" rIns="0" bIns="0" rtlCol="0">
+                <a:spAutoFit/>
+              </a:bodyPr>
+              <a:lstStyle/>
+              <a:p>
+                <a:pPr/>
+                <a14:m>
+                  <m:oMathPara xmlns:m="http://schemas.openxmlformats.org/officeDocument/2006/math">
+                    <m:oMathParaPr>
+                      <m:jc m:val="centerGroup"/>
+                    </m:oMathParaPr>
+                    <m:oMath xmlns:m="http://schemas.openxmlformats.org/officeDocument/2006/math">
+                      <m:sSubSup>
+                        <m:sSubSupPr>
+                          <m:ctrlPr>
+                            <a:rPr lang="en-US" sz="3600" b="0" i="1" smtClean="0">
+                              <a:latin typeface="Cambria Math" panose="02040503050406030204" pitchFamily="18" charset="0"/>
+                            </a:rPr>
+                          </m:ctrlPr>
+                        </m:sSubSupPr>
+                        <m:e>
+                          <m:r>
+                            <a:rPr lang="en-US" sz="3600" b="0" i="1" smtClean="0">
+                              <a:latin typeface="Cambria Math" panose="02040503050406030204" pitchFamily="18" charset="0"/>
+                            </a:rPr>
+                            <m:t>𝑄</m:t>
+                          </m:r>
+                        </m:e>
+                        <m:sub>
+                          <m:r>
+                            <a:rPr lang="en-US" sz="3600" b="0" i="1" smtClean="0">
+                              <a:latin typeface="Cambria Math" panose="02040503050406030204" pitchFamily="18" charset="0"/>
+                            </a:rPr>
+                            <m:t>1</m:t>
+                          </m:r>
+                        </m:sub>
+                        <m:sup>
+                          <m:r>
+                            <a:rPr lang="en-US" sz="3600" b="0" i="1" smtClean="0">
+                              <a:latin typeface="Cambria Math" panose="02040503050406030204" pitchFamily="18" charset="0"/>
+                            </a:rPr>
+                            <m:t> </m:t>
+                          </m:r>
+                        </m:sup>
+                      </m:sSubSup>
+                    </m:oMath>
+                  </m:oMathPara>
+                </a14:m>
+                <a:endParaRPr lang="en-US" sz="3600" dirty="0"/>
+              </a:p>
+            </p:txBody>
+          </p:sp>
+        </mc:Choice>
+        <mc:Fallback>
+          <p:sp>
+            <p:nvSpPr>
+              <p:cNvPr id="21" name="TextBox 20">
+                <a:extLst>
+                  <a:ext uri="{FF2B5EF4-FFF2-40B4-BE49-F238E27FC236}">
+                    <a16:creationId xmlns:a16="http://schemas.microsoft.com/office/drawing/2014/main" id="{ABB09AA8-FA1E-EF79-DC8E-3CF5A900EB60}"/>
+                  </a:ext>
+                </a:extLst>
+              </p:cNvPr>
+              <p:cNvSpPr txBox="1">
+                <a:spLocks noRot="1" noChangeAspect="1" noMove="1" noResize="1" noEditPoints="1" noAdjustHandles="1" noChangeArrowheads="1" noChangeShapeType="1" noTextEdit="1"/>
+              </p:cNvSpPr>
+              <p:nvPr/>
+            </p:nvSpPr>
+            <p:spPr>
+              <a:xfrm>
+                <a:off x="3465633" y="6330124"/>
+                <a:ext cx="575479" cy="553998"/>
+              </a:xfrm>
+              <a:prstGeom prst="rect">
+                <a:avLst/>
+              </a:prstGeom>
+              <a:blipFill>
+                <a:blip r:embed="rId3"/>
+                <a:stretch>
+                  <a:fillRect/>
+                </a:stretch>
+              </a:blipFill>
+            </p:spPr>
+            <p:txBody>
+              <a:bodyPr/>
+              <a:lstStyle/>
+              <a:p>
+                <a:r>
+                  <a:rPr lang="en-US">
+                    <a:noFill/>
+                  </a:rPr>
+                  <a:t> </a:t>
+                </a:r>
+              </a:p>
+            </p:txBody>
+          </p:sp>
+        </mc:Fallback>
+      </mc:AlternateContent>
+      <p:cxnSp>
+        <p:nvCxnSpPr>
+          <p:cNvPr id="2" name="Straight Connector 1">
+            <a:extLst>
+              <a:ext uri="{FF2B5EF4-FFF2-40B4-BE49-F238E27FC236}">
+                <a16:creationId xmlns:a16="http://schemas.microsoft.com/office/drawing/2014/main" id="{D3CC9D92-52A3-8F03-CC48-F9E5B81D48F6}"/>
+              </a:ext>
+            </a:extLst>
+          </p:cNvPr>
+          <p:cNvCxnSpPr>
+            <a:cxnSpLocks/>
+          </p:cNvCxnSpPr>
+          <p:nvPr/>
+        </p:nvCxnSpPr>
+        <p:spPr>
+          <a:xfrm>
+            <a:off x="3660228" y="4901471"/>
+            <a:ext cx="0" cy="1447271"/>
+          </a:xfrm>
+          <a:prstGeom prst="line">
+            <a:avLst/>
+          </a:prstGeom>
+          <a:ln>
+            <a:prstDash val="dash"/>
+          </a:ln>
+        </p:spPr>
+        <p:style>
+          <a:lnRef idx="2">
+            <a:schemeClr val="accent1"/>
+          </a:lnRef>
+          <a:fillRef idx="0">
+            <a:schemeClr val="accent1"/>
+          </a:fillRef>
+          <a:effectRef idx="1">
+            <a:schemeClr val="accent1"/>
+          </a:effectRef>
+          <a:fontRef idx="minor">
+            <a:schemeClr val="tx1"/>
+          </a:fontRef>
+        </p:style>
+      </p:cxnSp>
+      <mc:AlternateContent xmlns:mc="http://schemas.openxmlformats.org/markup-compatibility/2006">
+        <mc:Choice xmlns:a14="http://schemas.microsoft.com/office/drawing/2010/main" Requires="a14">
+          <p:sp>
+            <p:nvSpPr>
+              <p:cNvPr id="8" name="TextBox 7">
+                <a:extLst>
+                  <a:ext uri="{FF2B5EF4-FFF2-40B4-BE49-F238E27FC236}">
+                    <a16:creationId xmlns:a16="http://schemas.microsoft.com/office/drawing/2014/main" id="{B383925F-564B-82E9-2C26-7E098B426B43}"/>
+                  </a:ext>
+                </a:extLst>
+              </p:cNvPr>
+              <p:cNvSpPr txBox="1"/>
+              <p:nvPr/>
+            </p:nvSpPr>
+            <p:spPr>
+              <a:xfrm>
+                <a:off x="7051108" y="6314199"/>
+                <a:ext cx="575479" cy="566245"/>
+              </a:xfrm>
+              <a:prstGeom prst="rect">
+                <a:avLst/>
+              </a:prstGeom>
+              <a:noFill/>
+            </p:spPr>
+            <p:txBody>
+              <a:bodyPr wrap="square" lIns="0" tIns="0" rIns="0" bIns="0" rtlCol="0">
+                <a:spAutoFit/>
+              </a:bodyPr>
+              <a:lstStyle/>
+              <a:p>
+                <a:pPr/>
+                <a14:m>
+                  <m:oMathPara xmlns:m="http://schemas.openxmlformats.org/officeDocument/2006/math">
+                    <m:oMathParaPr>
+                      <m:jc m:val="centerGroup"/>
+                    </m:oMathParaPr>
+                    <m:oMath xmlns:m="http://schemas.openxmlformats.org/officeDocument/2006/math">
+                      <m:sSubSup>
+                        <m:sSubSupPr>
+                          <m:ctrlPr>
+                            <a:rPr lang="en-US" sz="3600" b="0" i="1" smtClean="0">
+                              <a:latin typeface="Cambria Math" panose="02040503050406030204" pitchFamily="18" charset="0"/>
+                            </a:rPr>
+                          </m:ctrlPr>
+                        </m:sSubSupPr>
+                        <m:e>
+                          <m:r>
+                            <a:rPr lang="en-US" sz="3600" b="0" i="1" smtClean="0">
+                              <a:latin typeface="Cambria Math" panose="02040503050406030204" pitchFamily="18" charset="0"/>
+                            </a:rPr>
+                            <m:t>𝑄</m:t>
+                          </m:r>
+                        </m:e>
+                        <m:sub>
+                          <m:r>
+                            <a:rPr lang="en-US" sz="3600" b="0" i="1" smtClean="0">
+                              <a:latin typeface="Cambria Math" panose="02040503050406030204" pitchFamily="18" charset="0"/>
+                            </a:rPr>
+                            <m:t>2</m:t>
+                          </m:r>
+                        </m:sub>
+                        <m:sup>
+                          <m:r>
+                            <a:rPr lang="en-US" sz="3600" b="0" i="1" smtClean="0">
+                              <a:latin typeface="Cambria Math" panose="02040503050406030204" pitchFamily="18" charset="0"/>
+                            </a:rPr>
+                            <m:t> </m:t>
+                          </m:r>
+                        </m:sup>
+                      </m:sSubSup>
+                    </m:oMath>
+                  </m:oMathPara>
+                </a14:m>
+                <a:endParaRPr lang="en-US" sz="3600" dirty="0"/>
+              </a:p>
+            </p:txBody>
+          </p:sp>
+        </mc:Choice>
+        <mc:Fallback>
+          <p:sp>
+            <p:nvSpPr>
+              <p:cNvPr id="8" name="TextBox 7">
+                <a:extLst>
+                  <a:ext uri="{FF2B5EF4-FFF2-40B4-BE49-F238E27FC236}">
+                    <a16:creationId xmlns:a16="http://schemas.microsoft.com/office/drawing/2014/main" id="{B383925F-564B-82E9-2C26-7E098B426B43}"/>
+                  </a:ext>
+                </a:extLst>
+              </p:cNvPr>
+              <p:cNvSpPr txBox="1">
+                <a:spLocks noRot="1" noChangeAspect="1" noMove="1" noResize="1" noEditPoints="1" noAdjustHandles="1" noChangeArrowheads="1" noChangeShapeType="1" noTextEdit="1"/>
+              </p:cNvSpPr>
+              <p:nvPr/>
+            </p:nvSpPr>
+            <p:spPr>
+              <a:xfrm>
+                <a:off x="7051108" y="6314199"/>
+                <a:ext cx="575479" cy="566245"/>
+              </a:xfrm>
+              <a:prstGeom prst="rect">
+                <a:avLst/>
+              </a:prstGeom>
+              <a:blipFill>
+                <a:blip r:embed="rId4"/>
+                <a:stretch>
+                  <a:fillRect/>
+                </a:stretch>
+              </a:blipFill>
+            </p:spPr>
+            <p:txBody>
+              <a:bodyPr/>
+              <a:lstStyle/>
+              <a:p>
+                <a:r>
+                  <a:rPr lang="en-US">
+                    <a:noFill/>
+                  </a:rPr>
+                  <a:t> </a:t>
+                </a:r>
+              </a:p>
+            </p:txBody>
+          </p:sp>
+        </mc:Fallback>
+      </mc:AlternateContent>
+      <mc:AlternateContent xmlns:mc="http://schemas.openxmlformats.org/markup-compatibility/2006">
+        <mc:Choice xmlns:a14="http://schemas.microsoft.com/office/drawing/2010/main" Requires="a14">
+          <p:sp>
+            <p:nvSpPr>
+              <p:cNvPr id="10" name="TextBox 9">
+                <a:extLst>
+                  <a:ext uri="{FF2B5EF4-FFF2-40B4-BE49-F238E27FC236}">
+                    <a16:creationId xmlns:a16="http://schemas.microsoft.com/office/drawing/2014/main" id="{163C9F3E-3FD8-275C-ABE8-A856655B0F92}"/>
+                  </a:ext>
+                </a:extLst>
+              </p:cNvPr>
+              <p:cNvSpPr txBox="1"/>
+              <p:nvPr/>
+            </p:nvSpPr>
+            <p:spPr>
+              <a:xfrm>
+                <a:off x="1557882" y="4605854"/>
+                <a:ext cx="594778" cy="553998"/>
+              </a:xfrm>
+              <a:prstGeom prst="rect">
+                <a:avLst/>
+              </a:prstGeom>
+              <a:noFill/>
+            </p:spPr>
+            <p:txBody>
+              <a:bodyPr wrap="none" lIns="0" tIns="0" rIns="0" bIns="0" rtlCol="0">
+                <a:spAutoFit/>
+              </a:bodyPr>
+              <a:lstStyle/>
+              <a:p>
+                <a:pPr/>
+                <a14:m>
+                  <m:oMathPara xmlns:m="http://schemas.openxmlformats.org/officeDocument/2006/math">
+                    <m:oMathParaPr>
+                      <m:jc m:val="centerGroup"/>
+                    </m:oMathParaPr>
+                    <m:oMath xmlns:m="http://schemas.openxmlformats.org/officeDocument/2006/math">
+                      <m:sSubSup>
+                        <m:sSubSupPr>
+                          <m:ctrlPr>
+                            <a:rPr lang="en-US" sz="3600" b="0" i="1" smtClean="0">
+                              <a:latin typeface="Cambria Math" panose="02040503050406030204" pitchFamily="18" charset="0"/>
+                            </a:rPr>
+                          </m:ctrlPr>
+                        </m:sSubSupPr>
+                        <m:e>
+                          <m:r>
+                            <a:rPr lang="en-US" sz="3600" b="0" i="1" smtClean="0">
+                              <a:latin typeface="Cambria Math" panose="02040503050406030204" pitchFamily="18" charset="0"/>
+                            </a:rPr>
+                            <m:t>𝑃</m:t>
+                          </m:r>
+                        </m:e>
+                        <m:sub>
+                          <m:r>
+                            <a:rPr lang="en-US" sz="3600" b="0" i="1" smtClean="0">
+                              <a:latin typeface="Cambria Math" panose="02040503050406030204" pitchFamily="18" charset="0"/>
+                            </a:rPr>
+                            <m:t>𝑤</m:t>
+                          </m:r>
+                        </m:sub>
+                        <m:sup>
+                          <m:r>
+                            <a:rPr lang="en-US" sz="3600" b="0" i="1" smtClean="0">
+                              <a:latin typeface="Cambria Math" panose="02040503050406030204" pitchFamily="18" charset="0"/>
+                            </a:rPr>
+                            <m:t> </m:t>
+                          </m:r>
+                        </m:sup>
+                      </m:sSubSup>
+                    </m:oMath>
+                  </m:oMathPara>
+                </a14:m>
+                <a:endParaRPr lang="en-US" sz="3600" dirty="0"/>
+              </a:p>
+            </p:txBody>
+          </p:sp>
+        </mc:Choice>
+        <mc:Fallback>
+          <p:sp>
+            <p:nvSpPr>
+              <p:cNvPr id="10" name="TextBox 9">
+                <a:extLst>
+                  <a:ext uri="{FF2B5EF4-FFF2-40B4-BE49-F238E27FC236}">
+                    <a16:creationId xmlns:a16="http://schemas.microsoft.com/office/drawing/2014/main" id="{163C9F3E-3FD8-275C-ABE8-A856655B0F92}"/>
+                  </a:ext>
+                </a:extLst>
+              </p:cNvPr>
+              <p:cNvSpPr txBox="1">
+                <a:spLocks noRot="1" noChangeAspect="1" noMove="1" noResize="1" noEditPoints="1" noAdjustHandles="1" noChangeArrowheads="1" noChangeShapeType="1" noTextEdit="1"/>
+              </p:cNvSpPr>
+              <p:nvPr/>
+            </p:nvSpPr>
+            <p:spPr>
+              <a:xfrm>
+                <a:off x="1557882" y="4605854"/>
+                <a:ext cx="594778" cy="553998"/>
+              </a:xfrm>
+              <a:prstGeom prst="rect">
+                <a:avLst/>
+              </a:prstGeom>
+              <a:blipFill>
+                <a:blip r:embed="rId5"/>
+                <a:stretch>
+                  <a:fillRect/>
+                </a:stretch>
+              </a:blipFill>
+            </p:spPr>
+            <p:txBody>
+              <a:bodyPr/>
+              <a:lstStyle/>
+              <a:p>
+                <a:r>
+                  <a:rPr lang="en-US">
+                    <a:noFill/>
+                  </a:rPr>
+                  <a:t> </a:t>
+                </a:r>
+              </a:p>
+            </p:txBody>
+          </p:sp>
+        </mc:Fallback>
+      </mc:AlternateContent>
+    </p:spTree>
+    <p:extLst>
+      <p:ext uri="{BB962C8B-B14F-4D97-AF65-F5344CB8AC3E}">
+        <p14:creationId xmlns:p14="http://schemas.microsoft.com/office/powerpoint/2010/main" val="1642758443"/>
+      </p:ext>
+    </p:extLst>
+  </p:cSld>
+  <p:clrMapOvr>
+    <a:masterClrMapping/>
+  </p:clrMapOvr>
+</p:sld>
+</file>
+
+<file path=ppt/slides/slide47.xml><?xml version="1.0" encoding="utf-8"?>
+<p:sld xmlns:a="http://schemas.openxmlformats.org/drawingml/2006/main" xmlns:r="http://schemas.openxmlformats.org/officeDocument/2006/relationships" xmlns:p="http://schemas.openxmlformats.org/presentationml/2006/main">
+  <p:cSld>
+    <p:spTree>
+      <p:nvGrpSpPr>
+        <p:cNvPr id="1" name="">
+          <a:extLst>
+            <a:ext uri="{FF2B5EF4-FFF2-40B4-BE49-F238E27FC236}">
+              <a16:creationId xmlns:a16="http://schemas.microsoft.com/office/drawing/2014/main" id="{BE675762-9D68-509C-1585-774541E92081}"/>
+            </a:ext>
+          </a:extLst>
+        </p:cNvPr>
+        <p:cNvGrpSpPr/>
+        <p:nvPr/>
+      </p:nvGrpSpPr>
+      <p:grpSpPr>
+        <a:xfrm>
+          <a:off x="0" y="0"/>
+          <a:ext cx="0" cy="0"/>
+          <a:chOff x="0" y="0"/>
+          <a:chExt cx="0" cy="0"/>
+        </a:xfrm>
+      </p:grpSpPr>
+      <p:cxnSp>
+        <p:nvCxnSpPr>
+          <p:cNvPr id="3" name="Straight Connector 2">
+            <a:extLst>
+              <a:ext uri="{FF2B5EF4-FFF2-40B4-BE49-F238E27FC236}">
+                <a16:creationId xmlns:a16="http://schemas.microsoft.com/office/drawing/2014/main" id="{16C4B93C-DF62-2A1F-E226-13B4C2C05A8F}"/>
+              </a:ext>
+            </a:extLst>
+          </p:cNvPr>
+          <p:cNvCxnSpPr>
+            <a:cxnSpLocks/>
+          </p:cNvCxnSpPr>
+          <p:nvPr/>
+        </p:nvCxnSpPr>
+        <p:spPr>
+          <a:xfrm>
+            <a:off x="2298071" y="1191491"/>
+            <a:ext cx="6430293" cy="4717473"/>
+          </a:xfrm>
+          <a:prstGeom prst="line">
+            <a:avLst/>
+          </a:prstGeom>
+          <a:ln w="57150">
+            <a:solidFill>
+              <a:srgbClr val="C00000"/>
+            </a:solidFill>
+          </a:ln>
+        </p:spPr>
+        <p:style>
+          <a:lnRef idx="2">
+            <a:schemeClr val="accent1"/>
+          </a:lnRef>
+          <a:fillRef idx="0">
+            <a:schemeClr val="accent1"/>
+          </a:fillRef>
+          <a:effectRef idx="1">
+            <a:schemeClr val="accent1"/>
+          </a:effectRef>
+          <a:fontRef idx="minor">
+            <a:schemeClr val="tx1"/>
+          </a:fontRef>
+        </p:style>
+      </p:cxnSp>
+      <p:grpSp>
+        <p:nvGrpSpPr>
+          <p:cNvPr id="4" name="Group 3">
+            <a:extLst>
+              <a:ext uri="{FF2B5EF4-FFF2-40B4-BE49-F238E27FC236}">
+                <a16:creationId xmlns:a16="http://schemas.microsoft.com/office/drawing/2014/main" id="{746F5067-0FE3-B46D-EBE4-2FE3E7D015B2}"/>
+              </a:ext>
+            </a:extLst>
+          </p:cNvPr>
+          <p:cNvGrpSpPr/>
+          <p:nvPr/>
+        </p:nvGrpSpPr>
+        <p:grpSpPr>
+          <a:xfrm>
+            <a:off x="2298071" y="509257"/>
+            <a:ext cx="6601485" cy="5839485"/>
+            <a:chOff x="1023042" y="115432"/>
+            <a:chExt cx="9942214" cy="6627136"/>
+          </a:xfrm>
+        </p:grpSpPr>
+        <p:cxnSp>
+          <p:nvCxnSpPr>
+            <p:cNvPr id="5" name="Straight Connector 4">
+              <a:extLst>
+                <a:ext uri="{FF2B5EF4-FFF2-40B4-BE49-F238E27FC236}">
+                  <a16:creationId xmlns:a16="http://schemas.microsoft.com/office/drawing/2014/main" id="{470599BF-8880-6933-343A-E31FBC69EEE7}"/>
+                </a:ext>
+              </a:extLst>
+            </p:cNvPr>
+            <p:cNvCxnSpPr/>
+            <p:nvPr/>
+          </p:nvCxnSpPr>
+          <p:spPr>
+            <a:xfrm>
+              <a:off x="1032095" y="115432"/>
+              <a:ext cx="0" cy="6627136"/>
+            </a:xfrm>
+            <a:prstGeom prst="line">
+              <a:avLst/>
+            </a:prstGeom>
+            <a:ln w="57150"/>
+          </p:spPr>
+          <p:style>
+            <a:lnRef idx="3">
+              <a:schemeClr val="dk1"/>
+            </a:lnRef>
+            <a:fillRef idx="0">
+              <a:schemeClr val="dk1"/>
+            </a:fillRef>
+            <a:effectRef idx="2">
+              <a:schemeClr val="dk1"/>
+            </a:effectRef>
+            <a:fontRef idx="minor">
+              <a:schemeClr val="tx1"/>
+            </a:fontRef>
+          </p:style>
+        </p:cxnSp>
+        <p:cxnSp>
+          <p:nvCxnSpPr>
+            <p:cNvPr id="6" name="Straight Connector 5">
+              <a:extLst>
+                <a:ext uri="{FF2B5EF4-FFF2-40B4-BE49-F238E27FC236}">
+                  <a16:creationId xmlns:a16="http://schemas.microsoft.com/office/drawing/2014/main" id="{03E37C18-4E8D-0A05-8132-3B95C534A9E2}"/>
+                </a:ext>
+              </a:extLst>
+            </p:cNvPr>
+            <p:cNvCxnSpPr>
+              <a:cxnSpLocks/>
+            </p:cNvCxnSpPr>
+            <p:nvPr/>
+          </p:nvCxnSpPr>
+          <p:spPr>
+            <a:xfrm flipH="1">
+              <a:off x="1023042" y="6732006"/>
+              <a:ext cx="9942214" cy="0"/>
+            </a:xfrm>
+            <a:prstGeom prst="line">
+              <a:avLst/>
+            </a:prstGeom>
+            <a:ln w="57150"/>
+          </p:spPr>
+          <p:style>
+            <a:lnRef idx="3">
+              <a:schemeClr val="dk1"/>
+            </a:lnRef>
+            <a:fillRef idx="0">
+              <a:schemeClr val="dk1"/>
+            </a:fillRef>
+            <a:effectRef idx="2">
+              <a:schemeClr val="dk1"/>
+            </a:effectRef>
+            <a:fontRef idx="minor">
+              <a:schemeClr val="tx1"/>
+            </a:fontRef>
+          </p:style>
+        </p:cxnSp>
+      </p:grpSp>
+      <p:sp>
+        <p:nvSpPr>
+          <p:cNvPr id="7" name="TextBox 6">
+            <a:extLst>
+              <a:ext uri="{FF2B5EF4-FFF2-40B4-BE49-F238E27FC236}">
+                <a16:creationId xmlns:a16="http://schemas.microsoft.com/office/drawing/2014/main" id="{A7899C2B-CFB9-EDEC-2944-E1A750DF1E5B}"/>
+              </a:ext>
+            </a:extLst>
+          </p:cNvPr>
+          <p:cNvSpPr txBox="1"/>
+          <p:nvPr/>
+        </p:nvSpPr>
+        <p:spPr>
+          <a:xfrm>
+            <a:off x="1191492" y="324591"/>
+            <a:ext cx="1106580" cy="523220"/>
+          </a:xfrm>
+          <a:prstGeom prst="rect">
+            <a:avLst/>
+          </a:prstGeom>
+          <a:noFill/>
+        </p:spPr>
+        <p:txBody>
+          <a:bodyPr wrap="square" rtlCol="0">
+            <a:spAutoFit/>
+          </a:bodyPr>
+          <a:lstStyle/>
+          <a:p>
+            <a:r>
+              <a:rPr lang="en-US" sz="2800" dirty="0">
+                <a:latin typeface="Aharoni" panose="02010803020104030203" pitchFamily="2" charset="-79"/>
+                <a:cs typeface="Aharoni" panose="02010803020104030203" pitchFamily="2" charset="-79"/>
+              </a:rPr>
+              <a:t>Price</a:t>
+            </a:r>
+            <a:endParaRPr lang="en-US" sz="2800" b="1" dirty="0">
+              <a:latin typeface="Aharoni" panose="02010803020104030203" pitchFamily="2" charset="-79"/>
+              <a:cs typeface="Aharoni" panose="02010803020104030203" pitchFamily="2" charset="-79"/>
+            </a:endParaRPr>
+          </a:p>
+        </p:txBody>
+      </p:sp>
+      <p:sp>
+        <p:nvSpPr>
+          <p:cNvPr id="11" name="TextBox 10">
+            <a:extLst>
+              <a:ext uri="{FF2B5EF4-FFF2-40B4-BE49-F238E27FC236}">
+                <a16:creationId xmlns:a16="http://schemas.microsoft.com/office/drawing/2014/main" id="{1E488D9B-55EB-02B6-8144-C0F4822F8127}"/>
+              </a:ext>
+            </a:extLst>
+          </p:cNvPr>
+          <p:cNvSpPr txBox="1"/>
+          <p:nvPr/>
+        </p:nvSpPr>
+        <p:spPr>
+          <a:xfrm>
+            <a:off x="8899555" y="6077825"/>
+            <a:ext cx="1775371" cy="523220"/>
+          </a:xfrm>
+          <a:prstGeom prst="rect">
+            <a:avLst/>
+          </a:prstGeom>
+          <a:noFill/>
+        </p:spPr>
+        <p:txBody>
+          <a:bodyPr wrap="square" rtlCol="0">
+            <a:spAutoFit/>
+          </a:bodyPr>
+          <a:lstStyle/>
+          <a:p>
+            <a:r>
+              <a:rPr lang="en-US" sz="2800" dirty="0">
+                <a:latin typeface="Aharoni" panose="02010803020104030203" pitchFamily="2" charset="-79"/>
+                <a:cs typeface="Aharoni" panose="02010803020104030203" pitchFamily="2" charset="-79"/>
+              </a:rPr>
+              <a:t>Quantity</a:t>
+            </a:r>
+            <a:endParaRPr lang="en-US" sz="2800" b="1" dirty="0">
+              <a:latin typeface="Aharoni" panose="02010803020104030203" pitchFamily="2" charset="-79"/>
+              <a:cs typeface="Aharoni" panose="02010803020104030203" pitchFamily="2" charset="-79"/>
+            </a:endParaRPr>
+          </a:p>
+        </p:txBody>
+      </p:sp>
+      <p:cxnSp>
+        <p:nvCxnSpPr>
+          <p:cNvPr id="12" name="Straight Connector 11">
+            <a:extLst>
+              <a:ext uri="{FF2B5EF4-FFF2-40B4-BE49-F238E27FC236}">
+                <a16:creationId xmlns:a16="http://schemas.microsoft.com/office/drawing/2014/main" id="{5AD97BE9-5729-F9EE-2952-719C11CE8ABA}"/>
+              </a:ext>
+            </a:extLst>
+          </p:cNvPr>
+          <p:cNvCxnSpPr>
+            <a:cxnSpLocks/>
+          </p:cNvCxnSpPr>
+          <p:nvPr/>
+        </p:nvCxnSpPr>
+        <p:spPr>
+          <a:xfrm flipV="1">
+            <a:off x="2310093" y="1032164"/>
+            <a:ext cx="6321289" cy="4876800"/>
+          </a:xfrm>
+          <a:prstGeom prst="line">
+            <a:avLst/>
+          </a:prstGeom>
+          <a:ln w="57150">
+            <a:solidFill>
+              <a:schemeClr val="accent6"/>
+            </a:solidFill>
+          </a:ln>
+        </p:spPr>
+        <p:style>
+          <a:lnRef idx="2">
+            <a:schemeClr val="accent1"/>
+          </a:lnRef>
+          <a:fillRef idx="0">
+            <a:schemeClr val="accent1"/>
+          </a:fillRef>
+          <a:effectRef idx="1">
+            <a:schemeClr val="accent1"/>
+          </a:effectRef>
+          <a:fontRef idx="minor">
+            <a:schemeClr val="tx1"/>
+          </a:fontRef>
+        </p:style>
+      </p:cxnSp>
+      <mc:AlternateContent xmlns:mc="http://schemas.openxmlformats.org/markup-compatibility/2006">
+        <mc:Choice xmlns:a14="http://schemas.microsoft.com/office/drawing/2010/main" Requires="a14">
+          <p:sp>
+            <p:nvSpPr>
+              <p:cNvPr id="20" name="TextBox 19">
+                <a:extLst>
+                  <a:ext uri="{FF2B5EF4-FFF2-40B4-BE49-F238E27FC236}">
+                    <a16:creationId xmlns:a16="http://schemas.microsoft.com/office/drawing/2014/main" id="{3EDDE33B-EBDC-E90F-A2ED-44378D7B7460}"/>
+                  </a:ext>
+                </a:extLst>
+              </p:cNvPr>
+              <p:cNvSpPr txBox="1"/>
+              <p:nvPr/>
+            </p:nvSpPr>
+            <p:spPr>
+              <a:xfrm>
+                <a:off x="1625610" y="3210301"/>
+                <a:ext cx="575479" cy="553998"/>
+              </a:xfrm>
+              <a:prstGeom prst="rect">
+                <a:avLst/>
+              </a:prstGeom>
+              <a:noFill/>
+            </p:spPr>
+            <p:txBody>
+              <a:bodyPr wrap="none" lIns="0" tIns="0" rIns="0" bIns="0" rtlCol="0">
+                <a:spAutoFit/>
+              </a:bodyPr>
+              <a:lstStyle/>
+              <a:p>
+                <a:pPr/>
+                <a14:m>
+                  <m:oMathPara xmlns:m="http://schemas.openxmlformats.org/officeDocument/2006/math">
+                    <m:oMathParaPr>
+                      <m:jc m:val="centerGroup"/>
+                    </m:oMathParaPr>
+                    <m:oMath xmlns:m="http://schemas.openxmlformats.org/officeDocument/2006/math">
+                      <m:sSup>
+                        <m:sSupPr>
+                          <m:ctrlPr>
+                            <a:rPr lang="en-US" sz="3600" b="0" i="1" smtClean="0">
+                              <a:latin typeface="Cambria Math" panose="02040503050406030204" pitchFamily="18" charset="0"/>
+                            </a:rPr>
+                          </m:ctrlPr>
+                        </m:sSupPr>
+                        <m:e>
+                          <m:r>
+                            <a:rPr lang="en-US" sz="3600" b="0" i="1" smtClean="0">
+                              <a:latin typeface="Cambria Math" panose="02040503050406030204" pitchFamily="18" charset="0"/>
+                            </a:rPr>
+                            <m:t>𝑃</m:t>
+                          </m:r>
+                        </m:e>
+                        <m:sup>
+                          <m:r>
+                            <a:rPr lang="en-US" sz="3600" b="0" i="1" smtClean="0">
+                              <a:latin typeface="Cambria Math" panose="02040503050406030204" pitchFamily="18" charset="0"/>
+                            </a:rPr>
+                            <m:t>∗</m:t>
+                          </m:r>
+                        </m:sup>
+                      </m:sSup>
+                    </m:oMath>
+                  </m:oMathPara>
+                </a14:m>
+                <a:endParaRPr lang="en-US" sz="3600" dirty="0"/>
+              </a:p>
+            </p:txBody>
+          </p:sp>
+        </mc:Choice>
+        <mc:Fallback>
+          <p:sp>
+            <p:nvSpPr>
+              <p:cNvPr id="20" name="TextBox 19">
+                <a:extLst>
+                  <a:ext uri="{FF2B5EF4-FFF2-40B4-BE49-F238E27FC236}">
+                    <a16:creationId xmlns:a16="http://schemas.microsoft.com/office/drawing/2014/main" id="{3EDDE33B-EBDC-E90F-A2ED-44378D7B7460}"/>
+                  </a:ext>
+                </a:extLst>
+              </p:cNvPr>
+              <p:cNvSpPr txBox="1">
+                <a:spLocks noRot="1" noChangeAspect="1" noMove="1" noResize="1" noEditPoints="1" noAdjustHandles="1" noChangeArrowheads="1" noChangeShapeType="1" noTextEdit="1"/>
+              </p:cNvSpPr>
+              <p:nvPr/>
+            </p:nvSpPr>
+            <p:spPr>
+              <a:xfrm>
+                <a:off x="1625610" y="3210301"/>
+                <a:ext cx="575479" cy="553998"/>
+              </a:xfrm>
+              <a:prstGeom prst="rect">
+                <a:avLst/>
+              </a:prstGeom>
+              <a:blipFill>
+                <a:blip r:embed="rId2"/>
+                <a:stretch>
+                  <a:fillRect/>
+                </a:stretch>
+              </a:blipFill>
+            </p:spPr>
+            <p:txBody>
+              <a:bodyPr/>
+              <a:lstStyle/>
+              <a:p>
+                <a:r>
+                  <a:rPr lang="en-US">
+                    <a:noFill/>
+                  </a:rPr>
+                  <a:t> </a:t>
+                </a:r>
+              </a:p>
+            </p:txBody>
+          </p:sp>
+        </mc:Fallback>
+      </mc:AlternateContent>
+      <mc:AlternateContent xmlns:mc="http://schemas.openxmlformats.org/markup-compatibility/2006">
+        <mc:Choice xmlns:a14="http://schemas.microsoft.com/office/drawing/2010/main" Requires="a14">
+          <p:sp>
+            <p:nvSpPr>
+              <p:cNvPr id="21" name="TextBox 20">
+                <a:extLst>
+                  <a:ext uri="{FF2B5EF4-FFF2-40B4-BE49-F238E27FC236}">
+                    <a16:creationId xmlns:a16="http://schemas.microsoft.com/office/drawing/2014/main" id="{7BCBFCF5-4C4C-4C50-D792-113331E59D0C}"/>
+                  </a:ext>
+                </a:extLst>
+              </p:cNvPr>
+              <p:cNvSpPr txBox="1"/>
+              <p:nvPr/>
+            </p:nvSpPr>
+            <p:spPr>
+              <a:xfrm>
+                <a:off x="3465633" y="6330124"/>
+                <a:ext cx="575479" cy="553998"/>
+              </a:xfrm>
+              <a:prstGeom prst="rect">
+                <a:avLst/>
+              </a:prstGeom>
+              <a:noFill/>
+            </p:spPr>
+            <p:txBody>
+              <a:bodyPr wrap="square" lIns="0" tIns="0" rIns="0" bIns="0" rtlCol="0">
+                <a:spAutoFit/>
+              </a:bodyPr>
+              <a:lstStyle/>
+              <a:p>
+                <a:pPr/>
+                <a14:m>
+                  <m:oMathPara xmlns:m="http://schemas.openxmlformats.org/officeDocument/2006/math">
+                    <m:oMathParaPr>
+                      <m:jc m:val="centerGroup"/>
+                    </m:oMathParaPr>
+                    <m:oMath xmlns:m="http://schemas.openxmlformats.org/officeDocument/2006/math">
+                      <m:sSubSup>
+                        <m:sSubSupPr>
+                          <m:ctrlPr>
+                            <a:rPr lang="en-US" sz="3600" b="0" i="1" smtClean="0">
+                              <a:latin typeface="Cambria Math" panose="02040503050406030204" pitchFamily="18" charset="0"/>
+                            </a:rPr>
+                          </m:ctrlPr>
+                        </m:sSubSupPr>
+                        <m:e>
+                          <m:r>
+                            <a:rPr lang="en-US" sz="3600" b="0" i="1" smtClean="0">
+                              <a:latin typeface="Cambria Math" panose="02040503050406030204" pitchFamily="18" charset="0"/>
+                            </a:rPr>
+                            <m:t>𝑄</m:t>
+                          </m:r>
+                        </m:e>
+                        <m:sub>
+                          <m:r>
+                            <a:rPr lang="en-US" sz="3600" b="0" i="1" smtClean="0">
+                              <a:latin typeface="Cambria Math" panose="02040503050406030204" pitchFamily="18" charset="0"/>
+                            </a:rPr>
+                            <m:t>1</m:t>
+                          </m:r>
+                        </m:sub>
+                        <m:sup>
+                          <m:r>
+                            <a:rPr lang="en-US" sz="3600" b="0" i="1" smtClean="0">
+                              <a:latin typeface="Cambria Math" panose="02040503050406030204" pitchFamily="18" charset="0"/>
+                            </a:rPr>
+                            <m:t> </m:t>
+                          </m:r>
+                        </m:sup>
+                      </m:sSubSup>
+                    </m:oMath>
+                  </m:oMathPara>
+                </a14:m>
+                <a:endParaRPr lang="en-US" sz="3600" dirty="0"/>
+              </a:p>
+            </p:txBody>
+          </p:sp>
+        </mc:Choice>
+        <mc:Fallback>
+          <p:sp>
+            <p:nvSpPr>
+              <p:cNvPr id="21" name="TextBox 20">
+                <a:extLst>
+                  <a:ext uri="{FF2B5EF4-FFF2-40B4-BE49-F238E27FC236}">
+                    <a16:creationId xmlns:a16="http://schemas.microsoft.com/office/drawing/2014/main" id="{7BCBFCF5-4C4C-4C50-D792-113331E59D0C}"/>
+                  </a:ext>
+                </a:extLst>
+              </p:cNvPr>
+              <p:cNvSpPr txBox="1">
+                <a:spLocks noRot="1" noChangeAspect="1" noMove="1" noResize="1" noEditPoints="1" noAdjustHandles="1" noChangeArrowheads="1" noChangeShapeType="1" noTextEdit="1"/>
+              </p:cNvSpPr>
+              <p:nvPr/>
+            </p:nvSpPr>
+            <p:spPr>
+              <a:xfrm>
+                <a:off x="3465633" y="6330124"/>
+                <a:ext cx="575479" cy="553998"/>
+              </a:xfrm>
+              <a:prstGeom prst="rect">
+                <a:avLst/>
+              </a:prstGeom>
+              <a:blipFill>
+                <a:blip r:embed="rId3"/>
+                <a:stretch>
+                  <a:fillRect/>
+                </a:stretch>
+              </a:blipFill>
+            </p:spPr>
+            <p:txBody>
+              <a:bodyPr/>
+              <a:lstStyle/>
+              <a:p>
+                <a:r>
+                  <a:rPr lang="en-US">
+                    <a:noFill/>
+                  </a:rPr>
+                  <a:t> </a:t>
+                </a:r>
+              </a:p>
+            </p:txBody>
+          </p:sp>
+        </mc:Fallback>
+      </mc:AlternateContent>
+      <p:grpSp>
+        <p:nvGrpSpPr>
+          <p:cNvPr id="15" name="Group 14">
+            <a:extLst>
+              <a:ext uri="{FF2B5EF4-FFF2-40B4-BE49-F238E27FC236}">
+                <a16:creationId xmlns:a16="http://schemas.microsoft.com/office/drawing/2014/main" id="{8FF7CBA4-0F37-F021-C1A3-D365C5942CB0}"/>
+              </a:ext>
+            </a:extLst>
+          </p:cNvPr>
+          <p:cNvGrpSpPr/>
+          <p:nvPr/>
+        </p:nvGrpSpPr>
+        <p:grpSpPr>
+          <a:xfrm>
+            <a:off x="2298071" y="4882853"/>
+            <a:ext cx="5040777" cy="1465889"/>
+            <a:chOff x="2298071" y="4882853"/>
+            <a:chExt cx="5040777" cy="1465889"/>
+          </a:xfrm>
+        </p:grpSpPr>
+        <p:grpSp>
+          <p:nvGrpSpPr>
+            <p:cNvPr id="16" name="Group 15">
+              <a:extLst>
+                <a:ext uri="{FF2B5EF4-FFF2-40B4-BE49-F238E27FC236}">
+                  <a16:creationId xmlns:a16="http://schemas.microsoft.com/office/drawing/2014/main" id="{BF0CA429-0F6C-D2E6-E7B5-787A68DF4CCA}"/>
+                </a:ext>
+              </a:extLst>
+            </p:cNvPr>
+            <p:cNvGrpSpPr/>
+            <p:nvPr/>
+          </p:nvGrpSpPr>
+          <p:grpSpPr>
+            <a:xfrm>
+              <a:off x="2298071" y="4882853"/>
+              <a:ext cx="5040777" cy="1447271"/>
+              <a:chOff x="2333625" y="1600298"/>
+              <a:chExt cx="1160145" cy="4477528"/>
+            </a:xfrm>
+          </p:grpSpPr>
+          <p:cxnSp>
+            <p:nvCxnSpPr>
+              <p:cNvPr id="17" name="Straight Connector 16">
+                <a:extLst>
+                  <a:ext uri="{FF2B5EF4-FFF2-40B4-BE49-F238E27FC236}">
+                    <a16:creationId xmlns:a16="http://schemas.microsoft.com/office/drawing/2014/main" id="{58F5470D-F8A7-243B-1341-A5D8943C481A}"/>
+                  </a:ext>
+                </a:extLst>
+              </p:cNvPr>
+              <p:cNvCxnSpPr>
+                <a:cxnSpLocks/>
+              </p:cNvCxnSpPr>
+              <p:nvPr/>
+            </p:nvCxnSpPr>
+            <p:spPr>
+              <a:xfrm>
+                <a:off x="2333625" y="1600298"/>
+                <a:ext cx="1160145" cy="0"/>
+              </a:xfrm>
+              <a:prstGeom prst="line">
+                <a:avLst/>
+              </a:prstGeom>
+              <a:ln>
+                <a:prstDash val="dash"/>
+              </a:ln>
+            </p:spPr>
+            <p:style>
+              <a:lnRef idx="2">
+                <a:schemeClr val="accent1"/>
+              </a:lnRef>
+              <a:fillRef idx="0">
+                <a:schemeClr val="accent1"/>
+              </a:fillRef>
+              <a:effectRef idx="1">
+                <a:schemeClr val="accent1"/>
+              </a:effectRef>
+              <a:fontRef idx="minor">
+                <a:schemeClr val="tx1"/>
+              </a:fontRef>
+            </p:style>
+          </p:cxnSp>
+          <p:cxnSp>
+            <p:nvCxnSpPr>
+              <p:cNvPr id="18" name="Straight Connector 17">
+                <a:extLst>
+                  <a:ext uri="{FF2B5EF4-FFF2-40B4-BE49-F238E27FC236}">
+                    <a16:creationId xmlns:a16="http://schemas.microsoft.com/office/drawing/2014/main" id="{2978E546-1B9C-0253-6B07-EFB955C73F14}"/>
+                  </a:ext>
+                </a:extLst>
+              </p:cNvPr>
+              <p:cNvCxnSpPr>
+                <a:cxnSpLocks/>
+              </p:cNvCxnSpPr>
+              <p:nvPr/>
+            </p:nvCxnSpPr>
+            <p:spPr>
+              <a:xfrm>
+                <a:off x="3493770" y="1600298"/>
+                <a:ext cx="0" cy="4477528"/>
+              </a:xfrm>
+              <a:prstGeom prst="line">
+                <a:avLst/>
+              </a:prstGeom>
+              <a:ln>
+                <a:prstDash val="dash"/>
+              </a:ln>
+            </p:spPr>
+            <p:style>
+              <a:lnRef idx="2">
+                <a:schemeClr val="accent1"/>
+              </a:lnRef>
+              <a:fillRef idx="0">
+                <a:schemeClr val="accent1"/>
+              </a:fillRef>
+              <a:effectRef idx="1">
+                <a:schemeClr val="accent1"/>
+              </a:effectRef>
+              <a:fontRef idx="minor">
+                <a:schemeClr val="tx1"/>
+              </a:fontRef>
+            </p:style>
+          </p:cxnSp>
+        </p:grpSp>
+        <p:cxnSp>
+          <p:nvCxnSpPr>
+            <p:cNvPr id="2" name="Straight Connector 1">
+              <a:extLst>
+                <a:ext uri="{FF2B5EF4-FFF2-40B4-BE49-F238E27FC236}">
+                  <a16:creationId xmlns:a16="http://schemas.microsoft.com/office/drawing/2014/main" id="{7C9175A3-34C0-3E85-2FD3-49CABA6101CD}"/>
+                </a:ext>
+              </a:extLst>
+            </p:cNvPr>
+            <p:cNvCxnSpPr>
+              <a:cxnSpLocks/>
+            </p:cNvCxnSpPr>
+            <p:nvPr/>
+          </p:nvCxnSpPr>
+          <p:spPr>
+            <a:xfrm>
+              <a:off x="3660228" y="4901471"/>
+              <a:ext cx="0" cy="1447271"/>
+            </a:xfrm>
+            <a:prstGeom prst="line">
+              <a:avLst/>
+            </a:prstGeom>
+            <a:ln>
+              <a:prstDash val="dash"/>
+            </a:ln>
+          </p:spPr>
+          <p:style>
+            <a:lnRef idx="2">
+              <a:schemeClr val="accent1"/>
+            </a:lnRef>
+            <a:fillRef idx="0">
+              <a:schemeClr val="accent1"/>
+            </a:fillRef>
+            <a:effectRef idx="1">
+              <a:schemeClr val="accent1"/>
+            </a:effectRef>
+            <a:fontRef idx="minor">
+              <a:schemeClr val="tx1"/>
+            </a:fontRef>
+          </p:style>
+        </p:cxnSp>
+      </p:grpSp>
+      <mc:AlternateContent xmlns:mc="http://schemas.openxmlformats.org/markup-compatibility/2006">
+        <mc:Choice xmlns:a14="http://schemas.microsoft.com/office/drawing/2010/main" Requires="a14">
+          <p:sp>
+            <p:nvSpPr>
+              <p:cNvPr id="8" name="TextBox 7">
+                <a:extLst>
+                  <a:ext uri="{FF2B5EF4-FFF2-40B4-BE49-F238E27FC236}">
+                    <a16:creationId xmlns:a16="http://schemas.microsoft.com/office/drawing/2014/main" id="{129EE1B5-1FFA-4C79-5AD8-7EE7668D06B7}"/>
+                  </a:ext>
+                </a:extLst>
+              </p:cNvPr>
+              <p:cNvSpPr txBox="1"/>
+              <p:nvPr/>
+            </p:nvSpPr>
+            <p:spPr>
+              <a:xfrm>
+                <a:off x="7051108" y="6314199"/>
+                <a:ext cx="575479" cy="566245"/>
+              </a:xfrm>
+              <a:prstGeom prst="rect">
+                <a:avLst/>
+              </a:prstGeom>
+              <a:noFill/>
+            </p:spPr>
+            <p:txBody>
+              <a:bodyPr wrap="square" lIns="0" tIns="0" rIns="0" bIns="0" rtlCol="0">
+                <a:spAutoFit/>
+              </a:bodyPr>
+              <a:lstStyle/>
+              <a:p>
+                <a:pPr/>
+                <a14:m>
+                  <m:oMathPara xmlns:m="http://schemas.openxmlformats.org/officeDocument/2006/math">
+                    <m:oMathParaPr>
+                      <m:jc m:val="centerGroup"/>
+                    </m:oMathParaPr>
+                    <m:oMath xmlns:m="http://schemas.openxmlformats.org/officeDocument/2006/math">
+                      <m:sSubSup>
+                        <m:sSubSupPr>
+                          <m:ctrlPr>
+                            <a:rPr lang="en-US" sz="3600" b="0" i="1" smtClean="0">
+                              <a:latin typeface="Cambria Math" panose="02040503050406030204" pitchFamily="18" charset="0"/>
+                            </a:rPr>
+                          </m:ctrlPr>
+                        </m:sSubSupPr>
+                        <m:e>
+                          <m:r>
+                            <a:rPr lang="en-US" sz="3600" b="0" i="1" smtClean="0">
+                              <a:latin typeface="Cambria Math" panose="02040503050406030204" pitchFamily="18" charset="0"/>
+                            </a:rPr>
+                            <m:t>𝑄</m:t>
+                          </m:r>
+                        </m:e>
+                        <m:sub>
+                          <m:r>
+                            <a:rPr lang="en-US" sz="3600" b="0" i="1" smtClean="0">
+                              <a:latin typeface="Cambria Math" panose="02040503050406030204" pitchFamily="18" charset="0"/>
+                            </a:rPr>
+                            <m:t>2</m:t>
+                          </m:r>
+                        </m:sub>
+                        <m:sup>
+                          <m:r>
+                            <a:rPr lang="en-US" sz="3600" b="0" i="1" smtClean="0">
+                              <a:latin typeface="Cambria Math" panose="02040503050406030204" pitchFamily="18" charset="0"/>
+                            </a:rPr>
+                            <m:t> </m:t>
+                          </m:r>
+                        </m:sup>
+                      </m:sSubSup>
+                    </m:oMath>
+                  </m:oMathPara>
+                </a14:m>
+                <a:endParaRPr lang="en-US" sz="3600" dirty="0"/>
+              </a:p>
+            </p:txBody>
+          </p:sp>
+        </mc:Choice>
+        <mc:Fallback>
+          <p:sp>
+            <p:nvSpPr>
+              <p:cNvPr id="8" name="TextBox 7">
+                <a:extLst>
+                  <a:ext uri="{FF2B5EF4-FFF2-40B4-BE49-F238E27FC236}">
+                    <a16:creationId xmlns:a16="http://schemas.microsoft.com/office/drawing/2014/main" id="{129EE1B5-1FFA-4C79-5AD8-7EE7668D06B7}"/>
+                  </a:ext>
+                </a:extLst>
+              </p:cNvPr>
+              <p:cNvSpPr txBox="1">
+                <a:spLocks noRot="1" noChangeAspect="1" noMove="1" noResize="1" noEditPoints="1" noAdjustHandles="1" noChangeArrowheads="1" noChangeShapeType="1" noTextEdit="1"/>
+              </p:cNvSpPr>
+              <p:nvPr/>
+            </p:nvSpPr>
+            <p:spPr>
+              <a:xfrm>
+                <a:off x="7051108" y="6314199"/>
+                <a:ext cx="575479" cy="566245"/>
+              </a:xfrm>
+              <a:prstGeom prst="rect">
+                <a:avLst/>
+              </a:prstGeom>
+              <a:blipFill>
+                <a:blip r:embed="rId4"/>
+                <a:stretch>
+                  <a:fillRect/>
+                </a:stretch>
+              </a:blipFill>
+            </p:spPr>
+            <p:txBody>
+              <a:bodyPr/>
+              <a:lstStyle/>
+              <a:p>
+                <a:r>
+                  <a:rPr lang="en-US">
+                    <a:noFill/>
+                  </a:rPr>
+                  <a:t> </a:t>
+                </a:r>
+              </a:p>
+            </p:txBody>
+          </p:sp>
+        </mc:Fallback>
+      </mc:AlternateContent>
+      <mc:AlternateContent xmlns:mc="http://schemas.openxmlformats.org/markup-compatibility/2006">
+        <mc:Choice xmlns:a14="http://schemas.microsoft.com/office/drawing/2010/main" Requires="a14">
+          <p:sp>
+            <p:nvSpPr>
+              <p:cNvPr id="9" name="TextBox 8">
+                <a:extLst>
+                  <a:ext uri="{FF2B5EF4-FFF2-40B4-BE49-F238E27FC236}">
+                    <a16:creationId xmlns:a16="http://schemas.microsoft.com/office/drawing/2014/main" id="{94067C8A-A543-1488-FC51-DF9799A95F6D}"/>
+                  </a:ext>
+                </a:extLst>
+              </p:cNvPr>
+              <p:cNvSpPr txBox="1"/>
+              <p:nvPr/>
+            </p:nvSpPr>
+            <p:spPr>
+              <a:xfrm>
+                <a:off x="1557882" y="4605854"/>
+                <a:ext cx="594778" cy="553998"/>
+              </a:xfrm>
+              <a:prstGeom prst="rect">
+                <a:avLst/>
+              </a:prstGeom>
+              <a:noFill/>
+            </p:spPr>
+            <p:txBody>
+              <a:bodyPr wrap="none" lIns="0" tIns="0" rIns="0" bIns="0" rtlCol="0">
+                <a:spAutoFit/>
+              </a:bodyPr>
+              <a:lstStyle/>
+              <a:p>
+                <a:pPr/>
+                <a14:m>
+                  <m:oMathPara xmlns:m="http://schemas.openxmlformats.org/officeDocument/2006/math">
+                    <m:oMathParaPr>
+                      <m:jc m:val="centerGroup"/>
+                    </m:oMathParaPr>
+                    <m:oMath xmlns:m="http://schemas.openxmlformats.org/officeDocument/2006/math">
+                      <m:sSubSup>
+                        <m:sSubSupPr>
+                          <m:ctrlPr>
+                            <a:rPr lang="en-US" sz="3600" b="0" i="1" smtClean="0">
+                              <a:latin typeface="Cambria Math" panose="02040503050406030204" pitchFamily="18" charset="0"/>
+                            </a:rPr>
+                          </m:ctrlPr>
+                        </m:sSubSupPr>
+                        <m:e>
+                          <m:r>
+                            <a:rPr lang="en-US" sz="3600" b="0" i="1" smtClean="0">
+                              <a:latin typeface="Cambria Math" panose="02040503050406030204" pitchFamily="18" charset="0"/>
+                            </a:rPr>
+                            <m:t>𝑃</m:t>
+                          </m:r>
+                        </m:e>
+                        <m:sub>
+                          <m:r>
+                            <a:rPr lang="en-US" sz="3600" b="0" i="1" smtClean="0">
+                              <a:latin typeface="Cambria Math" panose="02040503050406030204" pitchFamily="18" charset="0"/>
+                            </a:rPr>
+                            <m:t>𝑤</m:t>
+                          </m:r>
+                        </m:sub>
+                        <m:sup>
+                          <m:r>
+                            <a:rPr lang="en-US" sz="3600" b="0" i="1" smtClean="0">
+                              <a:latin typeface="Cambria Math" panose="02040503050406030204" pitchFamily="18" charset="0"/>
+                            </a:rPr>
+                            <m:t> </m:t>
+                          </m:r>
+                        </m:sup>
+                      </m:sSubSup>
+                    </m:oMath>
+                  </m:oMathPara>
+                </a14:m>
+                <a:endParaRPr lang="en-US" sz="3600" dirty="0"/>
+              </a:p>
+            </p:txBody>
+          </p:sp>
+        </mc:Choice>
+        <mc:Fallback>
+          <p:sp>
+            <p:nvSpPr>
+              <p:cNvPr id="9" name="TextBox 8">
+                <a:extLst>
+                  <a:ext uri="{FF2B5EF4-FFF2-40B4-BE49-F238E27FC236}">
+                    <a16:creationId xmlns:a16="http://schemas.microsoft.com/office/drawing/2014/main" id="{94067C8A-A543-1488-FC51-DF9799A95F6D}"/>
+                  </a:ext>
+                </a:extLst>
+              </p:cNvPr>
+              <p:cNvSpPr txBox="1">
+                <a:spLocks noRot="1" noChangeAspect="1" noMove="1" noResize="1" noEditPoints="1" noAdjustHandles="1" noChangeArrowheads="1" noChangeShapeType="1" noTextEdit="1"/>
+              </p:cNvSpPr>
+              <p:nvPr/>
+            </p:nvSpPr>
+            <p:spPr>
+              <a:xfrm>
+                <a:off x="1557882" y="4605854"/>
+                <a:ext cx="594778" cy="553998"/>
+              </a:xfrm>
+              <a:prstGeom prst="rect">
+                <a:avLst/>
+              </a:prstGeom>
+              <a:blipFill>
+                <a:blip r:embed="rId5"/>
+                <a:stretch>
+                  <a:fillRect/>
+                </a:stretch>
+              </a:blipFill>
+            </p:spPr>
+            <p:txBody>
+              <a:bodyPr/>
+              <a:lstStyle/>
+              <a:p>
+                <a:r>
+                  <a:rPr lang="en-US">
+                    <a:noFill/>
+                  </a:rPr>
+                  <a:t> </a:t>
+                </a:r>
+              </a:p>
+            </p:txBody>
+          </p:sp>
+        </mc:Fallback>
+      </mc:AlternateContent>
+      <p:grpSp>
+        <p:nvGrpSpPr>
+          <p:cNvPr id="22" name="Group 21">
+            <a:extLst>
+              <a:ext uri="{FF2B5EF4-FFF2-40B4-BE49-F238E27FC236}">
+                <a16:creationId xmlns:a16="http://schemas.microsoft.com/office/drawing/2014/main" id="{D20ECEE2-DEA3-8C2D-7882-EBBBB3BD590D}"/>
+              </a:ext>
+            </a:extLst>
+          </p:cNvPr>
+          <p:cNvGrpSpPr/>
+          <p:nvPr/>
+        </p:nvGrpSpPr>
+        <p:grpSpPr>
+          <a:xfrm>
+            <a:off x="2301488" y="4194770"/>
+            <a:ext cx="4143742" cy="2099045"/>
+            <a:chOff x="2333625" y="1600298"/>
+            <a:chExt cx="1160145" cy="4477528"/>
+          </a:xfrm>
+        </p:grpSpPr>
+        <p:cxnSp>
+          <p:nvCxnSpPr>
+            <p:cNvPr id="24" name="Straight Connector 23">
+              <a:extLst>
+                <a:ext uri="{FF2B5EF4-FFF2-40B4-BE49-F238E27FC236}">
+                  <a16:creationId xmlns:a16="http://schemas.microsoft.com/office/drawing/2014/main" id="{069F09B4-55BF-9F3F-9C4E-651C4661FB8D}"/>
+                </a:ext>
+              </a:extLst>
+            </p:cNvPr>
+            <p:cNvCxnSpPr>
+              <a:cxnSpLocks/>
+            </p:cNvCxnSpPr>
+            <p:nvPr/>
+          </p:nvCxnSpPr>
+          <p:spPr>
+            <a:xfrm>
+              <a:off x="2333625" y="1600298"/>
+              <a:ext cx="1160145" cy="0"/>
+            </a:xfrm>
+            <a:prstGeom prst="line">
+              <a:avLst/>
+            </a:prstGeom>
+            <a:ln>
+              <a:prstDash val="dash"/>
+            </a:ln>
+          </p:spPr>
+          <p:style>
+            <a:lnRef idx="2">
+              <a:schemeClr val="accent1"/>
+            </a:lnRef>
+            <a:fillRef idx="0">
+              <a:schemeClr val="accent1"/>
+            </a:fillRef>
+            <a:effectRef idx="1">
+              <a:schemeClr val="accent1"/>
+            </a:effectRef>
+            <a:fontRef idx="minor">
+              <a:schemeClr val="tx1"/>
+            </a:fontRef>
+          </p:style>
+        </p:cxnSp>
+        <p:cxnSp>
+          <p:nvCxnSpPr>
+            <p:cNvPr id="25" name="Straight Connector 24">
+              <a:extLst>
+                <a:ext uri="{FF2B5EF4-FFF2-40B4-BE49-F238E27FC236}">
+                  <a16:creationId xmlns:a16="http://schemas.microsoft.com/office/drawing/2014/main" id="{59CA2575-4E06-B782-957E-69D938AB9E4D}"/>
+                </a:ext>
+              </a:extLst>
+            </p:cNvPr>
+            <p:cNvCxnSpPr>
+              <a:cxnSpLocks/>
+            </p:cNvCxnSpPr>
+            <p:nvPr/>
+          </p:nvCxnSpPr>
+          <p:spPr>
+            <a:xfrm>
+              <a:off x="3493770" y="1600298"/>
+              <a:ext cx="0" cy="4477528"/>
+            </a:xfrm>
+            <a:prstGeom prst="line">
+              <a:avLst/>
+            </a:prstGeom>
+            <a:ln>
+              <a:prstDash val="dash"/>
+            </a:ln>
+          </p:spPr>
+          <p:style>
+            <a:lnRef idx="2">
+              <a:schemeClr val="accent1"/>
+            </a:lnRef>
+            <a:fillRef idx="0">
+              <a:schemeClr val="accent1"/>
+            </a:fillRef>
+            <a:effectRef idx="1">
+              <a:schemeClr val="accent1"/>
+            </a:effectRef>
+            <a:fontRef idx="minor">
+              <a:schemeClr val="tx1"/>
+            </a:fontRef>
+          </p:style>
+        </p:cxnSp>
+      </p:grpSp>
+      <p:cxnSp>
+        <p:nvCxnSpPr>
+          <p:cNvPr id="23" name="Straight Connector 22">
+            <a:extLst>
+              <a:ext uri="{FF2B5EF4-FFF2-40B4-BE49-F238E27FC236}">
+                <a16:creationId xmlns:a16="http://schemas.microsoft.com/office/drawing/2014/main" id="{11143A2F-4001-E9C3-FC59-A0AC14DB1370}"/>
+              </a:ext>
+            </a:extLst>
+          </p:cNvPr>
+          <p:cNvCxnSpPr>
+            <a:cxnSpLocks/>
+          </p:cNvCxnSpPr>
+          <p:nvPr/>
+        </p:nvCxnSpPr>
+        <p:spPr>
+          <a:xfrm>
+            <a:off x="4494968" y="4249697"/>
+            <a:ext cx="0" cy="2099045"/>
+          </a:xfrm>
+          <a:prstGeom prst="line">
+            <a:avLst/>
+          </a:prstGeom>
+          <a:ln>
+            <a:prstDash val="dash"/>
+          </a:ln>
+        </p:spPr>
+        <p:style>
+          <a:lnRef idx="2">
+            <a:schemeClr val="accent1"/>
+          </a:lnRef>
+          <a:fillRef idx="0">
+            <a:schemeClr val="accent1"/>
+          </a:fillRef>
+          <a:effectRef idx="1">
+            <a:schemeClr val="accent1"/>
+          </a:effectRef>
+          <a:fontRef idx="minor">
+            <a:schemeClr val="tx1"/>
+          </a:fontRef>
+        </p:style>
+      </p:cxnSp>
+      <mc:AlternateContent xmlns:mc="http://schemas.openxmlformats.org/markup-compatibility/2006">
+        <mc:Choice xmlns:a14="http://schemas.microsoft.com/office/drawing/2010/main" Requires="a14">
+          <p:sp>
+            <p:nvSpPr>
+              <p:cNvPr id="26" name="TextBox 25">
+                <a:extLst>
+                  <a:ext uri="{FF2B5EF4-FFF2-40B4-BE49-F238E27FC236}">
+                    <a16:creationId xmlns:a16="http://schemas.microsoft.com/office/drawing/2014/main" id="{CCF962FE-6DBD-7167-F59A-3B24BB1CA7A1}"/>
+                  </a:ext>
+                </a:extLst>
+              </p:cNvPr>
+              <p:cNvSpPr txBox="1"/>
+              <p:nvPr/>
+            </p:nvSpPr>
+            <p:spPr>
+              <a:xfrm>
+                <a:off x="4235707" y="6304002"/>
+                <a:ext cx="575479" cy="553998"/>
+              </a:xfrm>
+              <a:prstGeom prst="rect">
+                <a:avLst/>
+              </a:prstGeom>
+              <a:noFill/>
+            </p:spPr>
+            <p:txBody>
+              <a:bodyPr wrap="square" lIns="0" tIns="0" rIns="0" bIns="0" rtlCol="0">
+                <a:spAutoFit/>
+              </a:bodyPr>
+              <a:lstStyle/>
+              <a:p>
+                <a:pPr/>
+                <a14:m>
+                  <m:oMathPara xmlns:m="http://schemas.openxmlformats.org/officeDocument/2006/math">
+                    <m:oMathParaPr>
+                      <m:jc m:val="centerGroup"/>
+                    </m:oMathParaPr>
+                    <m:oMath xmlns:m="http://schemas.openxmlformats.org/officeDocument/2006/math">
+                      <m:sSubSup>
+                        <m:sSubSupPr>
+                          <m:ctrlPr>
+                            <a:rPr lang="en-US" sz="3600" b="0" i="1" smtClean="0">
+                              <a:latin typeface="Cambria Math" panose="02040503050406030204" pitchFamily="18" charset="0"/>
+                            </a:rPr>
+                          </m:ctrlPr>
+                        </m:sSubSupPr>
+                        <m:e>
+                          <m:r>
+                            <a:rPr lang="en-US" sz="3600" b="0" i="1" smtClean="0">
+                              <a:latin typeface="Cambria Math" panose="02040503050406030204" pitchFamily="18" charset="0"/>
+                            </a:rPr>
+                            <m:t>𝑄</m:t>
+                          </m:r>
+                        </m:e>
+                        <m:sub>
+                          <m:r>
+                            <a:rPr lang="en-US" sz="3600" b="0" i="1" smtClean="0">
+                              <a:latin typeface="Cambria Math" panose="02040503050406030204" pitchFamily="18" charset="0"/>
+                            </a:rPr>
+                            <m:t>1</m:t>
+                          </m:r>
+                        </m:sub>
+                        <m:sup>
+                          <m:r>
+                            <a:rPr lang="en-US" sz="3600" b="0" i="1" smtClean="0">
+                              <a:latin typeface="Cambria Math" panose="02040503050406030204" pitchFamily="18" charset="0"/>
+                            </a:rPr>
+                            <m:t>∗</m:t>
+                          </m:r>
+                          <m:r>
+                            <a:rPr lang="en-US" sz="3600" b="0" i="1" smtClean="0">
+                              <a:latin typeface="Cambria Math" panose="02040503050406030204" pitchFamily="18" charset="0"/>
+                            </a:rPr>
+                            <m:t> </m:t>
+                          </m:r>
+                        </m:sup>
+                      </m:sSubSup>
+                    </m:oMath>
+                  </m:oMathPara>
+                </a14:m>
+                <a:endParaRPr lang="en-US" sz="3600" dirty="0"/>
+              </a:p>
+            </p:txBody>
+          </p:sp>
+        </mc:Choice>
+        <mc:Fallback>
+          <p:sp>
+            <p:nvSpPr>
+              <p:cNvPr id="26" name="TextBox 25">
+                <a:extLst>
+                  <a:ext uri="{FF2B5EF4-FFF2-40B4-BE49-F238E27FC236}">
+                    <a16:creationId xmlns:a16="http://schemas.microsoft.com/office/drawing/2014/main" id="{CCF962FE-6DBD-7167-F59A-3B24BB1CA7A1}"/>
+                  </a:ext>
+                </a:extLst>
+              </p:cNvPr>
+              <p:cNvSpPr txBox="1">
+                <a:spLocks noRot="1" noChangeAspect="1" noMove="1" noResize="1" noEditPoints="1" noAdjustHandles="1" noChangeArrowheads="1" noChangeShapeType="1" noTextEdit="1"/>
+              </p:cNvSpPr>
+              <p:nvPr/>
+            </p:nvSpPr>
+            <p:spPr>
+              <a:xfrm>
+                <a:off x="4235707" y="6304002"/>
+                <a:ext cx="575479" cy="553998"/>
+              </a:xfrm>
+              <a:prstGeom prst="rect">
+                <a:avLst/>
+              </a:prstGeom>
+              <a:blipFill>
+                <a:blip r:embed="rId6"/>
+                <a:stretch>
+                  <a:fillRect/>
+                </a:stretch>
+              </a:blipFill>
+            </p:spPr>
+            <p:txBody>
+              <a:bodyPr/>
+              <a:lstStyle/>
+              <a:p>
+                <a:r>
+                  <a:rPr lang="en-US">
+                    <a:noFill/>
+                  </a:rPr>
+                  <a:t> </a:t>
+                </a:r>
+              </a:p>
+            </p:txBody>
+          </p:sp>
+        </mc:Fallback>
+      </mc:AlternateContent>
+      <mc:AlternateContent xmlns:mc="http://schemas.openxmlformats.org/markup-compatibility/2006">
+        <mc:Choice xmlns:a14="http://schemas.microsoft.com/office/drawing/2010/main" Requires="a14">
+          <p:sp>
+            <p:nvSpPr>
+              <p:cNvPr id="27" name="TextBox 26">
+                <a:extLst>
+                  <a:ext uri="{FF2B5EF4-FFF2-40B4-BE49-F238E27FC236}">
+                    <a16:creationId xmlns:a16="http://schemas.microsoft.com/office/drawing/2014/main" id="{6AB9BB6C-DE4F-4E07-A4A4-E30E34DD3F24}"/>
+                  </a:ext>
+                </a:extLst>
+              </p:cNvPr>
+              <p:cNvSpPr txBox="1"/>
+              <p:nvPr/>
+            </p:nvSpPr>
+            <p:spPr>
+              <a:xfrm>
+                <a:off x="6205266" y="6293169"/>
+                <a:ext cx="575479" cy="566245"/>
+              </a:xfrm>
+              <a:prstGeom prst="rect">
+                <a:avLst/>
+              </a:prstGeom>
+              <a:noFill/>
+            </p:spPr>
+            <p:txBody>
+              <a:bodyPr wrap="square" lIns="0" tIns="0" rIns="0" bIns="0" rtlCol="0">
+                <a:spAutoFit/>
+              </a:bodyPr>
+              <a:lstStyle/>
+              <a:p>
+                <a:pPr/>
+                <a14:m>
+                  <m:oMathPara xmlns:m="http://schemas.openxmlformats.org/officeDocument/2006/math">
+                    <m:oMathParaPr>
+                      <m:jc m:val="centerGroup"/>
+                    </m:oMathParaPr>
+                    <m:oMath xmlns:m="http://schemas.openxmlformats.org/officeDocument/2006/math">
+                      <m:sSubSup>
+                        <m:sSubSupPr>
+                          <m:ctrlPr>
+                            <a:rPr lang="en-US" sz="3600" b="0" i="1" smtClean="0">
+                              <a:latin typeface="Cambria Math" panose="02040503050406030204" pitchFamily="18" charset="0"/>
+                            </a:rPr>
+                          </m:ctrlPr>
+                        </m:sSubSupPr>
+                        <m:e>
+                          <m:r>
+                            <a:rPr lang="en-US" sz="3600" b="0" i="1" smtClean="0">
+                              <a:latin typeface="Cambria Math" panose="02040503050406030204" pitchFamily="18" charset="0"/>
+                            </a:rPr>
+                            <m:t>𝑄</m:t>
+                          </m:r>
+                        </m:e>
+                        <m:sub>
+                          <m:r>
+                            <a:rPr lang="en-US" sz="3600" b="0" i="1" smtClean="0">
+                              <a:latin typeface="Cambria Math" panose="02040503050406030204" pitchFamily="18" charset="0"/>
+                            </a:rPr>
+                            <m:t>2</m:t>
+                          </m:r>
+                        </m:sub>
+                        <m:sup>
+                          <m:r>
+                            <a:rPr lang="en-US" sz="3600" b="0" i="1" smtClean="0">
+                              <a:latin typeface="Cambria Math" panose="02040503050406030204" pitchFamily="18" charset="0"/>
+                            </a:rPr>
+                            <m:t>∗</m:t>
+                          </m:r>
+                          <m:r>
+                            <a:rPr lang="en-US" sz="3600" b="0" i="1" smtClean="0">
+                              <a:latin typeface="Cambria Math" panose="02040503050406030204" pitchFamily="18" charset="0"/>
+                            </a:rPr>
+                            <m:t> </m:t>
+                          </m:r>
+                        </m:sup>
+                      </m:sSubSup>
+                    </m:oMath>
+                  </m:oMathPara>
+                </a14:m>
+                <a:endParaRPr lang="en-US" sz="3600" dirty="0"/>
+              </a:p>
+            </p:txBody>
+          </p:sp>
+        </mc:Choice>
+        <mc:Fallback>
+          <p:sp>
+            <p:nvSpPr>
+              <p:cNvPr id="27" name="TextBox 26">
+                <a:extLst>
+                  <a:ext uri="{FF2B5EF4-FFF2-40B4-BE49-F238E27FC236}">
+                    <a16:creationId xmlns:a16="http://schemas.microsoft.com/office/drawing/2014/main" id="{6AB9BB6C-DE4F-4E07-A4A4-E30E34DD3F24}"/>
+                  </a:ext>
+                </a:extLst>
+              </p:cNvPr>
+              <p:cNvSpPr txBox="1">
+                <a:spLocks noRot="1" noChangeAspect="1" noMove="1" noResize="1" noEditPoints="1" noAdjustHandles="1" noChangeArrowheads="1" noChangeShapeType="1" noTextEdit="1"/>
+              </p:cNvSpPr>
+              <p:nvPr/>
+            </p:nvSpPr>
+            <p:spPr>
+              <a:xfrm>
+                <a:off x="6205266" y="6293169"/>
+                <a:ext cx="575479" cy="566245"/>
+              </a:xfrm>
+              <a:prstGeom prst="rect">
+                <a:avLst/>
+              </a:prstGeom>
+              <a:blipFill>
+                <a:blip r:embed="rId7"/>
+                <a:stretch>
+                  <a:fillRect/>
+                </a:stretch>
+              </a:blipFill>
+            </p:spPr>
+            <p:txBody>
+              <a:bodyPr/>
+              <a:lstStyle/>
+              <a:p>
+                <a:r>
+                  <a:rPr lang="en-US">
+                    <a:noFill/>
+                  </a:rPr>
+                  <a:t> </a:t>
+                </a:r>
+              </a:p>
+            </p:txBody>
+          </p:sp>
+        </mc:Fallback>
+      </mc:AlternateContent>
+      <mc:AlternateContent xmlns:mc="http://schemas.openxmlformats.org/markup-compatibility/2006">
+        <mc:Choice xmlns:a14="http://schemas.microsoft.com/office/drawing/2010/main" Requires="a14">
+          <p:sp>
+            <p:nvSpPr>
+              <p:cNvPr id="28" name="TextBox 27">
+                <a:extLst>
+                  <a:ext uri="{FF2B5EF4-FFF2-40B4-BE49-F238E27FC236}">
+                    <a16:creationId xmlns:a16="http://schemas.microsoft.com/office/drawing/2014/main" id="{A02102EF-1C6B-3E78-E44C-C0BD2EB09EB8}"/>
+                  </a:ext>
+                </a:extLst>
+              </p:cNvPr>
+              <p:cNvSpPr txBox="1"/>
+              <p:nvPr/>
+            </p:nvSpPr>
+            <p:spPr>
+              <a:xfrm>
+                <a:off x="1561376" y="3866719"/>
+                <a:ext cx="522707" cy="596766"/>
+              </a:xfrm>
+              <a:prstGeom prst="rect">
+                <a:avLst/>
+              </a:prstGeom>
+              <a:noFill/>
+            </p:spPr>
+            <p:txBody>
+              <a:bodyPr wrap="none" lIns="0" tIns="0" rIns="0" bIns="0" rtlCol="0">
+                <a:spAutoFit/>
+              </a:bodyPr>
+              <a:lstStyle/>
+              <a:p>
+                <a:pPr/>
+                <a14:m>
+                  <m:oMathPara xmlns:m="http://schemas.openxmlformats.org/officeDocument/2006/math">
+                    <m:oMathParaPr>
+                      <m:jc m:val="centerGroup"/>
+                    </m:oMathParaPr>
+                    <m:oMath xmlns:m="http://schemas.openxmlformats.org/officeDocument/2006/math">
+                      <m:sSubSup>
+                        <m:sSubSupPr>
+                          <m:ctrlPr>
+                            <a:rPr lang="en-US" sz="3600" b="0" i="1" smtClean="0">
+                              <a:latin typeface="Cambria Math" panose="02040503050406030204" pitchFamily="18" charset="0"/>
+                            </a:rPr>
+                          </m:ctrlPr>
+                        </m:sSubSupPr>
+                        <m:e>
+                          <m:r>
+                            <a:rPr lang="en-US" sz="3600" b="0" i="1" smtClean="0">
+                              <a:latin typeface="Cambria Math" panose="02040503050406030204" pitchFamily="18" charset="0"/>
+                            </a:rPr>
+                            <m:t>𝑃</m:t>
+                          </m:r>
+                        </m:e>
+                        <m:sub>
+                          <m:r>
+                            <a:rPr lang="en-US" sz="3600" b="0" i="1" smtClean="0">
+                              <a:latin typeface="Cambria Math" panose="02040503050406030204" pitchFamily="18" charset="0"/>
+                            </a:rPr>
+                            <m:t>𝑞</m:t>
+                          </m:r>
+                        </m:sub>
+                        <m:sup>
+                          <m:r>
+                            <a:rPr lang="en-US" sz="3600" b="0" i="1" smtClean="0">
+                              <a:latin typeface="Cambria Math" panose="02040503050406030204" pitchFamily="18" charset="0"/>
+                            </a:rPr>
+                            <m:t> </m:t>
+                          </m:r>
+                        </m:sup>
+                      </m:sSubSup>
+                    </m:oMath>
+                  </m:oMathPara>
+                </a14:m>
+                <a:endParaRPr lang="en-US" sz="3600" dirty="0"/>
+              </a:p>
+            </p:txBody>
+          </p:sp>
+        </mc:Choice>
+        <mc:Fallback>
+          <p:sp>
+            <p:nvSpPr>
+              <p:cNvPr id="28" name="TextBox 27">
+                <a:extLst>
+                  <a:ext uri="{FF2B5EF4-FFF2-40B4-BE49-F238E27FC236}">
+                    <a16:creationId xmlns:a16="http://schemas.microsoft.com/office/drawing/2014/main" id="{A02102EF-1C6B-3E78-E44C-C0BD2EB09EB8}"/>
+                  </a:ext>
+                </a:extLst>
+              </p:cNvPr>
+              <p:cNvSpPr txBox="1">
+                <a:spLocks noRot="1" noChangeAspect="1" noMove="1" noResize="1" noEditPoints="1" noAdjustHandles="1" noChangeArrowheads="1" noChangeShapeType="1" noTextEdit="1"/>
+              </p:cNvSpPr>
+              <p:nvPr/>
+            </p:nvSpPr>
+            <p:spPr>
+              <a:xfrm>
+                <a:off x="1561376" y="3866719"/>
+                <a:ext cx="522707" cy="596766"/>
+              </a:xfrm>
+              <a:prstGeom prst="rect">
+                <a:avLst/>
+              </a:prstGeom>
+              <a:blipFill>
+                <a:blip r:embed="rId8"/>
+                <a:stretch>
+                  <a:fillRect/>
+                </a:stretch>
+              </a:blipFill>
+            </p:spPr>
+            <p:txBody>
+              <a:bodyPr/>
+              <a:lstStyle/>
+              <a:p>
+                <a:r>
+                  <a:rPr lang="en-US">
+                    <a:noFill/>
+                  </a:rPr>
+                  <a:t> </a:t>
+                </a:r>
+              </a:p>
+            </p:txBody>
+          </p:sp>
+        </mc:Fallback>
+      </mc:AlternateContent>
+    </p:spTree>
+    <p:extLst>
+      <p:ext uri="{BB962C8B-B14F-4D97-AF65-F5344CB8AC3E}">
+        <p14:creationId xmlns:p14="http://schemas.microsoft.com/office/powerpoint/2010/main" val="3846502854"/>
+      </p:ext>
+    </p:extLst>
+  </p:cSld>
+  <p:clrMapOvr>
+    <a:masterClrMapping/>
+  </p:clrMapOvr>
+</p:sld>
+</file>
+
+<file path=ppt/slides/slide48.xml><?xml version="1.0" encoding="utf-8"?>
+<p:sld xmlns:a="http://schemas.openxmlformats.org/drawingml/2006/main" xmlns:r="http://schemas.openxmlformats.org/officeDocument/2006/relationships" xmlns:p="http://schemas.openxmlformats.org/presentationml/2006/main">
+  <p:cSld>
+    <p:spTree>
+      <p:nvGrpSpPr>
+        <p:cNvPr id="1" name=""/>
+        <p:cNvGrpSpPr/>
+        <p:nvPr/>
+      </p:nvGrpSpPr>
+      <p:grpSpPr>
+        <a:xfrm>
+          <a:off x="0" y="0"/>
+          <a:ext cx="0" cy="0"/>
+          <a:chOff x="0" y="0"/>
+          <a:chExt cx="0" cy="0"/>
+        </a:xfrm>
+      </p:grpSpPr>
+      <p:pic>
+        <p:nvPicPr>
+          <p:cNvPr id="5" name="Picture 4" descr="A diagram of a line and a line&#10;&#10;Description automatically generated">
+            <a:extLst>
+              <a:ext uri="{FF2B5EF4-FFF2-40B4-BE49-F238E27FC236}">
+                <a16:creationId xmlns:a16="http://schemas.microsoft.com/office/drawing/2014/main" id="{8794C31E-FD06-155A-BF2B-9ED916F002E6}"/>
+              </a:ext>
+            </a:extLst>
+          </p:cNvPr>
+          <p:cNvPicPr>
+            <a:picLocks noChangeAspect="1"/>
+          </p:cNvPicPr>
+          <p:nvPr/>
+        </p:nvPicPr>
+        <p:blipFill>
+          <a:blip r:embed="rId2">
+            <a:extLst>
+              <a:ext uri="{28A0092B-C50C-407E-A947-70E740481C1C}">
+                <a14:useLocalDpi xmlns:a14="http://schemas.microsoft.com/office/drawing/2010/main" val="0"/>
+              </a:ext>
+            </a:extLst>
+          </a:blip>
+          <a:stretch>
+            <a:fillRect/>
+          </a:stretch>
+        </p:blipFill>
+        <p:spPr>
+          <a:xfrm>
+            <a:off x="933184" y="695184"/>
+            <a:ext cx="10325631" cy="5467631"/>
+          </a:xfrm>
+          <a:prstGeom prst="rect">
+            <a:avLst/>
+          </a:prstGeom>
+        </p:spPr>
+      </p:pic>
+      <p:cxnSp>
+        <p:nvCxnSpPr>
+          <p:cNvPr id="7" name="Straight Arrow Connector 6">
+            <a:extLst>
+              <a:ext uri="{FF2B5EF4-FFF2-40B4-BE49-F238E27FC236}">
+                <a16:creationId xmlns:a16="http://schemas.microsoft.com/office/drawing/2014/main" id="{A45A0498-4299-6302-C840-FD89839E3EDD}"/>
+              </a:ext>
+            </a:extLst>
+          </p:cNvPr>
+          <p:cNvCxnSpPr/>
+          <p:nvPr/>
+        </p:nvCxnSpPr>
+        <p:spPr>
+          <a:xfrm>
+            <a:off x="3020291" y="4925291"/>
+            <a:ext cx="1745673" cy="0"/>
+          </a:xfrm>
+          <a:prstGeom prst="straightConnector1">
+            <a:avLst/>
+          </a:prstGeom>
+          <a:ln w="76200">
+            <a:solidFill>
+              <a:schemeClr val="accent2">
+                <a:lumMod val="75000"/>
+              </a:schemeClr>
+            </a:solidFill>
+            <a:headEnd type="triangle"/>
+            <a:tailEnd type="triangle"/>
+          </a:ln>
+        </p:spPr>
+        <p:style>
+          <a:lnRef idx="2">
+            <a:schemeClr val="accent1"/>
+          </a:lnRef>
+          <a:fillRef idx="0">
+            <a:schemeClr val="accent1"/>
+          </a:fillRef>
+          <a:effectRef idx="1">
+            <a:schemeClr val="accent1"/>
+          </a:effectRef>
+          <a:fontRef idx="minor">
+            <a:schemeClr val="tx1"/>
+          </a:fontRef>
+        </p:style>
+      </p:cxnSp>
+      <p:sp>
+        <p:nvSpPr>
+          <p:cNvPr id="8" name="TextBox 7">
+            <a:extLst>
+              <a:ext uri="{FF2B5EF4-FFF2-40B4-BE49-F238E27FC236}">
+                <a16:creationId xmlns:a16="http://schemas.microsoft.com/office/drawing/2014/main" id="{C815C429-9D89-3267-105B-3DE1C22DB09E}"/>
+              </a:ext>
+            </a:extLst>
+          </p:cNvPr>
+          <p:cNvSpPr txBox="1"/>
+          <p:nvPr/>
+        </p:nvSpPr>
+        <p:spPr>
+          <a:xfrm>
+            <a:off x="3193472" y="4332151"/>
+            <a:ext cx="1399309" cy="523220"/>
+          </a:xfrm>
+          <a:prstGeom prst="rect">
+            <a:avLst/>
+          </a:prstGeom>
+          <a:noFill/>
+        </p:spPr>
+        <p:txBody>
+          <a:bodyPr wrap="square" rtlCol="0">
+            <a:spAutoFit/>
+          </a:bodyPr>
+          <a:lstStyle/>
+          <a:p>
+            <a:pPr algn="ctr"/>
+            <a:r>
+              <a:rPr lang="en-US" sz="2800" dirty="0">
+                <a:latin typeface="Aharoni" panose="02010803020104030203" pitchFamily="2" charset="-79"/>
+                <a:cs typeface="Aharoni" panose="02010803020104030203" pitchFamily="2" charset="-79"/>
+              </a:rPr>
+              <a:t>Quota</a:t>
+            </a:r>
+            <a:endParaRPr lang="en-US" sz="2800" b="1" dirty="0">
+              <a:latin typeface="Aharoni" panose="02010803020104030203" pitchFamily="2" charset="-79"/>
+              <a:cs typeface="Aharoni" panose="02010803020104030203" pitchFamily="2" charset="-79"/>
+            </a:endParaRPr>
+          </a:p>
+        </p:txBody>
+      </p:sp>
+      <p:sp>
+        <p:nvSpPr>
+          <p:cNvPr id="9" name="TextBox 8">
+            <a:extLst>
+              <a:ext uri="{FF2B5EF4-FFF2-40B4-BE49-F238E27FC236}">
+                <a16:creationId xmlns:a16="http://schemas.microsoft.com/office/drawing/2014/main" id="{504727CA-1DF2-45CB-AAC8-48B5177735F5}"/>
+              </a:ext>
+            </a:extLst>
+          </p:cNvPr>
+          <p:cNvSpPr txBox="1"/>
+          <p:nvPr/>
+        </p:nvSpPr>
+        <p:spPr>
+          <a:xfrm>
+            <a:off x="3193471" y="5020833"/>
+            <a:ext cx="1399309" cy="523220"/>
+          </a:xfrm>
+          <a:prstGeom prst="rect">
+            <a:avLst/>
+          </a:prstGeom>
+          <a:noFill/>
+        </p:spPr>
+        <p:txBody>
+          <a:bodyPr wrap="square" rtlCol="0">
+            <a:spAutoFit/>
+          </a:bodyPr>
+          <a:lstStyle/>
+          <a:p>
+            <a:pPr algn="ctr"/>
+            <a:r>
+              <a:rPr lang="en-US" sz="2800" dirty="0">
+                <a:latin typeface="Aharoni" panose="02010803020104030203" pitchFamily="2" charset="-79"/>
+                <a:cs typeface="Aharoni" panose="02010803020104030203" pitchFamily="2" charset="-79"/>
+              </a:rPr>
+              <a:t>Quota</a:t>
+            </a:r>
+            <a:endParaRPr lang="en-US" sz="2800" b="1" dirty="0">
+              <a:latin typeface="Aharoni" panose="02010803020104030203" pitchFamily="2" charset="-79"/>
+              <a:cs typeface="Aharoni" panose="02010803020104030203" pitchFamily="2" charset="-79"/>
+            </a:endParaRPr>
+          </a:p>
+        </p:txBody>
+      </p:sp>
+      <p:sp>
+        <p:nvSpPr>
+          <p:cNvPr id="10" name="Arrow: Right 9">
+            <a:extLst>
+              <a:ext uri="{FF2B5EF4-FFF2-40B4-BE49-F238E27FC236}">
+                <a16:creationId xmlns:a16="http://schemas.microsoft.com/office/drawing/2014/main" id="{C8D82512-5936-4753-0160-2F841F269D24}"/>
+              </a:ext>
+            </a:extLst>
+          </p:cNvPr>
+          <p:cNvSpPr/>
+          <p:nvPr/>
+        </p:nvSpPr>
+        <p:spPr>
+          <a:xfrm rot="19414680">
+            <a:off x="3105236" y="3410204"/>
+            <a:ext cx="1438539" cy="180109"/>
+          </a:xfrm>
+          <a:prstGeom prst="rightArrow">
+            <a:avLst/>
+          </a:prstGeom>
+          <a:solidFill>
+            <a:schemeClr val="accent2"/>
+          </a:solidFill>
+          <a:ln>
+            <a:solidFill>
+              <a:schemeClr val="tx2">
+                <a:lumMod val="75000"/>
+                <a:lumOff val="25000"/>
+              </a:schemeClr>
+            </a:solidFill>
+          </a:ln>
+        </p:spPr>
+        <p:style>
+          <a:lnRef idx="2">
+            <a:schemeClr val="accent1">
+              <a:shade val="15000"/>
+            </a:schemeClr>
+          </a:lnRef>
+          <a:fillRef idx="1">
+            <a:schemeClr val="accent1"/>
+          </a:fillRef>
+          <a:effectRef idx="0">
+            <a:schemeClr val="accent1"/>
+          </a:effectRef>
+          <a:fontRef idx="minor">
+            <a:schemeClr val="lt1"/>
+          </a:fontRef>
+        </p:style>
+        <p:txBody>
+          <a:bodyPr rtlCol="0" anchor="ctr"/>
+          <a:lstStyle/>
+          <a:p>
+            <a:pPr algn="ctr"/>
+            <a:endParaRPr lang="en-US"/>
+          </a:p>
+        </p:txBody>
+      </p:sp>
+    </p:spTree>
+    <p:extLst>
+      <p:ext uri="{BB962C8B-B14F-4D97-AF65-F5344CB8AC3E}">
+        <p14:creationId xmlns:p14="http://schemas.microsoft.com/office/powerpoint/2010/main" val="3317459035"/>
+      </p:ext>
+    </p:extLst>
+  </p:cSld>
+  <p:clrMapOvr>
+    <a:masterClrMapping/>
+  </p:clrMapOvr>
+</p:sld>
+</file>
+
+<file path=ppt/slides/slide49.xml><?xml version="1.0" encoding="utf-8"?>
+<p:sld xmlns:a="http://schemas.openxmlformats.org/drawingml/2006/main" xmlns:r="http://schemas.openxmlformats.org/officeDocument/2006/relationships" xmlns:p="http://schemas.openxmlformats.org/presentationml/2006/main">
+  <p:cSld>
+    <p:spTree>
+      <p:nvGrpSpPr>
+        <p:cNvPr id="1" name=""/>
+        <p:cNvGrpSpPr/>
+        <p:nvPr/>
+      </p:nvGrpSpPr>
+      <p:grpSpPr>
+        <a:xfrm>
+          <a:off x="0" y="0"/>
+          <a:ext cx="0" cy="0"/>
+          <a:chOff x="0" y="0"/>
+          <a:chExt cx="0" cy="0"/>
+        </a:xfrm>
+      </p:grpSpPr>
+      <p:pic>
+        <p:nvPicPr>
+          <p:cNvPr id="3" name="Picture 2" descr="A diagram of a triangle&#10;&#10;Description automatically generated">
+            <a:extLst>
+              <a:ext uri="{FF2B5EF4-FFF2-40B4-BE49-F238E27FC236}">
+                <a16:creationId xmlns:a16="http://schemas.microsoft.com/office/drawing/2014/main" id="{79FAB072-99EE-289F-FC8D-43B6A24FFB50}"/>
+              </a:ext>
+            </a:extLst>
+          </p:cNvPr>
+          <p:cNvPicPr>
+            <a:picLocks noChangeAspect="1"/>
+          </p:cNvPicPr>
+          <p:nvPr/>
+        </p:nvPicPr>
+        <p:blipFill>
+          <a:blip r:embed="rId2">
+            <a:extLst>
+              <a:ext uri="{28A0092B-C50C-407E-A947-70E740481C1C}">
+                <a14:useLocalDpi xmlns:a14="http://schemas.microsoft.com/office/drawing/2010/main" val="0"/>
+              </a:ext>
+            </a:extLst>
+          </a:blip>
+          <a:stretch>
+            <a:fillRect/>
+          </a:stretch>
+        </p:blipFill>
+        <p:spPr>
+          <a:xfrm>
+            <a:off x="949060" y="685659"/>
+            <a:ext cx="10293879" cy="5486682"/>
+          </a:xfrm>
+          <a:prstGeom prst="rect">
+            <a:avLst/>
+          </a:prstGeom>
+        </p:spPr>
+      </p:pic>
+      <p:sp>
+        <p:nvSpPr>
+          <p:cNvPr id="4" name="Arrow: Right 3">
+            <a:extLst>
+              <a:ext uri="{FF2B5EF4-FFF2-40B4-BE49-F238E27FC236}">
+                <a16:creationId xmlns:a16="http://schemas.microsoft.com/office/drawing/2014/main" id="{60724352-C99C-C7F7-8BBD-E1DB2EF37E20}"/>
+              </a:ext>
+            </a:extLst>
+          </p:cNvPr>
+          <p:cNvSpPr/>
+          <p:nvPr/>
+        </p:nvSpPr>
+        <p:spPr>
+          <a:xfrm rot="19493466">
+            <a:off x="3165399" y="3936269"/>
+            <a:ext cx="498764" cy="180109"/>
+          </a:xfrm>
+          <a:prstGeom prst="rightArrow">
+            <a:avLst/>
+          </a:prstGeom>
+          <a:solidFill>
+            <a:schemeClr val="accent2"/>
+          </a:solidFill>
+          <a:ln>
+            <a:solidFill>
+              <a:schemeClr val="tx2">
+                <a:lumMod val="75000"/>
+                <a:lumOff val="25000"/>
+              </a:schemeClr>
+            </a:solidFill>
+          </a:ln>
+        </p:spPr>
+        <p:style>
+          <a:lnRef idx="2">
+            <a:schemeClr val="accent1">
+              <a:shade val="15000"/>
+            </a:schemeClr>
+          </a:lnRef>
+          <a:fillRef idx="1">
+            <a:schemeClr val="accent1"/>
+          </a:fillRef>
+          <a:effectRef idx="0">
+            <a:schemeClr val="accent1"/>
+          </a:effectRef>
+          <a:fontRef idx="minor">
+            <a:schemeClr val="lt1"/>
+          </a:fontRef>
+        </p:style>
+        <p:txBody>
+          <a:bodyPr rtlCol="0" anchor="ctr"/>
+          <a:lstStyle/>
+          <a:p>
+            <a:pPr algn="ctr"/>
+            <a:endParaRPr lang="en-US"/>
+          </a:p>
+        </p:txBody>
+      </p:sp>
+      <p:sp>
+        <p:nvSpPr>
+          <p:cNvPr id="5" name="Arrow: Right 4">
+            <a:extLst>
+              <a:ext uri="{FF2B5EF4-FFF2-40B4-BE49-F238E27FC236}">
+                <a16:creationId xmlns:a16="http://schemas.microsoft.com/office/drawing/2014/main" id="{185D8DD9-EF34-1A28-BC73-A800D4BA27A5}"/>
+              </a:ext>
+            </a:extLst>
+          </p:cNvPr>
+          <p:cNvSpPr/>
+          <p:nvPr/>
+        </p:nvSpPr>
+        <p:spPr>
+          <a:xfrm rot="19493466">
+            <a:off x="3700136" y="3556043"/>
+            <a:ext cx="498764" cy="180109"/>
+          </a:xfrm>
+          <a:prstGeom prst="rightArrow">
+            <a:avLst/>
+          </a:prstGeom>
+          <a:solidFill>
+            <a:schemeClr val="accent2"/>
+          </a:solidFill>
+          <a:ln>
+            <a:solidFill>
+              <a:schemeClr val="tx2">
+                <a:lumMod val="75000"/>
+                <a:lumOff val="25000"/>
+              </a:schemeClr>
+            </a:solidFill>
+          </a:ln>
+        </p:spPr>
+        <p:style>
+          <a:lnRef idx="2">
+            <a:schemeClr val="accent1">
+              <a:shade val="15000"/>
+            </a:schemeClr>
+          </a:lnRef>
+          <a:fillRef idx="1">
+            <a:schemeClr val="accent1"/>
+          </a:fillRef>
+          <a:effectRef idx="0">
+            <a:schemeClr val="accent1"/>
+          </a:effectRef>
+          <a:fontRef idx="minor">
+            <a:schemeClr val="lt1"/>
+          </a:fontRef>
+        </p:style>
+        <p:txBody>
+          <a:bodyPr rtlCol="0" anchor="ctr"/>
+          <a:lstStyle/>
+          <a:p>
+            <a:pPr algn="ctr"/>
+            <a:endParaRPr lang="en-US"/>
+          </a:p>
+        </p:txBody>
+      </p:sp>
+      <p:sp>
+        <p:nvSpPr>
+          <p:cNvPr id="6" name="Arrow: Right 5">
+            <a:extLst>
+              <a:ext uri="{FF2B5EF4-FFF2-40B4-BE49-F238E27FC236}">
+                <a16:creationId xmlns:a16="http://schemas.microsoft.com/office/drawing/2014/main" id="{5BC1ABBA-CEE2-082E-43C3-178493DE9555}"/>
+              </a:ext>
+            </a:extLst>
+          </p:cNvPr>
+          <p:cNvSpPr/>
+          <p:nvPr/>
+        </p:nvSpPr>
+        <p:spPr>
+          <a:xfrm rot="16200000">
+            <a:off x="1311969" y="3677019"/>
+            <a:ext cx="384328" cy="184280"/>
+          </a:xfrm>
+          <a:prstGeom prst="rightArrow">
+            <a:avLst/>
+          </a:prstGeom>
+          <a:solidFill>
+            <a:schemeClr val="accent2"/>
+          </a:solidFill>
+          <a:ln>
+            <a:solidFill>
+              <a:schemeClr val="tx2">
+                <a:lumMod val="75000"/>
+                <a:lumOff val="25000"/>
+              </a:schemeClr>
+            </a:solidFill>
+          </a:ln>
+        </p:spPr>
+        <p:style>
+          <a:lnRef idx="2">
+            <a:schemeClr val="accent1">
+              <a:shade val="15000"/>
+            </a:schemeClr>
+          </a:lnRef>
+          <a:fillRef idx="1">
+            <a:schemeClr val="accent1"/>
+          </a:fillRef>
+          <a:effectRef idx="0">
+            <a:schemeClr val="accent1"/>
+          </a:effectRef>
+          <a:fontRef idx="minor">
+            <a:schemeClr val="lt1"/>
+          </a:fontRef>
+        </p:style>
+        <p:txBody>
+          <a:bodyPr rtlCol="0" anchor="ctr"/>
+          <a:lstStyle/>
+          <a:p>
+            <a:pPr algn="ctr"/>
+            <a:endParaRPr lang="en-US"/>
+          </a:p>
+        </p:txBody>
+      </p:sp>
+    </p:spTree>
+    <p:extLst>
+      <p:ext uri="{BB962C8B-B14F-4D97-AF65-F5344CB8AC3E}">
+        <p14:creationId xmlns:p14="http://schemas.microsoft.com/office/powerpoint/2010/main" val="2475158386"/>
+      </p:ext>
+    </p:extLst>
+  </p:cSld>
+  <p:clrMapOvr>
+    <a:masterClrMapping/>
+  </p:clrMapOvr>
+</p:sld>
+</file>
+
 <file path=ppt/slides/slide5.xml><?xml version="1.0" encoding="utf-8"?>
 <p:sld xmlns:a="http://schemas.openxmlformats.org/drawingml/2006/main" xmlns:r="http://schemas.openxmlformats.org/officeDocument/2006/relationships" xmlns:p="http://schemas.openxmlformats.org/presentationml/2006/main">
   <p:cSld>

</xml_diff>

<commit_message>
added BoP II images
</commit_message>
<xml_diff>
--- a/Slides/graph-creator.pptx
+++ b/Slides/graph-creator.pptx
@@ -60,6 +60,7 @@
     <p:sldId id="310" r:id="rId54"/>
     <p:sldId id="308" r:id="rId55"/>
     <p:sldId id="309" r:id="rId56"/>
+    <p:sldId id="311" r:id="rId57"/>
   </p:sldIdLst>
   <p:sldSz cx="12192000" cy="6858000"/>
   <p:notesSz cx="6858000" cy="9144000"/>
@@ -313,7 +314,7 @@
           <a:p>
             <a:fld id="{7F9C3969-815D-4313-AD47-20854D5F097C}" type="datetimeFigureOut">
               <a:rPr lang="en-US" smtClean="0"/>
-              <a:t>11/20/2024</a:t>
+              <a:t>11/21/2024</a:t>
             </a:fld>
             <a:endParaRPr lang="en-US"/>
           </a:p>
@@ -511,7 +512,7 @@
           <a:p>
             <a:fld id="{7F9C3969-815D-4313-AD47-20854D5F097C}" type="datetimeFigureOut">
               <a:rPr lang="en-US" smtClean="0"/>
-              <a:t>11/20/2024</a:t>
+              <a:t>11/21/2024</a:t>
             </a:fld>
             <a:endParaRPr lang="en-US"/>
           </a:p>
@@ -719,7 +720,7 @@
           <a:p>
             <a:fld id="{7F9C3969-815D-4313-AD47-20854D5F097C}" type="datetimeFigureOut">
               <a:rPr lang="en-US" smtClean="0"/>
-              <a:t>11/20/2024</a:t>
+              <a:t>11/21/2024</a:t>
             </a:fld>
             <a:endParaRPr lang="en-US"/>
           </a:p>
@@ -917,7 +918,7 @@
           <a:p>
             <a:fld id="{7F9C3969-815D-4313-AD47-20854D5F097C}" type="datetimeFigureOut">
               <a:rPr lang="en-US" smtClean="0"/>
-              <a:t>11/20/2024</a:t>
+              <a:t>11/21/2024</a:t>
             </a:fld>
             <a:endParaRPr lang="en-US"/>
           </a:p>
@@ -1192,7 +1193,7 @@
           <a:p>
             <a:fld id="{7F9C3969-815D-4313-AD47-20854D5F097C}" type="datetimeFigureOut">
               <a:rPr lang="en-US" smtClean="0"/>
-              <a:t>11/20/2024</a:t>
+              <a:t>11/21/2024</a:t>
             </a:fld>
             <a:endParaRPr lang="en-US"/>
           </a:p>
@@ -1457,7 +1458,7 @@
           <a:p>
             <a:fld id="{7F9C3969-815D-4313-AD47-20854D5F097C}" type="datetimeFigureOut">
               <a:rPr lang="en-US" smtClean="0"/>
-              <a:t>11/20/2024</a:t>
+              <a:t>11/21/2024</a:t>
             </a:fld>
             <a:endParaRPr lang="en-US"/>
           </a:p>
@@ -1869,7 +1870,7 @@
           <a:p>
             <a:fld id="{7F9C3969-815D-4313-AD47-20854D5F097C}" type="datetimeFigureOut">
               <a:rPr lang="en-US" smtClean="0"/>
-              <a:t>11/20/2024</a:t>
+              <a:t>11/21/2024</a:t>
             </a:fld>
             <a:endParaRPr lang="en-US"/>
           </a:p>
@@ -2010,7 +2011,7 @@
           <a:p>
             <a:fld id="{7F9C3969-815D-4313-AD47-20854D5F097C}" type="datetimeFigureOut">
               <a:rPr lang="en-US" smtClean="0"/>
-              <a:t>11/20/2024</a:t>
+              <a:t>11/21/2024</a:t>
             </a:fld>
             <a:endParaRPr lang="en-US"/>
           </a:p>
@@ -2123,7 +2124,7 @@
           <a:p>
             <a:fld id="{7F9C3969-815D-4313-AD47-20854D5F097C}" type="datetimeFigureOut">
               <a:rPr lang="en-US" smtClean="0"/>
-              <a:t>11/20/2024</a:t>
+              <a:t>11/21/2024</a:t>
             </a:fld>
             <a:endParaRPr lang="en-US"/>
           </a:p>
@@ -2434,7 +2435,7 @@
           <a:p>
             <a:fld id="{7F9C3969-815D-4313-AD47-20854D5F097C}" type="datetimeFigureOut">
               <a:rPr lang="en-US" smtClean="0"/>
-              <a:t>11/20/2024</a:t>
+              <a:t>11/21/2024</a:t>
             </a:fld>
             <a:endParaRPr lang="en-US"/>
           </a:p>
@@ -2722,7 +2723,7 @@
           <a:p>
             <a:fld id="{7F9C3969-815D-4313-AD47-20854D5F097C}" type="datetimeFigureOut">
               <a:rPr lang="en-US" smtClean="0"/>
-              <a:t>11/20/2024</a:t>
+              <a:t>11/21/2024</a:t>
             </a:fld>
             <a:endParaRPr lang="en-US"/>
           </a:p>
@@ -2963,7 +2964,7 @@
           <a:p>
             <a:fld id="{7F9C3969-815D-4313-AD47-20854D5F097C}" type="datetimeFigureOut">
               <a:rPr lang="en-US" smtClean="0"/>
-              <a:t>11/20/2024</a:t>
+              <a:t>11/21/2024</a:t>
             </a:fld>
             <a:endParaRPr lang="en-US"/>
           </a:p>
@@ -41267,6 +41268,66 @@
 </p:sld>
 </file>
 
+<file path=ppt/slides/slide56.xml><?xml version="1.0" encoding="utf-8"?>
+<p:sld xmlns:a="http://schemas.openxmlformats.org/drawingml/2006/main" xmlns:r="http://schemas.openxmlformats.org/officeDocument/2006/relationships" xmlns:p="http://schemas.openxmlformats.org/presentationml/2006/main">
+  <p:cSld>
+    <p:spTree>
+      <p:nvGrpSpPr>
+        <p:cNvPr id="1" name=""/>
+        <p:cNvGrpSpPr/>
+        <p:nvPr/>
+      </p:nvGrpSpPr>
+      <p:grpSpPr>
+        <a:xfrm>
+          <a:off x="0" y="0"/>
+          <a:ext cx="0" cy="0"/>
+          <a:chOff x="0" y="0"/>
+          <a:chExt cx="0" cy="0"/>
+        </a:xfrm>
+      </p:grpSpPr>
+      <p:pic>
+        <p:nvPicPr>
+          <p:cNvPr id="3" name="Picture 2">
+            <a:extLst>
+              <a:ext uri="{FF2B5EF4-FFF2-40B4-BE49-F238E27FC236}">
+                <a16:creationId xmlns:a16="http://schemas.microsoft.com/office/drawing/2014/main" id="{C9D5628C-ECC9-60AD-F1F2-FCD4AB93DF3A}"/>
+              </a:ext>
+            </a:extLst>
+          </p:cNvPr>
+          <p:cNvPicPr>
+            <a:picLocks noChangeAspect="1"/>
+          </p:cNvPicPr>
+          <p:nvPr/>
+        </p:nvPicPr>
+        <p:blipFill>
+          <a:blip r:embed="rId2"/>
+          <a:stretch>
+            <a:fillRect/>
+          </a:stretch>
+        </p:blipFill>
+        <p:spPr>
+          <a:xfrm>
+            <a:off x="1468581" y="282355"/>
+            <a:ext cx="9324109" cy="6340396"/>
+          </a:xfrm>
+          <a:prstGeom prst="rect">
+            <a:avLst/>
+          </a:prstGeom>
+        </p:spPr>
+      </p:pic>
+    </p:spTree>
+    <p:extLst>
+      <p:ext uri="{BB962C8B-B14F-4D97-AF65-F5344CB8AC3E}">
+        <p14:creationId xmlns:p14="http://schemas.microsoft.com/office/powerpoint/2010/main" val="3725514243"/>
+      </p:ext>
+    </p:extLst>
+  </p:cSld>
+  <p:clrMapOvr>
+    <a:masterClrMapping/>
+  </p:clrMapOvr>
+</p:sld>
+</file>
+
 <file path=ppt/slides/slide6.xml><?xml version="1.0" encoding="utf-8"?>
 <p:sld xmlns:a="http://schemas.openxmlformats.org/drawingml/2006/main" xmlns:r="http://schemas.openxmlformats.org/officeDocument/2006/relationships" xmlns:p="http://schemas.openxmlformats.org/presentationml/2006/main">
   <p:cSld>

</xml_diff>

<commit_message>
updated Ricardo Model Slides
</commit_message>
<xml_diff>
--- a/Slides/graph-creator.pptx
+++ b/Slides/graph-creator.pptx
@@ -314,7 +314,7 @@
           <a:p>
             <a:fld id="{7F9C3969-815D-4313-AD47-20854D5F097C}" type="datetimeFigureOut">
               <a:rPr lang="en-US" smtClean="0"/>
-              <a:t>11/21/2024</a:t>
+              <a:t>1/2/25</a:t>
             </a:fld>
             <a:endParaRPr lang="en-US"/>
           </a:p>
@@ -512,7 +512,7 @@
           <a:p>
             <a:fld id="{7F9C3969-815D-4313-AD47-20854D5F097C}" type="datetimeFigureOut">
               <a:rPr lang="en-US" smtClean="0"/>
-              <a:t>11/21/2024</a:t>
+              <a:t>1/2/25</a:t>
             </a:fld>
             <a:endParaRPr lang="en-US"/>
           </a:p>
@@ -720,7 +720,7 @@
           <a:p>
             <a:fld id="{7F9C3969-815D-4313-AD47-20854D5F097C}" type="datetimeFigureOut">
               <a:rPr lang="en-US" smtClean="0"/>
-              <a:t>11/21/2024</a:t>
+              <a:t>1/2/25</a:t>
             </a:fld>
             <a:endParaRPr lang="en-US"/>
           </a:p>
@@ -918,7 +918,7 @@
           <a:p>
             <a:fld id="{7F9C3969-815D-4313-AD47-20854D5F097C}" type="datetimeFigureOut">
               <a:rPr lang="en-US" smtClean="0"/>
-              <a:t>11/21/2024</a:t>
+              <a:t>1/2/25</a:t>
             </a:fld>
             <a:endParaRPr lang="en-US"/>
           </a:p>
@@ -1193,7 +1193,7 @@
           <a:p>
             <a:fld id="{7F9C3969-815D-4313-AD47-20854D5F097C}" type="datetimeFigureOut">
               <a:rPr lang="en-US" smtClean="0"/>
-              <a:t>11/21/2024</a:t>
+              <a:t>1/2/25</a:t>
             </a:fld>
             <a:endParaRPr lang="en-US"/>
           </a:p>
@@ -1458,7 +1458,7 @@
           <a:p>
             <a:fld id="{7F9C3969-815D-4313-AD47-20854D5F097C}" type="datetimeFigureOut">
               <a:rPr lang="en-US" smtClean="0"/>
-              <a:t>11/21/2024</a:t>
+              <a:t>1/2/25</a:t>
             </a:fld>
             <a:endParaRPr lang="en-US"/>
           </a:p>
@@ -1870,7 +1870,7 @@
           <a:p>
             <a:fld id="{7F9C3969-815D-4313-AD47-20854D5F097C}" type="datetimeFigureOut">
               <a:rPr lang="en-US" smtClean="0"/>
-              <a:t>11/21/2024</a:t>
+              <a:t>1/2/25</a:t>
             </a:fld>
             <a:endParaRPr lang="en-US"/>
           </a:p>
@@ -2011,7 +2011,7 @@
           <a:p>
             <a:fld id="{7F9C3969-815D-4313-AD47-20854D5F097C}" type="datetimeFigureOut">
               <a:rPr lang="en-US" smtClean="0"/>
-              <a:t>11/21/2024</a:t>
+              <a:t>1/2/25</a:t>
             </a:fld>
             <a:endParaRPr lang="en-US"/>
           </a:p>
@@ -2124,7 +2124,7 @@
           <a:p>
             <a:fld id="{7F9C3969-815D-4313-AD47-20854D5F097C}" type="datetimeFigureOut">
               <a:rPr lang="en-US" smtClean="0"/>
-              <a:t>11/21/2024</a:t>
+              <a:t>1/2/25</a:t>
             </a:fld>
             <a:endParaRPr lang="en-US"/>
           </a:p>
@@ -2435,7 +2435,7 @@
           <a:p>
             <a:fld id="{7F9C3969-815D-4313-AD47-20854D5F097C}" type="datetimeFigureOut">
               <a:rPr lang="en-US" smtClean="0"/>
-              <a:t>11/21/2024</a:t>
+              <a:t>1/2/25</a:t>
             </a:fld>
             <a:endParaRPr lang="en-US"/>
           </a:p>
@@ -2723,7 +2723,7 @@
           <a:p>
             <a:fld id="{7F9C3969-815D-4313-AD47-20854D5F097C}" type="datetimeFigureOut">
               <a:rPr lang="en-US" smtClean="0"/>
-              <a:t>11/21/2024</a:t>
+              <a:t>1/2/25</a:t>
             </a:fld>
             <a:endParaRPr lang="en-US"/>
           </a:p>
@@ -2964,7 +2964,7 @@
           <a:p>
             <a:fld id="{7F9C3969-815D-4313-AD47-20854D5F097C}" type="datetimeFigureOut">
               <a:rPr lang="en-US" smtClean="0"/>
-              <a:t>11/21/2024</a:t>
+              <a:t>1/2/25</a:t>
             </a:fld>
             <a:endParaRPr lang="en-US"/>
           </a:p>
@@ -13013,7 +13013,13 @@
           <p:cNvGraphicFramePr>
             <a:graphicFrameLocks noGrp="1"/>
           </p:cNvGraphicFramePr>
-          <p:nvPr/>
+          <p:nvPr>
+            <p:extLst>
+              <p:ext uri="{D42A27DB-BD31-4B8C-83A1-F6EECF244321}">
+                <p14:modId xmlns:p14="http://schemas.microsoft.com/office/powerpoint/2010/main" val="1941515000"/>
+              </p:ext>
+            </p:extLst>
+          </p:nvPr>
         </p:nvGraphicFramePr>
         <p:xfrm>
           <a:off x="1981200" y="942108"/>
@@ -13070,10 +13076,9 @@
                     <a:p>
                       <a:pPr algn="ctr"/>
                       <a:r>
-                        <a:rPr lang="en-US" sz="3200" dirty="0" err="1"/>
-                        <a:t>Slurm</a:t>
+                        <a:rPr lang="en-US" sz="3200" dirty="0"/>
+                        <a:t>Sparkling Selfies</a:t>
                       </a:r>
-                      <a:endParaRPr lang="en-US" sz="3200" dirty="0"/>
                     </a:p>
                   </a:txBody>
                   <a:tcPr anchor="ctr"/>
@@ -13085,10 +13090,9 @@
                     <a:p>
                       <a:pPr algn="ctr"/>
                       <a:r>
-                        <a:rPr lang="en-US" sz="3200" dirty="0" err="1"/>
-                        <a:t>Popplers</a:t>
+                        <a:rPr lang="en-US" sz="3200" dirty="0"/>
+                        <a:t>Shirtless Selfies</a:t>
                       </a:r>
-                      <a:endParaRPr lang="en-US" sz="3200" dirty="0"/>
                     </a:p>
                   </a:txBody>
                   <a:tcPr anchor="ctr"/>
@@ -13108,15 +13112,7 @@
                       <a:pPr algn="ctr"/>
                       <a:r>
                         <a:rPr lang="en-US" sz="3200" b="1" dirty="0"/>
-                        <a:t>New </a:t>
-                      </a:r>
-                      <a:r>
-                        <a:rPr lang="en-US" sz="3200" b="1" dirty="0" err="1"/>
-                        <a:t>New</a:t>
-                      </a:r>
-                      <a:r>
-                        <a:rPr lang="en-US" sz="3200" b="1" dirty="0"/>
-                        <a:t> York</a:t>
+                        <a:t>Vampires</a:t>
                       </a:r>
                     </a:p>
                   </a:txBody>
@@ -13130,7 +13126,7 @@
                       <a:pPr algn="ctr"/>
                       <a:r>
                         <a:rPr lang="en-US" sz="3200" b="1" dirty="0"/>
-                        <a:t>7</a:t>
+                        <a:t>12</a:t>
                       </a:r>
                     </a:p>
                   </a:txBody>
@@ -13144,7 +13140,7 @@
                       <a:pPr algn="ctr"/>
                       <a:r>
                         <a:rPr lang="en-US" sz="3200" b="1" dirty="0"/>
-                        <a:t>9</a:t>
+                        <a:t>4</a:t>
                       </a:r>
                     </a:p>
                   </a:txBody>
@@ -13165,7 +13161,7 @@
                       <a:pPr algn="ctr"/>
                       <a:r>
                         <a:rPr lang="en-US" sz="3200" b="1" dirty="0"/>
-                        <a:t>Omicron Persei 8</a:t>
+                        <a:t>Wolves</a:t>
                       </a:r>
                     </a:p>
                   </a:txBody>
@@ -13179,7 +13175,7 @@
                       <a:pPr algn="ctr"/>
                       <a:r>
                         <a:rPr lang="en-US" sz="3200" b="1" dirty="0"/>
-                        <a:t>14</a:t>
+                        <a:t>6</a:t>
                       </a:r>
                     </a:p>
                   </a:txBody>
@@ -13193,7 +13189,7 @@
                       <a:pPr algn="ctr"/>
                       <a:r>
                         <a:rPr lang="en-US" sz="3200" b="1" dirty="0"/>
-                        <a:t>28</a:t>
+                        <a:t>18</a:t>
                       </a:r>
                     </a:p>
                   </a:txBody>
@@ -13254,7 +13250,7 @@
           <p:nvPr>
             <p:extLst>
               <p:ext uri="{D42A27DB-BD31-4B8C-83A1-F6EECF244321}">
-                <p14:modId xmlns:p14="http://schemas.microsoft.com/office/powerpoint/2010/main" val="703831512"/>
+                <p14:modId xmlns:p14="http://schemas.microsoft.com/office/powerpoint/2010/main" val="1954572582"/>
               </p:ext>
             </p:extLst>
           </p:nvPr>
@@ -13314,10 +13310,9 @@
                     <a:p>
                       <a:pPr algn="ctr"/>
                       <a:r>
-                        <a:rPr lang="en-US" sz="3200" dirty="0" err="1"/>
-                        <a:t>Slurm</a:t>
+                        <a:rPr lang="en-US" sz="3200" dirty="0"/>
+                        <a:t>Sparkling Selfies</a:t>
                       </a:r>
-                      <a:endParaRPr lang="en-US" sz="3200" dirty="0"/>
                     </a:p>
                   </a:txBody>
                   <a:tcPr anchor="ctr"/>
@@ -13329,10 +13324,9 @@
                     <a:p>
                       <a:pPr algn="ctr"/>
                       <a:r>
-                        <a:rPr lang="en-US" sz="3200" dirty="0" err="1"/>
-                        <a:t>Popplers</a:t>
+                        <a:rPr lang="en-US" sz="3200" dirty="0"/>
+                        <a:t>Shirtless Selfies</a:t>
                       </a:r>
-                      <a:endParaRPr lang="en-US" sz="3200" dirty="0"/>
                     </a:p>
                   </a:txBody>
                   <a:tcPr anchor="ctr"/>
@@ -13352,15 +13346,7 @@
                       <a:pPr algn="ctr"/>
                       <a:r>
                         <a:rPr lang="en-US" sz="3200" b="1" dirty="0"/>
-                        <a:t>New </a:t>
-                      </a:r>
-                      <a:r>
-                        <a:rPr lang="en-US" sz="3200" b="1" dirty="0" err="1"/>
-                        <a:t>New</a:t>
-                      </a:r>
-                      <a:r>
-                        <a:rPr lang="en-US" sz="3200" b="1" dirty="0"/>
-                        <a:t> York</a:t>
+                        <a:t>Vampires</a:t>
                       </a:r>
                     </a:p>
                   </a:txBody>
@@ -13374,7 +13360,7 @@
                       <a:pPr algn="ctr"/>
                       <a:r>
                         <a:rPr lang="en-US" sz="3200" b="1" dirty="0"/>
-                        <a:t>7</a:t>
+                        <a:t>12</a:t>
                       </a:r>
                     </a:p>
                   </a:txBody>
@@ -13388,7 +13374,7 @@
                       <a:pPr algn="ctr"/>
                       <a:r>
                         <a:rPr lang="en-US" sz="3200" b="1" dirty="0"/>
-                        <a:t>9</a:t>
+                        <a:t>4</a:t>
                       </a:r>
                     </a:p>
                   </a:txBody>
@@ -13445,14 +13431,13 @@
           </p:cNvPr>
           <p:cNvCxnSpPr>
             <a:cxnSpLocks/>
-            <a:stCxn id="8" idx="3"/>
           </p:cNvCxnSpPr>
           <p:nvPr/>
         </p:nvCxnSpPr>
         <p:spPr>
           <a:xfrm>
-            <a:off x="2312666" y="1716284"/>
-            <a:ext cx="3665570" cy="4611569"/>
+            <a:off x="2314639" y="3690608"/>
+            <a:ext cx="5581764" cy="2634866"/>
           </a:xfrm>
           <a:prstGeom prst="line">
             <a:avLst/>
@@ -13604,16 +13589,12 @@
           <a:lstStyle/>
           <a:p>
             <a:r>
-              <a:rPr lang="en-US" sz="2800" dirty="0" err="1">
+              <a:rPr lang="en-US" sz="2800" dirty="0">
                 <a:latin typeface="Aharoni" panose="02010803020104030203" pitchFamily="2" charset="-79"/>
                 <a:cs typeface="Aharoni" panose="02010803020104030203" pitchFamily="2" charset="-79"/>
               </a:rPr>
-              <a:t>Popplers</a:t>
+              <a:t>Shirtless</a:t>
             </a:r>
-            <a:endParaRPr lang="en-US" sz="2800" dirty="0">
-              <a:latin typeface="Aharoni" panose="02010803020104030203" pitchFamily="2" charset="-79"/>
-              <a:cs typeface="Aharoni" panose="02010803020104030203" pitchFamily="2" charset="-79"/>
-            </a:endParaRPr>
           </a:p>
         </p:txBody>
       </p:sp>
@@ -13631,8 +13612,8 @@
         </p:nvSpPr>
         <p:spPr>
           <a:xfrm>
-            <a:off x="8910113" y="6087132"/>
-            <a:ext cx="1403288" cy="523220"/>
+            <a:off x="8910112" y="6087132"/>
+            <a:ext cx="1951175" cy="523220"/>
           </a:xfrm>
           <a:prstGeom prst="rect">
             <a:avLst/>
@@ -13646,16 +13627,12 @@
           <a:lstStyle/>
           <a:p>
             <a:r>
-              <a:rPr lang="en-US" sz="2800" dirty="0" err="1">
+              <a:rPr lang="en-US" sz="2800" dirty="0">
                 <a:latin typeface="Aharoni" panose="02010803020104030203" pitchFamily="2" charset="-79"/>
                 <a:cs typeface="Aharoni" panose="02010803020104030203" pitchFamily="2" charset="-79"/>
               </a:rPr>
-              <a:t>Slurm</a:t>
+              <a:t>Sparkling</a:t>
             </a:r>
-            <a:endParaRPr lang="en-US" sz="2800" dirty="0">
-              <a:latin typeface="Aharoni" panose="02010803020104030203" pitchFamily="2" charset="-79"/>
-              <a:cs typeface="Aharoni" panose="02010803020104030203" pitchFamily="2" charset="-79"/>
-            </a:endParaRPr>
           </a:p>
         </p:txBody>
       </p:sp>
@@ -13673,7 +13650,7 @@
         </p:nvSpPr>
         <p:spPr>
           <a:xfrm>
-            <a:off x="1423574" y="1454674"/>
+            <a:off x="1529848" y="3428998"/>
             <a:ext cx="889092" cy="523220"/>
           </a:xfrm>
           <a:prstGeom prst="rect">
@@ -13687,12 +13664,13 @@
           </a:bodyPr>
           <a:lstStyle/>
           <a:p>
+            <a:pPr algn="ctr"/>
             <a:r>
               <a:rPr lang="en-US" sz="2800" dirty="0">
                 <a:latin typeface="Arial Rounded MT Bold" panose="020F0704030504030204" pitchFamily="34" charset="0"/>
                 <a:cs typeface="Aharoni" panose="02010803020104030203" pitchFamily="2" charset="-79"/>
               </a:rPr>
-              <a:t>180</a:t>
+              <a:t>80</a:t>
             </a:r>
           </a:p>
         </p:txBody>
@@ -13711,7 +13689,7 @@
         </p:nvSpPr>
         <p:spPr>
           <a:xfrm>
-            <a:off x="5598813" y="6327853"/>
+            <a:off x="7366112" y="6334780"/>
             <a:ext cx="1060582" cy="523220"/>
           </a:xfrm>
           <a:prstGeom prst="rect">
@@ -13725,12 +13703,13 @@
           </a:bodyPr>
           <a:lstStyle/>
           <a:p>
+            <a:pPr algn="ctr"/>
             <a:r>
               <a:rPr lang="en-US" sz="2800" dirty="0">
                 <a:latin typeface="Arial Rounded MT Bold" panose="020F0704030504030204" pitchFamily="34" charset="0"/>
                 <a:cs typeface="Aharoni" panose="02010803020104030203" pitchFamily="2" charset="-79"/>
               </a:rPr>
-              <a:t>140</a:t>
+              <a:t>240</a:t>
             </a:r>
           </a:p>
         </p:txBody>

</xml_diff>